<commit_message>
[dev/#1]Set the position of the placeholder lower.
</commit_message>
<xml_diff>
--- a/complete-cap.pptx
+++ b/complete-cap.pptx
@@ -3261,7 +3261,7 @@
         </p:nvSpPr>
         <p:spPr>
           <a:xfrm>
-            <a:off x="1712976" y="571500"/>
+            <a:off x="1712976" y="1524000"/>
             <a:ext cx="7112000" cy="1993900"/>
           </a:xfrm>
           <a:prstGeom prst="rect">
@@ -3296,7 +3296,7 @@
         </p:nvSpPr>
         <p:spPr>
           <a:xfrm>
-            <a:off x="1712976" y="3383280"/>
+            <a:off x="1712976" y="4114800"/>
             <a:ext cx="8763000" cy="1993900"/>
           </a:xfrm>
           <a:prstGeom prst="rect">
@@ -3357,7 +3357,7 @@
         </p:nvSpPr>
         <p:spPr>
           <a:xfrm>
-            <a:off x="1712976" y="571500"/>
+            <a:off x="1712976" y="1524000"/>
             <a:ext cx="7112000" cy="1993900"/>
           </a:xfrm>
           <a:prstGeom prst="rect">
@@ -3392,7 +3392,7 @@
         </p:nvSpPr>
         <p:spPr>
           <a:xfrm>
-            <a:off x="1712976" y="3383280"/>
+            <a:off x="1712976" y="4114800"/>
             <a:ext cx="8763000" cy="1993900"/>
           </a:xfrm>
           <a:prstGeom prst="rect">
@@ -3413,7 +3413,7 @@
                 </a:solidFill>
                 <a:latin typeface="MS Mincho"/>
               </a:rPr>
-              <a:t>でも、なぜ？</a:t>
+              <a:t>警部: でも、なぜ？</a:t>
             </a:r>
           </a:p>
           <a:p/>
@@ -3453,7 +3453,7 @@
         </p:nvSpPr>
         <p:spPr>
           <a:xfrm>
-            <a:off x="1712976" y="571500"/>
+            <a:off x="1712976" y="1524000"/>
             <a:ext cx="7112000" cy="1993900"/>
           </a:xfrm>
           <a:prstGeom prst="rect">
@@ -3488,7 +3488,7 @@
         </p:nvSpPr>
         <p:spPr>
           <a:xfrm>
-            <a:off x="1712976" y="3383280"/>
+            <a:off x="1712976" y="4114800"/>
             <a:ext cx="8763000" cy="1993900"/>
           </a:xfrm>
           <a:prstGeom prst="rect">
@@ -3509,7 +3509,7 @@
                 </a:solidFill>
                 <a:latin typeface="MS Mincho"/>
               </a:rPr>
-              <a:t>それって家族の放棄です、しかも悪意のある！</a:t>
+              <a:t>弁護士: なぜ「悪意のある家庭放棄」を知っているのですか？</a:t>
             </a:r>
           </a:p>
           <a:p/>
@@ -3549,7 +3549,7 @@
         </p:nvSpPr>
         <p:spPr>
           <a:xfrm>
-            <a:off x="1712976" y="571500"/>
+            <a:off x="1712976" y="1524000"/>
             <a:ext cx="7112000" cy="1993900"/>
           </a:xfrm>
           <a:prstGeom prst="rect">
@@ -3584,7 +3584,7 @@
         </p:nvSpPr>
         <p:spPr>
           <a:xfrm>
-            <a:off x="1712976" y="3383280"/>
+            <a:off x="1712976" y="4114800"/>
             <a:ext cx="8763000" cy="1993900"/>
           </a:xfrm>
           <a:prstGeom prst="rect">
@@ -3605,7 +3605,7 @@
                 </a:solidFill>
                 <a:latin typeface="MS Mincho"/>
               </a:rPr>
-              <a:t>それで、あなたは、悪意のある家庭の放棄が何なのかをどうして知っているのですか？</a:t>
+              <a:t>マルガリータ: 刑法典一冊買って読みました</a:t>
             </a:r>
           </a:p>
           <a:p/>
@@ -3645,7 +3645,7 @@
         </p:nvSpPr>
         <p:spPr>
           <a:xfrm>
-            <a:off x="1712976" y="571500"/>
+            <a:off x="1712976" y="1524000"/>
             <a:ext cx="7112000" cy="1993900"/>
           </a:xfrm>
           <a:prstGeom prst="rect">
@@ -3680,7 +3680,7 @@
         </p:nvSpPr>
         <p:spPr>
           <a:xfrm>
-            <a:off x="1712976" y="3383280"/>
+            <a:off x="1712976" y="4114800"/>
             <a:ext cx="8763000" cy="1993900"/>
           </a:xfrm>
           <a:prstGeom prst="rect">
@@ -3701,7 +3701,7 @@
                 </a:solidFill>
                 <a:latin typeface="MS Mincho"/>
               </a:rPr>
-              <a:t>刑法典で見ました。一冊買ったのです……。</a:t>
+              <a:t>弁護士: それならどうして専門家を呼ばせに来るのですか？</a:t>
             </a:r>
           </a:p>
           <a:p/>
@@ -3741,7 +3741,7 @@
         </p:nvSpPr>
         <p:spPr>
           <a:xfrm>
-            <a:off x="1712976" y="571500"/>
+            <a:off x="1712976" y="1524000"/>
             <a:ext cx="7112000" cy="1993900"/>
           </a:xfrm>
           <a:prstGeom prst="rect">
@@ -3776,7 +3776,7 @@
         </p:nvSpPr>
         <p:spPr>
           <a:xfrm>
-            <a:off x="1712976" y="3383280"/>
+            <a:off x="1712976" y="4114800"/>
             <a:ext cx="8763000" cy="1993900"/>
           </a:xfrm>
           <a:prstGeom prst="rect">
@@ -3797,7 +3797,7 @@
                 </a:solidFill>
                 <a:latin typeface="MS Mincho"/>
               </a:rPr>
-              <a:t>それならどうして専門家を呼ばせに来るのですか？専門家はね、微妙な意味合いや司法の細かいことをあなたよりもずっとよく知っているし、</a:t>
+              <a:t>弁護士: 専門家はね、微妙な意味合いや司法の細かいことをあなたよりもずっとよく知っているし、</a:t>
             </a:r>
           </a:p>
           <a:p/>
@@ -3837,7 +3837,7 @@
         </p:nvSpPr>
         <p:spPr>
           <a:xfrm>
-            <a:off x="1712976" y="571500"/>
+            <a:off x="1712976" y="1524000"/>
             <a:ext cx="7112000" cy="1993900"/>
           </a:xfrm>
           <a:prstGeom prst="rect">
@@ -3872,7 +3872,7 @@
         </p:nvSpPr>
         <p:spPr>
           <a:xfrm>
-            <a:off x="1712976" y="3383280"/>
+            <a:off x="1712976" y="4114800"/>
             <a:ext cx="8763000" cy="1993900"/>
           </a:xfrm>
           <a:prstGeom prst="rect">
@@ -3893,7 +3893,7 @@
                 </a:solidFill>
                 <a:latin typeface="MS Mincho"/>
               </a:rPr>
-              <a:t>あなたは刑法典を購入して、もう法律がわかった気になっている！</a:t>
+              <a:t>弁護士: あなたは刑法典を購入して、もう法律がわかった気になっている！</a:t>
             </a:r>
           </a:p>
           <a:p/>
@@ -3933,7 +3933,7 @@
         </p:nvSpPr>
         <p:spPr>
           <a:xfrm>
-            <a:off x="1712976" y="571500"/>
+            <a:off x="1712976" y="1524000"/>
             <a:ext cx="7112000" cy="1993900"/>
           </a:xfrm>
           <a:prstGeom prst="rect">
@@ -3968,7 +3968,7 @@
         </p:nvSpPr>
         <p:spPr>
           <a:xfrm>
-            <a:off x="1712976" y="3383280"/>
+            <a:off x="1712976" y="4114800"/>
             <a:ext cx="8763000" cy="1993900"/>
           </a:xfrm>
           <a:prstGeom prst="rect">
@@ -3989,7 +3989,7 @@
                 </a:solidFill>
                 <a:latin typeface="MS Mincho"/>
               </a:rPr>
-              <a:t>それなら、我々弁護士は何のために存在しているのでしょうか？</a:t>
+              <a:t>弁護士: それなら、我々弁護士は何のために存在しているのでしょうか？</a:t>
             </a:r>
           </a:p>
           <a:p/>
@@ -4029,7 +4029,7 @@
         </p:nvSpPr>
         <p:spPr>
           <a:xfrm>
-            <a:off x="1712976" y="571500"/>
+            <a:off x="1712976" y="1524000"/>
             <a:ext cx="7112000" cy="1993900"/>
           </a:xfrm>
           <a:prstGeom prst="rect">
@@ -4064,7 +4064,7 @@
         </p:nvSpPr>
         <p:spPr>
           <a:xfrm>
-            <a:off x="1712976" y="3383280"/>
+            <a:off x="1712976" y="4114800"/>
             <a:ext cx="8763000" cy="1993900"/>
           </a:xfrm>
           <a:prstGeom prst="rect">
@@ -4085,7 +4085,7 @@
                 </a:solidFill>
                 <a:latin typeface="MS Mincho"/>
               </a:rPr>
-              <a:t>離婚というのはそんなふうに簡単に諸求できないということも、ご存知ないのでしょう？</a:t>
+              <a:t>弁護士: 離婚というのはそんなふうに簡単に諸求できないということも、ご存知ないのでしょう？</a:t>
             </a:r>
           </a:p>
           <a:p/>
@@ -4125,7 +4125,7 @@
         </p:nvSpPr>
         <p:spPr>
           <a:xfrm>
-            <a:off x="1712976" y="571500"/>
+            <a:off x="1712976" y="1524000"/>
             <a:ext cx="7112000" cy="1993900"/>
           </a:xfrm>
           <a:prstGeom prst="rect">
@@ -4160,7 +4160,7 @@
         </p:nvSpPr>
         <p:spPr>
           <a:xfrm>
-            <a:off x="1712976" y="3383280"/>
+            <a:off x="1712976" y="4114800"/>
             <a:ext cx="8763000" cy="1993900"/>
           </a:xfrm>
           <a:prstGeom prst="rect">
@@ -4181,7 +4181,7 @@
                 </a:solidFill>
                 <a:latin typeface="MS Mincho"/>
               </a:rPr>
-              <a:t>ご存知ですか？</a:t>
+              <a:t>弁護士: ご存知ですか？</a:t>
             </a:r>
           </a:p>
           <a:p/>
@@ -4221,7 +4221,7 @@
         </p:nvSpPr>
         <p:spPr>
           <a:xfrm>
-            <a:off x="1712976" y="571500"/>
+            <a:off x="1712976" y="1524000"/>
             <a:ext cx="7112000" cy="1993900"/>
           </a:xfrm>
           <a:prstGeom prst="rect">
@@ -4256,7 +4256,7 @@
         </p:nvSpPr>
         <p:spPr>
           <a:xfrm>
-            <a:off x="1712976" y="3383280"/>
+            <a:off x="1712976" y="4114800"/>
             <a:ext cx="8763000" cy="1993900"/>
           </a:xfrm>
           <a:prstGeom prst="rect">
@@ -4277,7 +4277,7 @@
                 </a:solidFill>
                 <a:latin typeface="MS Mincho"/>
               </a:rPr>
-              <a:t>別居の申立書の提出前に告訴しなければならないということは？</a:t>
+              <a:t>弁護士: 別居の申立書の提出前に告訴しなければならないということは？</a:t>
             </a:r>
           </a:p>
           <a:p/>
@@ -4317,7 +4317,7 @@
         </p:nvSpPr>
         <p:spPr>
           <a:xfrm>
-            <a:off x="1712976" y="571500"/>
+            <a:off x="1712976" y="1524000"/>
             <a:ext cx="7112000" cy="1993900"/>
           </a:xfrm>
           <a:prstGeom prst="rect">
@@ -4352,7 +4352,7 @@
         </p:nvSpPr>
         <p:spPr>
           <a:xfrm>
-            <a:off x="1712976" y="3383280"/>
+            <a:off x="1712976" y="4114800"/>
             <a:ext cx="8763000" cy="1993900"/>
           </a:xfrm>
           <a:prstGeom prst="rect">
@@ -4373,7 +4373,7 @@
                 </a:solidFill>
                 <a:latin typeface="MS Mincho"/>
               </a:rPr>
-              <a:t>もう知っています。すでにやってみました。1Hの午後、警察署に行きました。</a:t>
+              <a:t>マルガリータ: 知っています、実際にやってみました</a:t>
             </a:r>
           </a:p>
           <a:p/>
@@ -4413,7 +4413,7 @@
         </p:nvSpPr>
         <p:spPr>
           <a:xfrm>
-            <a:off x="1712976" y="571500"/>
+            <a:off x="1712976" y="1524000"/>
             <a:ext cx="7112000" cy="1993900"/>
           </a:xfrm>
           <a:prstGeom prst="rect">
@@ -4448,7 +4448,7 @@
         </p:nvSpPr>
         <p:spPr>
           <a:xfrm>
-            <a:off x="1712976" y="3383280"/>
+            <a:off x="1712976" y="4114800"/>
             <a:ext cx="8763000" cy="1993900"/>
           </a:xfrm>
           <a:prstGeom prst="rect">
@@ -4509,7 +4509,7 @@
         </p:nvSpPr>
         <p:spPr>
           <a:xfrm>
-            <a:off x="1712976" y="571500"/>
+            <a:off x="1712976" y="1524000"/>
             <a:ext cx="7112000" cy="1993900"/>
           </a:xfrm>
           <a:prstGeom prst="rect">
@@ -4544,7 +4544,7 @@
         </p:nvSpPr>
         <p:spPr>
           <a:xfrm>
-            <a:off x="1712976" y="3383280"/>
+            <a:off x="1712976" y="4114800"/>
             <a:ext cx="8763000" cy="1993900"/>
           </a:xfrm>
           <a:prstGeom prst="rect">
@@ -4565,7 +4565,7 @@
                 </a:solidFill>
                 <a:latin typeface="MS Mincho"/>
               </a:rPr>
-              <a:t>それで、どうなりましたか？</a:t>
+              <a:t>マルガリータ: 昨日の午後、警察署に行きました</a:t>
             </a:r>
           </a:p>
           <a:p/>
@@ -4605,7 +4605,7 @@
         </p:nvSpPr>
         <p:spPr>
           <a:xfrm>
-            <a:off x="1712976" y="571500"/>
+            <a:off x="1712976" y="1524000"/>
             <a:ext cx="7112000" cy="1993900"/>
           </a:xfrm>
           <a:prstGeom prst="rect">
@@ -4640,7 +4640,7 @@
         </p:nvSpPr>
         <p:spPr>
           <a:xfrm>
-            <a:off x="1712976" y="3383280"/>
+            <a:off x="1712976" y="4114800"/>
             <a:ext cx="8763000" cy="1993900"/>
           </a:xfrm>
           <a:prstGeom prst="rect">
@@ -4661,7 +4661,7 @@
                 </a:solidFill>
                 <a:latin typeface="MS Mincho"/>
               </a:rPr>
-              <a:t>告訴を受け入れようとしてくれませんでした。</a:t>
+              <a:t>弁護士: どうなりましたか？</a:t>
             </a:r>
           </a:p>
           <a:p/>
@@ -4701,7 +4701,7 @@
         </p:nvSpPr>
         <p:spPr>
           <a:xfrm>
-            <a:off x="1712976" y="571500"/>
+            <a:off x="1712976" y="1524000"/>
             <a:ext cx="7112000" cy="1993900"/>
           </a:xfrm>
           <a:prstGeom prst="rect">
@@ -4736,7 +4736,7 @@
         </p:nvSpPr>
         <p:spPr>
           <a:xfrm>
-            <a:off x="1712976" y="3383280"/>
+            <a:off x="1712976" y="4114800"/>
             <a:ext cx="8763000" cy="1993900"/>
           </a:xfrm>
           <a:prstGeom prst="rect">
@@ -4757,7 +4757,7 @@
                 </a:solidFill>
                 <a:latin typeface="MS Mincho"/>
               </a:rPr>
-              <a:t>警察署長に、それは馬鹿げたことだと言われました。そのうち主人は戻ってくるから、</a:t>
+              <a:t>マルガリータ: 告訴を受け入れようとしてくれませんでした</a:t>
             </a:r>
           </a:p>
           <a:p/>
@@ -4797,7 +4797,7 @@
         </p:nvSpPr>
         <p:spPr>
           <a:xfrm>
-            <a:off x="1712976" y="571500"/>
+            <a:off x="1712976" y="1524000"/>
             <a:ext cx="7112000" cy="1993900"/>
           </a:xfrm>
           <a:prstGeom prst="rect">
@@ -4832,7 +4832,7 @@
         </p:nvSpPr>
         <p:spPr>
           <a:xfrm>
-            <a:off x="1712976" y="3383280"/>
+            <a:off x="1712976" y="4114800"/>
             <a:ext cx="8763000" cy="1993900"/>
           </a:xfrm>
           <a:prstGeom prst="rect">
@@ -4853,7 +4853,7 @@
                 </a:solidFill>
                 <a:latin typeface="MS Mincho"/>
               </a:rPr>
-              <a:t>それまでに家を掃除して主人のために美味しいご飯を用意しておくようにと言われました。疲れて帰ってくるだろうからと……。</a:t>
+              <a:t>マルガリータ: 警察署長は、それが馬鹿げていると言いました</a:t>
             </a:r>
           </a:p>
           <a:p/>
@@ -4893,7 +4893,7 @@
         </p:nvSpPr>
         <p:spPr>
           <a:xfrm>
-            <a:off x="1712976" y="571500"/>
+            <a:off x="1712976" y="1524000"/>
             <a:ext cx="7112000" cy="1993900"/>
           </a:xfrm>
           <a:prstGeom prst="rect">
@@ -4928,7 +4928,7 @@
         </p:nvSpPr>
         <p:spPr>
           <a:xfrm>
-            <a:off x="1712976" y="3383280"/>
+            <a:off x="1712976" y="4114800"/>
             <a:ext cx="8763000" cy="1993900"/>
           </a:xfrm>
           <a:prstGeom prst="rect">
@@ -4949,7 +4949,7 @@
                 </a:solidFill>
                 <a:latin typeface="MS Mincho"/>
               </a:rPr>
-              <a:t>的確な助言です。</a:t>
+              <a:t>マルガリータ: そのうち主人は戻ってくるから、</a:t>
             </a:r>
           </a:p>
           <a:p/>
@@ -4989,7 +4989,7 @@
         </p:nvSpPr>
         <p:spPr>
           <a:xfrm>
-            <a:off x="1712976" y="571500"/>
+            <a:off x="1712976" y="1524000"/>
             <a:ext cx="7112000" cy="1993900"/>
           </a:xfrm>
           <a:prstGeom prst="rect">
@@ -5024,7 +5024,7 @@
         </p:nvSpPr>
         <p:spPr>
           <a:xfrm>
-            <a:off x="1712976" y="3383280"/>
+            <a:off x="1712976" y="4114800"/>
             <a:ext cx="8763000" cy="1993900"/>
           </a:xfrm>
           <a:prstGeom prst="rect">
@@ -5045,7 +5045,7 @@
                 </a:solidFill>
                 <a:latin typeface="MS Mincho"/>
               </a:rPr>
-              <a:t>いつだって美味しいシチューを前にすれば苦労は和らぎます。</a:t>
+              <a:t>マルガリータ: それまでに家を掃除して主人のために美味しいご飯を用意しておくようにと言われました</a:t>
             </a:r>
           </a:p>
           <a:p/>
@@ -5085,7 +5085,7 @@
         </p:nvSpPr>
         <p:spPr>
           <a:xfrm>
-            <a:off x="1712976" y="571500"/>
+            <a:off x="1712976" y="1524000"/>
             <a:ext cx="7112000" cy="1993900"/>
           </a:xfrm>
           <a:prstGeom prst="rect">
@@ -5120,7 +5120,7 @@
         </p:nvSpPr>
         <p:spPr>
           <a:xfrm>
-            <a:off x="1712976" y="3383280"/>
+            <a:off x="1712976" y="4114800"/>
             <a:ext cx="8763000" cy="1993900"/>
           </a:xfrm>
           <a:prstGeom prst="rect">
@@ -5141,7 +5141,7 @@
                 </a:solidFill>
                 <a:latin typeface="MS Mincho"/>
               </a:rPr>
-              <a:t>もしあなたが献身的に家事に従事し、ご主人を取り戻すことに専念するなら、間違いなくご主人はあなたの心へ戻ってくるでしょう、しかるべくして……。</a:t>
+              <a:t>マルガリータ: 疲れて帰ってくるだろうからと……</a:t>
             </a:r>
           </a:p>
           <a:p/>
@@ -5181,7 +5181,7 @@
         </p:nvSpPr>
         <p:spPr>
           <a:xfrm>
-            <a:off x="1712976" y="571500"/>
+            <a:off x="1712976" y="1524000"/>
             <a:ext cx="7112000" cy="1993900"/>
           </a:xfrm>
           <a:prstGeom prst="rect">
@@ -5216,7 +5216,7 @@
         </p:nvSpPr>
         <p:spPr>
           <a:xfrm>
-            <a:off x="1712976" y="3383280"/>
+            <a:off x="1712976" y="4114800"/>
             <a:ext cx="8763000" cy="1993900"/>
           </a:xfrm>
           <a:prstGeom prst="rect">
@@ -5237,7 +5237,7 @@
                 </a:solidFill>
                 <a:latin typeface="MS Mincho"/>
               </a:rPr>
-              <a:t>弁護士 (ほとんど身動きせずに)出口のところで私の秘書に相談料を払うのをお忘れなく。</a:t>
+              <a:t>弁護士: もっともだ  いつだって美味しいシチューがあれば疲れも取れるでしょう</a:t>
             </a:r>
           </a:p>
           <a:p/>
@@ -5277,7 +5277,7 @@
         </p:nvSpPr>
         <p:spPr>
           <a:xfrm>
-            <a:off x="1712976" y="571500"/>
+            <a:off x="1712976" y="1524000"/>
             <a:ext cx="7112000" cy="1993900"/>
           </a:xfrm>
           <a:prstGeom prst="rect">
@@ -5312,7 +5312,7 @@
         </p:nvSpPr>
         <p:spPr>
           <a:xfrm>
-            <a:off x="1712976" y="3383280"/>
+            <a:off x="1712976" y="4114800"/>
             <a:ext cx="8763000" cy="1993900"/>
           </a:xfrm>
           <a:prstGeom prst="rect">
@@ -5333,7 +5333,7 @@
                 </a:solidFill>
                 <a:latin typeface="MS Mincho"/>
               </a:rPr>
-              <a:t>第三場</a:t>
+              <a:t>弁護士: あなたが真面目に家事をして夫を取り戻す努力をすれば、間違いなく戻ってくるでしょう、そして……</a:t>
             </a:r>
           </a:p>
           <a:p/>
@@ -5373,7 +5373,7 @@
         </p:nvSpPr>
         <p:spPr>
           <a:xfrm>
-            <a:off x="1712976" y="571500"/>
+            <a:off x="1712976" y="1524000"/>
             <a:ext cx="7112000" cy="1993900"/>
           </a:xfrm>
           <a:prstGeom prst="rect">
@@ -5408,7 +5408,7 @@
         </p:nvSpPr>
         <p:spPr>
           <a:xfrm>
-            <a:off x="1712976" y="3383280"/>
+            <a:off x="1712976" y="4114800"/>
             <a:ext cx="8763000" cy="1993900"/>
           </a:xfrm>
           <a:prstGeom prst="rect">
@@ -5429,7 +5429,7 @@
                 </a:solidFill>
                 <a:latin typeface="MS Mincho"/>
               </a:rPr>
-              <a:t>どなたですか？</a:t>
+              <a:t>弁護士: 出口で私の秘書に相談料を払うのをお忘れなく！</a:t>
             </a:r>
           </a:p>
           <a:p/>
@@ -5469,7 +5469,7 @@
         </p:nvSpPr>
         <p:spPr>
           <a:xfrm>
-            <a:off x="1712976" y="571500"/>
+            <a:off x="1712976" y="1524000"/>
             <a:ext cx="7112000" cy="1993900"/>
           </a:xfrm>
           <a:prstGeom prst="rect">
@@ -5504,7 +5504,7 @@
         </p:nvSpPr>
         <p:spPr>
           <a:xfrm>
-            <a:off x="1712976" y="3383280"/>
+            <a:off x="1712976" y="4114800"/>
             <a:ext cx="8763000" cy="1993900"/>
           </a:xfrm>
           <a:prstGeom prst="rect">
@@ -5525,7 +5525,7 @@
                 </a:solidFill>
                 <a:latin typeface="MS Mincho"/>
               </a:rPr>
-              <a:t>もちろんです！</a:t>
+              <a:t>警部: もちろんです！</a:t>
             </a:r>
           </a:p>
           <a:p/>
@@ -5565,7 +5565,7 @@
         </p:nvSpPr>
         <p:spPr>
           <a:xfrm>
-            <a:off x="1712976" y="571500"/>
+            <a:off x="1712976" y="1524000"/>
             <a:ext cx="7112000" cy="1993900"/>
           </a:xfrm>
           <a:prstGeom prst="rect">
@@ -5600,7 +5600,7 @@
         </p:nvSpPr>
         <p:spPr>
           <a:xfrm>
-            <a:off x="1712976" y="3383280"/>
+            <a:off x="1712976" y="4114800"/>
             <a:ext cx="8763000" cy="1993900"/>
           </a:xfrm>
           <a:prstGeom prst="rect">
@@ -5621,7 +5621,7 @@
                 </a:solidFill>
                 <a:latin typeface="MS Mincho"/>
               </a:rPr>
-              <a:t>マリアサンチェスです。精神科医との予約があります。</a:t>
+              <a:t>第三場</a:t>
             </a:r>
           </a:p>
           <a:p/>
@@ -5661,7 +5661,7 @@
         </p:nvSpPr>
         <p:spPr>
           <a:xfrm>
-            <a:off x="1712976" y="571500"/>
+            <a:off x="1712976" y="1524000"/>
             <a:ext cx="7112000" cy="1993900"/>
           </a:xfrm>
           <a:prstGeom prst="rect">
@@ -5696,7 +5696,7 @@
         </p:nvSpPr>
         <p:spPr>
           <a:xfrm>
-            <a:off x="1712976" y="3383280"/>
+            <a:off x="1712976" y="4114800"/>
             <a:ext cx="8763000" cy="1993900"/>
           </a:xfrm>
           <a:prstGeom prst="rect">
@@ -5717,7 +5717,7 @@
                 </a:solidFill>
                 <a:latin typeface="MS Mincho"/>
               </a:rPr>
-              <a:t>少々お待ちください。</a:t>
+              <a:t>声: どなたですか？</a:t>
             </a:r>
           </a:p>
           <a:p/>
@@ -5757,7 +5757,7 @@
         </p:nvSpPr>
         <p:spPr>
           <a:xfrm>
-            <a:off x="1712976" y="571500"/>
+            <a:off x="1712976" y="1524000"/>
             <a:ext cx="7112000" cy="1993900"/>
           </a:xfrm>
           <a:prstGeom prst="rect">
@@ -5792,7 +5792,7 @@
         </p:nvSpPr>
         <p:spPr>
           <a:xfrm>
-            <a:off x="1712976" y="3383280"/>
+            <a:off x="1712976" y="4114800"/>
             <a:ext cx="8763000" cy="1993900"/>
           </a:xfrm>
           <a:prstGeom prst="rect">
@@ -5813,7 +5813,7 @@
                 </a:solidFill>
                 <a:latin typeface="MS Mincho"/>
               </a:rPr>
-              <a:t>ポストに5000ぺセタ入れてください。</a:t>
+              <a:t>マリア: マリアサンチェスです 精神科医との予約があります</a:t>
             </a:r>
           </a:p>
           <a:p/>
@@ -5853,7 +5853,7 @@
         </p:nvSpPr>
         <p:spPr>
           <a:xfrm>
-            <a:off x="1712976" y="571500"/>
+            <a:off x="1712976" y="1524000"/>
             <a:ext cx="7112000" cy="1993900"/>
           </a:xfrm>
           <a:prstGeom prst="rect">
@@ -5888,7 +5888,7 @@
         </p:nvSpPr>
         <p:spPr>
           <a:xfrm>
-            <a:off x="1712976" y="3383280"/>
+            <a:off x="1712976" y="4114800"/>
             <a:ext cx="8763000" cy="1993900"/>
           </a:xfrm>
           <a:prstGeom prst="rect">
@@ -5909,7 +5909,7 @@
                 </a:solidFill>
                 <a:latin typeface="MS Mincho"/>
               </a:rPr>
-              <a:t>受話器を取って3番を押してください。</a:t>
+              <a:t>声: 少々お待ちください</a:t>
             </a:r>
           </a:p>
           <a:p/>
@@ -5949,7 +5949,7 @@
         </p:nvSpPr>
         <p:spPr>
           <a:xfrm>
-            <a:off x="1712976" y="571500"/>
+            <a:off x="1712976" y="1524000"/>
             <a:ext cx="7112000" cy="1993900"/>
           </a:xfrm>
           <a:prstGeom prst="rect">
@@ -5984,7 +5984,7 @@
         </p:nvSpPr>
         <p:spPr>
           <a:xfrm>
-            <a:off x="1712976" y="3383280"/>
+            <a:off x="1712976" y="4114800"/>
             <a:ext cx="8763000" cy="1993900"/>
           </a:xfrm>
           <a:prstGeom prst="rect">
@@ -6005,7 +6005,7 @@
                 </a:solidFill>
                 <a:latin typeface="MS Mincho"/>
               </a:rPr>
-              <a:t>もしもし。</a:t>
+              <a:t>声: ポストに5000ぺセタ入れてください</a:t>
             </a:r>
           </a:p>
           <a:p/>
@@ -6045,7 +6045,7 @@
         </p:nvSpPr>
         <p:spPr>
           <a:xfrm>
-            <a:off x="1712976" y="571500"/>
+            <a:off x="1712976" y="1524000"/>
             <a:ext cx="7112000" cy="1993900"/>
           </a:xfrm>
           <a:prstGeom prst="rect">
@@ -6080,7 +6080,7 @@
         </p:nvSpPr>
         <p:spPr>
           <a:xfrm>
-            <a:off x="1712976" y="3383280"/>
+            <a:off x="1712976" y="4114800"/>
             <a:ext cx="8763000" cy="1993900"/>
           </a:xfrm>
           <a:prstGeom prst="rect">
@@ -6101,7 +6101,7 @@
                 </a:solidFill>
                 <a:latin typeface="MS Mincho"/>
               </a:rPr>
-              <a:t>マリアサンチェスです。精神科医との予約があります…。</a:t>
+              <a:t>声: 受話器を取って3番を押してください</a:t>
             </a:r>
           </a:p>
           <a:p/>
@@ -6141,7 +6141,7 @@
         </p:nvSpPr>
         <p:spPr>
           <a:xfrm>
-            <a:off x="1712976" y="571500"/>
+            <a:off x="1712976" y="1524000"/>
             <a:ext cx="7112000" cy="1993900"/>
           </a:xfrm>
           <a:prstGeom prst="rect">
@@ -6176,7 +6176,7 @@
         </p:nvSpPr>
         <p:spPr>
           <a:xfrm>
-            <a:off x="1712976" y="3383280"/>
+            <a:off x="1712976" y="4114800"/>
             <a:ext cx="8763000" cy="1993900"/>
           </a:xfrm>
           <a:prstGeom prst="rect">
@@ -6197,7 +6197,7 @@
                 </a:solidFill>
                 <a:latin typeface="MS Mincho"/>
               </a:rPr>
-              <a:t>ではどうぞ。</a:t>
+              <a:t>声: もしもし</a:t>
             </a:r>
           </a:p>
           <a:p/>
@@ -6237,7 +6237,7 @@
         </p:nvSpPr>
         <p:spPr>
           <a:xfrm>
-            <a:off x="1712976" y="571500"/>
+            <a:off x="1712976" y="1524000"/>
             <a:ext cx="7112000" cy="1993900"/>
           </a:xfrm>
           <a:prstGeom prst="rect">
@@ -6272,7 +6272,7 @@
         </p:nvSpPr>
         <p:spPr>
           <a:xfrm>
-            <a:off x="1712976" y="3383280"/>
+            <a:off x="1712976" y="4114800"/>
             <a:ext cx="8763000" cy="1993900"/>
           </a:xfrm>
           <a:prstGeom prst="rect">
@@ -6293,7 +6293,7 @@
                 </a:solidFill>
                 <a:latin typeface="MS Mincho"/>
               </a:rPr>
-              <a:t>もしもし。</a:t>
+              <a:t>マリア: マリアサンチェスです 精神科医との予約があります…</a:t>
             </a:r>
           </a:p>
           <a:p/>
@@ -6333,7 +6333,7 @@
         </p:nvSpPr>
         <p:spPr>
           <a:xfrm>
-            <a:off x="1712976" y="571500"/>
+            <a:off x="1712976" y="1524000"/>
             <a:ext cx="7112000" cy="1993900"/>
           </a:xfrm>
           <a:prstGeom prst="rect">
@@ -6368,7 +6368,7 @@
         </p:nvSpPr>
         <p:spPr>
           <a:xfrm>
-            <a:off x="1712976" y="3383280"/>
+            <a:off x="1712976" y="4114800"/>
             <a:ext cx="8763000" cy="1993900"/>
           </a:xfrm>
           <a:prstGeom prst="rect">
@@ -6389,7 +6389,7 @@
                 </a:solidFill>
                 <a:latin typeface="MS Mincho"/>
               </a:rPr>
-              <a:t>面談をお願いします。気分がかなり落ち込んでいます...。 </a:t>
+              <a:t>声: ではどうぞ</a:t>
             </a:r>
           </a:p>
           <a:p/>
@@ -6429,7 +6429,7 @@
         </p:nvSpPr>
         <p:spPr>
           <a:xfrm>
-            <a:off x="1712976" y="571500"/>
+            <a:off x="1712976" y="1524000"/>
             <a:ext cx="7112000" cy="1993900"/>
           </a:xfrm>
           <a:prstGeom prst="rect">
@@ -6464,7 +6464,7 @@
         </p:nvSpPr>
         <p:spPr>
           <a:xfrm>
-            <a:off x="1712976" y="3383280"/>
+            <a:off x="1712976" y="4114800"/>
             <a:ext cx="8763000" cy="1993900"/>
           </a:xfrm>
           <a:prstGeom prst="rect">
@@ -6485,7 +6485,7 @@
                 </a:solidFill>
                 <a:latin typeface="MS Mincho"/>
               </a:rPr>
-              <a:t>どうしてですか? </a:t>
+              <a:t>声: もしもし</a:t>
             </a:r>
           </a:p>
           <a:p/>
@@ -6525,7 +6525,7 @@
         </p:nvSpPr>
         <p:spPr>
           <a:xfrm>
-            <a:off x="1712976" y="571500"/>
+            <a:off x="1712976" y="1524000"/>
             <a:ext cx="7112000" cy="1993900"/>
           </a:xfrm>
           <a:prstGeom prst="rect">
@@ -6560,7 +6560,7 @@
         </p:nvSpPr>
         <p:spPr>
           <a:xfrm>
-            <a:off x="1712976" y="3383280"/>
+            <a:off x="1712976" y="4114800"/>
             <a:ext cx="8763000" cy="1993900"/>
           </a:xfrm>
           <a:prstGeom prst="rect">
@@ -6581,7 +6581,7 @@
                 </a:solidFill>
                 <a:latin typeface="MS Mincho"/>
               </a:rPr>
-              <a:t>じゃなかったら何なんです？</a:t>
+              <a:t>警部: じゃなかったら何なんです？</a:t>
             </a:r>
           </a:p>
           <a:p/>
@@ -6621,7 +6621,7 @@
         </p:nvSpPr>
         <p:spPr>
           <a:xfrm>
-            <a:off x="1712976" y="571500"/>
+            <a:off x="1712976" y="1524000"/>
             <a:ext cx="7112000" cy="1993900"/>
           </a:xfrm>
           <a:prstGeom prst="rect">
@@ -6656,7 +6656,7 @@
         </p:nvSpPr>
         <p:spPr>
           <a:xfrm>
-            <a:off x="1712976" y="3383280"/>
+            <a:off x="1712976" y="4114800"/>
             <a:ext cx="8763000" cy="1993900"/>
           </a:xfrm>
           <a:prstGeom prst="rect">
@@ -6677,7 +6677,7 @@
                 </a:solidFill>
                 <a:latin typeface="MS Mincho"/>
               </a:rPr>
-              <a:t>愛人に捨てられました。 </a:t>
+              <a:t>マリア: 面談をお願いします 気分がかなり落ち込んでいます...</a:t>
             </a:r>
           </a:p>
           <a:p/>
@@ -6717,7 +6717,7 @@
         </p:nvSpPr>
         <p:spPr>
           <a:xfrm>
-            <a:off x="1712976" y="571500"/>
+            <a:off x="1712976" y="1524000"/>
             <a:ext cx="7112000" cy="1993900"/>
           </a:xfrm>
           <a:prstGeom prst="rect">
@@ -6752,7 +6752,7 @@
         </p:nvSpPr>
         <p:spPr>
           <a:xfrm>
-            <a:off x="1712976" y="3383280"/>
+            <a:off x="1712976" y="4114800"/>
             <a:ext cx="8763000" cy="1993900"/>
           </a:xfrm>
           <a:prstGeom prst="rect">
@@ -6773,7 +6773,7 @@
                 </a:solidFill>
                 <a:latin typeface="MS Mincho"/>
               </a:rPr>
-              <a:t>愛人ですか、それともご主人ですか?</a:t>
+              <a:t>声: どうしてですか? </a:t>
             </a:r>
           </a:p>
           <a:p/>
@@ -6813,7 +6813,7 @@
         </p:nvSpPr>
         <p:spPr>
           <a:xfrm>
-            <a:off x="1712976" y="571500"/>
+            <a:off x="1712976" y="1524000"/>
             <a:ext cx="7112000" cy="1993900"/>
           </a:xfrm>
           <a:prstGeom prst="rect">
@@ -6848,7 +6848,7 @@
         </p:nvSpPr>
         <p:spPr>
           <a:xfrm>
-            <a:off x="1712976" y="3383280"/>
+            <a:off x="1712976" y="4114800"/>
             <a:ext cx="8763000" cy="1993900"/>
           </a:xfrm>
           <a:prstGeom prst="rect">
@@ -6869,7 +6869,7 @@
                 </a:solidFill>
                 <a:latin typeface="MS Mincho"/>
               </a:rPr>
-              <a:t>愛人です。彼は結婚しています。 </a:t>
+              <a:t>マリア: 愛人に捨てられました</a:t>
             </a:r>
           </a:p>
           <a:p/>
@@ -6909,7 +6909,7 @@
         </p:nvSpPr>
         <p:spPr>
           <a:xfrm>
-            <a:off x="1712976" y="571500"/>
+            <a:off x="1712976" y="1524000"/>
             <a:ext cx="7112000" cy="1993900"/>
           </a:xfrm>
           <a:prstGeom prst="rect">
@@ -6944,7 +6944,7 @@
         </p:nvSpPr>
         <p:spPr>
           <a:xfrm>
-            <a:off x="1712976" y="3383280"/>
+            <a:off x="1712976" y="4114800"/>
             <a:ext cx="8763000" cy="1993900"/>
           </a:xfrm>
           <a:prstGeom prst="rect">
@@ -6965,7 +6965,7 @@
                 </a:solidFill>
                 <a:latin typeface="MS Mincho"/>
               </a:rPr>
-              <a:t>そのような乱れた関係は、あなたが未熟な女性で、まだ口答期を乗り越 えていないことの証です。 </a:t>
+              <a:t>声: 愛人ですか、それともご主人ですか?</a:t>
             </a:r>
           </a:p>
           <a:p/>
@@ -7005,7 +7005,7 @@
         </p:nvSpPr>
         <p:spPr>
           <a:xfrm>
-            <a:off x="1712976" y="571500"/>
+            <a:off x="1712976" y="1524000"/>
             <a:ext cx="7112000" cy="1993900"/>
           </a:xfrm>
           <a:prstGeom prst="rect">
@@ -7040,7 +7040,7 @@
         </p:nvSpPr>
         <p:spPr>
           <a:xfrm>
-            <a:off x="1712976" y="3383280"/>
+            <a:off x="1712976" y="4114800"/>
             <a:ext cx="8763000" cy="1993900"/>
           </a:xfrm>
           <a:prstGeom prst="rect">
@@ -7061,7 +7061,7 @@
                 </a:solidFill>
                 <a:latin typeface="MS Mincho"/>
               </a:rPr>
-              <a:t>彼、奥さんと別れて私と暮らすと言い ました。 </a:t>
+              <a:t>マリア: 愛人です 彼は結婚しています</a:t>
             </a:r>
           </a:p>
           <a:p/>
@@ -7101,7 +7101,7 @@
         </p:nvSpPr>
         <p:spPr>
           <a:xfrm>
-            <a:off x="1712976" y="571500"/>
+            <a:off x="1712976" y="1524000"/>
             <a:ext cx="7112000" cy="1993900"/>
           </a:xfrm>
           <a:prstGeom prst="rect">
@@ -7136,7 +7136,7 @@
         </p:nvSpPr>
         <p:spPr>
           <a:xfrm>
-            <a:off x="1712976" y="3383280"/>
+            <a:off x="1712976" y="4114800"/>
             <a:ext cx="8763000" cy="1993900"/>
           </a:xfrm>
           <a:prstGeom prst="rect">
@@ -7157,7 +7157,7 @@
                 </a:solidFill>
                 <a:latin typeface="MS Mincho"/>
               </a:rPr>
-              <a:t>あなたは保護を必要としています。あなたはその男性に父親像を見ているのです。</a:t>
+              <a:t>声: そんな乱れた関係は、あなたが未熟で、まだ口答期を乗り越えていない証拠です</a:t>
             </a:r>
           </a:p>
           <a:p/>
@@ -7197,7 +7197,7 @@
         </p:nvSpPr>
         <p:spPr>
           <a:xfrm>
-            <a:off x="1712976" y="571500"/>
+            <a:off x="1712976" y="1524000"/>
             <a:ext cx="7112000" cy="1993900"/>
           </a:xfrm>
           <a:prstGeom prst="rect">
@@ -7232,7 +7232,7 @@
         </p:nvSpPr>
         <p:spPr>
           <a:xfrm>
-            <a:off x="1712976" y="3383280"/>
+            <a:off x="1712976" y="4114800"/>
             <a:ext cx="8763000" cy="1993900"/>
           </a:xfrm>
           <a:prstGeom prst="rect">
@@ -7253,7 +7253,7 @@
                 </a:solidFill>
                 <a:latin typeface="MS Mincho"/>
               </a:rPr>
-              <a:t>あなたは幼児段階に留まっているのです。</a:t>
+              <a:t>マリア: 彼、奥さんと別れて私と暮らすと言い ました</a:t>
             </a:r>
           </a:p>
           <a:p/>
@@ -7293,7 +7293,7 @@
         </p:nvSpPr>
         <p:spPr>
           <a:xfrm>
-            <a:off x="1712976" y="571500"/>
+            <a:off x="1712976" y="1524000"/>
             <a:ext cx="7112000" cy="1993900"/>
           </a:xfrm>
           <a:prstGeom prst="rect">
@@ -7328,7 +7328,7 @@
         </p:nvSpPr>
         <p:spPr>
           <a:xfrm>
-            <a:off x="1712976" y="3383280"/>
+            <a:off x="1712976" y="4114800"/>
             <a:ext cx="8763000" cy="1993900"/>
           </a:xfrm>
           <a:prstGeom prst="rect">
@@ -7349,7 +7349,7 @@
                 </a:solidFill>
                 <a:latin typeface="MS Mincho"/>
               </a:rPr>
-              <a:t>エディプスコンプレックスを克服しておらず、あなたの愛人を代理にして父親への愛を達成しようとしています。 </a:t>
+              <a:t>声: あなたは保護を必要としています あなたはその男性に父親像を見ているのです</a:t>
             </a:r>
           </a:p>
           <a:p/>
@@ -7389,7 +7389,7 @@
         </p:nvSpPr>
         <p:spPr>
           <a:xfrm>
-            <a:off x="1712976" y="571500"/>
+            <a:off x="1712976" y="1524000"/>
             <a:ext cx="7112000" cy="1993900"/>
           </a:xfrm>
           <a:prstGeom prst="rect">
@@ -7424,7 +7424,7 @@
         </p:nvSpPr>
         <p:spPr>
           <a:xfrm>
-            <a:off x="1712976" y="3383280"/>
+            <a:off x="1712976" y="4114800"/>
             <a:ext cx="8763000" cy="1993900"/>
           </a:xfrm>
           <a:prstGeom prst="rect">
@@ -7445,7 +7445,7 @@
                 </a:solidFill>
                 <a:latin typeface="MS Mincho"/>
               </a:rPr>
-              <a:t>いや、どうかしら...。彼はいつも奥さんが理解してくれないと文句を言ってました。</a:t>
+              <a:t>声: あなたは幼児段階に留まっているのです</a:t>
             </a:r>
           </a:p>
           <a:p/>
@@ -7485,7 +7485,7 @@
         </p:nvSpPr>
         <p:spPr>
           <a:xfrm>
-            <a:off x="1712976" y="571500"/>
+            <a:off x="1712976" y="1524000"/>
             <a:ext cx="7112000" cy="1993900"/>
           </a:xfrm>
           <a:prstGeom prst="rect">
@@ -7520,7 +7520,7 @@
         </p:nvSpPr>
         <p:spPr>
           <a:xfrm>
-            <a:off x="1712976" y="3383280"/>
+            <a:off x="1712976" y="4114800"/>
             <a:ext cx="8763000" cy="1993900"/>
           </a:xfrm>
           <a:prstGeom prst="rect">
@@ -7541,7 +7541,7 @@
                 </a:solidFill>
                 <a:latin typeface="MS Mincho"/>
               </a:rPr>
-              <a:t>私が彼の世話をして甘えさせてあげました。</a:t>
+              <a:t>声: エディプスコンプレックスを克服しておらず、あなたの愛人を使って父親への愛を達成しようとしています</a:t>
             </a:r>
           </a:p>
           <a:p/>
@@ -7581,7 +7581,7 @@
         </p:nvSpPr>
         <p:spPr>
           <a:xfrm>
-            <a:off x="1712976" y="571500"/>
+            <a:off x="1712976" y="1524000"/>
             <a:ext cx="7112000" cy="1993900"/>
           </a:xfrm>
           <a:prstGeom prst="rect">
@@ -7616,7 +7616,7 @@
         </p:nvSpPr>
         <p:spPr>
           <a:xfrm>
-            <a:off x="1712976" y="3383280"/>
+            <a:off x="1712976" y="4114800"/>
             <a:ext cx="8763000" cy="1993900"/>
           </a:xfrm>
           <a:prstGeom prst="rect">
@@ -7677,7 +7677,7 @@
         </p:nvSpPr>
         <p:spPr>
           <a:xfrm>
-            <a:off x="1712976" y="571500"/>
+            <a:off x="1712976" y="1524000"/>
             <a:ext cx="7112000" cy="1993900"/>
           </a:xfrm>
           <a:prstGeom prst="rect">
@@ -7712,7 +7712,7 @@
         </p:nvSpPr>
         <p:spPr>
           <a:xfrm>
-            <a:off x="1712976" y="3383280"/>
+            <a:off x="1712976" y="4114800"/>
             <a:ext cx="8763000" cy="1993900"/>
           </a:xfrm>
           <a:prstGeom prst="rect">
@@ -7733,7 +7733,7 @@
                 </a:solidFill>
                 <a:latin typeface="MS Mincho"/>
               </a:rPr>
-              <a:t>だって、彼はいつだって愛情不足で、私みたいに世話をしてくれる人 はいないって言ってましたから。</a:t>
+              <a:t>マリア: いや、どうかしら... 彼はいつも奥さんが理解してくれないと文句を言ってました</a:t>
             </a:r>
           </a:p>
           <a:p/>
@@ -7773,7 +7773,7 @@
         </p:nvSpPr>
         <p:spPr>
           <a:xfrm>
-            <a:off x="1712976" y="571500"/>
+            <a:off x="1712976" y="1524000"/>
             <a:ext cx="7112000" cy="1993900"/>
           </a:xfrm>
           <a:prstGeom prst="rect">
@@ -7808,7 +7808,7 @@
         </p:nvSpPr>
         <p:spPr>
           <a:xfrm>
-            <a:off x="1712976" y="3383280"/>
+            <a:off x="1712976" y="4114800"/>
             <a:ext cx="8763000" cy="1993900"/>
           </a:xfrm>
           <a:prstGeom prst="rect">
@@ -7829,7 +7829,7 @@
                 </a:solidFill>
                 <a:latin typeface="MS Mincho"/>
               </a:rPr>
-              <a:t>イオカステのコンプレックスです。満足していない母性本能。あなたは子供が欲しいのです。</a:t>
+              <a:t>マリア: 私が彼の世話をして甘えさせてあげました</a:t>
             </a:r>
           </a:p>
           <a:p/>
@@ -7869,7 +7869,7 @@
         </p:nvSpPr>
         <p:spPr>
           <a:xfrm>
-            <a:off x="1712976" y="571500"/>
+            <a:off x="1712976" y="1524000"/>
             <a:ext cx="7112000" cy="1993900"/>
           </a:xfrm>
           <a:prstGeom prst="rect">
@@ -7904,7 +7904,7 @@
         </p:nvSpPr>
         <p:spPr>
           <a:xfrm>
-            <a:off x="1712976" y="3383280"/>
+            <a:off x="1712976" y="4114800"/>
             <a:ext cx="8763000" cy="1993900"/>
           </a:xfrm>
           <a:prstGeom prst="rect">
@@ -7925,7 +7925,7 @@
                 </a:solidFill>
                 <a:latin typeface="MS Mincho"/>
               </a:rPr>
-              <a:t>今は欲しくないです、彼には子供が何人もいて、奥さんとその子供達を養わなければならないからです。</a:t>
+              <a:t>マリア: だって、彼はいつだって愛情不足で、私みたいに世話をしてくれる人 はいないって言ってましたから</a:t>
             </a:r>
           </a:p>
           <a:p/>
@@ -7965,7 +7965,7 @@
         </p:nvSpPr>
         <p:spPr>
           <a:xfrm>
-            <a:off x="1712976" y="571500"/>
+            <a:off x="1712976" y="1524000"/>
             <a:ext cx="7112000" cy="1993900"/>
           </a:xfrm>
           <a:prstGeom prst="rect">
@@ -8000,7 +8000,7 @@
         </p:nvSpPr>
         <p:spPr>
           <a:xfrm>
-            <a:off x="1712976" y="3383280"/>
+            <a:off x="1712976" y="4114800"/>
             <a:ext cx="8763000" cy="1993900"/>
           </a:xfrm>
           <a:prstGeom prst="rect">
@@ -8021,7 +8021,7 @@
                 </a:solidFill>
                 <a:latin typeface="MS Mincho"/>
               </a:rPr>
-              <a:t>いつもお金に困っていました。</a:t>
+              <a:t>声: イオカステのコンプレックス、満足していない母性本能です あなたは子供が欲しいのです</a:t>
             </a:r>
           </a:p>
           <a:p/>
@@ -8061,7 +8061,7 @@
         </p:nvSpPr>
         <p:spPr>
           <a:xfrm>
-            <a:off x="1712976" y="571500"/>
+            <a:off x="1712976" y="1524000"/>
             <a:ext cx="7112000" cy="1993900"/>
           </a:xfrm>
           <a:prstGeom prst="rect">
@@ -8096,7 +8096,7 @@
         </p:nvSpPr>
         <p:spPr>
           <a:xfrm>
-            <a:off x="1712976" y="3383280"/>
+            <a:off x="1712976" y="4114800"/>
             <a:ext cx="8763000" cy="1993900"/>
           </a:xfrm>
           <a:prstGeom prst="rect">
@@ -8117,7 +8117,7 @@
                 </a:solidFill>
                 <a:latin typeface="MS Mincho"/>
               </a:rPr>
-              <a:t>私は自分の分は自分 で払わなければなりませんでした・・・・・・。</a:t>
+              <a:t>マリア: 今は欲しくないです、彼は子沢山で、奥さんとその子供達を養わなければならないからです</a:t>
             </a:r>
           </a:p>
           <a:p/>
@@ -8157,7 +8157,7 @@
         </p:nvSpPr>
         <p:spPr>
           <a:xfrm>
-            <a:off x="1712976" y="571500"/>
+            <a:off x="1712976" y="1524000"/>
             <a:ext cx="7112000" cy="1993900"/>
           </a:xfrm>
           <a:prstGeom prst="rect">
@@ -8192,7 +8192,7 @@
         </p:nvSpPr>
         <p:spPr>
           <a:xfrm>
-            <a:off x="1712976" y="3383280"/>
+            <a:off x="1712976" y="4114800"/>
             <a:ext cx="8763000" cy="1993900"/>
           </a:xfrm>
           <a:prstGeom prst="rect">
@@ -8213,7 +8213,7 @@
                 </a:solidFill>
                 <a:latin typeface="MS Mincho"/>
               </a:rPr>
-              <a:t>どうして彼はあなたを捨てたのですか?</a:t>
+              <a:t>マリア: いつもお金に困っていました</a:t>
             </a:r>
           </a:p>
           <a:p/>
@@ -8253,7 +8253,7 @@
         </p:nvSpPr>
         <p:spPr>
           <a:xfrm>
-            <a:off x="1712976" y="571500"/>
+            <a:off x="1712976" y="1524000"/>
             <a:ext cx="7112000" cy="1993900"/>
           </a:xfrm>
           <a:prstGeom prst="rect">
@@ -8288,7 +8288,7 @@
         </p:nvSpPr>
         <p:spPr>
           <a:xfrm>
-            <a:off x="1712976" y="3383280"/>
+            <a:off x="1712976" y="4114800"/>
             <a:ext cx="8763000" cy="1993900"/>
           </a:xfrm>
           <a:prstGeom prst="rect">
@@ -8309,7 +8309,7 @@
                 </a:solidFill>
                 <a:latin typeface="MS Mincho"/>
               </a:rPr>
-              <a:t>何の説明もしてくれませんでした…。きっと別の女と付き合っているんだわ。</a:t>
+              <a:t>マリア: 私は自分の分は自分 で払わなければなりませんでした...</a:t>
             </a:r>
           </a:p>
           <a:p/>
@@ -8349,7 +8349,7 @@
         </p:nvSpPr>
         <p:spPr>
           <a:xfrm>
-            <a:off x="1712976" y="571500"/>
+            <a:off x="1712976" y="1524000"/>
             <a:ext cx="7112000" cy="1993900"/>
           </a:xfrm>
           <a:prstGeom prst="rect">
@@ -8384,7 +8384,7 @@
         </p:nvSpPr>
         <p:spPr>
           <a:xfrm>
-            <a:off x="1712976" y="3383280"/>
+            <a:off x="1712976" y="4114800"/>
             <a:ext cx="8763000" cy="1993900"/>
           </a:xfrm>
           <a:prstGeom prst="rect">
@@ -8405,7 +8405,7 @@
                 </a:solidFill>
                 <a:latin typeface="MS Mincho"/>
               </a:rPr>
-              <a:t>短い手紙一枚で私に別れを告げて、プレゼントしてくれたダイヤモンドの指輪だって持っていってしまった。</a:t>
+              <a:t>声: どうして彼はあなたを捨てたのですか?</a:t>
             </a:r>
           </a:p>
           <a:p/>
@@ -8445,7 +8445,7 @@
         </p:nvSpPr>
         <p:spPr>
           <a:xfrm>
-            <a:off x="1712976" y="571500"/>
+            <a:off x="1712976" y="1524000"/>
             <a:ext cx="7112000" cy="1993900"/>
           </a:xfrm>
           <a:prstGeom prst="rect">
@@ -8480,7 +8480,7 @@
         </p:nvSpPr>
         <p:spPr>
           <a:xfrm>
-            <a:off x="1712976" y="3383280"/>
+            <a:off x="1712976" y="4114800"/>
             <a:ext cx="8763000" cy="1993900"/>
           </a:xfrm>
           <a:prstGeom prst="rect">
@@ -8501,7 +8501,7 @@
                 </a:solidFill>
                 <a:latin typeface="MS Mincho"/>
               </a:rPr>
-              <a:t>彼が出て行ってから気づいたわ、宝石箱から取っいったのね。</a:t>
+              <a:t>マリア: 何の説明もしてくれませんでした… きっと別の女と付き合っているんだわ</a:t>
             </a:r>
           </a:p>
           <a:p/>
@@ -8541,7 +8541,7 @@
         </p:nvSpPr>
         <p:spPr>
           <a:xfrm>
-            <a:off x="1712976" y="571500"/>
+            <a:off x="1712976" y="1524000"/>
             <a:ext cx="7112000" cy="1993900"/>
           </a:xfrm>
           <a:prstGeom prst="rect">
@@ -8576,7 +8576,7 @@
         </p:nvSpPr>
         <p:spPr>
           <a:xfrm>
-            <a:off x="1712976" y="3383280"/>
+            <a:off x="1712976" y="4114800"/>
             <a:ext cx="8763000" cy="1993900"/>
           </a:xfrm>
           <a:prstGeom prst="rect">
@@ -8597,7 +8597,7 @@
                 </a:solidFill>
                 <a:latin typeface="MS Mincho"/>
               </a:rPr>
-              <a:t>そしてアパートの鍵は私のバッグから取ったんだわ、これにも気づかなかった……。</a:t>
+              <a:t>マリア: 短い手紙で別れを告げ、プレゼントしてくれたダイヤモンドの指輪は持っていってしまいました</a:t>
             </a:r>
           </a:p>
           <a:p/>
@@ -8637,7 +8637,7 @@
         </p:nvSpPr>
         <p:spPr>
           <a:xfrm>
-            <a:off x="1712976" y="571500"/>
+            <a:off x="1712976" y="1524000"/>
             <a:ext cx="7112000" cy="1993900"/>
           </a:xfrm>
           <a:prstGeom prst="rect">
@@ -8672,7 +8672,7 @@
         </p:nvSpPr>
         <p:spPr>
           <a:xfrm>
-            <a:off x="1712976" y="3383280"/>
+            <a:off x="1712976" y="4114800"/>
             <a:ext cx="8763000" cy="1993900"/>
           </a:xfrm>
           <a:prstGeom prst="rect">
@@ -8693,7 +8693,7 @@
                 </a:solidFill>
                 <a:latin typeface="MS Mincho"/>
               </a:rPr>
-              <a:t>それで？</a:t>
+              <a:t>警部: それで？</a:t>
             </a:r>
           </a:p>
           <a:p/>
@@ -8733,7 +8733,7 @@
         </p:nvSpPr>
         <p:spPr>
           <a:xfrm>
-            <a:off x="1712976" y="571500"/>
+            <a:off x="1712976" y="1524000"/>
             <a:ext cx="7112000" cy="1993900"/>
           </a:xfrm>
           <a:prstGeom prst="rect">
@@ -8768,7 +8768,7 @@
         </p:nvSpPr>
         <p:spPr>
           <a:xfrm>
-            <a:off x="1712976" y="3383280"/>
+            <a:off x="1712976" y="4114800"/>
             <a:ext cx="8763000" cy="1993900"/>
           </a:xfrm>
           <a:prstGeom prst="rect">
@@ -8789,7 +8789,7 @@
                 </a:solidFill>
                 <a:latin typeface="MS Mincho"/>
               </a:rPr>
-              <a:t>もう本当に信じられなかった。</a:t>
+              <a:t>マリア: 彼が出て行ってから気づいたわ、宝石箱から取っいったのね</a:t>
             </a:r>
           </a:p>
           <a:p/>
@@ -8829,7 +8829,7 @@
         </p:nvSpPr>
         <p:spPr>
           <a:xfrm>
-            <a:off x="1712976" y="571500"/>
+            <a:off x="1712976" y="1524000"/>
             <a:ext cx="7112000" cy="1993900"/>
           </a:xfrm>
           <a:prstGeom prst="rect">
@@ -8864,7 +8864,7 @@
         </p:nvSpPr>
         <p:spPr>
           <a:xfrm>
-            <a:off x="1712976" y="3383280"/>
+            <a:off x="1712976" y="4114800"/>
             <a:ext cx="8763000" cy="1993900"/>
           </a:xfrm>
           <a:prstGeom prst="rect">
@@ -8885,7 +8885,7 @@
                 </a:solidFill>
                 <a:latin typeface="MS Mincho"/>
               </a:rPr>
-              <a:t>そして、手紙に書いてあったのは、アパートを入居したときと同じ状態にしておくようにってことだけ、それ以外何の説明もなし。</a:t>
+              <a:t>マリア: そしてアパートの鍵は私のバッグから取ったんだわ、これにも気づかなかった……</a:t>
             </a:r>
           </a:p>
           <a:p/>
@@ -8925,7 +8925,7 @@
         </p:nvSpPr>
         <p:spPr>
           <a:xfrm>
-            <a:off x="1712976" y="571500"/>
+            <a:off x="1712976" y="1524000"/>
             <a:ext cx="7112000" cy="1993900"/>
           </a:xfrm>
           <a:prstGeom prst="rect">
@@ -8960,7 +8960,7 @@
         </p:nvSpPr>
         <p:spPr>
           <a:xfrm>
-            <a:off x="1712976" y="3383280"/>
+            <a:off x="1712976" y="4114800"/>
             <a:ext cx="8763000" cy="1993900"/>
           </a:xfrm>
           <a:prstGeom prst="rect">
@@ -8981,7 +8981,7 @@
                 </a:solidFill>
                 <a:latin typeface="MS Mincho"/>
               </a:rPr>
-              <a:t>あなたの声が聞こえません！マイクに向かって話してください！</a:t>
+              <a:t>マリア: もう本当に信じられなかった</a:t>
             </a:r>
           </a:p>
           <a:p/>
@@ -9021,7 +9021,7 @@
         </p:nvSpPr>
         <p:spPr>
           <a:xfrm>
-            <a:off x="1712976" y="571500"/>
+            <a:off x="1712976" y="1524000"/>
             <a:ext cx="7112000" cy="1993900"/>
           </a:xfrm>
           <a:prstGeom prst="rect">
@@ -9056,7 +9056,7 @@
         </p:nvSpPr>
         <p:spPr>
           <a:xfrm>
-            <a:off x="1712976" y="3383280"/>
+            <a:off x="1712976" y="4114800"/>
             <a:ext cx="8763000" cy="1993900"/>
           </a:xfrm>
           <a:prstGeom prst="rect">
@@ -9077,7 +9077,7 @@
                 </a:solidFill>
                 <a:latin typeface="MS Mincho"/>
               </a:rPr>
-              <a:t>理由はわかりませんわ！彼に捨てられたんです！</a:t>
+              <a:t>マリア: 手紙には、「アパートを入居したときと同じ状態にしておくように」とだけ...</a:t>
             </a:r>
           </a:p>
           <a:p/>
@@ -9117,7 +9117,7 @@
         </p:nvSpPr>
         <p:spPr>
           <a:xfrm>
-            <a:off x="1712976" y="571500"/>
+            <a:off x="1712976" y="1524000"/>
             <a:ext cx="7112000" cy="1993900"/>
           </a:xfrm>
           <a:prstGeom prst="rect">
@@ -9152,7 +9152,7 @@
         </p:nvSpPr>
         <p:spPr>
           <a:xfrm>
-            <a:off x="1712976" y="3383280"/>
+            <a:off x="1712976" y="4114800"/>
             <a:ext cx="8763000" cy="1993900"/>
           </a:xfrm>
           <a:prstGeom prst="rect">
@@ -9173,7 +9173,7 @@
                 </a:solidFill>
                 <a:latin typeface="MS Mincho"/>
               </a:rPr>
-              <a:t>あなたは傲慢な性格です。彼にとってあなたはもう一人のメディアに変わってしまったのです。</a:t>
+              <a:t>声: あなたの声が聞こえません！マイクに向かって話してください！</a:t>
             </a:r>
           </a:p>
           <a:p/>
@@ -9213,7 +9213,7 @@
         </p:nvSpPr>
         <p:spPr>
           <a:xfrm>
-            <a:off x="1712976" y="571500"/>
+            <a:off x="1712976" y="1524000"/>
             <a:ext cx="7112000" cy="1993900"/>
           </a:xfrm>
           <a:prstGeom prst="rect">
@@ -9248,7 +9248,7 @@
         </p:nvSpPr>
         <p:spPr>
           <a:xfrm>
-            <a:off x="1712976" y="3383280"/>
+            <a:off x="1712976" y="4114800"/>
             <a:ext cx="8763000" cy="1993900"/>
           </a:xfrm>
           <a:prstGeom prst="rect">
@@ -9269,7 +9269,7 @@
                 </a:solidFill>
                 <a:latin typeface="MS Mincho"/>
               </a:rPr>
-              <a:t>あなたは彼の母親になって、彼を支配したいのです。</a:t>
+              <a:t>マリア: 理由はわかりませんわ！彼に捨てられたんです！</a:t>
             </a:r>
           </a:p>
           <a:p/>
@@ -9309,7 +9309,7 @@
         </p:nvSpPr>
         <p:spPr>
           <a:xfrm>
-            <a:off x="1712976" y="571500"/>
+            <a:off x="1712976" y="1524000"/>
             <a:ext cx="7112000" cy="1993900"/>
           </a:xfrm>
           <a:prstGeom prst="rect">
@@ -9344,7 +9344,7 @@
         </p:nvSpPr>
         <p:spPr>
           <a:xfrm>
-            <a:off x="1712976" y="3383280"/>
+            <a:off x="1712976" y="4114800"/>
             <a:ext cx="8763000" cy="1993900"/>
           </a:xfrm>
           <a:prstGeom prst="rect">
@@ -9365,7 +9365,7 @@
                 </a:solidFill>
                 <a:latin typeface="MS Mincho"/>
               </a:rPr>
-              <a:t>彼が母親の子宮に戻るように、もう一度彼を飲み込もうとしているのです。</a:t>
+              <a:t>声: あなたは傲慢だ、彼にとってあなたはもう一人のメディアに変わってしまったのです</a:t>
             </a:r>
           </a:p>
           <a:p/>
@@ -9405,7 +9405,7 @@
         </p:nvSpPr>
         <p:spPr>
           <a:xfrm>
-            <a:off x="1712976" y="571500"/>
+            <a:off x="1712976" y="1524000"/>
             <a:ext cx="7112000" cy="1993900"/>
           </a:xfrm>
           <a:prstGeom prst="rect">
@@ -9440,7 +9440,7 @@
         </p:nvSpPr>
         <p:spPr>
           <a:xfrm>
-            <a:off x="1712976" y="3383280"/>
+            <a:off x="1712976" y="4114800"/>
             <a:ext cx="8763000" cy="1993900"/>
           </a:xfrm>
           <a:prstGeom prst="rect">
@@ -9461,7 +9461,7 @@
                 </a:solidFill>
                 <a:latin typeface="MS Mincho"/>
               </a:rPr>
-              <a:t>違います、私は……！</a:t>
+              <a:t>声: あなたは彼の母親になって、彼を支配したいのです</a:t>
             </a:r>
           </a:p>
           <a:p/>
@@ -9501,7 +9501,7 @@
         </p:nvSpPr>
         <p:spPr>
           <a:xfrm>
-            <a:off x="1712976" y="571500"/>
+            <a:off x="1712976" y="1524000"/>
             <a:ext cx="7112000" cy="1993900"/>
           </a:xfrm>
           <a:prstGeom prst="rect">
@@ -9535,7 +9535,7 @@
         </p:nvSpPr>
         <p:spPr>
           <a:xfrm>
-            <a:off x="1712976" y="3383280"/>
+            <a:off x="1712976" y="4114800"/>
             <a:ext cx="8763000" cy="1993900"/>
           </a:xfrm>
           <a:prstGeom prst="rect">
@@ -9556,9 +9556,10 @@
                 </a:solidFill>
                 <a:latin typeface="MS Mincho"/>
               </a:rPr>
-              <a:t>時間です。来週木曜にまたお越しください。</a:t>
-            </a:r>
-          </a:p>
+              <a:t>声: 彼が母親の子宮に戻るように、もう一度彼を飲み込もうとしているのです</a:t>
+            </a:r>
+          </a:p>
+          <a:p/>
         </p:txBody>
       </p:sp>
     </p:spTree>
@@ -9595,7 +9596,7 @@
         </p:nvSpPr>
         <p:spPr>
           <a:xfrm>
-            <a:off x="1712976" y="571500"/>
+            <a:off x="1712976" y="1524000"/>
             <a:ext cx="7112000" cy="1993900"/>
           </a:xfrm>
           <a:prstGeom prst="rect">
@@ -9630,7 +9631,7 @@
         </p:nvSpPr>
         <p:spPr>
           <a:xfrm>
-            <a:off x="1712976" y="3383280"/>
+            <a:off x="1712976" y="4114800"/>
             <a:ext cx="8763000" cy="1993900"/>
           </a:xfrm>
           <a:prstGeom prst="rect">
@@ -9691,7 +9692,7 @@
         </p:nvSpPr>
         <p:spPr>
           <a:xfrm>
-            <a:off x="1712976" y="571500"/>
+            <a:off x="1712976" y="1524000"/>
             <a:ext cx="7112000" cy="1993900"/>
           </a:xfrm>
           <a:prstGeom prst="rect">
@@ -9726,7 +9727,7 @@
         </p:nvSpPr>
         <p:spPr>
           <a:xfrm>
-            <a:off x="1712976" y="3383280"/>
+            <a:off x="1712976" y="4114800"/>
             <a:ext cx="8763000" cy="1993900"/>
           </a:xfrm>
           <a:prstGeom prst="rect">
@@ -9747,7 +9748,7 @@
                 </a:solidFill>
                 <a:latin typeface="MS Mincho"/>
               </a:rPr>
-              <a:t>告訴！ありえるとでも？</a:t>
+              <a:t>警部: 告訴！ありえるとでも？</a:t>
             </a:r>
           </a:p>
           <a:p/>
@@ -9787,7 +9788,7 @@
         </p:nvSpPr>
         <p:spPr>
           <a:xfrm>
-            <a:off x="1712976" y="571500"/>
+            <a:off x="1712976" y="1524000"/>
             <a:ext cx="7112000" cy="1993900"/>
           </a:xfrm>
           <a:prstGeom prst="rect">
@@ -9822,7 +9823,7 @@
         </p:nvSpPr>
         <p:spPr>
           <a:xfrm>
-            <a:off x="1712976" y="3383280"/>
+            <a:off x="1712976" y="4114800"/>
             <a:ext cx="8763000" cy="1993900"/>
           </a:xfrm>
           <a:prstGeom prst="rect">
@@ -9843,7 +9844,7 @@
                 </a:solidFill>
                 <a:latin typeface="MS Mincho"/>
               </a:rPr>
-              <a:t>告訴のためにここに来るなんて...もっとマシな対応があったのでは？</a:t>
+              <a:t>警部: 告訴のためにここに来るなんて...もっとマシな対応があったのでは？</a:t>
             </a:r>
           </a:p>
           <a:p/>
@@ -9883,7 +9884,7 @@
         </p:nvSpPr>
         <p:spPr>
           <a:xfrm>
-            <a:off x="1712976" y="571500"/>
+            <a:off x="1712976" y="1524000"/>
             <a:ext cx="7112000" cy="1993900"/>
           </a:xfrm>
           <a:prstGeom prst="rect">
@@ -9918,7 +9919,7 @@
         </p:nvSpPr>
         <p:spPr>
           <a:xfrm>
-            <a:off x="1712976" y="3383280"/>
+            <a:off x="1712976" y="4114800"/>
             <a:ext cx="8763000" cy="1993900"/>
           </a:xfrm>
           <a:prstGeom prst="rect">
@@ -9939,7 +9940,7 @@
                 </a:solidFill>
                 <a:latin typeface="MS Mincho"/>
               </a:rPr>
-              <a:t>たとえご主人があなたを殴ったとしても！</a:t>
+              <a:t>警部: たとえご主人があなたを殴ったとしても！</a:t>
             </a:r>
           </a:p>
           <a:p/>
@@ -9979,7 +9980,7 @@
         </p:nvSpPr>
         <p:spPr>
           <a:xfrm>
-            <a:off x="1712976" y="571500"/>
+            <a:off x="1712976" y="1524000"/>
             <a:ext cx="7112000" cy="1993900"/>
           </a:xfrm>
           <a:prstGeom prst="rect">
@@ -10014,7 +10015,7 @@
         </p:nvSpPr>
         <p:spPr>
           <a:xfrm>
-            <a:off x="1712976" y="3383280"/>
+            <a:off x="1712976" y="4114800"/>
             <a:ext cx="8763000" cy="1993900"/>
           </a:xfrm>
           <a:prstGeom prst="rect">
@@ -10075,7 +10076,7 @@
         </p:nvSpPr>
         <p:spPr>
           <a:xfrm>
-            <a:off x="1712976" y="571500"/>
+            <a:off x="1712976" y="1524000"/>
             <a:ext cx="7112000" cy="1993900"/>
           </a:xfrm>
           <a:prstGeom prst="rect">
@@ -10110,7 +10111,7 @@
         </p:nvSpPr>
         <p:spPr>
           <a:xfrm>
-            <a:off x="1712976" y="3383280"/>
+            <a:off x="1712976" y="4114800"/>
             <a:ext cx="8763000" cy="1993900"/>
           </a:xfrm>
           <a:prstGeom prst="rect">
@@ -10131,7 +10132,7 @@
                 </a:solidFill>
                 <a:latin typeface="MS Mincho"/>
               </a:rPr>
-              <a:t>今は日曜日の午後、サッカー中継の最中ですよ！</a:t>
+              <a:t>警部: 今は日曜日の午後、サッカー中継の最中ですよ！</a:t>
             </a:r>
           </a:p>
           <a:p/>
@@ -10171,7 +10172,7 @@
         </p:nvSpPr>
         <p:spPr>
           <a:xfrm>
-            <a:off x="1712976" y="571500"/>
+            <a:off x="1712976" y="1524000"/>
             <a:ext cx="7112000" cy="1993900"/>
           </a:xfrm>
           <a:prstGeom prst="rect">
@@ -10206,7 +10207,7 @@
         </p:nvSpPr>
         <p:spPr>
           <a:xfrm>
-            <a:off x="1712976" y="3383280"/>
+            <a:off x="1712976" y="4114800"/>
             <a:ext cx="8763000" cy="1993900"/>
           </a:xfrm>
           <a:prstGeom prst="rect">
@@ -10267,7 +10268,7 @@
         </p:nvSpPr>
         <p:spPr>
           <a:xfrm>
-            <a:off x="1712976" y="571500"/>
+            <a:off x="1712976" y="1524000"/>
             <a:ext cx="7112000" cy="1993900"/>
           </a:xfrm>
           <a:prstGeom prst="rect">
@@ -10302,7 +10303,7 @@
         </p:nvSpPr>
         <p:spPr>
           <a:xfrm>
-            <a:off x="1712976" y="3383280"/>
+            <a:off x="1712976" y="4114800"/>
             <a:ext cx="8763000" cy="1993900"/>
           </a:xfrm>
           <a:prstGeom prst="rect">
@@ -10323,7 +10324,7 @@
                 </a:solidFill>
                 <a:latin typeface="MS Mincho"/>
               </a:rPr>
-              <a:t>マグダ: 家を追い出されました。もう私を家に入れないと言っています。</a:t>
+              <a:t>マグダ: 家を追い出され...もう私を家に入れないと言っています</a:t>
             </a:r>
           </a:p>
           <a:p/>
@@ -10363,7 +10364,7 @@
         </p:nvSpPr>
         <p:spPr>
           <a:xfrm>
-            <a:off x="1712976" y="571500"/>
+            <a:off x="1712976" y="1524000"/>
             <a:ext cx="7112000" cy="1993900"/>
           </a:xfrm>
           <a:prstGeom prst="rect">
@@ -10398,7 +10399,7 @@
         </p:nvSpPr>
         <p:spPr>
           <a:xfrm>
-            <a:off x="1712976" y="3383280"/>
+            <a:off x="1712976" y="4114800"/>
             <a:ext cx="8763000" cy="1993900"/>
           </a:xfrm>
           <a:prstGeom prst="rect">
@@ -10419,7 +10420,7 @@
                 </a:solidFill>
                 <a:latin typeface="MS Mincho"/>
               </a:rPr>
-              <a:t>マグダ: また、子供達が邪魔なので施設に入れる、とも...。</a:t>
+              <a:t>マグダ: また、子供達が邪魔なので施設に入れる、とも...</a:t>
             </a:r>
           </a:p>
           <a:p/>
@@ -10459,7 +10460,7 @@
         </p:nvSpPr>
         <p:spPr>
           <a:xfrm>
-            <a:off x="1712976" y="571500"/>
+            <a:off x="1712976" y="1524000"/>
             <a:ext cx="7112000" cy="1993900"/>
           </a:xfrm>
           <a:prstGeom prst="rect">
@@ -10494,7 +10495,7 @@
         </p:nvSpPr>
         <p:spPr>
           <a:xfrm>
-            <a:off x="1712976" y="3383280"/>
+            <a:off x="1712976" y="4114800"/>
             <a:ext cx="8763000" cy="1993900"/>
           </a:xfrm>
           <a:prstGeom prst="rect">
@@ -10515,7 +10516,7 @@
                 </a:solidFill>
                 <a:latin typeface="MS Mincho"/>
               </a:rPr>
-              <a:t>なぜ？</a:t>
+              <a:t>警部: なぜ？</a:t>
             </a:r>
           </a:p>
           <a:p/>
@@ -10555,7 +10556,7 @@
         </p:nvSpPr>
         <p:spPr>
           <a:xfrm>
-            <a:off x="1712976" y="571500"/>
+            <a:off x="1712976" y="1524000"/>
             <a:ext cx="7112000" cy="1993900"/>
           </a:xfrm>
           <a:prstGeom prst="rect">
@@ -10590,7 +10591,7 @@
         </p:nvSpPr>
         <p:spPr>
           <a:xfrm>
-            <a:off x="1712976" y="3383280"/>
+            <a:off x="1712976" y="4114800"/>
             <a:ext cx="8763000" cy="1993900"/>
           </a:xfrm>
           <a:prstGeom prst="rect">
@@ -10611,7 +10612,7 @@
                 </a:solidFill>
                 <a:latin typeface="MS Mincho"/>
               </a:rPr>
-              <a:t>マグダ: 私のことをもう愛してないと言うのです。</a:t>
+              <a:t>マグダ: 私のことをもう愛してないと言うのです</a:t>
             </a:r>
           </a:p>
           <a:p/>
@@ -10651,7 +10652,7 @@
         </p:nvSpPr>
         <p:spPr>
           <a:xfrm>
-            <a:off x="1712976" y="571500"/>
+            <a:off x="1712976" y="1524000"/>
             <a:ext cx="7112000" cy="1993900"/>
           </a:xfrm>
           <a:prstGeom prst="rect">
@@ -10686,7 +10687,7 @@
         </p:nvSpPr>
         <p:spPr>
           <a:xfrm>
-            <a:off x="1712976" y="3383280"/>
+            <a:off x="1712976" y="4114800"/>
             <a:ext cx="8763000" cy="1993900"/>
           </a:xfrm>
           <a:prstGeom prst="rect">
@@ -10747,7 +10748,7 @@
         </p:nvSpPr>
         <p:spPr>
           <a:xfrm>
-            <a:off x="1712976" y="571500"/>
+            <a:off x="1712976" y="1524000"/>
             <a:ext cx="7112000" cy="1993900"/>
           </a:xfrm>
           <a:prstGeom prst="rect">
@@ -10782,7 +10783,7 @@
         </p:nvSpPr>
         <p:spPr>
           <a:xfrm>
-            <a:off x="1712976" y="3383280"/>
+            <a:off x="1712976" y="4114800"/>
             <a:ext cx="8763000" cy="1993900"/>
           </a:xfrm>
           <a:prstGeom prst="rect">
@@ -10803,7 +10804,7 @@
                 </a:solidFill>
                 <a:latin typeface="MS Mincho"/>
               </a:rPr>
-              <a:t>うるさくて中継が聞こえないらしく...</a:t>
+              <a:t>マグダ: うるさくて中継が聞こえないらしく...</a:t>
             </a:r>
           </a:p>
           <a:p/>
@@ -10843,7 +10844,7 @@
         </p:nvSpPr>
         <p:spPr>
           <a:xfrm>
-            <a:off x="1712976" y="571500"/>
+            <a:off x="1712976" y="1524000"/>
             <a:ext cx="7112000" cy="1993900"/>
           </a:xfrm>
           <a:prstGeom prst="rect">
@@ -10878,7 +10879,7 @@
         </p:nvSpPr>
         <p:spPr>
           <a:xfrm>
-            <a:off x="1712976" y="3383280"/>
+            <a:off x="1712976" y="4114800"/>
             <a:ext cx="8763000" cy="1993900"/>
           </a:xfrm>
           <a:prstGeom prst="rect">
@@ -10899,7 +10900,7 @@
                 </a:solidFill>
                 <a:latin typeface="MS Mincho"/>
               </a:rPr>
-              <a:t>で、それは本当なのですか？</a:t>
+              <a:t>警部: で、それは本当なのですか？</a:t>
             </a:r>
           </a:p>
           <a:p/>
@@ -10939,7 +10940,7 @@
         </p:nvSpPr>
         <p:spPr>
           <a:xfrm>
-            <a:off x="1712976" y="571500"/>
+            <a:off x="1712976" y="1524000"/>
             <a:ext cx="7112000" cy="1993900"/>
           </a:xfrm>
           <a:prstGeom prst="rect">
@@ -10974,7 +10975,7 @@
         </p:nvSpPr>
         <p:spPr>
           <a:xfrm>
-            <a:off x="1712976" y="3383280"/>
+            <a:off x="1712976" y="4114800"/>
             <a:ext cx="8763000" cy="1993900"/>
           </a:xfrm>
           <a:prstGeom prst="rect">
@@ -10995,7 +10996,7 @@
                 </a:solidFill>
                 <a:latin typeface="MS Mincho"/>
               </a:rPr>
-              <a:t>マグダ: そ⋯そうですね、時々は、はい、もちろん⋯⋯。</a:t>
+              <a:t>マグダ: そうですね...時々は...はい...もちろん⋯⋯</a:t>
             </a:r>
           </a:p>
           <a:p/>
@@ -11035,7 +11036,7 @@
         </p:nvSpPr>
         <p:spPr>
           <a:xfrm>
-            <a:off x="1712976" y="571500"/>
+            <a:off x="1712976" y="1524000"/>
             <a:ext cx="7112000" cy="1993900"/>
           </a:xfrm>
           <a:prstGeom prst="rect">
@@ -11070,7 +11071,7 @@
         </p:nvSpPr>
         <p:spPr>
           <a:xfrm>
-            <a:off x="1712976" y="3383280"/>
+            <a:off x="1712976" y="4114800"/>
             <a:ext cx="8763000" cy="1993900"/>
           </a:xfrm>
           <a:prstGeom prst="rect">
@@ -11131,7 +11132,7 @@
         </p:nvSpPr>
         <p:spPr>
           <a:xfrm>
-            <a:off x="1712976" y="571500"/>
+            <a:off x="1712976" y="1524000"/>
             <a:ext cx="7112000" cy="1993900"/>
           </a:xfrm>
           <a:prstGeom prst="rect">
@@ -11166,7 +11167,7 @@
         </p:nvSpPr>
         <p:spPr>
           <a:xfrm>
-            <a:off x="1712976" y="3383280"/>
+            <a:off x="1712976" y="4114800"/>
             <a:ext cx="8763000" cy="1993900"/>
           </a:xfrm>
           <a:prstGeom prst="rect">
@@ -11187,7 +11188,7 @@
                 </a:solidFill>
                 <a:latin typeface="MS Mincho"/>
               </a:rPr>
-              <a:t>マグダ: 子供達はまだ小さく、騒いでいても私は何もできません...。</a:t>
+              <a:t>マグダ: 子供達はまだ小さく、騒いでいても私は何もできません...</a:t>
             </a:r>
           </a:p>
           <a:p/>
@@ -11227,7 +11228,7 @@
         </p:nvSpPr>
         <p:spPr>
           <a:xfrm>
-            <a:off x="1712976" y="571500"/>
+            <a:off x="1712976" y="1524000"/>
             <a:ext cx="7112000" cy="1993900"/>
           </a:xfrm>
           <a:prstGeom prst="rect">
@@ -11262,7 +11263,7 @@
         </p:nvSpPr>
         <p:spPr>
           <a:xfrm>
-            <a:off x="1712976" y="3383280"/>
+            <a:off x="1712976" y="4114800"/>
             <a:ext cx="8763000" cy="1993900"/>
           </a:xfrm>
           <a:prstGeom prst="rect">
@@ -11283,7 +11284,7 @@
                 </a:solidFill>
                 <a:latin typeface="MS Mincho"/>
               </a:rPr>
-              <a:t>それでもあなたは告訴したいのですか！</a:t>
+              <a:t>警部: それでもあなたは告訴したいのですか！</a:t>
             </a:r>
           </a:p>
           <a:p/>
@@ -11323,7 +11324,7 @@
         </p:nvSpPr>
         <p:spPr>
           <a:xfrm>
-            <a:off x="1712976" y="571500"/>
+            <a:off x="1712976" y="1524000"/>
             <a:ext cx="7112000" cy="1993900"/>
           </a:xfrm>
           <a:prstGeom prst="rect">
@@ -11358,7 +11359,7 @@
         </p:nvSpPr>
         <p:spPr>
           <a:xfrm>
-            <a:off x="1712976" y="3383280"/>
+            <a:off x="1712976" y="4114800"/>
             <a:ext cx="8763000" cy="1993900"/>
           </a:xfrm>
           <a:prstGeom prst="rect">
@@ -11379,7 +11380,7 @@
                 </a:solidFill>
                 <a:latin typeface="MS Mincho"/>
               </a:rPr>
-              <a:t>かわいそうな男だ！仕事で疲れて帰ってきて、</a:t>
+              <a:t>警部: かわいそうな男だ！仕事で疲れて</a:t>
             </a:r>
           </a:p>
           <a:p/>
@@ -11419,7 +11420,7 @@
         </p:nvSpPr>
         <p:spPr>
           <a:xfrm>
-            <a:off x="1712976" y="571500"/>
+            <a:off x="1712976" y="1524000"/>
             <a:ext cx="7112000" cy="1993900"/>
           </a:xfrm>
           <a:prstGeom prst="rect">
@@ -11454,7 +11455,7 @@
         </p:nvSpPr>
         <p:spPr>
           <a:xfrm>
-            <a:off x="1712976" y="3383280"/>
+            <a:off x="1712976" y="4114800"/>
             <a:ext cx="8763000" cy="1993900"/>
           </a:xfrm>
           <a:prstGeom prst="rect">
@@ -11467,7 +11468,17 @@
             <a:spAutoFit/>
           </a:bodyPr>
           <a:lstStyle/>
-          <a:p/>
+          <a:p>
+            <a:r>
+              <a:rPr sz="4000">
+                <a:solidFill>
+                  <a:srgbClr val="FFFFFF"/>
+                </a:solidFill>
+                <a:latin typeface="MS Mincho"/>
+              </a:rPr>
+              <a:t>警部: サッカーの決勝戦を聞くのを楽しみに帰ってきたというのに...</a:t>
+            </a:r>
+          </a:p>
           <a:p/>
         </p:txBody>
       </p:sp>
@@ -11505,7 +11516,7 @@
         </p:nvSpPr>
         <p:spPr>
           <a:xfrm>
-            <a:off x="1712976" y="571500"/>
+            <a:off x="1712976" y="1524000"/>
             <a:ext cx="7112000" cy="1993900"/>
           </a:xfrm>
           <a:prstGeom prst="rect">
@@ -11540,7 +11551,7 @@
         </p:nvSpPr>
         <p:spPr>
           <a:xfrm>
-            <a:off x="1712976" y="3383280"/>
+            <a:off x="1712976" y="4114800"/>
             <a:ext cx="8763000" cy="1993900"/>
           </a:xfrm>
           <a:prstGeom prst="rect">
@@ -11561,7 +11572,7 @@
                 </a:solidFill>
                 <a:latin typeface="MS Mincho"/>
               </a:rPr>
-              <a:t>仕事で疲れて、</a:t>
+              <a:t>警部: しかも決勝戦、相手はマドリード、ホームグラウンドで！</a:t>
             </a:r>
           </a:p>
           <a:p/>
@@ -11601,7 +11612,7 @@
         </p:nvSpPr>
         <p:spPr>
           <a:xfrm>
-            <a:off x="1712976" y="571500"/>
+            <a:off x="1712976" y="1524000"/>
             <a:ext cx="7112000" cy="1993900"/>
           </a:xfrm>
           <a:prstGeom prst="rect">
@@ -11636,7 +11647,7 @@
         </p:nvSpPr>
         <p:spPr>
           <a:xfrm>
-            <a:off x="1712976" y="3383280"/>
+            <a:off x="1712976" y="4114800"/>
             <a:ext cx="8763000" cy="1993900"/>
           </a:xfrm>
           <a:prstGeom prst="rect">
@@ -11657,7 +11668,7 @@
                 </a:solidFill>
                 <a:latin typeface="MS Mincho"/>
               </a:rPr>
-              <a:t>サッカーの決勝戦を聞くのを楽しみに帰ってきて、</a:t>
+              <a:t>警部: それなのに、泣き虫の妻とやかましい子供達がいて、</a:t>
             </a:r>
           </a:p>
           <a:p/>
@@ -11697,7 +11708,7 @@
         </p:nvSpPr>
         <p:spPr>
           <a:xfrm>
-            <a:off x="1712976" y="571500"/>
+            <a:off x="1712976" y="1524000"/>
             <a:ext cx="7112000" cy="1993900"/>
           </a:xfrm>
           <a:prstGeom prst="rect">
@@ -11732,7 +11743,7 @@
         </p:nvSpPr>
         <p:spPr>
           <a:xfrm>
-            <a:off x="1712976" y="3383280"/>
+            <a:off x="1712976" y="4114800"/>
             <a:ext cx="8763000" cy="1993900"/>
           </a:xfrm>
           <a:prstGeom prst="rect">
@@ -11753,7 +11764,7 @@
                 </a:solidFill>
                 <a:latin typeface="MS Mincho"/>
               </a:rPr>
-              <a:t>しかも決勝戦、相手はマドリード、ホームグラウンドで！</a:t>
+              <a:t>警部: 落ち着いて試合を聞かせてもらえない⋯⋯！</a:t>
             </a:r>
           </a:p>
           <a:p/>
@@ -11793,7 +11804,7 @@
         </p:nvSpPr>
         <p:spPr>
           <a:xfrm>
-            <a:off x="1712976" y="571500"/>
+            <a:off x="1712976" y="1524000"/>
             <a:ext cx="7112000" cy="1993900"/>
           </a:xfrm>
           <a:prstGeom prst="rect">
@@ -11828,7 +11839,7 @@
         </p:nvSpPr>
         <p:spPr>
           <a:xfrm>
-            <a:off x="1712976" y="3383280"/>
+            <a:off x="1712976" y="4114800"/>
             <a:ext cx="8763000" cy="1993900"/>
           </a:xfrm>
           <a:prstGeom prst="rect">
@@ -11849,7 +11860,7 @@
                 </a:solidFill>
                 <a:latin typeface="MS Mincho"/>
               </a:rPr>
-              <a:t>それなのに、泣き虫の妻とやかましい子供達がいて、</a:t>
+              <a:t>警部: それはもう、皆殺しするに値する！ご主人はあなたに何もしていないに等しい！</a:t>
             </a:r>
           </a:p>
           <a:p/>
@@ -11889,7 +11900,7 @@
         </p:nvSpPr>
         <p:spPr>
           <a:xfrm>
-            <a:off x="1712976" y="571500"/>
+            <a:off x="1712976" y="1524000"/>
             <a:ext cx="7112000" cy="1993900"/>
           </a:xfrm>
           <a:prstGeom prst="rect">
@@ -11924,7 +11935,7 @@
         </p:nvSpPr>
         <p:spPr>
           <a:xfrm>
-            <a:off x="1712976" y="3383280"/>
+            <a:off x="1712976" y="4114800"/>
             <a:ext cx="8763000" cy="1993900"/>
           </a:xfrm>
           <a:prstGeom prst="rect">
@@ -11945,7 +11956,7 @@
                 </a:solidFill>
                 <a:latin typeface="MS Mincho"/>
               </a:rPr>
-              <a:t>落ち着いて試合を聞かせてもらえない⋯⋯！</a:t>
+              <a:t>警部補: 警部！レケホ銀行に強盗が入りました！</a:t>
             </a:r>
           </a:p>
           <a:p/>
@@ -11985,7 +11996,7 @@
         </p:nvSpPr>
         <p:spPr>
           <a:xfrm>
-            <a:off x="1712976" y="571500"/>
+            <a:off x="1712976" y="1524000"/>
             <a:ext cx="7112000" cy="1993900"/>
           </a:xfrm>
           <a:prstGeom prst="rect">
@@ -12020,7 +12031,7 @@
         </p:nvSpPr>
         <p:spPr>
           <a:xfrm>
-            <a:off x="1712976" y="3383280"/>
+            <a:off x="1712976" y="4114800"/>
             <a:ext cx="8763000" cy="1993900"/>
           </a:xfrm>
           <a:prstGeom prst="rect">
@@ -12041,7 +12052,7 @@
                 </a:solidFill>
                 <a:latin typeface="MS Mincho"/>
               </a:rPr>
-              <a:t>それはもう、皆殺しするに値する！ご主人はあなたに何もしていないに等しい！</a:t>
+              <a:t>警部補: この建物です！強盗が中にいます！</a:t>
             </a:r>
           </a:p>
           <a:p/>
@@ -12081,7 +12092,7 @@
         </p:nvSpPr>
         <p:spPr>
           <a:xfrm>
-            <a:off x="1712976" y="571500"/>
+            <a:off x="1712976" y="1524000"/>
             <a:ext cx="7112000" cy="1993900"/>
           </a:xfrm>
           <a:prstGeom prst="rect">
@@ -12116,7 +12127,7 @@
         </p:nvSpPr>
         <p:spPr>
           <a:xfrm>
-            <a:off x="1712976" y="3383280"/>
+            <a:off x="1712976" y="4114800"/>
             <a:ext cx="8763000" cy="1993900"/>
           </a:xfrm>
           <a:prstGeom prst="rect">
@@ -12137,7 +12148,7 @@
                 </a:solidFill>
                 <a:latin typeface="MS Mincho"/>
               </a:rPr>
-              <a:t>検察: ここで何をしているのですか？</a:t>
+              <a:t>警部: ここで何をしているのですか？</a:t>
             </a:r>
           </a:p>
           <a:p/>
@@ -12177,7 +12188,7 @@
         </p:nvSpPr>
         <p:spPr>
           <a:xfrm>
-            <a:off x="1712976" y="571500"/>
+            <a:off x="1712976" y="1524000"/>
             <a:ext cx="7112000" cy="1993900"/>
           </a:xfrm>
           <a:prstGeom prst="rect">
@@ -12212,7 +12223,7 @@
         </p:nvSpPr>
         <p:spPr>
           <a:xfrm>
-            <a:off x="1712976" y="3383280"/>
+            <a:off x="1712976" y="4114800"/>
             <a:ext cx="8763000" cy="1993900"/>
           </a:xfrm>
           <a:prstGeom prst="rect">
@@ -12233,7 +12244,7 @@
                 </a:solidFill>
                 <a:latin typeface="MS Mincho"/>
               </a:rPr>
-              <a:t>警部！レケホ銀行に強盗が入りました。</a:t>
+              <a:t>警部補: 会計係を負傷させて、人質を20人とっています⋯⋯</a:t>
             </a:r>
           </a:p>
           <a:p/>
@@ -12273,7 +12284,7 @@
         </p:nvSpPr>
         <p:spPr>
           <a:xfrm>
-            <a:off x="1712976" y="571500"/>
+            <a:off x="1712976" y="1524000"/>
             <a:ext cx="7112000" cy="1993900"/>
           </a:xfrm>
           <a:prstGeom prst="rect">
@@ -12308,7 +12319,7 @@
         </p:nvSpPr>
         <p:spPr>
           <a:xfrm>
-            <a:off x="1712976" y="3383280"/>
+            <a:off x="1712976" y="4114800"/>
             <a:ext cx="8763000" cy="1993900"/>
           </a:xfrm>
           <a:prstGeom prst="rect">
@@ -12329,7 +12340,7 @@
                 </a:solidFill>
                 <a:latin typeface="MS Mincho"/>
               </a:rPr>
-              <a:t>この建物です！強盗が中にいます！</a:t>
+              <a:t>警部: なんてことだ！</a:t>
             </a:r>
           </a:p>
           <a:p/>
@@ -12369,7 +12380,7 @@
         </p:nvSpPr>
         <p:spPr>
           <a:xfrm>
-            <a:off x="1712976" y="571500"/>
+            <a:off x="1712976" y="1524000"/>
             <a:ext cx="7112000" cy="1993900"/>
           </a:xfrm>
           <a:prstGeom prst="rect">
@@ -12404,7 +12415,7 @@
         </p:nvSpPr>
         <p:spPr>
           <a:xfrm>
-            <a:off x="1712976" y="3383280"/>
+            <a:off x="1712976" y="4114800"/>
             <a:ext cx="8763000" cy="1993900"/>
           </a:xfrm>
           <a:prstGeom prst="rect">
@@ -12425,7 +12436,7 @@
                 </a:solidFill>
                 <a:latin typeface="MS Mincho"/>
               </a:rPr>
-              <a:t>会計係を負傷させて、人質を２０人とっています⋯⋯</a:t>
+              <a:t>警部: テロリスト、マフィア、エタの協力者、こそ泥、こんちくしょうだ！</a:t>
             </a:r>
           </a:p>
           <a:p/>
@@ -12465,7 +12476,7 @@
         </p:nvSpPr>
         <p:spPr>
           <a:xfrm>
-            <a:off x="1712976" y="571500"/>
+            <a:off x="1712976" y="1524000"/>
             <a:ext cx="7112000" cy="1993900"/>
           </a:xfrm>
           <a:prstGeom prst="rect">
@@ -12500,7 +12511,7 @@
         </p:nvSpPr>
         <p:spPr>
           <a:xfrm>
-            <a:off x="1712976" y="3383280"/>
+            <a:off x="1712976" y="4114800"/>
             <a:ext cx="8763000" cy="1993900"/>
           </a:xfrm>
           <a:prstGeom prst="rect">
@@ -12521,7 +12532,7 @@
                 </a:solidFill>
                 <a:latin typeface="MS Mincho"/>
               </a:rPr>
-              <a:t>なんてことだ！</a:t>
+              <a:t>警部: 出動させろ、皆だ！ 平の隊員 警部 警部補 警察官 全員だ！</a:t>
             </a:r>
           </a:p>
           <a:p/>
@@ -12561,7 +12572,7 @@
         </p:nvSpPr>
         <p:spPr>
           <a:xfrm>
-            <a:off x="1712976" y="571500"/>
+            <a:off x="1712976" y="1524000"/>
             <a:ext cx="7112000" cy="1993900"/>
           </a:xfrm>
           <a:prstGeom prst="rect">
@@ -12596,7 +12607,7 @@
         </p:nvSpPr>
         <p:spPr>
           <a:xfrm>
-            <a:off x="1712976" y="3383280"/>
+            <a:off x="1712976" y="4114800"/>
             <a:ext cx="8763000" cy="1993900"/>
           </a:xfrm>
           <a:prstGeom prst="rect">
@@ -12617,7 +12628,7 @@
                 </a:solidFill>
                 <a:latin typeface="MS Mincho"/>
               </a:rPr>
-              <a:t>テロリスト、マフィア、エタの協力者、こそ泥、こんちくしょうだ！</a:t>
+              <a:t>警部補: 平隊員は2名のみで、警察署で警備に当たっています</a:t>
             </a:r>
           </a:p>
           <a:p/>
@@ -12657,7 +12668,7 @@
         </p:nvSpPr>
         <p:spPr>
           <a:xfrm>
-            <a:off x="1712976" y="571500"/>
+            <a:off x="1712976" y="1524000"/>
             <a:ext cx="7112000" cy="1993900"/>
           </a:xfrm>
           <a:prstGeom prst="rect">
@@ -12692,7 +12703,7 @@
         </p:nvSpPr>
         <p:spPr>
           <a:xfrm>
-            <a:off x="1712976" y="3383280"/>
+            <a:off x="1712976" y="4114800"/>
             <a:ext cx="8763000" cy="1993900"/>
           </a:xfrm>
           <a:prstGeom prst="rect">
@@ -12713,7 +12724,7 @@
                 </a:solidFill>
                 <a:latin typeface="MS Mincho"/>
               </a:rPr>
-              <a:t>出動させろ、みんな出動させるんだ！平の隊員、警部、警部補、警察官みんなだ</a:t>
+              <a:t>警部: なら ほとんど仕事をしていない特殊作戦部隊を呼ぶんだ！</a:t>
             </a:r>
           </a:p>
           <a:p/>
@@ -12753,7 +12764,7 @@
         </p:nvSpPr>
         <p:spPr>
           <a:xfrm>
-            <a:off x="1712976" y="571500"/>
+            <a:off x="1712976" y="1524000"/>
             <a:ext cx="7112000" cy="1993900"/>
           </a:xfrm>
           <a:prstGeom prst="rect">
@@ -12788,7 +12799,7 @@
         </p:nvSpPr>
         <p:spPr>
           <a:xfrm>
-            <a:off x="1712976" y="3383280"/>
+            <a:off x="1712976" y="4114800"/>
             <a:ext cx="8763000" cy="1993900"/>
           </a:xfrm>
           <a:prstGeom prst="rect">
@@ -12809,7 +12820,7 @@
                 </a:solidFill>
                 <a:latin typeface="MS Mincho"/>
               </a:rPr>
-              <a:t>平の隊員が２名しかいません。それに、警察署で警備に当たっています</a:t>
+              <a:t>警部: あいつらが受け取っている特別報酬分の仕事をしてもらおうじゃないか！</a:t>
             </a:r>
           </a:p>
           <a:p/>
@@ -12849,7 +12860,7 @@
         </p:nvSpPr>
         <p:spPr>
           <a:xfrm>
-            <a:off x="1712976" y="571500"/>
+            <a:off x="1712976" y="1524000"/>
             <a:ext cx="7112000" cy="1993900"/>
           </a:xfrm>
           <a:prstGeom prst="rect">
@@ -12884,7 +12895,7 @@
         </p:nvSpPr>
         <p:spPr>
           <a:xfrm>
-            <a:off x="1712976" y="3383280"/>
+            <a:off x="1712976" y="4114800"/>
             <a:ext cx="8763000" cy="1993900"/>
           </a:xfrm>
           <a:prstGeom prst="rect">
@@ -12905,7 +12916,7 @@
                 </a:solidFill>
                 <a:latin typeface="MS Mincho"/>
               </a:rPr>
-              <a:t>それじゃ、ほとんど仕事をしていない特殊作戦部隊を呼ぶんだ！</a:t>
+              <a:t>警部: そして俺はここで、仕事で疲労困憊して、一人きりで、助けもなく、残業代もなしだ！</a:t>
             </a:r>
           </a:p>
           <a:p/>
@@ -12945,7 +12956,7 @@
         </p:nvSpPr>
         <p:spPr>
           <a:xfrm>
-            <a:off x="1712976" y="571500"/>
+            <a:off x="1712976" y="1524000"/>
             <a:ext cx="7112000" cy="1993900"/>
           </a:xfrm>
           <a:prstGeom prst="rect">
@@ -12980,7 +12991,7 @@
         </p:nvSpPr>
         <p:spPr>
           <a:xfrm>
-            <a:off x="1712976" y="3383280"/>
+            <a:off x="1712976" y="4114800"/>
             <a:ext cx="8763000" cy="1993900"/>
           </a:xfrm>
           <a:prstGeom prst="rect">
@@ -13001,7 +13012,7 @@
                 </a:solidFill>
                 <a:latin typeface="MS Mincho"/>
               </a:rPr>
-              <a:t>あいつらが受け取っている特別報酬分の仕事をしてもらおうじゃないか！</a:t>
+              <a:t>マグダ: ならどうすれば...？</a:t>
             </a:r>
           </a:p>
           <a:p/>
@@ -13041,7 +13052,7 @@
         </p:nvSpPr>
         <p:spPr>
           <a:xfrm>
-            <a:off x="1712976" y="571500"/>
+            <a:off x="1712976" y="1524000"/>
             <a:ext cx="7112000" cy="1993900"/>
           </a:xfrm>
           <a:prstGeom prst="rect">
@@ -13076,7 +13087,7 @@
         </p:nvSpPr>
         <p:spPr>
           <a:xfrm>
-            <a:off x="1712976" y="3383280"/>
+            <a:off x="1712976" y="4114800"/>
             <a:ext cx="8763000" cy="1993900"/>
           </a:xfrm>
           <a:prstGeom prst="rect">
@@ -13097,7 +13108,7 @@
                 </a:solidFill>
                 <a:latin typeface="MS Mincho"/>
               </a:rPr>
-              <a:t>そして俺はここで、仕事で疲労困憊して、一人きりで、助けもなく、残業代もなしだ！</a:t>
+              <a:t>警部: なんということだ！まだここにいるのですか？</a:t>
             </a:r>
           </a:p>
           <a:p/>
@@ -13137,7 +13148,7 @@
         </p:nvSpPr>
         <p:spPr>
           <a:xfrm>
-            <a:off x="1712976" y="571500"/>
+            <a:off x="1712976" y="1524000"/>
             <a:ext cx="7112000" cy="1993900"/>
           </a:xfrm>
           <a:prstGeom prst="rect">
@@ -13172,7 +13183,7 @@
         </p:nvSpPr>
         <p:spPr>
           <a:xfrm>
-            <a:off x="1712976" y="3383280"/>
+            <a:off x="1712976" y="4114800"/>
             <a:ext cx="8763000" cy="1993900"/>
           </a:xfrm>
           <a:prstGeom prst="rect">
@@ -13233,7 +13244,7 @@
         </p:nvSpPr>
         <p:spPr>
           <a:xfrm>
-            <a:off x="1712976" y="571500"/>
+            <a:off x="1712976" y="1524000"/>
             <a:ext cx="7112000" cy="1993900"/>
           </a:xfrm>
           <a:prstGeom prst="rect">
@@ -13268,7 +13279,7 @@
         </p:nvSpPr>
         <p:spPr>
           <a:xfrm>
-            <a:off x="1712976" y="3383280"/>
+            <a:off x="1712976" y="4114800"/>
             <a:ext cx="8763000" cy="1993900"/>
           </a:xfrm>
           <a:prstGeom prst="rect">
@@ -13289,7 +13300,7 @@
                 </a:solidFill>
                 <a:latin typeface="MS Mincho"/>
               </a:rPr>
-              <a:t>マグダ: ならどうすればいいの...？</a:t>
+              <a:t>警部: 私たちが直面している重大な問題に気がついていないのですか？</a:t>
             </a:r>
           </a:p>
           <a:p/>
@@ -13329,7 +13340,7 @@
         </p:nvSpPr>
         <p:spPr>
           <a:xfrm>
-            <a:off x="1712976" y="571500"/>
+            <a:off x="1712976" y="1524000"/>
             <a:ext cx="7112000" cy="1993900"/>
           </a:xfrm>
           <a:prstGeom prst="rect">
@@ -13364,7 +13375,7 @@
         </p:nvSpPr>
         <p:spPr>
           <a:xfrm>
-            <a:off x="1712976" y="3383280"/>
+            <a:off x="1712976" y="4114800"/>
             <a:ext cx="8763000" cy="1993900"/>
           </a:xfrm>
           <a:prstGeom prst="rect">
@@ -13385,7 +13396,7 @@
                 </a:solidFill>
                 <a:latin typeface="MS Mincho"/>
               </a:rPr>
-              <a:t>なんということだ！まだここにいるのですか？</a:t>
+              <a:t>警部: 祖国の危機の最中に、あなたは平手打ちと呼べなくもない理由に泣いている！</a:t>
             </a:r>
           </a:p>
           <a:p/>
@@ -13425,7 +13436,7 @@
         </p:nvSpPr>
         <p:spPr>
           <a:xfrm>
-            <a:off x="1712976" y="571500"/>
+            <a:off x="1712976" y="1524000"/>
             <a:ext cx="7112000" cy="1993900"/>
           </a:xfrm>
           <a:prstGeom prst="rect">
@@ -13460,7 +13471,7 @@
         </p:nvSpPr>
         <p:spPr>
           <a:xfrm>
-            <a:off x="1712976" y="3383280"/>
+            <a:off x="1712976" y="4114800"/>
             <a:ext cx="8763000" cy="1993900"/>
           </a:xfrm>
           <a:prstGeom prst="rect">
@@ -13481,7 +13492,7 @@
                 </a:solidFill>
                 <a:latin typeface="MS Mincho"/>
               </a:rPr>
-              <a:t>私たちが直面している重大な問題に気がついていないのですか？</a:t>
+              <a:t>警部: 私たちはあなたのため 奴らのために命の危険を冒し、</a:t>
             </a:r>
           </a:p>
           <a:p/>
@@ -13521,7 +13532,7 @@
         </p:nvSpPr>
         <p:spPr>
           <a:xfrm>
-            <a:off x="1712976" y="571500"/>
+            <a:off x="1712976" y="1524000"/>
             <a:ext cx="7112000" cy="1993900"/>
           </a:xfrm>
           <a:prstGeom prst="rect">
@@ -13556,7 +13567,7 @@
         </p:nvSpPr>
         <p:spPr>
           <a:xfrm>
-            <a:off x="1712976" y="3383280"/>
+            <a:off x="1712976" y="4114800"/>
             <a:ext cx="8763000" cy="1993900"/>
           </a:xfrm>
           <a:prstGeom prst="rect">
@@ -13577,7 +13588,7 @@
                 </a:solidFill>
                 <a:latin typeface="MS Mincho"/>
               </a:rPr>
-              <a:t>祖国の安全が危険にさらされているというのに、あなたは平手打ちと呼べなくもない、そんなものを理由に泣いている</a:t>
+              <a:t>警部: 犯罪者やテロリスト 泥棒 ホモ などからあなたたちを守っているのですよ</a:t>
             </a:r>
           </a:p>
           <a:p/>
@@ -13617,7 +13628,7 @@
         </p:nvSpPr>
         <p:spPr>
           <a:xfrm>
-            <a:off x="1712976" y="571500"/>
+            <a:off x="1712976" y="1524000"/>
             <a:ext cx="7112000" cy="1993900"/>
           </a:xfrm>
           <a:prstGeom prst="rect">
@@ -13652,7 +13663,7 @@
         </p:nvSpPr>
         <p:spPr>
           <a:xfrm>
-            <a:off x="1712976" y="3383280"/>
+            <a:off x="1712976" y="4114800"/>
             <a:ext cx="8763000" cy="1993900"/>
           </a:xfrm>
           <a:prstGeom prst="rect">
@@ -13673,7 +13684,7 @@
                 </a:solidFill>
                 <a:latin typeface="MS Mincho"/>
               </a:rPr>
-              <a:t>私たちはあなたのために、あなたのような人たちのために、命を危険にさらし、</a:t>
+              <a:t>警部: あなたのかわいそうなご主人は 仕事で疲れて試合も楽しめず.......</a:t>
             </a:r>
           </a:p>
           <a:p/>
@@ -13713,7 +13724,7 @@
         </p:nvSpPr>
         <p:spPr>
           <a:xfrm>
-            <a:off x="1712976" y="571500"/>
+            <a:off x="1712976" y="1524000"/>
             <a:ext cx="7112000" cy="1993900"/>
           </a:xfrm>
           <a:prstGeom prst="rect">
@@ -13748,7 +13759,7 @@
         </p:nvSpPr>
         <p:spPr>
           <a:xfrm>
-            <a:off x="1712976" y="3383280"/>
+            <a:off x="1712976" y="4114800"/>
             <a:ext cx="8763000" cy="1993900"/>
           </a:xfrm>
           <a:prstGeom prst="rect">
@@ -13769,7 +13780,7 @@
                 </a:solidFill>
                 <a:latin typeface="MS Mincho"/>
               </a:rPr>
-              <a:t>犯罪者やテロリスト、泥棒、ホモ、その他もろもろからあなたたちを守っているのですよ。</a:t>
+              <a:t>警部: とっとと出てってください！今回は許してあげますから！</a:t>
             </a:r>
           </a:p>
           <a:p/>
@@ -13809,7 +13820,7 @@
         </p:nvSpPr>
         <p:spPr>
           <a:xfrm>
-            <a:off x="1712976" y="571500"/>
+            <a:off x="1712976" y="1524000"/>
             <a:ext cx="7112000" cy="1993900"/>
           </a:xfrm>
           <a:prstGeom prst="rect">
@@ -13844,7 +13855,7 @@
         </p:nvSpPr>
         <p:spPr>
           <a:xfrm>
-            <a:off x="1712976" y="3383280"/>
+            <a:off x="1712976" y="4114800"/>
             <a:ext cx="8763000" cy="1993900"/>
           </a:xfrm>
           <a:prstGeom prst="rect">
@@ -13865,7 +13876,7 @@
                 </a:solidFill>
                 <a:latin typeface="MS Mincho"/>
               </a:rPr>
-              <a:t>そして、あなたのかわいそうなご主人は、仕事で疲れ果て、試合を楽しむこともできず⋯⋯</a:t>
+              <a:t>警部: もう繰り返さないように！</a:t>
             </a:r>
           </a:p>
           <a:p/>
@@ -13905,7 +13916,7 @@
         </p:nvSpPr>
         <p:spPr>
           <a:xfrm>
-            <a:off x="1712976" y="571500"/>
+            <a:off x="1712976" y="1524000"/>
             <a:ext cx="7112000" cy="1993900"/>
           </a:xfrm>
           <a:prstGeom prst="rect">
@@ -13940,7 +13951,7 @@
         </p:nvSpPr>
         <p:spPr>
           <a:xfrm>
-            <a:off x="1712976" y="3383280"/>
+            <a:off x="1712976" y="4114800"/>
             <a:ext cx="8763000" cy="1993900"/>
           </a:xfrm>
           <a:prstGeom prst="rect">
@@ -13961,7 +13972,7 @@
                 </a:solidFill>
                 <a:latin typeface="MS Mincho"/>
               </a:rPr>
-              <a:t>さあ、出て行ってください！とっとと出ていってください　今回は許してあげますから！</a:t>
+              <a:t>マルガリータ: こんにちは⋯⋯</a:t>
             </a:r>
           </a:p>
           <a:p/>
@@ -14001,7 +14012,7 @@
         </p:nvSpPr>
         <p:spPr>
           <a:xfrm>
-            <a:off x="1712976" y="571500"/>
+            <a:off x="1712976" y="1524000"/>
             <a:ext cx="7112000" cy="1993900"/>
           </a:xfrm>
           <a:prstGeom prst="rect">
@@ -14036,7 +14047,7 @@
         </p:nvSpPr>
         <p:spPr>
           <a:xfrm>
-            <a:off x="1712976" y="3383280"/>
+            <a:off x="1712976" y="4114800"/>
             <a:ext cx="8763000" cy="1993900"/>
           </a:xfrm>
           <a:prstGeom prst="rect">
@@ -14057,7 +14068,7 @@
                 </a:solidFill>
                 <a:latin typeface="MS Mincho"/>
               </a:rPr>
-              <a:t>でも、もう繰り返さないように！</a:t>
+              <a:t>第二場</a:t>
             </a:r>
           </a:p>
           <a:p/>
@@ -14097,7 +14108,7 @@
         </p:nvSpPr>
         <p:spPr>
           <a:xfrm>
-            <a:off x="1712976" y="571500"/>
+            <a:off x="1712976" y="1524000"/>
             <a:ext cx="7112000" cy="1993900"/>
           </a:xfrm>
           <a:prstGeom prst="rect">
@@ -14132,7 +14143,7 @@
         </p:nvSpPr>
         <p:spPr>
           <a:xfrm>
-            <a:off x="1712976" y="3383280"/>
+            <a:off x="1712976" y="4114800"/>
             <a:ext cx="8763000" cy="1993900"/>
           </a:xfrm>
           <a:prstGeom prst="rect">
@@ -14153,7 +14164,7 @@
                 </a:solidFill>
                 <a:latin typeface="MS Mincho"/>
               </a:rPr>
-              <a:t>こんにちは⋯⋯</a:t>
+              <a:t>弁護士: 離婚したいとおっしゃるのですね？</a:t>
             </a:r>
           </a:p>
           <a:p/>
@@ -14193,7 +14204,7 @@
         </p:nvSpPr>
         <p:spPr>
           <a:xfrm>
-            <a:off x="1712976" y="571500"/>
+            <a:off x="1712976" y="1524000"/>
             <a:ext cx="7112000" cy="1993900"/>
           </a:xfrm>
           <a:prstGeom prst="rect">
@@ -14228,7 +14239,7 @@
         </p:nvSpPr>
         <p:spPr>
           <a:xfrm>
-            <a:off x="1712976" y="3383280"/>
+            <a:off x="1712976" y="4114800"/>
             <a:ext cx="8763000" cy="1993900"/>
           </a:xfrm>
           <a:prstGeom prst="rect">
@@ -14249,7 +14260,7 @@
                 </a:solidFill>
                 <a:latin typeface="MS Mincho"/>
               </a:rPr>
-              <a:t>なぜ？</a:t>
+              <a:t>警部: なぜ？</a:t>
             </a:r>
           </a:p>
           <a:p/>
@@ -14289,7 +14300,7 @@
         </p:nvSpPr>
         <p:spPr>
           <a:xfrm>
-            <a:off x="1712976" y="571500"/>
+            <a:off x="1712976" y="1524000"/>
             <a:ext cx="7112000" cy="1993900"/>
           </a:xfrm>
           <a:prstGeom prst="rect">
@@ -14324,7 +14335,7 @@
         </p:nvSpPr>
         <p:spPr>
           <a:xfrm>
-            <a:off x="1712976" y="3383280"/>
+            <a:off x="1712976" y="4114800"/>
             <a:ext cx="8763000" cy="1993900"/>
           </a:xfrm>
           <a:prstGeom prst="rect">
@@ -14345,7 +14356,7 @@
                 </a:solidFill>
                 <a:latin typeface="MS Mincho"/>
               </a:rPr>
-              <a:t>第二場</a:t>
+              <a:t>弁護士: では、その理由を教えていただけますか？</a:t>
             </a:r>
           </a:p>
           <a:p/>
@@ -14385,7 +14396,7 @@
         </p:nvSpPr>
         <p:spPr>
           <a:xfrm>
-            <a:off x="1712976" y="571500"/>
+            <a:off x="1712976" y="1524000"/>
             <a:ext cx="7112000" cy="1993900"/>
           </a:xfrm>
           <a:prstGeom prst="rect">
@@ -14420,7 +14431,7 @@
         </p:nvSpPr>
         <p:spPr>
           <a:xfrm>
-            <a:off x="1712976" y="3383280"/>
+            <a:off x="1712976" y="4114800"/>
             <a:ext cx="8763000" cy="1993900"/>
           </a:xfrm>
           <a:prstGeom prst="rect">
@@ -14441,7 +14452,7 @@
                 </a:solidFill>
                 <a:latin typeface="MS Mincho"/>
               </a:rPr>
-              <a:t>離婚したいとおっしゃるのですね？</a:t>
+              <a:t>マルガリータ: 主人が秘書を連れて家を出ていきました</a:t>
             </a:r>
           </a:p>
           <a:p/>
@@ -14481,7 +14492,7 @@
         </p:nvSpPr>
         <p:spPr>
           <a:xfrm>
-            <a:off x="1712976" y="571500"/>
+            <a:off x="1712976" y="1524000"/>
             <a:ext cx="7112000" cy="1993900"/>
           </a:xfrm>
           <a:prstGeom prst="rect">
@@ -14516,7 +14527,7 @@
         </p:nvSpPr>
         <p:spPr>
           <a:xfrm>
-            <a:off x="1712976" y="3383280"/>
+            <a:off x="1712976" y="4114800"/>
             <a:ext cx="8763000" cy="1993900"/>
           </a:xfrm>
           <a:prstGeom prst="rect">
@@ -14537,7 +14548,7 @@
                 </a:solidFill>
                 <a:latin typeface="MS Mincho"/>
               </a:rPr>
-              <a:t>では、その理由を教えていただけますか？</a:t>
+              <a:t>マルガリータ: 大したことではないと思われますか？</a:t>
             </a:r>
           </a:p>
           <a:p/>
@@ -14577,7 +14588,7 @@
         </p:nvSpPr>
         <p:spPr>
           <a:xfrm>
-            <a:off x="1712976" y="571500"/>
+            <a:off x="1712976" y="1524000"/>
             <a:ext cx="7112000" cy="1993900"/>
           </a:xfrm>
           <a:prstGeom prst="rect">
@@ -14612,7 +14623,7 @@
         </p:nvSpPr>
         <p:spPr>
           <a:xfrm>
-            <a:off x="1712976" y="3383280"/>
+            <a:off x="1712976" y="4114800"/>
             <a:ext cx="8763000" cy="1993900"/>
           </a:xfrm>
           <a:prstGeom prst="rect">
@@ -14633,7 +14644,7 @@
                 </a:solidFill>
                 <a:latin typeface="MS Mincho"/>
               </a:rPr>
-              <a:t>主人が秘書を連れて家を出ていきました。</a:t>
+              <a:t>弁護士: 考えてみましょう⋯⋯考えてみましょう</a:t>
             </a:r>
           </a:p>
           <a:p/>
@@ -14673,7 +14684,7 @@
         </p:nvSpPr>
         <p:spPr>
           <a:xfrm>
-            <a:off x="1712976" y="571500"/>
+            <a:off x="1712976" y="1524000"/>
             <a:ext cx="7112000" cy="1993900"/>
           </a:xfrm>
           <a:prstGeom prst="rect">
@@ -14708,7 +14719,7 @@
         </p:nvSpPr>
         <p:spPr>
           <a:xfrm>
-            <a:off x="1712976" y="3383280"/>
+            <a:off x="1712976" y="4114800"/>
             <a:ext cx="8763000" cy="1993900"/>
           </a:xfrm>
           <a:prstGeom prst="rect">
@@ -14729,7 +14740,7 @@
                 </a:solidFill>
                 <a:latin typeface="MS Mincho"/>
               </a:rPr>
-              <a:t>大したことではないと思われますか？　　考えてみましょう⋯⋯考えてみましょう　</a:t>
+              <a:t>弁護士: 大変なことかもしれないし、どうでもいいことかもしれません その二人はどこに行ったのですか？</a:t>
             </a:r>
           </a:p>
           <a:p/>
@@ -14769,7 +14780,7 @@
         </p:nvSpPr>
         <p:spPr>
           <a:xfrm>
-            <a:off x="1712976" y="571500"/>
+            <a:off x="1712976" y="1524000"/>
             <a:ext cx="7112000" cy="1993900"/>
           </a:xfrm>
           <a:prstGeom prst="rect">
@@ -14804,7 +14815,7 @@
         </p:nvSpPr>
         <p:spPr>
           <a:xfrm>
-            <a:off x="1712976" y="3383280"/>
+            <a:off x="1712976" y="4114800"/>
             <a:ext cx="8763000" cy="1993900"/>
           </a:xfrm>
           <a:prstGeom prst="rect">
@@ -14825,7 +14836,7 @@
                 </a:solidFill>
                 <a:latin typeface="MS Mincho"/>
               </a:rPr>
-              <a:t>大変なことかもしれないし、どうでもいいことかもしれません　そのお二人はどこに行ったのですか？</a:t>
+              <a:t>マルガリータ: 数日休暇を過ごすためにマヨルカ島へ...</a:t>
             </a:r>
           </a:p>
           <a:p/>
@@ -14865,7 +14876,7 @@
         </p:nvSpPr>
         <p:spPr>
           <a:xfrm>
-            <a:off x="1712976" y="571500"/>
+            <a:off x="1712976" y="1524000"/>
             <a:ext cx="7112000" cy="1993900"/>
           </a:xfrm>
           <a:prstGeom prst="rect">
@@ -14900,7 +14911,7 @@
         </p:nvSpPr>
         <p:spPr>
           <a:xfrm>
-            <a:off x="1712976" y="3383280"/>
+            <a:off x="1712976" y="4114800"/>
             <a:ext cx="8763000" cy="1993900"/>
           </a:xfrm>
           <a:prstGeom prst="rect">
@@ -14921,7 +14932,7 @@
                 </a:solidFill>
                 <a:latin typeface="MS Mincho"/>
               </a:rPr>
-              <a:t>マヨルカ島です。数日間の休暇を過ごすために</a:t>
+              <a:t>マルガリータ: セントラル・ホテルに泊まっています</a:t>
             </a:r>
           </a:p>
           <a:p/>
@@ -14961,7 +14972,7 @@
         </p:nvSpPr>
         <p:spPr>
           <a:xfrm>
-            <a:off x="1712976" y="571500"/>
+            <a:off x="1712976" y="1524000"/>
             <a:ext cx="7112000" cy="1993900"/>
           </a:xfrm>
           <a:prstGeom prst="rect">
@@ -14996,7 +15007,7 @@
         </p:nvSpPr>
         <p:spPr>
           <a:xfrm>
-            <a:off x="1712976" y="3383280"/>
+            <a:off x="1712976" y="4114800"/>
             <a:ext cx="8763000" cy="1993900"/>
           </a:xfrm>
           <a:prstGeom prst="rect">
@@ -15017,7 +15028,7 @@
                 </a:solidFill>
                 <a:latin typeface="MS Mincho"/>
               </a:rPr>
-              <a:t>セントラル・ホテルに泊まっています</a:t>
+              <a:t>マルガリータ: 部屋番号と電話番号はわかっています</a:t>
             </a:r>
           </a:p>
           <a:p/>
@@ -15057,7 +15068,7 @@
         </p:nvSpPr>
         <p:spPr>
           <a:xfrm>
-            <a:off x="1712976" y="571500"/>
+            <a:off x="1712976" y="1524000"/>
             <a:ext cx="7112000" cy="1993900"/>
           </a:xfrm>
           <a:prstGeom prst="rect">
@@ -15092,7 +15103,7 @@
         </p:nvSpPr>
         <p:spPr>
           <a:xfrm>
-            <a:off x="1712976" y="3383280"/>
+            <a:off x="1712976" y="4114800"/>
             <a:ext cx="8763000" cy="1993900"/>
           </a:xfrm>
           <a:prstGeom prst="rect">
@@ -15113,7 +15124,7 @@
                 </a:solidFill>
                 <a:latin typeface="MS Mincho"/>
               </a:rPr>
-              <a:t>部屋番号と電話番号はわかっています</a:t>
+              <a:t>弁護士: わかりました...よく考えれば大したではないです</a:t>
             </a:r>
           </a:p>
           <a:p/>
@@ -15153,7 +15164,7 @@
         </p:nvSpPr>
         <p:spPr>
           <a:xfrm>
-            <a:off x="1712976" y="571500"/>
+            <a:off x="1712976" y="1524000"/>
             <a:ext cx="7112000" cy="1993900"/>
           </a:xfrm>
           <a:prstGeom prst="rect">
@@ -15188,7 +15199,7 @@
         </p:nvSpPr>
         <p:spPr>
           <a:xfrm>
-            <a:off x="1712976" y="3383280"/>
+            <a:off x="1712976" y="4114800"/>
             <a:ext cx="8763000" cy="1993900"/>
           </a:xfrm>
           <a:prstGeom prst="rect">
@@ -15209,7 +15220,7 @@
                 </a:solidFill>
                 <a:latin typeface="MS Mincho"/>
               </a:rPr>
-              <a:t>はい、はい、わかりました　よく考えれば、別に大したことではありません。</a:t>
+              <a:t>弁護士: その二人は夫婦のように生活しているのですか？</a:t>
             </a:r>
           </a:p>
           <a:p/>
@@ -15249,7 +15260,7 @@
         </p:nvSpPr>
         <p:spPr>
           <a:xfrm>
-            <a:off x="1712976" y="571500"/>
+            <a:off x="1712976" y="1524000"/>
             <a:ext cx="7112000" cy="1993900"/>
           </a:xfrm>
           <a:prstGeom prst="rect">
@@ -15284,7 +15295,7 @@
         </p:nvSpPr>
         <p:spPr>
           <a:xfrm>
-            <a:off x="1712976" y="3383280"/>
+            <a:off x="1712976" y="4114800"/>
             <a:ext cx="8763000" cy="1993900"/>
           </a:xfrm>
           <a:prstGeom prst="rect">
@@ -15345,7 +15356,7 @@
         </p:nvSpPr>
         <p:spPr>
           <a:xfrm>
-            <a:off x="1712976" y="571500"/>
+            <a:off x="1712976" y="1524000"/>
             <a:ext cx="7112000" cy="1993900"/>
           </a:xfrm>
           <a:prstGeom prst="rect">
@@ -15380,7 +15391,7 @@
         </p:nvSpPr>
         <p:spPr>
           <a:xfrm>
-            <a:off x="1712976" y="3383280"/>
+            <a:off x="1712976" y="4114800"/>
             <a:ext cx="8763000" cy="1993900"/>
           </a:xfrm>
           <a:prstGeom prst="rect">
@@ -15401,7 +15412,7 @@
                 </a:solidFill>
                 <a:latin typeface="MS Mincho"/>
               </a:rPr>
-              <a:t>それで、そのお二人は夫婦のように生活しているのですか？</a:t>
+              <a:t>弁護士: ホテルに夫妻としてチェックインしたのですか？</a:t>
             </a:r>
           </a:p>
           <a:p/>
@@ -15441,7 +15452,7 @@
         </p:nvSpPr>
         <p:spPr>
           <a:xfrm>
-            <a:off x="1712976" y="571500"/>
+            <a:off x="1712976" y="1524000"/>
             <a:ext cx="7112000" cy="1993900"/>
           </a:xfrm>
           <a:prstGeom prst="rect">
@@ -15476,7 +15487,7 @@
         </p:nvSpPr>
         <p:spPr>
           <a:xfrm>
-            <a:off x="1712976" y="3383280"/>
+            <a:off x="1712976" y="4114800"/>
             <a:ext cx="8763000" cy="1993900"/>
           </a:xfrm>
           <a:prstGeom prst="rect">
@@ -15497,7 +15508,7 @@
                 </a:solidFill>
                 <a:latin typeface="MS Mincho"/>
               </a:rPr>
-              <a:t>ホテルに夫妻としてチェックインしたのですか？</a:t>
+              <a:t>マルガリータ: いえ、二人はそれぞれの名前で別々の部屋に泊まっています</a:t>
             </a:r>
           </a:p>
           <a:p/>
@@ -15537,7 +15548,7 @@
         </p:nvSpPr>
         <p:spPr>
           <a:xfrm>
-            <a:off x="1712976" y="571500"/>
+            <a:off x="1712976" y="1524000"/>
             <a:ext cx="7112000" cy="1993900"/>
           </a:xfrm>
           <a:prstGeom prst="rect">
@@ -15572,7 +15583,7 @@
         </p:nvSpPr>
         <p:spPr>
           <a:xfrm>
-            <a:off x="1712976" y="3383280"/>
+            <a:off x="1712976" y="4114800"/>
             <a:ext cx="8763000" cy="1993900"/>
           </a:xfrm>
           <a:prstGeom prst="rect">
@@ -15593,7 +15604,7 @@
                 </a:solidFill>
                 <a:latin typeface="MS Mincho"/>
               </a:rPr>
-              <a:t>いいえ。二人はそれぞれの名前で別々の部屋に泊まっています　</a:t>
+              <a:t>マルガリータ: 単なる上司と秘書のふりをしています</a:t>
             </a:r>
           </a:p>
           <a:p/>
@@ -15633,7 +15644,7 @@
         </p:nvSpPr>
         <p:spPr>
           <a:xfrm>
-            <a:off x="1712976" y="571500"/>
+            <a:off x="1712976" y="1524000"/>
             <a:ext cx="7112000" cy="1993900"/>
           </a:xfrm>
           <a:prstGeom prst="rect">
@@ -15668,7 +15679,7 @@
         </p:nvSpPr>
         <p:spPr>
           <a:xfrm>
-            <a:off x="1712976" y="3383280"/>
+            <a:off x="1712976" y="4114800"/>
             <a:ext cx="8763000" cy="1993900"/>
           </a:xfrm>
           <a:prstGeom prst="rect">
@@ -15689,7 +15700,7 @@
                 </a:solidFill>
                 <a:latin typeface="MS Mincho"/>
               </a:rPr>
-              <a:t>単なる上司と秘書のふりをしているのです。</a:t>
+              <a:t>弁護士: ああ！良くない、非常に良くない 姦通の明確な証拠がありません</a:t>
             </a:r>
           </a:p>
           <a:p/>
@@ -15729,7 +15740,7 @@
         </p:nvSpPr>
         <p:spPr>
           <a:xfrm>
-            <a:off x="1712976" y="571500"/>
+            <a:off x="1712976" y="1524000"/>
             <a:ext cx="7112000" cy="1993900"/>
           </a:xfrm>
           <a:prstGeom prst="rect">
@@ -15764,7 +15775,7 @@
         </p:nvSpPr>
         <p:spPr>
           <a:xfrm>
-            <a:off x="1712976" y="3383280"/>
+            <a:off x="1712976" y="4114800"/>
             <a:ext cx="8763000" cy="1993900"/>
           </a:xfrm>
           <a:prstGeom prst="rect">
@@ -15785,7 +15796,7 @@
                 </a:solidFill>
                 <a:latin typeface="MS Mincho"/>
               </a:rPr>
-              <a:t>ああ！良くないな、非常に良くないです　姦通の明白な証拠がありません</a:t>
+              <a:t>弁護士: ADULTERII PROBATUM DEBEM ESSE - 姦通は証明されなければならない - お分かりですか？</a:t>
             </a:r>
           </a:p>
           <a:p/>
@@ -15825,7 +15836,7 @@
         </p:nvSpPr>
         <p:spPr>
           <a:xfrm>
-            <a:off x="1712976" y="571500"/>
+            <a:off x="1712976" y="1524000"/>
             <a:ext cx="7112000" cy="1993900"/>
           </a:xfrm>
           <a:prstGeom prst="rect">
@@ -15860,7 +15871,7 @@
         </p:nvSpPr>
         <p:spPr>
           <a:xfrm>
-            <a:off x="1712976" y="3383280"/>
+            <a:off x="1712976" y="4114800"/>
             <a:ext cx="8763000" cy="1993900"/>
           </a:xfrm>
           <a:prstGeom prst="rect">
@@ -15881,7 +15892,7 @@
                 </a:solidFill>
                 <a:latin typeface="MS Mincho"/>
               </a:rPr>
-              <a:t>Adulterii probatum debem esse、姦通は証明されなければならない、ということです　お分かりですか？</a:t>
+              <a:t>弁護士: 姦通は、性交があった証言をする限りにおいて COMPROBATUM EST つまり立証されます</a:t>
             </a:r>
           </a:p>
           <a:p/>
@@ -15921,7 +15932,7 @@
         </p:nvSpPr>
         <p:spPr>
           <a:xfrm>
-            <a:off x="1712976" y="571500"/>
+            <a:off x="1712976" y="1524000"/>
             <a:ext cx="7112000" cy="1993900"/>
           </a:xfrm>
           <a:prstGeom prst="rect">
@@ -15956,7 +15967,7 @@
         </p:nvSpPr>
         <p:spPr>
           <a:xfrm>
-            <a:off x="1712976" y="3383280"/>
+            <a:off x="1712976" y="4114800"/>
             <a:ext cx="8763000" cy="1993900"/>
           </a:xfrm>
           <a:prstGeom prst="rect">
@@ -15977,7 +15988,7 @@
                 </a:solidFill>
                 <a:latin typeface="MS Mincho"/>
               </a:rPr>
-              <a:t>姦通は、性交があったというような意味で証言をする限りにおいて comprobatum est、つまり立証されます</a:t>
+              <a:t>弁護士: それも、居合わせた目撃者が明白な誓いのもと！</a:t>
             </a:r>
           </a:p>
           <a:p/>
@@ -16017,7 +16028,7 @@
         </p:nvSpPr>
         <p:spPr>
           <a:xfrm>
-            <a:off x="1712976" y="571500"/>
+            <a:off x="1712976" y="1524000"/>
             <a:ext cx="7112000" cy="1993900"/>
           </a:xfrm>
           <a:prstGeom prst="rect">
@@ -16052,7 +16063,7 @@
         </p:nvSpPr>
         <p:spPr>
           <a:xfrm>
-            <a:off x="1712976" y="3383280"/>
+            <a:off x="1712976" y="4114800"/>
             <a:ext cx="8763000" cy="1993900"/>
           </a:xfrm>
           <a:prstGeom prst="rect">
@@ -16073,7 +16084,7 @@
                 </a:solidFill>
                 <a:latin typeface="MS Mincho"/>
               </a:rPr>
-              <a:t>居合わせた目撃者が明白な誓いのもと。</a:t>
+              <a:t>弁護士: しかし、理解に努めましょう</a:t>
             </a:r>
           </a:p>
           <a:p/>
@@ -16113,7 +16124,7 @@
         </p:nvSpPr>
         <p:spPr>
           <a:xfrm>
-            <a:off x="1712976" y="571500"/>
+            <a:off x="1712976" y="1524000"/>
             <a:ext cx="7112000" cy="1993900"/>
           </a:xfrm>
           <a:prstGeom prst="rect">
@@ -16148,7 +16159,7 @@
         </p:nvSpPr>
         <p:spPr>
           <a:xfrm>
-            <a:off x="1712976" y="3383280"/>
+            <a:off x="1712976" y="4114800"/>
             <a:ext cx="8763000" cy="1993900"/>
           </a:xfrm>
           <a:prstGeom prst="rect">
@@ -16169,7 +16180,7 @@
                 </a:solidFill>
                 <a:latin typeface="MS Mincho"/>
               </a:rPr>
-              <a:t>しかし、理解に努めましょう⋯⋯</a:t>
+              <a:t>弁護士: 姦通を事実と認めるには、完全なる交が必要です</a:t>
             </a:r>
           </a:p>
           <a:p/>
@@ -16209,7 +16220,7 @@
         </p:nvSpPr>
         <p:spPr>
           <a:xfrm>
-            <a:off x="1712976" y="571500"/>
+            <a:off x="1712976" y="1524000"/>
             <a:ext cx="7112000" cy="1993900"/>
           </a:xfrm>
           <a:prstGeom prst="rect">
@@ -16244,7 +16255,7 @@
         </p:nvSpPr>
         <p:spPr>
           <a:xfrm>
-            <a:off x="1712976" y="3383280"/>
+            <a:off x="1712976" y="4114800"/>
             <a:ext cx="8763000" cy="1993900"/>
           </a:xfrm>
           <a:prstGeom prst="rect">
@@ -16265,7 +16276,7 @@
                 </a:solidFill>
                 <a:latin typeface="MS Mincho"/>
               </a:rPr>
-              <a:t>確実に事実と認められる姦通が存在したとするために必要とされる性交は、完全なる交尾なのです</a:t>
+              <a:t>弁護士: つまり、完全な射精における精液の放出をともなう男性器の女性器への挿入です</a:t>
             </a:r>
           </a:p>
           <a:p/>
@@ -16305,7 +16316,7 @@
         </p:nvSpPr>
         <p:spPr>
           <a:xfrm>
-            <a:off x="1712976" y="571500"/>
+            <a:off x="1712976" y="1524000"/>
             <a:ext cx="7112000" cy="1993900"/>
           </a:xfrm>
           <a:prstGeom prst="rect">
@@ -16340,7 +16351,7 @@
         </p:nvSpPr>
         <p:spPr>
           <a:xfrm>
-            <a:off x="1712976" y="3383280"/>
+            <a:off x="1712976" y="4114800"/>
             <a:ext cx="8763000" cy="1993900"/>
           </a:xfrm>
           <a:prstGeom prst="rect">
@@ -16361,7 +16372,7 @@
                 </a:solidFill>
                 <a:latin typeface="MS Mincho"/>
               </a:rPr>
-              <a:t>告訴？ここで？今日？</a:t>
+              <a:t>警部: 告訴？ここで？今日？</a:t>
             </a:r>
           </a:p>
           <a:p/>
@@ -16401,7 +16412,7 @@
         </p:nvSpPr>
         <p:spPr>
           <a:xfrm>
-            <a:off x="1712976" y="571500"/>
+            <a:off x="1712976" y="1524000"/>
             <a:ext cx="7112000" cy="1993900"/>
           </a:xfrm>
           <a:prstGeom prst="rect">
@@ -16436,7 +16447,7 @@
         </p:nvSpPr>
         <p:spPr>
           <a:xfrm>
-            <a:off x="1712976" y="3383280"/>
+            <a:off x="1712976" y="4114800"/>
             <a:ext cx="8763000" cy="1993900"/>
           </a:xfrm>
           <a:prstGeom prst="rect">
@@ -16457,7 +16468,7 @@
                 </a:solidFill>
                 <a:latin typeface="MS Mincho"/>
               </a:rPr>
-              <a:t>つまり、完全な射精における精液の放出をともなう男性器の女性器への挿入です</a:t>
+              <a:t>弁護士: そのような射精の検証には、その場に居合わせて即座に目で見ることは必要とされず、</a:t>
             </a:r>
           </a:p>
           <a:p/>
@@ -16497,7 +16508,7 @@
         </p:nvSpPr>
         <p:spPr>
           <a:xfrm>
-            <a:off x="1712976" y="571500"/>
+            <a:off x="1712976" y="1524000"/>
             <a:ext cx="7112000" cy="1993900"/>
           </a:xfrm>
           <a:prstGeom prst="rect">
@@ -16532,7 +16543,7 @@
         </p:nvSpPr>
         <p:spPr>
           <a:xfrm>
-            <a:off x="1712976" y="3383280"/>
+            <a:off x="1712976" y="4114800"/>
             <a:ext cx="8763000" cy="1993900"/>
           </a:xfrm>
           <a:prstGeom prst="rect">
@@ -16553,7 +16564,7 @@
                 </a:solidFill>
                 <a:latin typeface="MS Mincho"/>
               </a:rPr>
-              <a:t>そのような射精の検証には、その場に居合わせて即座に目で見ることは必要とされず、染みが付いたばかりのシーツや女性器の検査のような外から見て十分といえる印でこと足りるということを理解しましょう</a:t>
+              <a:t>弁護士: 染みが付いたばかりのシーツなど、外から見て十分といえる印で大丈夫です</a:t>
             </a:r>
           </a:p>
           <a:p/>
@@ -16593,7 +16604,7 @@
         </p:nvSpPr>
         <p:spPr>
           <a:xfrm>
-            <a:off x="1712976" y="571500"/>
+            <a:off x="1712976" y="1524000"/>
             <a:ext cx="7112000" cy="1993900"/>
           </a:xfrm>
           <a:prstGeom prst="rect">
@@ -16628,7 +16639,7 @@
         </p:nvSpPr>
         <p:spPr>
           <a:xfrm>
-            <a:off x="1712976" y="3383280"/>
+            <a:off x="1712976" y="4114800"/>
             <a:ext cx="8763000" cy="1993900"/>
           </a:xfrm>
           <a:prstGeom prst="rect">
@@ -16641,7 +16652,17 @@
             <a:spAutoFit/>
           </a:bodyPr>
           <a:lstStyle/>
-          <a:p/>
+          <a:p>
+            <a:r>
+              <a:rPr sz="4000">
+                <a:solidFill>
+                  <a:srgbClr val="FFFFFF"/>
+                </a:solidFill>
+                <a:latin typeface="MS Mincho"/>
+              </a:rPr>
+              <a:t>弁護士: 医師による女性器の検査でも可能です</a:t>
+            </a:r>
+          </a:p>
           <a:p/>
         </p:txBody>
       </p:sp>
@@ -16679,7 +16700,7 @@
         </p:nvSpPr>
         <p:spPr>
           <a:xfrm>
-            <a:off x="1712976" y="571500"/>
+            <a:off x="1712976" y="1524000"/>
             <a:ext cx="7112000" cy="1993900"/>
           </a:xfrm>
           <a:prstGeom prst="rect">
@@ -16714,7 +16735,7 @@
         </p:nvSpPr>
         <p:spPr>
           <a:xfrm>
-            <a:off x="1712976" y="3383280"/>
+            <a:off x="1712976" y="4114800"/>
             <a:ext cx="8763000" cy="1993900"/>
           </a:xfrm>
           <a:prstGeom prst="rect">
@@ -16727,7 +16748,17 @@
             <a:spAutoFit/>
           </a:bodyPr>
           <a:lstStyle/>
-          <a:p/>
+          <a:p>
+            <a:r>
+              <a:rPr sz="4000">
+                <a:solidFill>
+                  <a:srgbClr val="FFFFFF"/>
+                </a:solidFill>
+                <a:latin typeface="MS Mincho"/>
+              </a:rPr>
+              <a:t>弁護士: そんな形跡もないのに、どう証拠を提示するのですか？</a:t>
+            </a:r>
+          </a:p>
           <a:p/>
         </p:txBody>
       </p:sp>
@@ -16765,7 +16796,7 @@
         </p:nvSpPr>
         <p:spPr>
           <a:xfrm>
-            <a:off x="1712976" y="571500"/>
+            <a:off x="1712976" y="1524000"/>
             <a:ext cx="7112000" cy="1993900"/>
           </a:xfrm>
           <a:prstGeom prst="rect">
@@ -16800,7 +16831,7 @@
         </p:nvSpPr>
         <p:spPr>
           <a:xfrm>
-            <a:off x="1712976" y="3383280"/>
+            <a:off x="1712976" y="4114800"/>
             <a:ext cx="8763000" cy="1993900"/>
           </a:xfrm>
           <a:prstGeom prst="rect">
@@ -16821,7 +16852,7 @@
                 </a:solidFill>
                 <a:latin typeface="MS Mincho"/>
               </a:rPr>
-              <a:t>でも、どうでしょう、そういった形跡すらないのに、どうやってしかるべき証拠を提示できるのですか？</a:t>
+              <a:t>マルガリータ: もちろんそれはできません</a:t>
             </a:r>
           </a:p>
           <a:p/>
@@ -16861,7 +16892,7 @@
         </p:nvSpPr>
         <p:spPr>
           <a:xfrm>
-            <a:off x="1712976" y="571500"/>
+            <a:off x="1712976" y="1524000"/>
             <a:ext cx="7112000" cy="1993900"/>
           </a:xfrm>
           <a:prstGeom prst="rect">
@@ -16896,7 +16927,7 @@
         </p:nvSpPr>
         <p:spPr>
           <a:xfrm>
-            <a:off x="1712976" y="3383280"/>
+            <a:off x="1712976" y="4114800"/>
             <a:ext cx="8763000" cy="1993900"/>
           </a:xfrm>
           <a:prstGeom prst="rect">
@@ -16917,7 +16948,7 @@
                 </a:solidFill>
                 <a:latin typeface="MS Mincho"/>
               </a:rPr>
-              <a:t>もちろんそれはできません。</a:t>
+              <a:t>マルガリータ: でも、主人はその女性と2年前から付き合っています</a:t>
             </a:r>
           </a:p>
           <a:p/>
@@ -16957,7 +16988,7 @@
         </p:nvSpPr>
         <p:spPr>
           <a:xfrm>
-            <a:off x="1712976" y="571500"/>
+            <a:off x="1712976" y="1524000"/>
             <a:ext cx="7112000" cy="1993900"/>
           </a:xfrm>
           <a:prstGeom prst="rect">
@@ -16992,7 +17023,7 @@
         </p:nvSpPr>
         <p:spPr>
           <a:xfrm>
-            <a:off x="1712976" y="3383280"/>
+            <a:off x="1712976" y="4114800"/>
             <a:ext cx="8763000" cy="1993900"/>
           </a:xfrm>
           <a:prstGeom prst="rect">
@@ -17013,7 +17044,7 @@
                 </a:solidFill>
                 <a:latin typeface="MS Mincho"/>
               </a:rPr>
-              <a:t>でも、主人はその女性と2年前から付き合っています。</a:t>
+              <a:t>マルガリータ: 結婚前に主人の両親からもらったダイヤモンドの婚約指輪もその子にあげてしまいました</a:t>
             </a:r>
           </a:p>
           <a:p/>
@@ -17053,7 +17084,7 @@
         </p:nvSpPr>
         <p:spPr>
           <a:xfrm>
-            <a:off x="1712976" y="571500"/>
+            <a:off x="1712976" y="1524000"/>
             <a:ext cx="7112000" cy="1993900"/>
           </a:xfrm>
           <a:prstGeom prst="rect">
@@ -17088,7 +17119,7 @@
         </p:nvSpPr>
         <p:spPr>
           <a:xfrm>
-            <a:off x="1712976" y="3383280"/>
+            <a:off x="1712976" y="4114800"/>
             <a:ext cx="8763000" cy="1993900"/>
           </a:xfrm>
           <a:prstGeom prst="rect">
@@ -17109,7 +17140,7 @@
                 </a:solidFill>
                 <a:latin typeface="MS Mincho"/>
               </a:rPr>
-              <a:t>結婚前に主人の両親からプレゼントされたダイヤモンドの婚約指輪まで、その子にあげてしまいました。</a:t>
+              <a:t>マルガリータ: しかも、アパートを借りていて、仕事のあとは一緒にそこに行くのです</a:t>
             </a:r>
           </a:p>
           <a:p/>
@@ -17149,7 +17180,7 @@
         </p:nvSpPr>
         <p:spPr>
           <a:xfrm>
-            <a:off x="1712976" y="571500"/>
+            <a:off x="1712976" y="1524000"/>
             <a:ext cx="7112000" cy="1993900"/>
           </a:xfrm>
           <a:prstGeom prst="rect">
@@ -17184,7 +17215,7 @@
         </p:nvSpPr>
         <p:spPr>
           <a:xfrm>
-            <a:off x="1712976" y="3383280"/>
+            <a:off x="1712976" y="4114800"/>
             <a:ext cx="8763000" cy="1993900"/>
           </a:xfrm>
           <a:prstGeom prst="rect">
@@ -17205,7 +17236,7 @@
                 </a:solidFill>
                 <a:latin typeface="MS Mincho"/>
               </a:rPr>
-              <a:t>しかも、アパートを借りていて、仕事が終わると……一緒にそこに行くのです。</a:t>
+              <a:t>マルガリータ: 二人が出入りするのを近所の人たちが目撃しています</a:t>
             </a:r>
           </a:p>
           <a:p/>
@@ -17245,7 +17276,7 @@
         </p:nvSpPr>
         <p:spPr>
           <a:xfrm>
-            <a:off x="1712976" y="571500"/>
+            <a:off x="1712976" y="1524000"/>
             <a:ext cx="7112000" cy="1993900"/>
           </a:xfrm>
           <a:prstGeom prst="rect">
@@ -17280,7 +17311,7 @@
         </p:nvSpPr>
         <p:spPr>
           <a:xfrm>
-            <a:off x="1712976" y="3383280"/>
+            <a:off x="1712976" y="4114800"/>
             <a:ext cx="8763000" cy="1993900"/>
           </a:xfrm>
           <a:prstGeom prst="rect">
@@ -17301,7 +17332,7 @@
                 </a:solidFill>
                 <a:latin typeface="MS Mincho"/>
               </a:rPr>
-              <a:t>二人が出入りするのを通所の人たちが見ているのですから。</a:t>
+              <a:t>弁護士: 徴候、憶測、ああでもない、こうでもない！</a:t>
             </a:r>
           </a:p>
           <a:p/>
@@ -17341,7 +17372,7 @@
         </p:nvSpPr>
         <p:spPr>
           <a:xfrm>
-            <a:off x="1712976" y="571500"/>
+            <a:off x="1712976" y="1524000"/>
             <a:ext cx="7112000" cy="1993900"/>
           </a:xfrm>
           <a:prstGeom prst="rect">
@@ -17376,7 +17407,7 @@
         </p:nvSpPr>
         <p:spPr>
           <a:xfrm>
-            <a:off x="1712976" y="3383280"/>
+            <a:off x="1712976" y="4114800"/>
             <a:ext cx="8763000" cy="1993900"/>
           </a:xfrm>
           <a:prstGeom prst="rect">
@@ -17437,7 +17468,7 @@
         </p:nvSpPr>
         <p:spPr>
           <a:xfrm>
-            <a:off x="1712976" y="571500"/>
+            <a:off x="1712976" y="1524000"/>
             <a:ext cx="7112000" cy="1993900"/>
           </a:xfrm>
           <a:prstGeom prst="rect">
@@ -17472,7 +17503,7 @@
         </p:nvSpPr>
         <p:spPr>
           <a:xfrm>
-            <a:off x="1712976" y="3383280"/>
+            <a:off x="1712976" y="4114800"/>
             <a:ext cx="8763000" cy="1993900"/>
           </a:xfrm>
           <a:prstGeom prst="rect">
@@ -17493,7 +17524,7 @@
                 </a:solidFill>
                 <a:latin typeface="MS Mincho"/>
               </a:rPr>
-              <a:t>徴候、憶測、ああでもない、こうでもない！</a:t>
+              <a:t>弁護士: それは教会裁判所で姦通の疑いによる別居手続きには十分だったでしょうが、</a:t>
             </a:r>
           </a:p>
           <a:p/>
@@ -17533,7 +17564,7 @@
         </p:nvSpPr>
         <p:spPr>
           <a:xfrm>
-            <a:off x="1712976" y="571500"/>
+            <a:off x="1712976" y="1524000"/>
             <a:ext cx="7112000" cy="1993900"/>
           </a:xfrm>
           <a:prstGeom prst="rect">
@@ -17568,7 +17599,7 @@
         </p:nvSpPr>
         <p:spPr>
           <a:xfrm>
-            <a:off x="1712976" y="3383280"/>
+            <a:off x="1712976" y="4114800"/>
             <a:ext cx="8763000" cy="1993900"/>
           </a:xfrm>
           <a:prstGeom prst="rect">
@@ -17589,7 +17620,7 @@
                 </a:solidFill>
                 <a:latin typeface="MS Mincho"/>
               </a:rPr>
-              <a:t>それは教会裁判所で姦通の疑いによる別居の手続きするには十分だったでしょうが、</a:t>
+              <a:t>弁護士: いまのご時勢はですね奥さん、恩知らずなことに教会の司法権が軽んじられ</a:t>
             </a:r>
           </a:p>
           <a:p/>
@@ -17629,7 +17660,7 @@
         </p:nvSpPr>
         <p:spPr>
           <a:xfrm>
-            <a:off x="1712976" y="571500"/>
+            <a:off x="1712976" y="1524000"/>
             <a:ext cx="7112000" cy="1993900"/>
           </a:xfrm>
           <a:prstGeom prst="rect">
@@ -17664,7 +17695,7 @@
         </p:nvSpPr>
         <p:spPr>
           <a:xfrm>
-            <a:off x="1712976" y="3383280"/>
+            <a:off x="1712976" y="4114800"/>
             <a:ext cx="8763000" cy="1993900"/>
           </a:xfrm>
           <a:prstGeom prst="rect">
@@ -17685,7 +17716,7 @@
                 </a:solidFill>
                 <a:latin typeface="MS Mincho"/>
               </a:rPr>
-              <a:t>いまのご時勢はですね、親愛なる奥さん、恩知らずなことに教会の司法権が軽んじられ、</a:t>
+              <a:t>弁護士: 我々はただの民事裁判所になってしまいました...人の感情もキリスト教の道徳も考慮されず...</a:t>
             </a:r>
           </a:p>
           <a:p/>
@@ -17725,7 +17756,7 @@
         </p:nvSpPr>
         <p:spPr>
           <a:xfrm>
-            <a:off x="1712976" y="571500"/>
+            <a:off x="1712976" y="1524000"/>
             <a:ext cx="7112000" cy="1993900"/>
           </a:xfrm>
           <a:prstGeom prst="rect">
@@ -17760,7 +17791,7 @@
         </p:nvSpPr>
         <p:spPr>
           <a:xfrm>
-            <a:off x="1712976" y="3383280"/>
+            <a:off x="1712976" y="4114800"/>
             <a:ext cx="8763000" cy="1993900"/>
           </a:xfrm>
           <a:prstGeom prst="rect">
@@ -17781,7 +17812,7 @@
                 </a:solidFill>
                 <a:latin typeface="MS Mincho"/>
               </a:rPr>
-              <a:t>私たちは民事裁判所に成り下がらなければなりませんでした。そこでは人間感情もキリスト教徒の道徳も考慮されず、</a:t>
+              <a:t>弁護士: 我々にできるのは証拠を出すだけ...</a:t>
             </a:r>
           </a:p>
           <a:p/>
@@ -17821,7 +17852,7 @@
         </p:nvSpPr>
         <p:spPr>
           <a:xfrm>
-            <a:off x="1712976" y="571500"/>
+            <a:off x="1712976" y="1524000"/>
             <a:ext cx="7112000" cy="1993900"/>
           </a:xfrm>
           <a:prstGeom prst="rect">
@@ -17856,7 +17887,7 @@
         </p:nvSpPr>
         <p:spPr>
           <a:xfrm>
-            <a:off x="1712976" y="3383280"/>
+            <a:off x="1712976" y="4114800"/>
             <a:ext cx="8763000" cy="1993900"/>
           </a:xfrm>
           <a:prstGeom prst="rect">
@@ -17877,7 +17908,7 @@
                 </a:solidFill>
                 <a:latin typeface="MS Mincho"/>
               </a:rPr>
-              <a:t>我々にできるのは証拠を提出することだけ、</a:t>
+              <a:t>弁護士: 別居手続きにとりかかるための反証できない、疑う余地のない、証拠を！</a:t>
             </a:r>
           </a:p>
           <a:p/>
@@ -17917,7 +17948,7 @@
         </p:nvSpPr>
         <p:spPr>
           <a:xfrm>
-            <a:off x="1712976" y="571500"/>
+            <a:off x="1712976" y="1524000"/>
             <a:ext cx="7112000" cy="1993900"/>
           </a:xfrm>
           <a:prstGeom prst="rect">
@@ -17952,7 +17983,7 @@
         </p:nvSpPr>
         <p:spPr>
           <a:xfrm>
-            <a:off x="1712976" y="3383280"/>
+            <a:off x="1712976" y="4114800"/>
             <a:ext cx="8763000" cy="1993900"/>
           </a:xfrm>
           <a:prstGeom prst="rect">
@@ -17973,7 +18004,7 @@
                 </a:solidFill>
                 <a:latin typeface="MS Mincho"/>
               </a:rPr>
-              <a:t>別居手続きにとりかかるための反証できない、疑う余地のない、証拠を！</a:t>
+              <a:t>マルガリータ: それに、中人は家を出て行って、彼女と一緒にいるのですよ！</a:t>
             </a:r>
           </a:p>
           <a:p/>
@@ -18013,7 +18044,7 @@
         </p:nvSpPr>
         <p:spPr>
           <a:xfrm>
-            <a:off x="1712976" y="571500"/>
+            <a:off x="1712976" y="1524000"/>
             <a:ext cx="7112000" cy="1993900"/>
           </a:xfrm>
           <a:prstGeom prst="rect">
@@ -18048,7 +18079,7 @@
         </p:nvSpPr>
         <p:spPr>
           <a:xfrm>
-            <a:off x="1712976" y="3383280"/>
+            <a:off x="1712976" y="4114800"/>
             <a:ext cx="8763000" cy="1993900"/>
           </a:xfrm>
           <a:prstGeom prst="rect">
@@ -18069,7 +18100,7 @@
                 </a:solidFill>
                 <a:latin typeface="MS Mincho"/>
               </a:rPr>
-              <a:t>それに、中人は家を出て行って、彼女と一緒にいるのですよ！</a:t>
+              <a:t>マルガリータ: 休暇を取った1ヶ月は戻ってこないつもりです、</a:t>
             </a:r>
           </a:p>
           <a:p/>
@@ -18109,7 +18140,7 @@
         </p:nvSpPr>
         <p:spPr>
           <a:xfrm>
-            <a:off x="1712976" y="571500"/>
+            <a:off x="1712976" y="1524000"/>
             <a:ext cx="7112000" cy="1993900"/>
           </a:xfrm>
           <a:prstGeom prst="rect">
@@ -18144,7 +18175,7 @@
         </p:nvSpPr>
         <p:spPr>
           <a:xfrm>
-            <a:off x="1712976" y="3383280"/>
+            <a:off x="1712976" y="4114800"/>
             <a:ext cx="8763000" cy="1993900"/>
           </a:xfrm>
           <a:prstGeom prst="rect">
@@ -18165,7 +18196,7 @@
                 </a:solidFill>
                 <a:latin typeface="MS Mincho"/>
               </a:rPr>
-              <a:t>休暇を取った1ヶ月は戻ってこないつもりです、</a:t>
+              <a:t>マルガリータ: 私一人をバルセロナのマンションに子供と残して、しかも5ペセタのお金もなしに</a:t>
             </a:r>
           </a:p>
           <a:p/>
@@ -18205,7 +18236,7 @@
         </p:nvSpPr>
         <p:spPr>
           <a:xfrm>
-            <a:off x="1712976" y="571500"/>
+            <a:off x="1712976" y="1524000"/>
             <a:ext cx="7112000" cy="1993900"/>
           </a:xfrm>
           <a:prstGeom prst="rect">
@@ -18240,7 +18271,7 @@
         </p:nvSpPr>
         <p:spPr>
           <a:xfrm>
-            <a:off x="1712976" y="3383280"/>
+            <a:off x="1712976" y="4114800"/>
             <a:ext cx="8763000" cy="1993900"/>
           </a:xfrm>
           <a:prstGeom prst="rect">
@@ -18261,7 +18292,7 @@
                 </a:solidFill>
                 <a:latin typeface="MS Mincho"/>
               </a:rPr>
-              <a:t>私一人をバルセロナのマンションに子供と残して、しかも5ペセタのお金もなしに。</a:t>
+              <a:t>マルガリータ: 昨日は、料金未納のため電気が止められました</a:t>
             </a:r>
           </a:p>
           <a:p/>
@@ -18301,7 +18332,7 @@
         </p:nvSpPr>
         <p:spPr>
           <a:xfrm>
-            <a:off x="1712976" y="571500"/>
+            <a:off x="1712976" y="1524000"/>
             <a:ext cx="7112000" cy="1993900"/>
           </a:xfrm>
           <a:prstGeom prst="rect">
@@ -18336,7 +18367,7 @@
         </p:nvSpPr>
         <p:spPr>
           <a:xfrm>
-            <a:off x="1712976" y="3383280"/>
+            <a:off x="1712976" y="4114800"/>
             <a:ext cx="8763000" cy="1993900"/>
           </a:xfrm>
           <a:prstGeom prst="rect">
@@ -18357,7 +18388,7 @@
                 </a:solidFill>
                 <a:latin typeface="MS Mincho"/>
               </a:rPr>
-              <a:t>昨日は、料金未納のため電気が止められました。</a:t>
+              <a:t>マルガリータ: それって家族の放棄です、しかも悪意のある！</a:t>
             </a:r>
           </a:p>
           <a:p/>

</xml_diff>

<commit_message>
Set the placeholder lower again
</commit_message>
<xml_diff>
--- a/complete-cap.pptx
+++ b/complete-cap.pptx
@@ -163,6 +163,8 @@
     <p:sldId id="411" r:id="rId162"/>
     <p:sldId id="412" r:id="rId163"/>
     <p:sldId id="413" r:id="rId164"/>
+    <p:sldId id="414" r:id="rId165"/>
+    <p:sldId id="415" r:id="rId166"/>
   </p:sldIdLst>
   <p:sldSz cx="12188952" cy="6858000" type="screen4x3"/>
   <p:notesSz cx="6858000" cy="9144000"/>
@@ -3261,7 +3263,7 @@
         </p:nvSpPr>
         <p:spPr>
           <a:xfrm>
-            <a:off x="1712976" y="1524000"/>
+            <a:off x="1712976" y="4064000"/>
             <a:ext cx="7112000" cy="1993900"/>
           </a:xfrm>
           <a:prstGeom prst="rect">
@@ -3296,7 +3298,7 @@
         </p:nvSpPr>
         <p:spPr>
           <a:xfrm>
-            <a:off x="1712976" y="4114800"/>
+            <a:off x="1712976" y="7315200"/>
             <a:ext cx="8763000" cy="1993900"/>
           </a:xfrm>
           <a:prstGeom prst="rect">
@@ -3357,7 +3359,7 @@
         </p:nvSpPr>
         <p:spPr>
           <a:xfrm>
-            <a:off x="1712976" y="1524000"/>
+            <a:off x="1712976" y="4064000"/>
             <a:ext cx="7112000" cy="1993900"/>
           </a:xfrm>
           <a:prstGeom prst="rect">
@@ -3392,7 +3394,7 @@
         </p:nvSpPr>
         <p:spPr>
           <a:xfrm>
-            <a:off x="1712976" y="4114800"/>
+            <a:off x="1712976" y="7315200"/>
             <a:ext cx="8763000" cy="1993900"/>
           </a:xfrm>
           <a:prstGeom prst="rect">
@@ -3453,7 +3455,7 @@
         </p:nvSpPr>
         <p:spPr>
           <a:xfrm>
-            <a:off x="1712976" y="1524000"/>
+            <a:off x="1712976" y="4064000"/>
             <a:ext cx="7112000" cy="1993900"/>
           </a:xfrm>
           <a:prstGeom prst="rect">
@@ -3474,7 +3476,7 @@
                 </a:solidFill>
                 <a:latin typeface="Times New Roman"/>
               </a:rPr>
-              <a:t>MARGARITA. - ¡Eso es abandono de familia, y además malicioso!</a:t>
+              <a:t>ABOGADO. - ¿Y usted cómo sabe cuál es el abandono malicioso del hogar?</a:t>
             </a:r>
           </a:p>
           <a:p/>
@@ -3488,7 +3490,7 @@
         </p:nvSpPr>
         <p:spPr>
           <a:xfrm>
-            <a:off x="1712976" y="4114800"/>
+            <a:off x="1712976" y="7315200"/>
             <a:ext cx="8763000" cy="1993900"/>
           </a:xfrm>
           <a:prstGeom prst="rect">
@@ -3549,7 +3551,7 @@
         </p:nvSpPr>
         <p:spPr>
           <a:xfrm>
-            <a:off x="1712976" y="1524000"/>
+            <a:off x="1712976" y="4064000"/>
             <a:ext cx="7112000" cy="1993900"/>
           </a:xfrm>
           <a:prstGeom prst="rect">
@@ -3570,7 +3572,7 @@
                 </a:solidFill>
                 <a:latin typeface="Times New Roman"/>
               </a:rPr>
-              <a:t>ABOGADO. - ¿Y usted cómo sabe cuál es el abandono malicioso del hogar?</a:t>
+              <a:t>MARGARITA. - Lo he mirado en el Código Penal. Me compré uno...</a:t>
             </a:r>
           </a:p>
           <a:p/>
@@ -3584,7 +3586,7 @@
         </p:nvSpPr>
         <p:spPr>
           <a:xfrm>
-            <a:off x="1712976" y="4114800"/>
+            <a:off x="1712976" y="7315200"/>
             <a:ext cx="8763000" cy="1993900"/>
           </a:xfrm>
           <a:prstGeom prst="rect">
@@ -3645,7 +3647,7 @@
         </p:nvSpPr>
         <p:spPr>
           <a:xfrm>
-            <a:off x="1712976" y="1524000"/>
+            <a:off x="1712976" y="4064000"/>
             <a:ext cx="7112000" cy="1993900"/>
           </a:xfrm>
           <a:prstGeom prst="rect">
@@ -3666,7 +3668,7 @@
                 </a:solidFill>
                 <a:latin typeface="Times New Roman"/>
               </a:rPr>
-              <a:t>MARGARITA. - Lo he mirado en el Código Penal. Me compré uno...</a:t>
+              <a:t>ABOGADO. - ¿Entonces para qué viene a molestar a un profesional</a:t>
             </a:r>
           </a:p>
           <a:p/>
@@ -3680,7 +3682,7 @@
         </p:nvSpPr>
         <p:spPr>
           <a:xfrm>
-            <a:off x="1712976" y="4114800"/>
+            <a:off x="1712976" y="7315200"/>
             <a:ext cx="8763000" cy="1993900"/>
           </a:xfrm>
           <a:prstGeom prst="rect">
@@ -3741,7 +3743,7 @@
         </p:nvSpPr>
         <p:spPr>
           <a:xfrm>
-            <a:off x="1712976" y="1524000"/>
+            <a:off x="1712976" y="4064000"/>
             <a:ext cx="7112000" cy="1993900"/>
           </a:xfrm>
           <a:prstGeom prst="rect">
@@ -3762,7 +3764,7 @@
                 </a:solidFill>
                 <a:latin typeface="Times New Roman"/>
               </a:rPr>
-              <a:t>ABOGADO. - ¿Entonces para qué viene a molestar a un profesional, que conoce mucho mejor que usted los matices, los detalles jurídicos,</a:t>
+              <a:t> que conoce mucho mejor que usted los matices, los detalles jurídicos,</a:t>
             </a:r>
           </a:p>
           <a:p/>
@@ -3776,7 +3778,7 @@
         </p:nvSpPr>
         <p:spPr>
           <a:xfrm>
-            <a:off x="1712976" y="4114800"/>
+            <a:off x="1712976" y="7315200"/>
             <a:ext cx="8763000" cy="1993900"/>
           </a:xfrm>
           <a:prstGeom prst="rect">
@@ -3837,7 +3839,7 @@
         </p:nvSpPr>
         <p:spPr>
           <a:xfrm>
-            <a:off x="1712976" y="1524000"/>
+            <a:off x="1712976" y="4064000"/>
             <a:ext cx="7112000" cy="1993900"/>
           </a:xfrm>
           <a:prstGeom prst="rect">
@@ -3872,7 +3874,7 @@
         </p:nvSpPr>
         <p:spPr>
           <a:xfrm>
-            <a:off x="1712976" y="4114800"/>
+            <a:off x="1712976" y="7315200"/>
             <a:ext cx="8763000" cy="1993900"/>
           </a:xfrm>
           <a:prstGeom prst="rect">
@@ -3933,7 +3935,7 @@
         </p:nvSpPr>
         <p:spPr>
           <a:xfrm>
-            <a:off x="1712976" y="1524000"/>
+            <a:off x="1712976" y="4064000"/>
             <a:ext cx="7112000" cy="1993900"/>
           </a:xfrm>
           <a:prstGeom prst="rect">
@@ -3968,7 +3970,7 @@
         </p:nvSpPr>
         <p:spPr>
           <a:xfrm>
-            <a:off x="1712976" y="4114800"/>
+            <a:off x="1712976" y="7315200"/>
             <a:ext cx="8763000" cy="1993900"/>
           </a:xfrm>
           <a:prstGeom prst="rect">
@@ -4029,7 +4031,7 @@
         </p:nvSpPr>
         <p:spPr>
           <a:xfrm>
-            <a:off x="1712976" y="1524000"/>
+            <a:off x="1712976" y="4064000"/>
             <a:ext cx="7112000" cy="1993900"/>
           </a:xfrm>
           <a:prstGeom prst="rect">
@@ -4064,7 +4066,7 @@
         </p:nvSpPr>
         <p:spPr>
           <a:xfrm>
-            <a:off x="1712976" y="4114800"/>
+            <a:off x="1712976" y="7315200"/>
             <a:ext cx="8763000" cy="1993900"/>
           </a:xfrm>
           <a:prstGeom prst="rect">
@@ -4125,7 +4127,7 @@
         </p:nvSpPr>
         <p:spPr>
           <a:xfrm>
-            <a:off x="1712976" y="1524000"/>
+            <a:off x="1712976" y="4064000"/>
             <a:ext cx="7112000" cy="1993900"/>
           </a:xfrm>
           <a:prstGeom prst="rect">
@@ -4160,7 +4162,7 @@
         </p:nvSpPr>
         <p:spPr>
           <a:xfrm>
-            <a:off x="1712976" y="4114800"/>
+            <a:off x="1712976" y="7315200"/>
             <a:ext cx="8763000" cy="1993900"/>
           </a:xfrm>
           <a:prstGeom prst="rect">
@@ -4221,7 +4223,7 @@
         </p:nvSpPr>
         <p:spPr>
           <a:xfrm>
-            <a:off x="1712976" y="1524000"/>
+            <a:off x="1712976" y="4064000"/>
             <a:ext cx="7112000" cy="1993900"/>
           </a:xfrm>
           <a:prstGeom prst="rect">
@@ -4256,7 +4258,7 @@
         </p:nvSpPr>
         <p:spPr>
           <a:xfrm>
-            <a:off x="1712976" y="4114800"/>
+            <a:off x="1712976" y="7315200"/>
             <a:ext cx="8763000" cy="1993900"/>
           </a:xfrm>
           <a:prstGeom prst="rect">
@@ -4317,7 +4319,7 @@
         </p:nvSpPr>
         <p:spPr>
           <a:xfrm>
-            <a:off x="1712976" y="1524000"/>
+            <a:off x="1712976" y="4064000"/>
             <a:ext cx="7112000" cy="1993900"/>
           </a:xfrm>
           <a:prstGeom prst="rect">
@@ -4338,7 +4340,7 @@
                 </a:solidFill>
                 <a:latin typeface="Times New Roman"/>
               </a:rPr>
-              <a:t>MARGARITA. - Ya lo sé. Ya lo he intentado. Estuve ayer por la tarde en la comisaría...</a:t>
+              <a:t>MARGARITA. - Ya lo sé. Ya lo he intentado.</a:t>
             </a:r>
           </a:p>
           <a:p/>
@@ -4352,7 +4354,7 @@
         </p:nvSpPr>
         <p:spPr>
           <a:xfrm>
-            <a:off x="1712976" y="4114800"/>
+            <a:off x="1712976" y="7315200"/>
             <a:ext cx="8763000" cy="1993900"/>
           </a:xfrm>
           <a:prstGeom prst="rect">
@@ -4413,7 +4415,7 @@
         </p:nvSpPr>
         <p:spPr>
           <a:xfrm>
-            <a:off x="1712976" y="1524000"/>
+            <a:off x="1712976" y="4064000"/>
             <a:ext cx="7112000" cy="1993900"/>
           </a:xfrm>
           <a:prstGeom prst="rect">
@@ -4448,7 +4450,7 @@
         </p:nvSpPr>
         <p:spPr>
           <a:xfrm>
-            <a:off x="1712976" y="4114800"/>
+            <a:off x="1712976" y="7315200"/>
             <a:ext cx="8763000" cy="1993900"/>
           </a:xfrm>
           <a:prstGeom prst="rect">
@@ -4509,7 +4511,7 @@
         </p:nvSpPr>
         <p:spPr>
           <a:xfrm>
-            <a:off x="1712976" y="1524000"/>
+            <a:off x="1712976" y="4064000"/>
             <a:ext cx="7112000" cy="1993900"/>
           </a:xfrm>
           <a:prstGeom prst="rect">
@@ -4530,7 +4532,7 @@
                 </a:solidFill>
                 <a:latin typeface="Times New Roman"/>
               </a:rPr>
-              <a:t>ABOGADO. -  ¿Y qué pasó?</a:t>
+              <a:t>Estuve ayer por la tarde en la comisaría...</a:t>
             </a:r>
           </a:p>
           <a:p/>
@@ -4544,7 +4546,7 @@
         </p:nvSpPr>
         <p:spPr>
           <a:xfrm>
-            <a:off x="1712976" y="4114800"/>
+            <a:off x="1712976" y="7315200"/>
             <a:ext cx="8763000" cy="1993900"/>
           </a:xfrm>
           <a:prstGeom prst="rect">
@@ -4605,7 +4607,7 @@
         </p:nvSpPr>
         <p:spPr>
           <a:xfrm>
-            <a:off x="1712976" y="1524000"/>
+            <a:off x="1712976" y="4064000"/>
             <a:ext cx="7112000" cy="1993900"/>
           </a:xfrm>
           <a:prstGeom prst="rect">
@@ -4626,7 +4628,7 @@
                 </a:solidFill>
                 <a:latin typeface="Times New Roman"/>
               </a:rPr>
-              <a:t>MARGARITA. - No me quisieron tomar la denuncia. </a:t>
+              <a:t>ABOGADO. -  ¿Y qué pasó?</a:t>
             </a:r>
           </a:p>
           <a:p/>
@@ -4640,7 +4642,7 @@
         </p:nvSpPr>
         <p:spPr>
           <a:xfrm>
-            <a:off x="1712976" y="4114800"/>
+            <a:off x="1712976" y="7315200"/>
             <a:ext cx="8763000" cy="1993900"/>
           </a:xfrm>
           <a:prstGeom prst="rect">
@@ -4701,7 +4703,7 @@
         </p:nvSpPr>
         <p:spPr>
           <a:xfrm>
-            <a:off x="1712976" y="1524000"/>
+            <a:off x="1712976" y="4064000"/>
             <a:ext cx="7112000" cy="1993900"/>
           </a:xfrm>
           <a:prstGeom prst="rect">
@@ -4722,7 +4724,7 @@
                 </a:solidFill>
                 <a:latin typeface="Times New Roman"/>
               </a:rPr>
-              <a:t>MARGARITA. - El comisario dijo que era una tontería, que ya regresaría mi marido</a:t>
+              <a:t>MARGARITA. - No me quisieron tomar la denuncia. </a:t>
             </a:r>
           </a:p>
           <a:p/>
@@ -4736,7 +4738,7 @@
         </p:nvSpPr>
         <p:spPr>
           <a:xfrm>
-            <a:off x="1712976" y="4114800"/>
+            <a:off x="1712976" y="7315200"/>
             <a:ext cx="8763000" cy="1993900"/>
           </a:xfrm>
           <a:prstGeom prst="rect">
@@ -4797,7 +4799,7 @@
         </p:nvSpPr>
         <p:spPr>
           <a:xfrm>
-            <a:off x="1712976" y="1524000"/>
+            <a:off x="1712976" y="4064000"/>
             <a:ext cx="7112000" cy="1993900"/>
           </a:xfrm>
           <a:prstGeom prst="rect">
@@ -4818,7 +4820,7 @@
                 </a:solidFill>
                 <a:latin typeface="Times New Roman"/>
               </a:rPr>
-              <a:t>MARGARITA. - y que mientras tanto aprovechara para limpiar la casa y hacerle una buena comida, que volvería muy cansado...</a:t>
+              <a:t>MARGARITA. - El comisario dijo que era una tontería,</a:t>
             </a:r>
           </a:p>
           <a:p/>
@@ -4832,7 +4834,7 @@
         </p:nvSpPr>
         <p:spPr>
           <a:xfrm>
-            <a:off x="1712976" y="4114800"/>
+            <a:off x="1712976" y="7315200"/>
             <a:ext cx="8763000" cy="1993900"/>
           </a:xfrm>
           <a:prstGeom prst="rect">
@@ -4893,7 +4895,7 @@
         </p:nvSpPr>
         <p:spPr>
           <a:xfrm>
-            <a:off x="1712976" y="1524000"/>
+            <a:off x="1712976" y="4064000"/>
             <a:ext cx="7112000" cy="1993900"/>
           </a:xfrm>
           <a:prstGeom prst="rect">
@@ -4914,7 +4916,7 @@
                 </a:solidFill>
                 <a:latin typeface="Times New Roman"/>
               </a:rPr>
-              <a:t>ABOGADO. -  Acertado consejo. Las penas delante de un buen estofado siempre son menos,</a:t>
+              <a:t>que ya regresaría mi marido</a:t>
             </a:r>
           </a:p>
           <a:p/>
@@ -4928,7 +4930,7 @@
         </p:nvSpPr>
         <p:spPr>
           <a:xfrm>
-            <a:off x="1712976" y="4114800"/>
+            <a:off x="1712976" y="7315200"/>
             <a:ext cx="8763000" cy="1993900"/>
           </a:xfrm>
           <a:prstGeom prst="rect">
@@ -4989,7 +4991,7 @@
         </p:nvSpPr>
         <p:spPr>
           <a:xfrm>
-            <a:off x="1712976" y="1524000"/>
+            <a:off x="1712976" y="4064000"/>
             <a:ext cx="7112000" cy="1993900"/>
           </a:xfrm>
           <a:prstGeom prst="rect">
@@ -5010,7 +5012,7 @@
                 </a:solidFill>
                 <a:latin typeface="Times New Roman"/>
               </a:rPr>
-              <a:t>ABOGADO. - y si usted atiende su casa con devoción y se dedica a reconquistar a su esposo</a:t>
+              <a:t>MARGARITA. - y que mientras tanto aprovechara para limpiar la casa y hacerle una buena comida,</a:t>
             </a:r>
           </a:p>
           <a:p/>
@@ -5024,7 +5026,7 @@
         </p:nvSpPr>
         <p:spPr>
           <a:xfrm>
-            <a:off x="1712976" y="4114800"/>
+            <a:off x="1712976" y="7315200"/>
             <a:ext cx="8763000" cy="1993900"/>
           </a:xfrm>
           <a:prstGeom prst="rect">
@@ -5085,7 +5087,7 @@
         </p:nvSpPr>
         <p:spPr>
           <a:xfrm>
-            <a:off x="1712976" y="1524000"/>
+            <a:off x="1712976" y="4064000"/>
             <a:ext cx="7112000" cy="1993900"/>
           </a:xfrm>
           <a:prstGeom prst="rect">
@@ -5106,7 +5108,7 @@
                 </a:solidFill>
                 <a:latin typeface="Times New Roman"/>
               </a:rPr>
-              <a:t>no dude que él volverá a usted, como debe...</a:t>
+              <a:t>que volvería muy cansado...</a:t>
             </a:r>
           </a:p>
           <a:p/>
@@ -5120,7 +5122,7 @@
         </p:nvSpPr>
         <p:spPr>
           <a:xfrm>
-            <a:off x="1712976" y="4114800"/>
+            <a:off x="1712976" y="7315200"/>
             <a:ext cx="8763000" cy="1993900"/>
           </a:xfrm>
           <a:prstGeom prst="rect">
@@ -5181,7 +5183,7 @@
         </p:nvSpPr>
         <p:spPr>
           <a:xfrm>
-            <a:off x="1712976" y="1524000"/>
+            <a:off x="1712976" y="4064000"/>
             <a:ext cx="7112000" cy="1993900"/>
           </a:xfrm>
           <a:prstGeom prst="rect">
@@ -5202,7 +5204,7 @@
                 </a:solidFill>
                 <a:latin typeface="Times New Roman"/>
               </a:rPr>
-              <a:t>ABOGADO. - A la salida no se olvide de pagar a mi secretaria la visita.</a:t>
+              <a:t>ABOGADO. -  Acertado consejo. Las penas delante de un buen estofado siempre son menos,</a:t>
             </a:r>
           </a:p>
           <a:p/>
@@ -5216,7 +5218,7 @@
         </p:nvSpPr>
         <p:spPr>
           <a:xfrm>
-            <a:off x="1712976" y="4114800"/>
+            <a:off x="1712976" y="7315200"/>
             <a:ext cx="8763000" cy="1993900"/>
           </a:xfrm>
           <a:prstGeom prst="rect">
@@ -5277,7 +5279,7 @@
         </p:nvSpPr>
         <p:spPr>
           <a:xfrm>
-            <a:off x="1712976" y="1524000"/>
+            <a:off x="1712976" y="4064000"/>
             <a:ext cx="7112000" cy="1993900"/>
           </a:xfrm>
           <a:prstGeom prst="rect">
@@ -5298,7 +5300,7 @@
                 </a:solidFill>
                 <a:latin typeface="Times New Roman"/>
               </a:rPr>
-              <a:t>ESCENA Ⅲ</a:t>
+              <a:t>ABOGADO. - y si usted atiende su casa con devoción y se dedica a reconquistar a su esposo　　　　　　　　　　　　　　　　　　　　　　　　　　　　　　　　　　　　　　　　　　　　　　　　　　　　　　　　　　　　　　　　　　　　　　　　　　　　　　　　　　　　　　　　　　　　　　　　　　　　　　　　　　　　　　　　　　　　　　　　　　　　　　　　　　　　　　　　　　　　　　　　　　　　　　　　　　　　　　　　　　　　　　　　　　　　　　　　　　　　　　　　　　　　　　　　　　　　　　　　　　　　　　　　　　　</a:t>
             </a:r>
           </a:p>
           <a:p/>
@@ -5312,7 +5314,7 @@
         </p:nvSpPr>
         <p:spPr>
           <a:xfrm>
-            <a:off x="1712976" y="4114800"/>
+            <a:off x="1712976" y="7315200"/>
             <a:ext cx="8763000" cy="1993900"/>
           </a:xfrm>
           <a:prstGeom prst="rect">
@@ -5373,7 +5375,7 @@
         </p:nvSpPr>
         <p:spPr>
           <a:xfrm>
-            <a:off x="1712976" y="1524000"/>
+            <a:off x="1712976" y="4064000"/>
             <a:ext cx="7112000" cy="1993900"/>
           </a:xfrm>
           <a:prstGeom prst="rect">
@@ -5394,7 +5396,7 @@
                 </a:solidFill>
                 <a:latin typeface="Times New Roman"/>
               </a:rPr>
-              <a:t>VOZ. - ¿Quién llama?</a:t>
+              <a:t>ABOGADO. - A la salida no se olvide de pagar a mi secretaria la visita.</a:t>
             </a:r>
           </a:p>
           <a:p/>
@@ -5408,7 +5410,7 @@
         </p:nvSpPr>
         <p:spPr>
           <a:xfrm>
-            <a:off x="1712976" y="4114800"/>
+            <a:off x="1712976" y="7315200"/>
             <a:ext cx="8763000" cy="1993900"/>
           </a:xfrm>
           <a:prstGeom prst="rect">
@@ -5469,7 +5471,7 @@
         </p:nvSpPr>
         <p:spPr>
           <a:xfrm>
-            <a:off x="1712976" y="1524000"/>
+            <a:off x="1712976" y="4064000"/>
             <a:ext cx="7112000" cy="1993900"/>
           </a:xfrm>
           <a:prstGeom prst="rect">
@@ -5504,7 +5506,7 @@
         </p:nvSpPr>
         <p:spPr>
           <a:xfrm>
-            <a:off x="1712976" y="4114800"/>
+            <a:off x="1712976" y="7315200"/>
             <a:ext cx="8763000" cy="1993900"/>
           </a:xfrm>
           <a:prstGeom prst="rect">
@@ -5565,7 +5567,7 @@
         </p:nvSpPr>
         <p:spPr>
           <a:xfrm>
-            <a:off x="1712976" y="1524000"/>
+            <a:off x="1712976" y="4064000"/>
             <a:ext cx="7112000" cy="1993900"/>
           </a:xfrm>
           <a:prstGeom prst="rect">
@@ -5586,7 +5588,7 @@
                 </a:solidFill>
                 <a:latin typeface="Times New Roman"/>
               </a:rPr>
-              <a:t>MARÍA. - Soy María Sánchez. Tengo hora con el psiquiatra.</a:t>
+              <a:t>ESCENA Ⅲ</a:t>
             </a:r>
           </a:p>
           <a:p/>
@@ -5600,7 +5602,7 @@
         </p:nvSpPr>
         <p:spPr>
           <a:xfrm>
-            <a:off x="1712976" y="4114800"/>
+            <a:off x="1712976" y="7315200"/>
             <a:ext cx="8763000" cy="1993900"/>
           </a:xfrm>
           <a:prstGeom prst="rect">
@@ -5661,7 +5663,7 @@
         </p:nvSpPr>
         <p:spPr>
           <a:xfrm>
-            <a:off x="1712976" y="1524000"/>
+            <a:off x="1712976" y="4064000"/>
             <a:ext cx="7112000" cy="1993900"/>
           </a:xfrm>
           <a:prstGeom prst="rect">
@@ -5682,7 +5684,7 @@
                 </a:solidFill>
                 <a:latin typeface="Times New Roman"/>
               </a:rPr>
-              <a:t>VOZ. - Un momento.</a:t>
+              <a:t>VOZ. - ¿Quién llama?</a:t>
             </a:r>
           </a:p>
           <a:p/>
@@ -5696,7 +5698,7 @@
         </p:nvSpPr>
         <p:spPr>
           <a:xfrm>
-            <a:off x="1712976" y="4114800"/>
+            <a:off x="1712976" y="7315200"/>
             <a:ext cx="8763000" cy="1993900"/>
           </a:xfrm>
           <a:prstGeom prst="rect">
@@ -5757,7 +5759,7 @@
         </p:nvSpPr>
         <p:spPr>
           <a:xfrm>
-            <a:off x="1712976" y="1524000"/>
+            <a:off x="1712976" y="4064000"/>
             <a:ext cx="7112000" cy="1993900"/>
           </a:xfrm>
           <a:prstGeom prst="rect">
@@ -5778,7 +5780,7 @@
                 </a:solidFill>
                 <a:latin typeface="Times New Roman"/>
               </a:rPr>
-              <a:t>VOZ. - Deposite cinco mil pesetas en el buzón.</a:t>
+              <a:t>MARÍA. - Soy María Sánchez. Tengo hora con el psiquiatra.</a:t>
             </a:r>
           </a:p>
           <a:p/>
@@ -5792,7 +5794,7 @@
         </p:nvSpPr>
         <p:spPr>
           <a:xfrm>
-            <a:off x="1712976" y="4114800"/>
+            <a:off x="1712976" y="7315200"/>
             <a:ext cx="8763000" cy="1993900"/>
           </a:xfrm>
           <a:prstGeom prst="rect">
@@ -5853,7 +5855,7 @@
         </p:nvSpPr>
         <p:spPr>
           <a:xfrm>
-            <a:off x="1712976" y="1524000"/>
+            <a:off x="1712976" y="4064000"/>
             <a:ext cx="7112000" cy="1993900"/>
           </a:xfrm>
           <a:prstGeom prst="rect">
@@ -5874,7 +5876,7 @@
                 </a:solidFill>
                 <a:latin typeface="Times New Roman"/>
               </a:rPr>
-              <a:t>VOZ. - Está bien. Descuelgue el teléfono y marque el número tres.</a:t>
+              <a:t>VOZ. - Un momento.</a:t>
             </a:r>
           </a:p>
           <a:p/>
@@ -5888,7 +5890,7 @@
         </p:nvSpPr>
         <p:spPr>
           <a:xfrm>
-            <a:off x="1712976" y="4114800"/>
+            <a:off x="1712976" y="7315200"/>
             <a:ext cx="8763000" cy="1993900"/>
           </a:xfrm>
           <a:prstGeom prst="rect">
@@ -5949,7 +5951,7 @@
         </p:nvSpPr>
         <p:spPr>
           <a:xfrm>
-            <a:off x="1712976" y="1524000"/>
+            <a:off x="1712976" y="4064000"/>
             <a:ext cx="7112000" cy="1993900"/>
           </a:xfrm>
           <a:prstGeom prst="rect">
@@ -5970,7 +5972,7 @@
                 </a:solidFill>
                 <a:latin typeface="Times New Roman"/>
               </a:rPr>
-              <a:t>VOZ. - Diga.</a:t>
+              <a:t>VOZ. - Deposite cinco mil pesetas en el buzón.</a:t>
             </a:r>
           </a:p>
           <a:p/>
@@ -5984,7 +5986,7 @@
         </p:nvSpPr>
         <p:spPr>
           <a:xfrm>
-            <a:off x="1712976" y="4114800"/>
+            <a:off x="1712976" y="7315200"/>
             <a:ext cx="8763000" cy="1993900"/>
           </a:xfrm>
           <a:prstGeom prst="rect">
@@ -6045,7 +6047,7 @@
         </p:nvSpPr>
         <p:spPr>
           <a:xfrm>
-            <a:off x="1712976" y="1524000"/>
+            <a:off x="1712976" y="4064000"/>
             <a:ext cx="7112000" cy="1993900"/>
           </a:xfrm>
           <a:prstGeom prst="rect">
@@ -6066,7 +6068,7 @@
                 </a:solidFill>
                 <a:latin typeface="Times New Roman"/>
               </a:rPr>
-              <a:t>MARÍA. - Soy María Sánchez. Tengo hora con el psiquiatra...</a:t>
+              <a:t>VOZ. - Está bien. Descuelgue el teléfono y marque el número tres.</a:t>
             </a:r>
           </a:p>
           <a:p/>
@@ -6080,7 +6082,7 @@
         </p:nvSpPr>
         <p:spPr>
           <a:xfrm>
-            <a:off x="1712976" y="4114800"/>
+            <a:off x="1712976" y="7315200"/>
             <a:ext cx="8763000" cy="1993900"/>
           </a:xfrm>
           <a:prstGeom prst="rect">
@@ -6141,7 +6143,7 @@
         </p:nvSpPr>
         <p:spPr>
           <a:xfrm>
-            <a:off x="1712976" y="1524000"/>
+            <a:off x="1712976" y="4064000"/>
             <a:ext cx="7112000" cy="1993900"/>
           </a:xfrm>
           <a:prstGeom prst="rect">
@@ -6162,7 +6164,7 @@
                 </a:solidFill>
                 <a:latin typeface="Times New Roman"/>
               </a:rPr>
-              <a:t>VOZ. - Bien, dígame.</a:t>
+              <a:t>VOZ. - Diga.</a:t>
             </a:r>
           </a:p>
           <a:p/>
@@ -6176,7 +6178,7 @@
         </p:nvSpPr>
         <p:spPr>
           <a:xfrm>
-            <a:off x="1712976" y="4114800"/>
+            <a:off x="1712976" y="7315200"/>
             <a:ext cx="8763000" cy="1993900"/>
           </a:xfrm>
           <a:prstGeom prst="rect">
@@ -6237,7 +6239,7 @@
         </p:nvSpPr>
         <p:spPr>
           <a:xfrm>
-            <a:off x="1712976" y="1524000"/>
+            <a:off x="1712976" y="4064000"/>
             <a:ext cx="7112000" cy="1993900"/>
           </a:xfrm>
           <a:prstGeom prst="rect">
@@ -6258,7 +6260,7 @@
                 </a:solidFill>
                 <a:latin typeface="Times New Roman"/>
               </a:rPr>
-              <a:t>VOZ. - Dígame.</a:t>
+              <a:t>MARÍA. - Soy María Sánchez. Tengo hora con el psiquiatra...</a:t>
             </a:r>
           </a:p>
           <a:p/>
@@ -6272,7 +6274,7 @@
         </p:nvSpPr>
         <p:spPr>
           <a:xfrm>
-            <a:off x="1712976" y="4114800"/>
+            <a:off x="1712976" y="7315200"/>
             <a:ext cx="8763000" cy="1993900"/>
           </a:xfrm>
           <a:prstGeom prst="rect">
@@ -6333,7 +6335,7 @@
         </p:nvSpPr>
         <p:spPr>
           <a:xfrm>
-            <a:off x="1712976" y="1524000"/>
+            <a:off x="1712976" y="4064000"/>
             <a:ext cx="7112000" cy="1993900"/>
           </a:xfrm>
           <a:prstGeom prst="rect">
@@ -6354,7 +6356,7 @@
                 </a:solidFill>
                 <a:latin typeface="Times New Roman"/>
               </a:rPr>
-              <a:t>MARÍA. - Necesito una entrevista. Me siento muy deprimida...</a:t>
+              <a:t>VOZ. - Bien, dígame.</a:t>
             </a:r>
           </a:p>
           <a:p/>
@@ -6368,7 +6370,7 @@
         </p:nvSpPr>
         <p:spPr>
           <a:xfrm>
-            <a:off x="1712976" y="4114800"/>
+            <a:off x="1712976" y="7315200"/>
             <a:ext cx="8763000" cy="1993900"/>
           </a:xfrm>
           <a:prstGeom prst="rect">
@@ -6429,7 +6431,7 @@
         </p:nvSpPr>
         <p:spPr>
           <a:xfrm>
-            <a:off x="1712976" y="1524000"/>
+            <a:off x="1712976" y="4064000"/>
             <a:ext cx="7112000" cy="1993900"/>
           </a:xfrm>
           <a:prstGeom prst="rect">
@@ -6450,7 +6452,7 @@
                 </a:solidFill>
                 <a:latin typeface="Times New Roman"/>
               </a:rPr>
-              <a:t>VOZ. - ¿Por qué?</a:t>
+              <a:t>VOZ. - Dígame.</a:t>
             </a:r>
           </a:p>
           <a:p/>
@@ -6464,7 +6466,7 @@
         </p:nvSpPr>
         <p:spPr>
           <a:xfrm>
-            <a:off x="1712976" y="4114800"/>
+            <a:off x="1712976" y="7315200"/>
             <a:ext cx="8763000" cy="1993900"/>
           </a:xfrm>
           <a:prstGeom prst="rect">
@@ -6525,7 +6527,7 @@
         </p:nvSpPr>
         <p:spPr>
           <a:xfrm>
-            <a:off x="1712976" y="1524000"/>
+            <a:off x="1712976" y="4064000"/>
             <a:ext cx="7112000" cy="1993900"/>
           </a:xfrm>
           <a:prstGeom prst="rect">
@@ -6560,7 +6562,7 @@
         </p:nvSpPr>
         <p:spPr>
           <a:xfrm>
-            <a:off x="1712976" y="4114800"/>
+            <a:off x="1712976" y="7315200"/>
             <a:ext cx="8763000" cy="1993900"/>
           </a:xfrm>
           <a:prstGeom prst="rect">
@@ -6621,7 +6623,7 @@
         </p:nvSpPr>
         <p:spPr>
           <a:xfrm>
-            <a:off x="1712976" y="1524000"/>
+            <a:off x="1712976" y="4064000"/>
             <a:ext cx="7112000" cy="1993900"/>
           </a:xfrm>
           <a:prstGeom prst="rect">
@@ -6642,7 +6644,7 @@
                 </a:solidFill>
                 <a:latin typeface="Times New Roman"/>
               </a:rPr>
-              <a:t>MARÍA. - Mi amante me ha abandonado.</a:t>
+              <a:t>MARÍA. - Necesito una entrevista. Me siento muy deprimida...</a:t>
             </a:r>
           </a:p>
           <a:p/>
@@ -6656,7 +6658,7 @@
         </p:nvSpPr>
         <p:spPr>
           <a:xfrm>
-            <a:off x="1712976" y="4114800"/>
+            <a:off x="1712976" y="7315200"/>
             <a:ext cx="8763000" cy="1993900"/>
           </a:xfrm>
           <a:prstGeom prst="rect">
@@ -6717,7 +6719,7 @@
         </p:nvSpPr>
         <p:spPr>
           <a:xfrm>
-            <a:off x="1712976" y="1524000"/>
+            <a:off x="1712976" y="4064000"/>
             <a:ext cx="7112000" cy="1993900"/>
           </a:xfrm>
           <a:prstGeom prst="rect">
@@ -6738,7 +6740,7 @@
                 </a:solidFill>
                 <a:latin typeface="Times New Roman"/>
               </a:rPr>
-              <a:t>VOZ. - ¿Su amante o su marido?</a:t>
+              <a:t>VOZ. - ¿Por qué?</a:t>
             </a:r>
           </a:p>
           <a:p/>
@@ -6752,7 +6754,7 @@
         </p:nvSpPr>
         <p:spPr>
           <a:xfrm>
-            <a:off x="1712976" y="4114800"/>
+            <a:off x="1712976" y="7315200"/>
             <a:ext cx="8763000" cy="1993900"/>
           </a:xfrm>
           <a:prstGeom prst="rect">
@@ -6813,7 +6815,7 @@
         </p:nvSpPr>
         <p:spPr>
           <a:xfrm>
-            <a:off x="1712976" y="1524000"/>
+            <a:off x="1712976" y="4064000"/>
             <a:ext cx="7112000" cy="1993900"/>
           </a:xfrm>
           <a:prstGeom prst="rect">
@@ -6834,7 +6836,7 @@
                 </a:solidFill>
                 <a:latin typeface="Times New Roman"/>
               </a:rPr>
-              <a:t>MARÍA. - Mi amante. Él está casado.</a:t>
+              <a:t>MARÍA. - Mi amante me ha abandonado.</a:t>
             </a:r>
           </a:p>
           <a:p/>
@@ -6848,7 +6850,7 @@
         </p:nvSpPr>
         <p:spPr>
           <a:xfrm>
-            <a:off x="1712976" y="4114800"/>
+            <a:off x="1712976" y="7315200"/>
             <a:ext cx="8763000" cy="1993900"/>
           </a:xfrm>
           <a:prstGeom prst="rect">
@@ -6909,7 +6911,7 @@
         </p:nvSpPr>
         <p:spPr>
           <a:xfrm>
-            <a:off x="1712976" y="1524000"/>
+            <a:off x="1712976" y="4064000"/>
             <a:ext cx="7112000" cy="1993900"/>
           </a:xfrm>
           <a:prstGeom prst="rect">
@@ -6930,7 +6932,7 @@
                 </a:solidFill>
                 <a:latin typeface="Times New Roman"/>
               </a:rPr>
-              <a:t>VOZ. - Esas relaciones irregulares demuestran que usted es una mujer inmadura, que no ha superado aún la fase oral.</a:t>
+              <a:t>VOZ. - ¿Su amante o su marido?</a:t>
             </a:r>
           </a:p>
           <a:p/>
@@ -6944,7 +6946,7 @@
         </p:nvSpPr>
         <p:spPr>
           <a:xfrm>
-            <a:off x="1712976" y="4114800"/>
+            <a:off x="1712976" y="7315200"/>
             <a:ext cx="8763000" cy="1993900"/>
           </a:xfrm>
           <a:prstGeom prst="rect">
@@ -7005,7 +7007,7 @@
         </p:nvSpPr>
         <p:spPr>
           <a:xfrm>
-            <a:off x="1712976" y="1524000"/>
+            <a:off x="1712976" y="4064000"/>
             <a:ext cx="7112000" cy="1993900"/>
           </a:xfrm>
           <a:prstGeom prst="rect">
@@ -7026,7 +7028,7 @@
                 </a:solidFill>
                 <a:latin typeface="Times New Roman"/>
               </a:rPr>
-              <a:t>MARÍA. -  Él me dijo que se separaría y se iría a vivir conmigo.</a:t>
+              <a:t>MARÍA. - Mi amante. Él está casado.</a:t>
             </a:r>
           </a:p>
           <a:p/>
@@ -7040,7 +7042,7 @@
         </p:nvSpPr>
         <p:spPr>
           <a:xfrm>
-            <a:off x="1712976" y="4114800"/>
+            <a:off x="1712976" y="7315200"/>
             <a:ext cx="8763000" cy="1993900"/>
           </a:xfrm>
           <a:prstGeom prst="rect">
@@ -7101,7 +7103,7 @@
         </p:nvSpPr>
         <p:spPr>
           <a:xfrm>
-            <a:off x="1712976" y="1524000"/>
+            <a:off x="1712976" y="4064000"/>
             <a:ext cx="7112000" cy="1993900"/>
           </a:xfrm>
           <a:prstGeom prst="rect">
@@ -7122,7 +7124,7 @@
                 </a:solidFill>
                 <a:latin typeface="Times New Roman"/>
               </a:rPr>
-              <a:t>VOZ. - Usted necesita protección. Ha identificado a ese hombre con la figura de su padre.</a:t>
+              <a:t>VOZ. - Esas relaciones irregulares demuestran que usted es una mujer inmadura, que no ha superado aún la fase oral.</a:t>
             </a:r>
           </a:p>
           <a:p/>
@@ -7136,7 +7138,7 @@
         </p:nvSpPr>
         <p:spPr>
           <a:xfrm>
-            <a:off x="1712976" y="4114800"/>
+            <a:off x="1712976" y="7315200"/>
             <a:ext cx="8763000" cy="1993900"/>
           </a:xfrm>
           <a:prstGeom prst="rect">
@@ -7197,7 +7199,7 @@
         </p:nvSpPr>
         <p:spPr>
           <a:xfrm>
-            <a:off x="1712976" y="1524000"/>
+            <a:off x="1712976" y="4064000"/>
             <a:ext cx="7112000" cy="1993900"/>
           </a:xfrm>
           <a:prstGeom prst="rect">
@@ -7218,7 +7220,7 @@
                 </a:solidFill>
                 <a:latin typeface="Times New Roman"/>
               </a:rPr>
-              <a:t>VOZ. - Está usted fijada en la fase infantil.</a:t>
+              <a:t>MARÍA. -  Él me dijo que se separaría y se iría a vivir conmigo.</a:t>
             </a:r>
           </a:p>
           <a:p/>
@@ -7232,7 +7234,7 @@
         </p:nvSpPr>
         <p:spPr>
           <a:xfrm>
-            <a:off x="1712976" y="4114800"/>
+            <a:off x="1712976" y="7315200"/>
             <a:ext cx="8763000" cy="1993900"/>
           </a:xfrm>
           <a:prstGeom prst="rect">
@@ -7293,7 +7295,7 @@
         </p:nvSpPr>
         <p:spPr>
           <a:xfrm>
-            <a:off x="1712976" y="1524000"/>
+            <a:off x="1712976" y="4064000"/>
             <a:ext cx="7112000" cy="1993900"/>
           </a:xfrm>
           <a:prstGeom prst="rect">
@@ -7314,7 +7316,7 @@
                 </a:solidFill>
                 <a:latin typeface="Times New Roman"/>
               </a:rPr>
-              <a:t>VOZ. - No ha superado el complejo de Edipo y busca realizar el amor hacia su padre en la persona de su amante.</a:t>
+              <a:t>VOZ. - Usted necesita protección. Ha identificado a ese hombre con la figura de su padre.</a:t>
             </a:r>
           </a:p>
           <a:p/>
@@ -7328,7 +7330,7 @@
         </p:nvSpPr>
         <p:spPr>
           <a:xfrm>
-            <a:off x="1712976" y="4114800"/>
+            <a:off x="1712976" y="7315200"/>
             <a:ext cx="8763000" cy="1993900"/>
           </a:xfrm>
           <a:prstGeom prst="rect">
@@ -7389,7 +7391,7 @@
         </p:nvSpPr>
         <p:spPr>
           <a:xfrm>
-            <a:off x="1712976" y="1524000"/>
+            <a:off x="1712976" y="4064000"/>
             <a:ext cx="7112000" cy="1993900"/>
           </a:xfrm>
           <a:prstGeom prst="rect">
@@ -7410,7 +7412,7 @@
                 </a:solidFill>
                 <a:latin typeface="Times New Roman"/>
               </a:rPr>
-              <a:t>MARÍA. - No, no sé. Él siempre estaba quejándose de que su mujer no le comprendía. </a:t>
+              <a:t>VOZ. - Está usted fijada en la fase infantil.</a:t>
             </a:r>
           </a:p>
           <a:p/>
@@ -7424,7 +7426,7 @@
         </p:nvSpPr>
         <p:spPr>
           <a:xfrm>
-            <a:off x="1712976" y="4114800"/>
+            <a:off x="1712976" y="7315200"/>
             <a:ext cx="8763000" cy="1993900"/>
           </a:xfrm>
           <a:prstGeom prst="rect">
@@ -7485,7 +7487,7 @@
         </p:nvSpPr>
         <p:spPr>
           <a:xfrm>
-            <a:off x="1712976" y="1524000"/>
+            <a:off x="1712976" y="4064000"/>
             <a:ext cx="7112000" cy="1993900"/>
           </a:xfrm>
           <a:prstGeom prst="rect">
@@ -7506,7 +7508,7 @@
                 </a:solidFill>
                 <a:latin typeface="Times New Roman"/>
               </a:rPr>
-              <a:t>MARÍA. - Yo lo cuidaba y lo mimaba, </a:t>
+              <a:t>VOZ. - No ha superado el complejo de Edipo y busca realizar el amor hacia su padre en la persona de su amante.</a:t>
             </a:r>
           </a:p>
           <a:p/>
@@ -7520,7 +7522,7 @@
         </p:nvSpPr>
         <p:spPr>
           <a:xfrm>
-            <a:off x="1712976" y="4114800"/>
+            <a:off x="1712976" y="7315200"/>
             <a:ext cx="8763000" cy="1993900"/>
           </a:xfrm>
           <a:prstGeom prst="rect">
@@ -7581,7 +7583,7 @@
         </p:nvSpPr>
         <p:spPr>
           <a:xfrm>
-            <a:off x="1712976" y="1524000"/>
+            <a:off x="1712976" y="4064000"/>
             <a:ext cx="7112000" cy="1993900"/>
           </a:xfrm>
           <a:prstGeom prst="rect">
@@ -7616,7 +7618,7 @@
         </p:nvSpPr>
         <p:spPr>
           <a:xfrm>
-            <a:off x="1712976" y="4114800"/>
+            <a:off x="1712976" y="7315200"/>
             <a:ext cx="8763000" cy="1993900"/>
           </a:xfrm>
           <a:prstGeom prst="rect">
@@ -7677,7 +7679,7 @@
         </p:nvSpPr>
         <p:spPr>
           <a:xfrm>
-            <a:off x="1712976" y="1524000"/>
+            <a:off x="1712976" y="4064000"/>
             <a:ext cx="7112000" cy="1993900"/>
           </a:xfrm>
           <a:prstGeom prst="rect">
@@ -7698,7 +7700,7 @@
                 </a:solidFill>
                 <a:latin typeface="Times New Roman"/>
               </a:rPr>
-              <a:t>porque siempre decía que el hacía falta cariño, que nadie le atendía como yo.</a:t>
+              <a:t>MARÍA. - No, no sé. Él siempre estaba quejándose de que su mujer no le comprendía. </a:t>
             </a:r>
           </a:p>
           <a:p/>
@@ -7712,7 +7714,7 @@
         </p:nvSpPr>
         <p:spPr>
           <a:xfrm>
-            <a:off x="1712976" y="4114800"/>
+            <a:off x="1712976" y="7315200"/>
             <a:ext cx="8763000" cy="1993900"/>
           </a:xfrm>
           <a:prstGeom prst="rect">
@@ -7773,7 +7775,7 @@
         </p:nvSpPr>
         <p:spPr>
           <a:xfrm>
-            <a:off x="1712976" y="1524000"/>
+            <a:off x="1712976" y="4064000"/>
             <a:ext cx="7112000" cy="1993900"/>
           </a:xfrm>
           <a:prstGeom prst="rect">
@@ -7794,7 +7796,7 @@
                 </a:solidFill>
                 <a:latin typeface="Times New Roman"/>
               </a:rPr>
-              <a:t>VOZ. - Complejo de Yocasta. Instinto materno no satisfecho. Usted desea tener hijos.</a:t>
+              <a:t>MARÍA. - Yo lo cuidaba y lo mimaba, </a:t>
             </a:r>
           </a:p>
           <a:p/>
@@ -7808,7 +7810,7 @@
         </p:nvSpPr>
         <p:spPr>
           <a:xfrm>
-            <a:off x="1712976" y="4114800"/>
+            <a:off x="1712976" y="7315200"/>
             <a:ext cx="8763000" cy="1993900"/>
           </a:xfrm>
           <a:prstGeom prst="rect">
@@ -7869,7 +7871,7 @@
         </p:nvSpPr>
         <p:spPr>
           <a:xfrm>
-            <a:off x="1712976" y="1524000"/>
+            <a:off x="1712976" y="4064000"/>
             <a:ext cx="7112000" cy="1993900"/>
           </a:xfrm>
           <a:prstGeom prst="rect">
@@ -7890,7 +7892,7 @@
                 </a:solidFill>
                 <a:latin typeface="Times New Roman"/>
               </a:rPr>
-              <a:t>MARÍA. -  Ahora no, porque él tiene varios y tiene que mantener a su esposa y a ellos.</a:t>
+              <a:t>porque siempre decía que el hacía falta cariño, que nadie le atendía como yo.</a:t>
             </a:r>
           </a:p>
           <a:p/>
@@ -7904,7 +7906,7 @@
         </p:nvSpPr>
         <p:spPr>
           <a:xfrm>
-            <a:off x="1712976" y="4114800"/>
+            <a:off x="1712976" y="7315200"/>
             <a:ext cx="8763000" cy="1993900"/>
           </a:xfrm>
           <a:prstGeom prst="rect">
@@ -7965,7 +7967,7 @@
         </p:nvSpPr>
         <p:spPr>
           <a:xfrm>
-            <a:off x="1712976" y="1524000"/>
+            <a:off x="1712976" y="4064000"/>
             <a:ext cx="7112000" cy="1993900"/>
           </a:xfrm>
           <a:prstGeom prst="rect">
@@ -7986,7 +7988,7 @@
                 </a:solidFill>
                 <a:latin typeface="Times New Roman"/>
               </a:rPr>
-              <a:t>MARÍA. - Siempre estaba escaso de dinero.</a:t>
+              <a:t>VOZ. - Complejo de Yocasta. Instinto materno no satisfecho. Usted desea tener hijos.</a:t>
             </a:r>
           </a:p>
           <a:p/>
@@ -8000,7 +8002,7 @@
         </p:nvSpPr>
         <p:spPr>
           <a:xfrm>
-            <a:off x="1712976" y="4114800"/>
+            <a:off x="1712976" y="7315200"/>
             <a:ext cx="8763000" cy="1993900"/>
           </a:xfrm>
           <a:prstGeom prst="rect">
@@ -8061,7 +8063,7 @@
         </p:nvSpPr>
         <p:spPr>
           <a:xfrm>
-            <a:off x="1712976" y="1524000"/>
+            <a:off x="1712976" y="4064000"/>
             <a:ext cx="7112000" cy="1993900"/>
           </a:xfrm>
           <a:prstGeom prst="rect">
@@ -8082,7 +8084,7 @@
                 </a:solidFill>
                 <a:latin typeface="Times New Roman"/>
               </a:rPr>
-              <a:t>MARÍA. -Yo tenía que pagarme mi parte de los gastos...</a:t>
+              <a:t>MARÍA. -  Ahora no, porque él tiene varios y tiene que mantener a su esposa y a ellos.</a:t>
             </a:r>
           </a:p>
           <a:p/>
@@ -8096,7 +8098,7 @@
         </p:nvSpPr>
         <p:spPr>
           <a:xfrm>
-            <a:off x="1712976" y="4114800"/>
+            <a:off x="1712976" y="7315200"/>
             <a:ext cx="8763000" cy="1993900"/>
           </a:xfrm>
           <a:prstGeom prst="rect">
@@ -8157,7 +8159,7 @@
         </p:nvSpPr>
         <p:spPr>
           <a:xfrm>
-            <a:off x="1712976" y="1524000"/>
+            <a:off x="1712976" y="4064000"/>
             <a:ext cx="7112000" cy="1993900"/>
           </a:xfrm>
           <a:prstGeom prst="rect">
@@ -8178,7 +8180,7 @@
                 </a:solidFill>
                 <a:latin typeface="Times New Roman"/>
               </a:rPr>
-              <a:t>VOZ. - ¿Por qué el ha dejado?</a:t>
+              <a:t>MARÍA. - Siempre estaba escaso de dinero.</a:t>
             </a:r>
           </a:p>
           <a:p/>
@@ -8192,7 +8194,7 @@
         </p:nvSpPr>
         <p:spPr>
           <a:xfrm>
-            <a:off x="1712976" y="4114800"/>
+            <a:off x="1712976" y="7315200"/>
             <a:ext cx="8763000" cy="1993900"/>
           </a:xfrm>
           <a:prstGeom prst="rect">
@@ -8253,7 +8255,7 @@
         </p:nvSpPr>
         <p:spPr>
           <a:xfrm>
-            <a:off x="1712976" y="1524000"/>
+            <a:off x="1712976" y="4064000"/>
             <a:ext cx="7112000" cy="1993900"/>
           </a:xfrm>
           <a:prstGeom prst="rect">
@@ -8274,7 +8276,7 @@
                 </a:solidFill>
                 <a:latin typeface="Times New Roman"/>
               </a:rPr>
-              <a:t>MARÍA. - No me ha dado ninguna explicación. Creo que sale con otra. </a:t>
+              <a:t>MARÍA. -Yo tenía que pagarme mi parte de los gastos...</a:t>
             </a:r>
           </a:p>
           <a:p/>
@@ -8288,7 +8290,7 @@
         </p:nvSpPr>
         <p:spPr>
           <a:xfrm>
-            <a:off x="1712976" y="4114800"/>
+            <a:off x="1712976" y="7315200"/>
             <a:ext cx="8763000" cy="1993900"/>
           </a:xfrm>
           <a:prstGeom prst="rect">
@@ -8349,7 +8351,7 @@
         </p:nvSpPr>
         <p:spPr>
           <a:xfrm>
-            <a:off x="1712976" y="1524000"/>
+            <a:off x="1712976" y="4064000"/>
             <a:ext cx="7112000" cy="1993900"/>
           </a:xfrm>
           <a:prstGeom prst="rect">
@@ -8370,7 +8372,7 @@
                 </a:solidFill>
                 <a:latin typeface="Times New Roman"/>
               </a:rPr>
-              <a:t>MARÍA. - Me despidió con una carta breve y se llevó el anillo de brillantes que me había regalado. </a:t>
+              <a:t>VOZ. - ¿Por qué el ha dejado?</a:t>
             </a:r>
           </a:p>
           <a:p/>
@@ -8384,7 +8386,7 @@
         </p:nvSpPr>
         <p:spPr>
           <a:xfrm>
-            <a:off x="1712976" y="4114800"/>
+            <a:off x="1712976" y="7315200"/>
             <a:ext cx="8763000" cy="1993900"/>
           </a:xfrm>
           <a:prstGeom prst="rect">
@@ -8445,7 +8447,7 @@
         </p:nvSpPr>
         <p:spPr>
           <a:xfrm>
-            <a:off x="1712976" y="1524000"/>
+            <a:off x="1712976" y="4064000"/>
             <a:ext cx="7112000" cy="1993900"/>
           </a:xfrm>
           <a:prstGeom prst="rect">
@@ -8466,7 +8468,7 @@
                 </a:solidFill>
                 <a:latin typeface="Times New Roman"/>
               </a:rPr>
-              <a:t>MARÍA. - Me di cuenta cuando es había ido, me lo quitó del joyero... </a:t>
+              <a:t>MARÍA. - No me ha dado ninguna explicación. Creo que sale con otra. </a:t>
             </a:r>
           </a:p>
           <a:p/>
@@ -8480,7 +8482,7 @@
         </p:nvSpPr>
         <p:spPr>
           <a:xfrm>
-            <a:off x="1712976" y="4114800"/>
+            <a:off x="1712976" y="7315200"/>
             <a:ext cx="8763000" cy="1993900"/>
           </a:xfrm>
           <a:prstGeom prst="rect">
@@ -8541,7 +8543,7 @@
         </p:nvSpPr>
         <p:spPr>
           <a:xfrm>
-            <a:off x="1712976" y="1524000"/>
+            <a:off x="1712976" y="4064000"/>
             <a:ext cx="7112000" cy="1993900"/>
           </a:xfrm>
           <a:prstGeom prst="rect">
@@ -8562,7 +8564,7 @@
                 </a:solidFill>
                 <a:latin typeface="Times New Roman"/>
               </a:rPr>
-              <a:t>y las llaves del apartamento que me sacó del bolso, sin que me diera cuenta tampoco. </a:t>
+              <a:t>MARÍA. - Me despidió con una carta breve y se llevó el anillo de brillantes que me había regalado. </a:t>
             </a:r>
           </a:p>
           <a:p/>
@@ -8576,7 +8578,7 @@
         </p:nvSpPr>
         <p:spPr>
           <a:xfrm>
-            <a:off x="1712976" y="4114800"/>
+            <a:off x="1712976" y="7315200"/>
             <a:ext cx="8763000" cy="1993900"/>
           </a:xfrm>
           <a:prstGeom prst="rect">
@@ -8637,7 +8639,7 @@
         </p:nvSpPr>
         <p:spPr>
           <a:xfrm>
-            <a:off x="1712976" y="1524000"/>
+            <a:off x="1712976" y="4064000"/>
             <a:ext cx="7112000" cy="1993900"/>
           </a:xfrm>
           <a:prstGeom prst="rect">
@@ -8672,7 +8674,7 @@
         </p:nvSpPr>
         <p:spPr>
           <a:xfrm>
-            <a:off x="1712976" y="4114800"/>
+            <a:off x="1712976" y="7315200"/>
             <a:ext cx="8763000" cy="1993900"/>
           </a:xfrm>
           <a:prstGeom prst="rect">
@@ -8733,7 +8735,7 @@
         </p:nvSpPr>
         <p:spPr>
           <a:xfrm>
-            <a:off x="1712976" y="1524000"/>
+            <a:off x="1712976" y="4064000"/>
             <a:ext cx="7112000" cy="1993900"/>
           </a:xfrm>
           <a:prstGeom prst="rect">
@@ -8754,7 +8756,7 @@
                 </a:solidFill>
                 <a:latin typeface="Times New Roman"/>
               </a:rPr>
-              <a:t>MARÍA. - No hubiera podido creerlo nunca.</a:t>
+              <a:t>MARÍA. - Me di cuenta cuando es había ido, me lo quitó del joyero... </a:t>
             </a:r>
           </a:p>
           <a:p/>
@@ -8768,7 +8770,7 @@
         </p:nvSpPr>
         <p:spPr>
           <a:xfrm>
-            <a:off x="1712976" y="4114800"/>
+            <a:off x="1712976" y="7315200"/>
             <a:ext cx="8763000" cy="1993900"/>
           </a:xfrm>
           <a:prstGeom prst="rect">
@@ -8829,7 +8831,7 @@
         </p:nvSpPr>
         <p:spPr>
           <a:xfrm>
-            <a:off x="1712976" y="1524000"/>
+            <a:off x="1712976" y="4064000"/>
             <a:ext cx="7112000" cy="1993900"/>
           </a:xfrm>
           <a:prstGeom prst="rect">
@@ -8850,7 +8852,7 @@
                 </a:solidFill>
                 <a:latin typeface="Times New Roman"/>
               </a:rPr>
-              <a:t>MARÍA. - Y en la carta me dice que deje el apartamento igual que lo encontré... sin más explicación.</a:t>
+              <a:t>y las llaves del apartamento que me sacó del bolso, sin que me diera cuenta tampoco. </a:t>
             </a:r>
           </a:p>
           <a:p/>
@@ -8864,7 +8866,7 @@
         </p:nvSpPr>
         <p:spPr>
           <a:xfrm>
-            <a:off x="1712976" y="4114800"/>
+            <a:off x="1712976" y="7315200"/>
             <a:ext cx="8763000" cy="1993900"/>
           </a:xfrm>
           <a:prstGeom prst="rect">
@@ -8925,7 +8927,7 @@
         </p:nvSpPr>
         <p:spPr>
           <a:xfrm>
-            <a:off x="1712976" y="1524000"/>
+            <a:off x="1712976" y="4064000"/>
             <a:ext cx="7112000" cy="1993900"/>
           </a:xfrm>
           <a:prstGeom prst="rect">
@@ -8946,7 +8948,7 @@
                 </a:solidFill>
                 <a:latin typeface="Times New Roman"/>
               </a:rPr>
-              <a:t>VOZ. - ¡No la oigo! ¡Hable en el micrófono!</a:t>
+              <a:t>MARÍA. - No hubiera podido creerlo nunca.</a:t>
             </a:r>
           </a:p>
           <a:p/>
@@ -8960,7 +8962,7 @@
         </p:nvSpPr>
         <p:spPr>
           <a:xfrm>
-            <a:off x="1712976" y="4114800"/>
+            <a:off x="1712976" y="7315200"/>
             <a:ext cx="8763000" cy="1993900"/>
           </a:xfrm>
           <a:prstGeom prst="rect">
@@ -9021,7 +9023,7 @@
         </p:nvSpPr>
         <p:spPr>
           <a:xfrm>
-            <a:off x="1712976" y="1524000"/>
+            <a:off x="1712976" y="4064000"/>
             <a:ext cx="7112000" cy="1993900"/>
           </a:xfrm>
           <a:prstGeom prst="rect">
@@ -9042,7 +9044,7 @@
                 </a:solidFill>
                 <a:latin typeface="Times New Roman"/>
               </a:rPr>
-              <a:t>MARÍA. -  ¡No lo sé! ¡Me ha abandonado!</a:t>
+              <a:t>MARÍA. - Y en la carta me dice que deje el apartamento igual que lo encontré... sin más explicación.</a:t>
             </a:r>
           </a:p>
           <a:p/>
@@ -9056,7 +9058,7 @@
         </p:nvSpPr>
         <p:spPr>
           <a:xfrm>
-            <a:off x="1712976" y="4114800"/>
+            <a:off x="1712976" y="7315200"/>
             <a:ext cx="8763000" cy="1993900"/>
           </a:xfrm>
           <a:prstGeom prst="rect">
@@ -9117,7 +9119,7 @@
         </p:nvSpPr>
         <p:spPr>
           <a:xfrm>
-            <a:off x="1712976" y="1524000"/>
+            <a:off x="1712976" y="4064000"/>
             <a:ext cx="7112000" cy="1993900"/>
           </a:xfrm>
           <a:prstGeom prst="rect">
@@ -9138,7 +9140,7 @@
                 </a:solidFill>
                 <a:latin typeface="Times New Roman"/>
               </a:rPr>
-              <a:t>VOZ. - Tiene usted un carácter dominante. Para él se ha convertido en otra Medea. </a:t>
+              <a:t>VOZ. - ¡No la oigo! ¡Hable en el micrófono!</a:t>
             </a:r>
           </a:p>
           <a:p/>
@@ -9152,7 +9154,7 @@
         </p:nvSpPr>
         <p:spPr>
           <a:xfrm>
-            <a:off x="1712976" y="4114800"/>
+            <a:off x="1712976" y="7315200"/>
             <a:ext cx="8763000" cy="1993900"/>
           </a:xfrm>
           <a:prstGeom prst="rect">
@@ -9213,7 +9215,7 @@
         </p:nvSpPr>
         <p:spPr>
           <a:xfrm>
-            <a:off x="1712976" y="1524000"/>
+            <a:off x="1712976" y="4064000"/>
             <a:ext cx="7112000" cy="1993900"/>
           </a:xfrm>
           <a:prstGeom prst="rect">
@@ -9234,7 +9236,7 @@
                 </a:solidFill>
                 <a:latin typeface="Times New Roman"/>
               </a:rPr>
-              <a:t>VOZ. - Usted quiere ser su madre y dominarle.</a:t>
+              <a:t>MARÍA. -  ¡No lo sé! ¡Me ha abandonado!</a:t>
             </a:r>
           </a:p>
           <a:p/>
@@ -9248,7 +9250,7 @@
         </p:nvSpPr>
         <p:spPr>
           <a:xfrm>
-            <a:off x="1712976" y="4114800"/>
+            <a:off x="1712976" y="7315200"/>
             <a:ext cx="8763000" cy="1993900"/>
           </a:xfrm>
           <a:prstGeom prst="rect">
@@ -9309,7 +9311,7 @@
         </p:nvSpPr>
         <p:spPr>
           <a:xfrm>
-            <a:off x="1712976" y="1524000"/>
+            <a:off x="1712976" y="4064000"/>
             <a:ext cx="7112000" cy="1993900"/>
           </a:xfrm>
           <a:prstGeom prst="rect">
@@ -9330,7 +9332,7 @@
                 </a:solidFill>
                 <a:latin typeface="Times New Roman"/>
               </a:rPr>
-              <a:t>VOZ. - Tragarle de nuevo para que vuelva al Mútero materno.</a:t>
+              <a:t>VOZ. - Tiene usted un carácter dominante. Para él se ha convertido en otra Medea. </a:t>
             </a:r>
           </a:p>
           <a:p/>
@@ -9344,7 +9346,7 @@
         </p:nvSpPr>
         <p:spPr>
           <a:xfrm>
-            <a:off x="1712976" y="4114800"/>
+            <a:off x="1712976" y="7315200"/>
             <a:ext cx="8763000" cy="1993900"/>
           </a:xfrm>
           <a:prstGeom prst="rect">
@@ -9405,7 +9407,7 @@
         </p:nvSpPr>
         <p:spPr>
           <a:xfrm>
-            <a:off x="1712976" y="1524000"/>
+            <a:off x="1712976" y="4064000"/>
             <a:ext cx="7112000" cy="1993900"/>
           </a:xfrm>
           <a:prstGeom prst="rect">
@@ -9426,7 +9428,7 @@
                 </a:solidFill>
                 <a:latin typeface="Times New Roman"/>
               </a:rPr>
-              <a:t>MARÍA. - No, yo...</a:t>
+              <a:t>VOZ. - Usted quiere ser su madre y dominarle.</a:t>
             </a:r>
           </a:p>
           <a:p/>
@@ -9440,7 +9442,7 @@
         </p:nvSpPr>
         <p:spPr>
           <a:xfrm>
-            <a:off x="1712976" y="4114800"/>
+            <a:off x="1712976" y="7315200"/>
             <a:ext cx="8763000" cy="1993900"/>
           </a:xfrm>
           <a:prstGeom prst="rect">
@@ -9501,7 +9503,7 @@
         </p:nvSpPr>
         <p:spPr>
           <a:xfrm>
-            <a:off x="1712976" y="1524000"/>
+            <a:off x="1712976" y="4064000"/>
             <a:ext cx="7112000" cy="1993900"/>
           </a:xfrm>
           <a:prstGeom prst="rect">
@@ -9522,9 +9524,10 @@
                 </a:solidFill>
                 <a:latin typeface="Times New Roman"/>
               </a:rPr>
-              <a:t>VOZ. - Se terminó el tiempo. Vuelva el jueves que viene.</a:t>
-            </a:r>
-          </a:p>
+              <a:t>VOZ. - Tragarle de nuevo para que vuelva al Mútero materno.</a:t>
+            </a:r>
+          </a:p>
+          <a:p/>
         </p:txBody>
       </p:sp>
       <p:sp>
@@ -9535,7 +9538,7 @@
         </p:nvSpPr>
         <p:spPr>
           <a:xfrm>
-            <a:off x="1712976" y="4114800"/>
+            <a:off x="1712976" y="7315200"/>
             <a:ext cx="8763000" cy="1993900"/>
           </a:xfrm>
           <a:prstGeom prst="rect">
@@ -9557,6 +9560,102 @@
                 <a:latin typeface="MS Mincho"/>
               </a:rPr>
               <a:t>声: 彼が母親の子宮に戻るように、もう一度彼を飲み込もうとしているのです</a:t>
+            </a:r>
+          </a:p>
+          <a:p/>
+        </p:txBody>
+      </p:sp>
+    </p:spTree>
+  </p:cSld>
+  <p:clrMapOvr>
+    <a:masterClrMapping/>
+  </p:clrMapOvr>
+</p:sld>
+</file>
+
+<file path=ppt/slides/slide159.xml><?xml version="1.0" encoding="utf-8"?>
+<p:sld xmlns:a="http://schemas.openxmlformats.org/drawingml/2006/main" xmlns:p="http://schemas.openxmlformats.org/presentationml/2006/main" xmlns:r="http://schemas.openxmlformats.org/officeDocument/2006/relationships">
+  <p:cSld>
+    <p:bg>
+      <p:bgPr>
+        <a:solidFill>
+          <a:srgbClr val="000000"/>
+        </a:solidFill>
+        <a:effectLst/>
+      </p:bgPr>
+    </p:bg>
+    <p:spTree>
+      <p:nvGrpSpPr>
+        <p:cNvPr id="1" name=""/>
+        <p:cNvGrpSpPr/>
+        <p:nvPr/>
+      </p:nvGrpSpPr>
+      <p:grpSpPr/>
+      <p:sp>
+        <p:nvSpPr>
+          <p:cNvPr id="2" name="TextBox 1"/>
+          <p:cNvSpPr txBox="1"/>
+          <p:nvPr/>
+        </p:nvSpPr>
+        <p:spPr>
+          <a:xfrm>
+            <a:off x="1712976" y="4064000"/>
+            <a:ext cx="7112000" cy="1993900"/>
+          </a:xfrm>
+          <a:prstGeom prst="rect">
+            <a:avLst/>
+          </a:prstGeom>
+          <a:noFill/>
+        </p:spPr>
+        <p:txBody>
+          <a:bodyPr wrap="square">
+            <a:spAutoFit/>
+          </a:bodyPr>
+          <a:lstStyle/>
+          <a:p>
+            <a:r>
+              <a:rPr sz="4000">
+                <a:solidFill>
+                  <a:srgbClr val="FFFFFF"/>
+                </a:solidFill>
+                <a:latin typeface="Times New Roman"/>
+              </a:rPr>
+              <a:t>MARÍA. - No, yo...</a:t>
+            </a:r>
+          </a:p>
+          <a:p/>
+        </p:txBody>
+      </p:sp>
+      <p:sp>
+        <p:nvSpPr>
+          <p:cNvPr id="3" name="TextBox 2"/>
+          <p:cNvSpPr txBox="1"/>
+          <p:nvPr/>
+        </p:nvSpPr>
+        <p:spPr>
+          <a:xfrm>
+            <a:off x="1712976" y="7315200"/>
+            <a:ext cx="8763000" cy="1993900"/>
+          </a:xfrm>
+          <a:prstGeom prst="rect">
+            <a:avLst/>
+          </a:prstGeom>
+          <a:noFill/>
+        </p:spPr>
+        <p:txBody>
+          <a:bodyPr wrap="square">
+            <a:spAutoFit/>
+          </a:bodyPr>
+          <a:lstStyle/>
+          <a:p>
+            <a:r>
+              <a:rPr sz="4000">
+                <a:solidFill>
+                  <a:srgbClr val="FFFFFF"/>
+                </a:solidFill>
+                <a:latin typeface="MS Mincho"/>
+              </a:rPr>
+              <a:t>マリア: 違います、私は……！</a:t>
             </a:r>
           </a:p>
           <a:p/>
@@ -9596,7 +9695,7 @@
         </p:nvSpPr>
         <p:spPr>
           <a:xfrm>
-            <a:off x="1712976" y="1524000"/>
+            <a:off x="1712976" y="4064000"/>
             <a:ext cx="7112000" cy="1993900"/>
           </a:xfrm>
           <a:prstGeom prst="rect">
@@ -9631,7 +9730,7 @@
         </p:nvSpPr>
         <p:spPr>
           <a:xfrm>
-            <a:off x="1712976" y="4114800"/>
+            <a:off x="1712976" y="7315200"/>
             <a:ext cx="8763000" cy="1993900"/>
           </a:xfrm>
           <a:prstGeom prst="rect">
@@ -9656,6 +9755,100 @@
             </a:r>
           </a:p>
           <a:p/>
+        </p:txBody>
+      </p:sp>
+    </p:spTree>
+  </p:cSld>
+  <p:clrMapOvr>
+    <a:masterClrMapping/>
+  </p:clrMapOvr>
+</p:sld>
+</file>
+
+<file path=ppt/slides/slide160.xml><?xml version="1.0" encoding="utf-8"?>
+<p:sld xmlns:a="http://schemas.openxmlformats.org/drawingml/2006/main" xmlns:p="http://schemas.openxmlformats.org/presentationml/2006/main" xmlns:r="http://schemas.openxmlformats.org/officeDocument/2006/relationships">
+  <p:cSld>
+    <p:bg>
+      <p:bgPr>
+        <a:solidFill>
+          <a:srgbClr val="000000"/>
+        </a:solidFill>
+        <a:effectLst/>
+      </p:bgPr>
+    </p:bg>
+    <p:spTree>
+      <p:nvGrpSpPr>
+        <p:cNvPr id="1" name=""/>
+        <p:cNvGrpSpPr/>
+        <p:nvPr/>
+      </p:nvGrpSpPr>
+      <p:grpSpPr/>
+      <p:sp>
+        <p:nvSpPr>
+          <p:cNvPr id="2" name="TextBox 1"/>
+          <p:cNvSpPr txBox="1"/>
+          <p:nvPr/>
+        </p:nvSpPr>
+        <p:spPr>
+          <a:xfrm>
+            <a:off x="1712976" y="4064000"/>
+            <a:ext cx="7112000" cy="1993900"/>
+          </a:xfrm>
+          <a:prstGeom prst="rect">
+            <a:avLst/>
+          </a:prstGeom>
+          <a:noFill/>
+        </p:spPr>
+        <p:txBody>
+          <a:bodyPr wrap="square">
+            <a:spAutoFit/>
+          </a:bodyPr>
+          <a:lstStyle/>
+          <a:p>
+            <a:r>
+              <a:rPr sz="4000">
+                <a:solidFill>
+                  <a:srgbClr val="FFFFFF"/>
+                </a:solidFill>
+                <a:latin typeface="Times New Roman"/>
+              </a:rPr>
+              <a:t>VOZ. - Se terminó el tiempo. Vuelva el jueves que viene.</a:t>
+            </a:r>
+          </a:p>
+        </p:txBody>
+      </p:sp>
+      <p:sp>
+        <p:nvSpPr>
+          <p:cNvPr id="3" name="TextBox 2"/>
+          <p:cNvSpPr txBox="1"/>
+          <p:nvPr/>
+        </p:nvSpPr>
+        <p:spPr>
+          <a:xfrm>
+            <a:off x="1712976" y="7315200"/>
+            <a:ext cx="8763000" cy="1993900"/>
+          </a:xfrm>
+          <a:prstGeom prst="rect">
+            <a:avLst/>
+          </a:prstGeom>
+          <a:noFill/>
+        </p:spPr>
+        <p:txBody>
+          <a:bodyPr wrap="square">
+            <a:spAutoFit/>
+          </a:bodyPr>
+          <a:lstStyle/>
+          <a:p>
+            <a:r>
+              <a:rPr sz="4000">
+                <a:solidFill>
+                  <a:srgbClr val="FFFFFF"/>
+                </a:solidFill>
+                <a:latin typeface="MS Mincho"/>
+              </a:rPr>
+              <a:t>声: 時間になりました 来週木曜にまたお越しください</a:t>
+            </a:r>
+          </a:p>
         </p:txBody>
       </p:sp>
     </p:spTree>
@@ -9692,7 +9885,7 @@
         </p:nvSpPr>
         <p:spPr>
           <a:xfrm>
-            <a:off x="1712976" y="1524000"/>
+            <a:off x="1712976" y="4064000"/>
             <a:ext cx="7112000" cy="1993900"/>
           </a:xfrm>
           <a:prstGeom prst="rect">
@@ -9727,7 +9920,7 @@
         </p:nvSpPr>
         <p:spPr>
           <a:xfrm>
-            <a:off x="1712976" y="4114800"/>
+            <a:off x="1712976" y="7315200"/>
             <a:ext cx="8763000" cy="1993900"/>
           </a:xfrm>
           <a:prstGeom prst="rect">
@@ -9788,7 +9981,7 @@
         </p:nvSpPr>
         <p:spPr>
           <a:xfrm>
-            <a:off x="1712976" y="1524000"/>
+            <a:off x="1712976" y="4064000"/>
             <a:ext cx="7112000" cy="1993900"/>
           </a:xfrm>
           <a:prstGeom prst="rect">
@@ -9823,7 +10016,7 @@
         </p:nvSpPr>
         <p:spPr>
           <a:xfrm>
-            <a:off x="1712976" y="4114800"/>
+            <a:off x="1712976" y="7315200"/>
             <a:ext cx="8763000" cy="1993900"/>
           </a:xfrm>
           <a:prstGeom prst="rect">
@@ -9884,7 +10077,7 @@
         </p:nvSpPr>
         <p:spPr>
           <a:xfrm>
-            <a:off x="1712976" y="1524000"/>
+            <a:off x="1712976" y="4064000"/>
             <a:ext cx="7112000" cy="1993900"/>
           </a:xfrm>
           <a:prstGeom prst="rect">
@@ -9919,7 +10112,7 @@
         </p:nvSpPr>
         <p:spPr>
           <a:xfrm>
-            <a:off x="1712976" y="4114800"/>
+            <a:off x="1712976" y="7315200"/>
             <a:ext cx="8763000" cy="1993900"/>
           </a:xfrm>
           <a:prstGeom prst="rect">
@@ -9980,7 +10173,7 @@
         </p:nvSpPr>
         <p:spPr>
           <a:xfrm>
-            <a:off x="1712976" y="1524000"/>
+            <a:off x="1712976" y="4064000"/>
             <a:ext cx="7112000" cy="1993900"/>
           </a:xfrm>
           <a:prstGeom prst="rect">
@@ -10015,7 +10208,7 @@
         </p:nvSpPr>
         <p:spPr>
           <a:xfrm>
-            <a:off x="1712976" y="4114800"/>
+            <a:off x="1712976" y="7315200"/>
             <a:ext cx="8763000" cy="1993900"/>
           </a:xfrm>
           <a:prstGeom prst="rect">
@@ -10076,7 +10269,7 @@
         </p:nvSpPr>
         <p:spPr>
           <a:xfrm>
-            <a:off x="1712976" y="1524000"/>
+            <a:off x="1712976" y="4064000"/>
             <a:ext cx="7112000" cy="1993900"/>
           </a:xfrm>
           <a:prstGeom prst="rect">
@@ -10111,7 +10304,7 @@
         </p:nvSpPr>
         <p:spPr>
           <a:xfrm>
-            <a:off x="1712976" y="4114800"/>
+            <a:off x="1712976" y="7315200"/>
             <a:ext cx="8763000" cy="1993900"/>
           </a:xfrm>
           <a:prstGeom prst="rect">
@@ -10172,7 +10365,7 @@
         </p:nvSpPr>
         <p:spPr>
           <a:xfrm>
-            <a:off x="1712976" y="1524000"/>
+            <a:off x="1712976" y="4064000"/>
             <a:ext cx="7112000" cy="1993900"/>
           </a:xfrm>
           <a:prstGeom prst="rect">
@@ -10207,7 +10400,7 @@
         </p:nvSpPr>
         <p:spPr>
           <a:xfrm>
-            <a:off x="1712976" y="4114800"/>
+            <a:off x="1712976" y="7315200"/>
             <a:ext cx="8763000" cy="1993900"/>
           </a:xfrm>
           <a:prstGeom prst="rect">
@@ -10268,7 +10461,7 @@
         </p:nvSpPr>
         <p:spPr>
           <a:xfrm>
-            <a:off x="1712976" y="1524000"/>
+            <a:off x="1712976" y="4064000"/>
             <a:ext cx="7112000" cy="1993900"/>
           </a:xfrm>
           <a:prstGeom prst="rect">
@@ -10303,7 +10496,7 @@
         </p:nvSpPr>
         <p:spPr>
           <a:xfrm>
-            <a:off x="1712976" y="4114800"/>
+            <a:off x="1712976" y="7315200"/>
             <a:ext cx="8763000" cy="1993900"/>
           </a:xfrm>
           <a:prstGeom prst="rect">
@@ -10364,7 +10557,7 @@
         </p:nvSpPr>
         <p:spPr>
           <a:xfrm>
-            <a:off x="1712976" y="1524000"/>
+            <a:off x="1712976" y="4064000"/>
             <a:ext cx="7112000" cy="1993900"/>
           </a:xfrm>
           <a:prstGeom prst="rect">
@@ -10399,7 +10592,7 @@
         </p:nvSpPr>
         <p:spPr>
           <a:xfrm>
-            <a:off x="1712976" y="4114800"/>
+            <a:off x="1712976" y="7315200"/>
             <a:ext cx="8763000" cy="1993900"/>
           </a:xfrm>
           <a:prstGeom prst="rect">
@@ -10460,7 +10653,7 @@
         </p:nvSpPr>
         <p:spPr>
           <a:xfrm>
-            <a:off x="1712976" y="1524000"/>
+            <a:off x="1712976" y="4064000"/>
             <a:ext cx="7112000" cy="1993900"/>
           </a:xfrm>
           <a:prstGeom prst="rect">
@@ -10495,7 +10688,7 @@
         </p:nvSpPr>
         <p:spPr>
           <a:xfrm>
-            <a:off x="1712976" y="4114800"/>
+            <a:off x="1712976" y="7315200"/>
             <a:ext cx="8763000" cy="1993900"/>
           </a:xfrm>
           <a:prstGeom prst="rect">
@@ -10556,7 +10749,7 @@
         </p:nvSpPr>
         <p:spPr>
           <a:xfrm>
-            <a:off x="1712976" y="1524000"/>
+            <a:off x="1712976" y="4064000"/>
             <a:ext cx="7112000" cy="1993900"/>
           </a:xfrm>
           <a:prstGeom prst="rect">
@@ -10591,7 +10784,7 @@
         </p:nvSpPr>
         <p:spPr>
           <a:xfrm>
-            <a:off x="1712976" y="4114800"/>
+            <a:off x="1712976" y="7315200"/>
             <a:ext cx="8763000" cy="1993900"/>
           </a:xfrm>
           <a:prstGeom prst="rect">
@@ -10652,7 +10845,7 @@
         </p:nvSpPr>
         <p:spPr>
           <a:xfrm>
-            <a:off x="1712976" y="1524000"/>
+            <a:off x="1712976" y="4064000"/>
             <a:ext cx="7112000" cy="1993900"/>
           </a:xfrm>
           <a:prstGeom prst="rect">
@@ -10687,7 +10880,7 @@
         </p:nvSpPr>
         <p:spPr>
           <a:xfrm>
-            <a:off x="1712976" y="4114800"/>
+            <a:off x="1712976" y="7315200"/>
             <a:ext cx="8763000" cy="1993900"/>
           </a:xfrm>
           <a:prstGeom prst="rect">
@@ -10748,7 +10941,7 @@
         </p:nvSpPr>
         <p:spPr>
           <a:xfrm>
-            <a:off x="1712976" y="1524000"/>
+            <a:off x="1712976" y="4064000"/>
             <a:ext cx="7112000" cy="1993900"/>
           </a:xfrm>
           <a:prstGeom prst="rect">
@@ -10783,7 +10976,7 @@
         </p:nvSpPr>
         <p:spPr>
           <a:xfrm>
-            <a:off x="1712976" y="4114800"/>
+            <a:off x="1712976" y="7315200"/>
             <a:ext cx="8763000" cy="1993900"/>
           </a:xfrm>
           <a:prstGeom prst="rect">
@@ -10844,7 +11037,7 @@
         </p:nvSpPr>
         <p:spPr>
           <a:xfrm>
-            <a:off x="1712976" y="1524000"/>
+            <a:off x="1712976" y="4064000"/>
             <a:ext cx="7112000" cy="1993900"/>
           </a:xfrm>
           <a:prstGeom prst="rect">
@@ -10879,7 +11072,7 @@
         </p:nvSpPr>
         <p:spPr>
           <a:xfrm>
-            <a:off x="1712976" y="4114800"/>
+            <a:off x="1712976" y="7315200"/>
             <a:ext cx="8763000" cy="1993900"/>
           </a:xfrm>
           <a:prstGeom prst="rect">
@@ -10940,7 +11133,7 @@
         </p:nvSpPr>
         <p:spPr>
           <a:xfrm>
-            <a:off x="1712976" y="1524000"/>
+            <a:off x="1712976" y="4064000"/>
             <a:ext cx="7112000" cy="1993900"/>
           </a:xfrm>
           <a:prstGeom prst="rect">
@@ -10975,7 +11168,7 @@
         </p:nvSpPr>
         <p:spPr>
           <a:xfrm>
-            <a:off x="1712976" y="4114800"/>
+            <a:off x="1712976" y="7315200"/>
             <a:ext cx="8763000" cy="1993900"/>
           </a:xfrm>
           <a:prstGeom prst="rect">
@@ -11036,7 +11229,7 @@
         </p:nvSpPr>
         <p:spPr>
           <a:xfrm>
-            <a:off x="1712976" y="1524000"/>
+            <a:off x="1712976" y="4064000"/>
             <a:ext cx="7112000" cy="1993900"/>
           </a:xfrm>
           <a:prstGeom prst="rect">
@@ -11071,7 +11264,7 @@
         </p:nvSpPr>
         <p:spPr>
           <a:xfrm>
-            <a:off x="1712976" y="4114800"/>
+            <a:off x="1712976" y="7315200"/>
             <a:ext cx="8763000" cy="1993900"/>
           </a:xfrm>
           <a:prstGeom prst="rect">
@@ -11132,7 +11325,7 @@
         </p:nvSpPr>
         <p:spPr>
           <a:xfrm>
-            <a:off x="1712976" y="1524000"/>
+            <a:off x="1712976" y="4064000"/>
             <a:ext cx="7112000" cy="1993900"/>
           </a:xfrm>
           <a:prstGeom prst="rect">
@@ -11167,7 +11360,7 @@
         </p:nvSpPr>
         <p:spPr>
           <a:xfrm>
-            <a:off x="1712976" y="4114800"/>
+            <a:off x="1712976" y="7315200"/>
             <a:ext cx="8763000" cy="1993900"/>
           </a:xfrm>
           <a:prstGeom prst="rect">
@@ -11228,7 +11421,7 @@
         </p:nvSpPr>
         <p:spPr>
           <a:xfrm>
-            <a:off x="1712976" y="1524000"/>
+            <a:off x="1712976" y="4064000"/>
             <a:ext cx="7112000" cy="1993900"/>
           </a:xfrm>
           <a:prstGeom prst="rect">
@@ -11263,7 +11456,7 @@
         </p:nvSpPr>
         <p:spPr>
           <a:xfrm>
-            <a:off x="1712976" y="4114800"/>
+            <a:off x="1712976" y="7315200"/>
             <a:ext cx="8763000" cy="1993900"/>
           </a:xfrm>
           <a:prstGeom prst="rect">
@@ -11324,7 +11517,7 @@
         </p:nvSpPr>
         <p:spPr>
           <a:xfrm>
-            <a:off x="1712976" y="1524000"/>
+            <a:off x="1712976" y="4064000"/>
             <a:ext cx="7112000" cy="1993900"/>
           </a:xfrm>
           <a:prstGeom prst="rect">
@@ -11359,7 +11552,7 @@
         </p:nvSpPr>
         <p:spPr>
           <a:xfrm>
-            <a:off x="1712976" y="4114800"/>
+            <a:off x="1712976" y="7315200"/>
             <a:ext cx="8763000" cy="1993900"/>
           </a:xfrm>
           <a:prstGeom prst="rect">
@@ -11420,7 +11613,7 @@
         </p:nvSpPr>
         <p:spPr>
           <a:xfrm>
-            <a:off x="1712976" y="1524000"/>
+            <a:off x="1712976" y="4064000"/>
             <a:ext cx="7112000" cy="1993900"/>
           </a:xfrm>
           <a:prstGeom prst="rect">
@@ -11441,7 +11634,7 @@
                 </a:solidFill>
                 <a:latin typeface="Times New Roman"/>
               </a:rPr>
-              <a:t>no dude que él volverá a usted, como debe...</a:t>
+              <a:t>INSPECTOR. - para disfrutar con el inocente recreo de escuchar un partido de fútbol, final de Copa, </a:t>
             </a:r>
           </a:p>
           <a:p/>
@@ -11455,7 +11648,7 @@
         </p:nvSpPr>
         <p:spPr>
           <a:xfrm>
-            <a:off x="1712976" y="4114800"/>
+            <a:off x="1712976" y="7315200"/>
             <a:ext cx="8763000" cy="1993900"/>
           </a:xfrm>
           <a:prstGeom prst="rect">
@@ -11516,7 +11709,7 @@
         </p:nvSpPr>
         <p:spPr>
           <a:xfrm>
-            <a:off x="1712976" y="1524000"/>
+            <a:off x="1712976" y="4064000"/>
             <a:ext cx="7112000" cy="1993900"/>
           </a:xfrm>
           <a:prstGeom prst="rect">
@@ -11537,7 +11730,7 @@
                 </a:solidFill>
                 <a:latin typeface="Times New Roman"/>
               </a:rPr>
-              <a:t>INSPECTOR. - para disfrutar con el inocente recreo de</a:t>
+              <a:t>INSPECTOR. - además y competición contra el Madrid en su propio campo.</a:t>
             </a:r>
           </a:p>
           <a:p/>
@@ -11551,7 +11744,7 @@
         </p:nvSpPr>
         <p:spPr>
           <a:xfrm>
-            <a:off x="1712976" y="4114800"/>
+            <a:off x="1712976" y="7315200"/>
             <a:ext cx="8763000" cy="1993900"/>
           </a:xfrm>
           <a:prstGeom prst="rect">
@@ -11612,7 +11805,7 @@
         </p:nvSpPr>
         <p:spPr>
           <a:xfrm>
-            <a:off x="1712976" y="1524000"/>
+            <a:off x="1712976" y="4064000"/>
             <a:ext cx="7112000" cy="1993900"/>
           </a:xfrm>
           <a:prstGeom prst="rect">
@@ -11633,7 +11826,7 @@
                 </a:solidFill>
                 <a:latin typeface="Times New Roman"/>
               </a:rPr>
-              <a:t>escuchar un partido de fútbol, final de Copa, </a:t>
+              <a:t>INSPECTOR. - Y se encuentra con una mujer llorona</a:t>
             </a:r>
           </a:p>
           <a:p/>
@@ -11647,7 +11840,7 @@
         </p:nvSpPr>
         <p:spPr>
           <a:xfrm>
-            <a:off x="1712976" y="4114800"/>
+            <a:off x="1712976" y="7315200"/>
             <a:ext cx="8763000" cy="1993900"/>
           </a:xfrm>
           <a:prstGeom prst="rect">
@@ -11708,7 +11901,7 @@
         </p:nvSpPr>
         <p:spPr>
           <a:xfrm>
-            <a:off x="1712976" y="1524000"/>
+            <a:off x="1712976" y="4064000"/>
             <a:ext cx="7112000" cy="1993900"/>
           </a:xfrm>
           <a:prstGeom prst="rect">
@@ -11729,7 +11922,7 @@
                 </a:solidFill>
                 <a:latin typeface="Times New Roman"/>
               </a:rPr>
-              <a:t>INSPECTOR. - además y competición contra el Madrid en su propio campo.</a:t>
+              <a:t>y unos niños gritones que no le dejan oír con tranquilidad...</a:t>
             </a:r>
           </a:p>
           <a:p/>
@@ -11743,7 +11936,7 @@
         </p:nvSpPr>
         <p:spPr>
           <a:xfrm>
-            <a:off x="1712976" y="4114800"/>
+            <a:off x="1712976" y="7315200"/>
             <a:ext cx="8763000" cy="1993900"/>
           </a:xfrm>
           <a:prstGeom prst="rect">
@@ -11804,7 +11997,7 @@
         </p:nvSpPr>
         <p:spPr>
           <a:xfrm>
-            <a:off x="1712976" y="1524000"/>
+            <a:off x="1712976" y="4064000"/>
             <a:ext cx="7112000" cy="1993900"/>
           </a:xfrm>
           <a:prstGeom prst="rect">
@@ -11825,7 +12018,7 @@
                 </a:solidFill>
                 <a:latin typeface="Times New Roman"/>
               </a:rPr>
-              <a:t>INSPECTOR. - Y se encuentra con una mujer llorona</a:t>
+              <a:t>INSPECTOR. - ¡Pero si es para matarlos a todos! ¡Poco le ha hecho!</a:t>
             </a:r>
           </a:p>
           <a:p/>
@@ -11839,7 +12032,7 @@
         </p:nvSpPr>
         <p:spPr>
           <a:xfrm>
-            <a:off x="1712976" y="4114800"/>
+            <a:off x="1712976" y="7315200"/>
             <a:ext cx="8763000" cy="1993900"/>
           </a:xfrm>
           <a:prstGeom prst="rect">
@@ -11900,7 +12093,7 @@
         </p:nvSpPr>
         <p:spPr>
           <a:xfrm>
-            <a:off x="1712976" y="1524000"/>
+            <a:off x="1712976" y="4064000"/>
             <a:ext cx="7112000" cy="1993900"/>
           </a:xfrm>
           <a:prstGeom prst="rect">
@@ -11921,7 +12114,7 @@
                 </a:solidFill>
                 <a:latin typeface="Times New Roman"/>
               </a:rPr>
-              <a:t>y unos niños gritones que no le dejan oír con tranquilidad...</a:t>
+              <a:t>SUBINSPECTOR. - ¡Inspector! Han atracado el Banco Requejo.</a:t>
             </a:r>
           </a:p>
           <a:p/>
@@ -11935,7 +12128,7 @@
         </p:nvSpPr>
         <p:spPr>
           <a:xfrm>
-            <a:off x="1712976" y="4114800"/>
+            <a:off x="1712976" y="7315200"/>
             <a:ext cx="8763000" cy="1993900"/>
           </a:xfrm>
           <a:prstGeom prst="rect">
@@ -11996,7 +12189,7 @@
         </p:nvSpPr>
         <p:spPr>
           <a:xfrm>
-            <a:off x="1712976" y="1524000"/>
+            <a:off x="1712976" y="4064000"/>
             <a:ext cx="7112000" cy="1993900"/>
           </a:xfrm>
           <a:prstGeom prst="rect">
@@ -12017,7 +12210,7 @@
                 </a:solidFill>
                 <a:latin typeface="Times New Roman"/>
               </a:rPr>
-              <a:t>INSPECTOR. - ¡Pero si es para matarlos a todos! ¡Poco le ha hecho!</a:t>
+              <a:t>SUBINSPECTOR. - ¡Aquí mismo! ¡Los atracadores están dentro!</a:t>
             </a:r>
           </a:p>
           <a:p/>
@@ -12031,7 +12224,7 @@
         </p:nvSpPr>
         <p:spPr>
           <a:xfrm>
-            <a:off x="1712976" y="4114800"/>
+            <a:off x="1712976" y="7315200"/>
             <a:ext cx="8763000" cy="1993900"/>
           </a:xfrm>
           <a:prstGeom prst="rect">
@@ -12092,7 +12285,7 @@
         </p:nvSpPr>
         <p:spPr>
           <a:xfrm>
-            <a:off x="1712976" y="1524000"/>
+            <a:off x="1712976" y="4064000"/>
             <a:ext cx="7112000" cy="1993900"/>
           </a:xfrm>
           <a:prstGeom prst="rect">
@@ -12127,7 +12320,7 @@
         </p:nvSpPr>
         <p:spPr>
           <a:xfrm>
-            <a:off x="1712976" y="4114800"/>
+            <a:off x="1712976" y="7315200"/>
             <a:ext cx="8763000" cy="1993900"/>
           </a:xfrm>
           <a:prstGeom prst="rect">
@@ -12188,7 +12381,7 @@
         </p:nvSpPr>
         <p:spPr>
           <a:xfrm>
-            <a:off x="1712976" y="1524000"/>
+            <a:off x="1712976" y="4064000"/>
             <a:ext cx="7112000" cy="1993900"/>
           </a:xfrm>
           <a:prstGeom prst="rect">
@@ -12209,7 +12402,7 @@
                 </a:solidFill>
                 <a:latin typeface="Times New Roman"/>
               </a:rPr>
-              <a:t>SUBINSPECTOR. - ¡Inspector! Han atracado el Banco Requejo.</a:t>
+              <a:t>SUBINSPECTOR. - Han herido al cajero y tienen veinte rehenes...</a:t>
             </a:r>
           </a:p>
           <a:p/>
@@ -12223,7 +12416,7 @@
         </p:nvSpPr>
         <p:spPr>
           <a:xfrm>
-            <a:off x="1712976" y="4114800"/>
+            <a:off x="1712976" y="7315200"/>
             <a:ext cx="8763000" cy="1993900"/>
           </a:xfrm>
           <a:prstGeom prst="rect">
@@ -12284,7 +12477,7 @@
         </p:nvSpPr>
         <p:spPr>
           <a:xfrm>
-            <a:off x="1712976" y="1524000"/>
+            <a:off x="1712976" y="4064000"/>
             <a:ext cx="7112000" cy="1993900"/>
           </a:xfrm>
           <a:prstGeom prst="rect">
@@ -12305,7 +12498,7 @@
                 </a:solidFill>
                 <a:latin typeface="Times New Roman"/>
               </a:rPr>
-              <a:t>SUBINSPECTOR. - ¡Aquí mismo! ¡Los atracadores están dentro!</a:t>
+              <a:t>INSPECTOR, - ¡Mardita sea!</a:t>
             </a:r>
           </a:p>
           <a:p/>
@@ -12319,7 +12512,7 @@
         </p:nvSpPr>
         <p:spPr>
           <a:xfrm>
-            <a:off x="1712976" y="4114800"/>
+            <a:off x="1712976" y="7315200"/>
             <a:ext cx="8763000" cy="1993900"/>
           </a:xfrm>
           <a:prstGeom prst="rect">
@@ -12380,7 +12573,7 @@
         </p:nvSpPr>
         <p:spPr>
           <a:xfrm>
-            <a:off x="1712976" y="1524000"/>
+            <a:off x="1712976" y="4064000"/>
             <a:ext cx="7112000" cy="1993900"/>
           </a:xfrm>
           <a:prstGeom prst="rect">
@@ -12401,7 +12594,7 @@
                 </a:solidFill>
                 <a:latin typeface="Times New Roman"/>
               </a:rPr>
-              <a:t>SUBINSPECTOR. - Han herido al cajero y tienen veinte rehenes...</a:t>
+              <a:t>INSPECTOR. -  ¡Marditos sean todos los terroristas, mafiosos, etarras, chorizos!</a:t>
             </a:r>
           </a:p>
           <a:p/>
@@ -12415,7 +12608,7 @@
         </p:nvSpPr>
         <p:spPr>
           <a:xfrm>
-            <a:off x="1712976" y="4114800"/>
+            <a:off x="1712976" y="7315200"/>
             <a:ext cx="8763000" cy="1993900"/>
           </a:xfrm>
           <a:prstGeom prst="rect">
@@ -12476,7 +12669,7 @@
         </p:nvSpPr>
         <p:spPr>
           <a:xfrm>
-            <a:off x="1712976" y="1524000"/>
+            <a:off x="1712976" y="4064000"/>
             <a:ext cx="7112000" cy="1993900"/>
           </a:xfrm>
           <a:prstGeom prst="rect">
@@ -12497,7 +12690,7 @@
                 </a:solidFill>
                 <a:latin typeface="Times New Roman"/>
               </a:rPr>
-              <a:t>INSPECTOR, - ¡Mardita sea!</a:t>
+              <a:t>INSPECTOR. - ¡Que vayan, que vayan todos!  Números, inspector, subinspector, oficiales.</a:t>
             </a:r>
           </a:p>
           <a:p/>
@@ -12511,7 +12704,7 @@
         </p:nvSpPr>
         <p:spPr>
           <a:xfrm>
-            <a:off x="1712976" y="4114800"/>
+            <a:off x="1712976" y="7315200"/>
             <a:ext cx="8763000" cy="1993900"/>
           </a:xfrm>
           <a:prstGeom prst="rect">
@@ -12572,7 +12765,7 @@
         </p:nvSpPr>
         <p:spPr>
           <a:xfrm>
-            <a:off x="1712976" y="1524000"/>
+            <a:off x="1712976" y="4064000"/>
             <a:ext cx="7112000" cy="1993900"/>
           </a:xfrm>
           <a:prstGeom prst="rect">
@@ -12593,7 +12786,7 @@
                 </a:solidFill>
                 <a:latin typeface="Times New Roman"/>
               </a:rPr>
-              <a:t>INSPECTOR. -  ¡Marditos sean todos los terroristas, mafiosos, etarras, chorizos!</a:t>
+              <a:t>SUBINSPECTOR. - No tenemos más que dos números y están de guardia en la comisaría,</a:t>
             </a:r>
           </a:p>
           <a:p/>
@@ -12607,7 +12800,7 @@
         </p:nvSpPr>
         <p:spPr>
           <a:xfrm>
-            <a:off x="1712976" y="4114800"/>
+            <a:off x="1712976" y="7315200"/>
             <a:ext cx="8763000" cy="1993900"/>
           </a:xfrm>
           <a:prstGeom prst="rect">
@@ -12668,7 +12861,7 @@
         </p:nvSpPr>
         <p:spPr>
           <a:xfrm>
-            <a:off x="1712976" y="1524000"/>
+            <a:off x="1712976" y="4064000"/>
             <a:ext cx="7112000" cy="1993900"/>
           </a:xfrm>
           <a:prstGeom prst="rect">
@@ -12689,7 +12882,7 @@
                 </a:solidFill>
                 <a:latin typeface="Times New Roman"/>
               </a:rPr>
-              <a:t>INSPECTOR. - ¡Que vayan, que vayan todos!  Números, inspector, subinspector, oficiales.</a:t>
+              <a:t>INSPECTOR. - ¡Pues llama a los Geos que apenas tienen trabajo!</a:t>
             </a:r>
           </a:p>
           <a:p/>
@@ -12703,7 +12896,7 @@
         </p:nvSpPr>
         <p:spPr>
           <a:xfrm>
-            <a:off x="1712976" y="4114800"/>
+            <a:off x="1712976" y="7315200"/>
             <a:ext cx="8763000" cy="1993900"/>
           </a:xfrm>
           <a:prstGeom prst="rect">
@@ -12764,7 +12957,7 @@
         </p:nvSpPr>
         <p:spPr>
           <a:xfrm>
-            <a:off x="1712976" y="1524000"/>
+            <a:off x="1712976" y="4064000"/>
             <a:ext cx="7112000" cy="1993900"/>
           </a:xfrm>
           <a:prstGeom prst="rect">
@@ -12785,7 +12978,7 @@
                 </a:solidFill>
                 <a:latin typeface="Times New Roman"/>
               </a:rPr>
-              <a:t>SUBINSPECTOR. - No tenemos más que dos números y están de guardia en la comisaría,</a:t>
+              <a:t>INSPECTOR. - ¡A ver si se ganan los emolumentos extras que cobran!</a:t>
             </a:r>
           </a:p>
           <a:p/>
@@ -12799,7 +12992,7 @@
         </p:nvSpPr>
         <p:spPr>
           <a:xfrm>
-            <a:off x="1712976" y="4114800"/>
+            <a:off x="1712976" y="7315200"/>
             <a:ext cx="8763000" cy="1993900"/>
           </a:xfrm>
           <a:prstGeom prst="rect">
@@ -12860,7 +13053,7 @@
         </p:nvSpPr>
         <p:spPr>
           <a:xfrm>
-            <a:off x="1712976" y="1524000"/>
+            <a:off x="1712976" y="4064000"/>
             <a:ext cx="7112000" cy="1993900"/>
           </a:xfrm>
           <a:prstGeom prst="rect">
@@ -12881,7 +13074,7 @@
                 </a:solidFill>
                 <a:latin typeface="Times New Roman"/>
               </a:rPr>
-              <a:t>INSPECTOR. - ¡Pues llama a los Geos que apenas tienen trabajo!</a:t>
+              <a:t>INSPECTOR. - ¡Y yo aquí, rendido de trabajar, y solo, sin ayuda, y sin pagas extras!</a:t>
             </a:r>
           </a:p>
           <a:p/>
@@ -12895,7 +13088,7 @@
         </p:nvSpPr>
         <p:spPr>
           <a:xfrm>
-            <a:off x="1712976" y="4114800"/>
+            <a:off x="1712976" y="7315200"/>
             <a:ext cx="8763000" cy="1993900"/>
           </a:xfrm>
           <a:prstGeom prst="rect">
@@ -12956,7 +13149,7 @@
         </p:nvSpPr>
         <p:spPr>
           <a:xfrm>
-            <a:off x="1712976" y="1524000"/>
+            <a:off x="1712976" y="4064000"/>
             <a:ext cx="7112000" cy="1993900"/>
           </a:xfrm>
           <a:prstGeom prst="rect">
@@ -12977,7 +13170,7 @@
                 </a:solidFill>
                 <a:latin typeface="Times New Roman"/>
               </a:rPr>
-              <a:t>INSPECTOR. - ¡A ver si se ganan los emolumentos extras que cobran!</a:t>
+              <a:t>MAGDA. - Entonces, ¿qué hay que hacer?</a:t>
             </a:r>
           </a:p>
           <a:p/>
@@ -12991,7 +13184,7 @@
         </p:nvSpPr>
         <p:spPr>
           <a:xfrm>
-            <a:off x="1712976" y="4114800"/>
+            <a:off x="1712976" y="7315200"/>
             <a:ext cx="8763000" cy="1993900"/>
           </a:xfrm>
           <a:prstGeom prst="rect">
@@ -13052,7 +13245,7 @@
         </p:nvSpPr>
         <p:spPr>
           <a:xfrm>
-            <a:off x="1712976" y="1524000"/>
+            <a:off x="1712976" y="4064000"/>
             <a:ext cx="7112000" cy="1993900"/>
           </a:xfrm>
           <a:prstGeom prst="rect">
@@ -13073,7 +13266,7 @@
                 </a:solidFill>
                 <a:latin typeface="Times New Roman"/>
               </a:rPr>
-              <a:t>INSPECTOR. - ¡Y yo aquí, rendido de trabajar, y solo, sin ayuda, y sin pagas extras!</a:t>
+              <a:t>INSPECTOR. - ¡Vaya por Dios! ¿Todavía sigue usted aquí?</a:t>
             </a:r>
           </a:p>
           <a:p/>
@@ -13087,7 +13280,7 @@
         </p:nvSpPr>
         <p:spPr>
           <a:xfrm>
-            <a:off x="1712976" y="4114800"/>
+            <a:off x="1712976" y="7315200"/>
             <a:ext cx="8763000" cy="1993900"/>
           </a:xfrm>
           <a:prstGeom prst="rect">
@@ -13148,7 +13341,7 @@
         </p:nvSpPr>
         <p:spPr>
           <a:xfrm>
-            <a:off x="1712976" y="1524000"/>
+            <a:off x="1712976" y="4064000"/>
             <a:ext cx="7112000" cy="1993900"/>
           </a:xfrm>
           <a:prstGeom prst="rect">
@@ -13183,7 +13376,7 @@
         </p:nvSpPr>
         <p:spPr>
           <a:xfrm>
-            <a:off x="1712976" y="4114800"/>
+            <a:off x="1712976" y="7315200"/>
             <a:ext cx="8763000" cy="1993900"/>
           </a:xfrm>
           <a:prstGeom prst="rect">
@@ -13244,7 +13437,7 @@
         </p:nvSpPr>
         <p:spPr>
           <a:xfrm>
-            <a:off x="1712976" y="1524000"/>
+            <a:off x="1712976" y="4064000"/>
             <a:ext cx="7112000" cy="1993900"/>
           </a:xfrm>
           <a:prstGeom prst="rect">
@@ -13265,7 +13458,7 @@
                 </a:solidFill>
                 <a:latin typeface="Times New Roman"/>
               </a:rPr>
-              <a:t>MAGDA. - Entonces, ¿qué hay que hacer?</a:t>
+              <a:t>INSPECTOR. - ¿No se ha dado cuenta de los graves problemas que tenemos?</a:t>
             </a:r>
           </a:p>
           <a:p/>
@@ -13279,7 +13472,7 @@
         </p:nvSpPr>
         <p:spPr>
           <a:xfrm>
-            <a:off x="1712976" y="4114800"/>
+            <a:off x="1712976" y="7315200"/>
             <a:ext cx="8763000" cy="1993900"/>
           </a:xfrm>
           <a:prstGeom prst="rect">
@@ -13340,7 +13533,7 @@
         </p:nvSpPr>
         <p:spPr>
           <a:xfrm>
-            <a:off x="1712976" y="1524000"/>
+            <a:off x="1712976" y="4064000"/>
             <a:ext cx="7112000" cy="1993900"/>
           </a:xfrm>
           <a:prstGeom prst="rect">
@@ -13361,7 +13554,7 @@
                 </a:solidFill>
                 <a:latin typeface="Times New Roman"/>
               </a:rPr>
-              <a:t>INSPECTOR. - ¡Vaya por Dios! ¿Todavía sigue usted aquí?</a:t>
+              <a:t>INSPECTOR. - La seguridad de la patria está en peligro y usted llorando por un bofetón más o menos.</a:t>
             </a:r>
           </a:p>
           <a:p/>
@@ -13375,7 +13568,7 @@
         </p:nvSpPr>
         <p:spPr>
           <a:xfrm>
-            <a:off x="1712976" y="4114800"/>
+            <a:off x="1712976" y="7315200"/>
             <a:ext cx="8763000" cy="1993900"/>
           </a:xfrm>
           <a:prstGeom prst="rect">
@@ -13436,7 +13629,7 @@
         </p:nvSpPr>
         <p:spPr>
           <a:xfrm>
-            <a:off x="1712976" y="1524000"/>
+            <a:off x="1712976" y="4064000"/>
             <a:ext cx="7112000" cy="1993900"/>
           </a:xfrm>
           <a:prstGeom prst="rect">
@@ -13457,7 +13650,7 @@
                 </a:solidFill>
                 <a:latin typeface="Times New Roman"/>
               </a:rPr>
-              <a:t>INSPECTOR. - ¿No se ha dado cuenta de los graves problemas que tenemos?</a:t>
+              <a:t>INSPECTOR. - Nosotros arriesgándonos la vida por usted, y otros como usted, </a:t>
             </a:r>
           </a:p>
           <a:p/>
@@ -13471,7 +13664,7 @@
         </p:nvSpPr>
         <p:spPr>
           <a:xfrm>
-            <a:off x="1712976" y="4114800"/>
+            <a:off x="1712976" y="7315200"/>
             <a:ext cx="8763000" cy="1993900"/>
           </a:xfrm>
           <a:prstGeom prst="rect">
@@ -13532,7 +13725,7 @@
         </p:nvSpPr>
         <p:spPr>
           <a:xfrm>
-            <a:off x="1712976" y="1524000"/>
+            <a:off x="1712976" y="4064000"/>
             <a:ext cx="7112000" cy="1993900"/>
           </a:xfrm>
           <a:prstGeom prst="rect">
@@ -13553,7 +13746,7 @@
                 </a:solidFill>
                 <a:latin typeface="Times New Roman"/>
               </a:rPr>
-              <a:t>INSPECTOR. - La seguridad de la patria está en peligro y usted llorando por un bofetón más o menos.</a:t>
+              <a:t>INSPECTOR, - para degenderlos de criminales, terroristas, chorizos, maricas y demás ralea.</a:t>
             </a:r>
           </a:p>
           <a:p/>
@@ -13567,7 +13760,7 @@
         </p:nvSpPr>
         <p:spPr>
           <a:xfrm>
-            <a:off x="1712976" y="4114800"/>
+            <a:off x="1712976" y="7315200"/>
             <a:ext cx="8763000" cy="1993900"/>
           </a:xfrm>
           <a:prstGeom prst="rect">
@@ -13628,7 +13821,7 @@
         </p:nvSpPr>
         <p:spPr>
           <a:xfrm>
-            <a:off x="1712976" y="1524000"/>
+            <a:off x="1712976" y="4064000"/>
             <a:ext cx="7112000" cy="1993900"/>
           </a:xfrm>
           <a:prstGeom prst="rect">
@@ -13649,7 +13842,7 @@
                 </a:solidFill>
                 <a:latin typeface="Times New Roman"/>
               </a:rPr>
-              <a:t>INSPECTOR. - Nosotros arriesgándonos la vida por usted, y otros como usted, </a:t>
+              <a:t>INSPECTOR, - Y su pobre marido, reventado de trabajar, sin poder disfrutar del partido...</a:t>
             </a:r>
           </a:p>
           <a:p/>
@@ -13663,7 +13856,7 @@
         </p:nvSpPr>
         <p:spPr>
           <a:xfrm>
-            <a:off x="1712976" y="4114800"/>
+            <a:off x="1712976" y="7315200"/>
             <a:ext cx="8763000" cy="1993900"/>
           </a:xfrm>
           <a:prstGeom prst="rect">
@@ -13724,7 +13917,7 @@
         </p:nvSpPr>
         <p:spPr>
           <a:xfrm>
-            <a:off x="1712976" y="1524000"/>
+            <a:off x="1712976" y="4064000"/>
             <a:ext cx="7112000" cy="1993900"/>
           </a:xfrm>
           <a:prstGeom prst="rect">
@@ -13745,7 +13938,7 @@
                 </a:solidFill>
                 <a:latin typeface="Times New Roman"/>
               </a:rPr>
-              <a:t>INSPECTOR, - para degenderlos de criminales, terroristas, chorizos, maricas y demás ralea.</a:t>
+              <a:t>INSPECTOR, - Ande, ¡váyase! ¡Váyase de una vez y por ésta se lo perdodo!</a:t>
             </a:r>
           </a:p>
           <a:p/>
@@ -13759,7 +13952,7 @@
         </p:nvSpPr>
         <p:spPr>
           <a:xfrm>
-            <a:off x="1712976" y="4114800"/>
+            <a:off x="1712976" y="7315200"/>
             <a:ext cx="8763000" cy="1993900"/>
           </a:xfrm>
           <a:prstGeom prst="rect">
@@ -13820,7 +14013,7 @@
         </p:nvSpPr>
         <p:spPr>
           <a:xfrm>
-            <a:off x="1712976" y="1524000"/>
+            <a:off x="1712976" y="4064000"/>
             <a:ext cx="7112000" cy="1993900"/>
           </a:xfrm>
           <a:prstGeom prst="rect">
@@ -13841,7 +14034,7 @@
                 </a:solidFill>
                 <a:latin typeface="Times New Roman"/>
               </a:rPr>
-              <a:t>INSPECTOR, - Y su pobre marido, reventado de trabajar, sin poder disfrutar del partido...</a:t>
+              <a:t>INSPECTOR, - ¡Pero que no se repita!</a:t>
             </a:r>
           </a:p>
           <a:p/>
@@ -13855,7 +14048,7 @@
         </p:nvSpPr>
         <p:spPr>
           <a:xfrm>
-            <a:off x="1712976" y="4114800"/>
+            <a:off x="1712976" y="7315200"/>
             <a:ext cx="8763000" cy="1993900"/>
           </a:xfrm>
           <a:prstGeom prst="rect">
@@ -13916,7 +14109,7 @@
         </p:nvSpPr>
         <p:spPr>
           <a:xfrm>
-            <a:off x="1712976" y="1524000"/>
+            <a:off x="1712976" y="4064000"/>
             <a:ext cx="7112000" cy="1993900"/>
           </a:xfrm>
           <a:prstGeom prst="rect">
@@ -13937,7 +14130,7 @@
                 </a:solidFill>
                 <a:latin typeface="Times New Roman"/>
               </a:rPr>
-              <a:t>INSPECTOR, - Ande, ¡váyase! ¡Váyase de una vez y por ésta se lo perdodo!</a:t>
+              <a:t>MARGARITA. - Buenas tardes...</a:t>
             </a:r>
           </a:p>
           <a:p/>
@@ -13951,7 +14144,7 @@
         </p:nvSpPr>
         <p:spPr>
           <a:xfrm>
-            <a:off x="1712976" y="4114800"/>
+            <a:off x="1712976" y="7315200"/>
             <a:ext cx="8763000" cy="1993900"/>
           </a:xfrm>
           <a:prstGeom prst="rect">
@@ -14012,7 +14205,7 @@
         </p:nvSpPr>
         <p:spPr>
           <a:xfrm>
-            <a:off x="1712976" y="1524000"/>
+            <a:off x="1712976" y="4064000"/>
             <a:ext cx="7112000" cy="1993900"/>
           </a:xfrm>
           <a:prstGeom prst="rect">
@@ -14033,7 +14226,7 @@
                 </a:solidFill>
                 <a:latin typeface="Times New Roman"/>
               </a:rPr>
-              <a:t>INSPECTOR, - ¡Pero que no se repita!</a:t>
+              <a:t>ESCENAⅡ</a:t>
             </a:r>
           </a:p>
           <a:p/>
@@ -14047,7 +14240,7 @@
         </p:nvSpPr>
         <p:spPr>
           <a:xfrm>
-            <a:off x="1712976" y="4114800"/>
+            <a:off x="1712976" y="7315200"/>
             <a:ext cx="8763000" cy="1993900"/>
           </a:xfrm>
           <a:prstGeom prst="rect">
@@ -14108,7 +14301,7 @@
         </p:nvSpPr>
         <p:spPr>
           <a:xfrm>
-            <a:off x="1712976" y="1524000"/>
+            <a:off x="1712976" y="4064000"/>
             <a:ext cx="7112000" cy="1993900"/>
           </a:xfrm>
           <a:prstGeom prst="rect">
@@ -14129,7 +14322,7 @@
                 </a:solidFill>
                 <a:latin typeface="Times New Roman"/>
               </a:rPr>
-              <a:t>MARGARITA. - Buenas tardes...</a:t>
+              <a:t>ABOGADO. - ¿Dice usted que quiere divorciarse?</a:t>
             </a:r>
           </a:p>
           <a:p/>
@@ -14143,7 +14336,7 @@
         </p:nvSpPr>
         <p:spPr>
           <a:xfrm>
-            <a:off x="1712976" y="4114800"/>
+            <a:off x="1712976" y="7315200"/>
             <a:ext cx="8763000" cy="1993900"/>
           </a:xfrm>
           <a:prstGeom prst="rect">
@@ -14204,7 +14397,7 @@
         </p:nvSpPr>
         <p:spPr>
           <a:xfrm>
-            <a:off x="1712976" y="1524000"/>
+            <a:off x="1712976" y="4064000"/>
             <a:ext cx="7112000" cy="1993900"/>
           </a:xfrm>
           <a:prstGeom prst="rect">
@@ -14239,7 +14432,7 @@
         </p:nvSpPr>
         <p:spPr>
           <a:xfrm>
-            <a:off x="1712976" y="4114800"/>
+            <a:off x="1712976" y="7315200"/>
             <a:ext cx="8763000" cy="1993900"/>
           </a:xfrm>
           <a:prstGeom prst="rect">
@@ -14300,7 +14493,7 @@
         </p:nvSpPr>
         <p:spPr>
           <a:xfrm>
-            <a:off x="1712976" y="1524000"/>
+            <a:off x="1712976" y="4064000"/>
             <a:ext cx="7112000" cy="1993900"/>
           </a:xfrm>
           <a:prstGeom prst="rect">
@@ -14321,7 +14514,7 @@
                 </a:solidFill>
                 <a:latin typeface="Times New Roman"/>
               </a:rPr>
-              <a:t>ESCENAⅡ</a:t>
+              <a:t>ABOGADO. -¿Y puede saberse por qué?</a:t>
             </a:r>
           </a:p>
           <a:p/>
@@ -14335,7 +14528,7 @@
         </p:nvSpPr>
         <p:spPr>
           <a:xfrm>
-            <a:off x="1712976" y="4114800"/>
+            <a:off x="1712976" y="7315200"/>
             <a:ext cx="8763000" cy="1993900"/>
           </a:xfrm>
           <a:prstGeom prst="rect">
@@ -14396,7 +14589,7 @@
         </p:nvSpPr>
         <p:spPr>
           <a:xfrm>
-            <a:off x="1712976" y="1524000"/>
+            <a:off x="1712976" y="4064000"/>
             <a:ext cx="7112000" cy="1993900"/>
           </a:xfrm>
           <a:prstGeom prst="rect">
@@ -14417,7 +14610,7 @@
                 </a:solidFill>
                 <a:latin typeface="Times New Roman"/>
               </a:rPr>
-              <a:t>ABOGADO. - ¿Dice usted que quiere divorciarse?</a:t>
+              <a:t>MARGARITA. - Mi marido se ha ido de casa con su secretaria. </a:t>
             </a:r>
           </a:p>
           <a:p/>
@@ -14431,7 +14624,7 @@
         </p:nvSpPr>
         <p:spPr>
           <a:xfrm>
-            <a:off x="1712976" y="4114800"/>
+            <a:off x="1712976" y="7315200"/>
             <a:ext cx="8763000" cy="1993900"/>
           </a:xfrm>
           <a:prstGeom prst="rect">
@@ -14492,7 +14685,7 @@
         </p:nvSpPr>
         <p:spPr>
           <a:xfrm>
-            <a:off x="1712976" y="1524000"/>
+            <a:off x="1712976" y="4064000"/>
             <a:ext cx="7112000" cy="1993900"/>
           </a:xfrm>
           <a:prstGeom prst="rect">
@@ -14513,7 +14706,7 @@
                 </a:solidFill>
                 <a:latin typeface="Times New Roman"/>
               </a:rPr>
-              <a:t>ABOGADO. -¿Y puede saberse por qué?</a:t>
+              <a:t>MARGARITA. - ¿Le parece poco? </a:t>
             </a:r>
           </a:p>
           <a:p/>
@@ -14527,7 +14720,7 @@
         </p:nvSpPr>
         <p:spPr>
           <a:xfrm>
-            <a:off x="1712976" y="4114800"/>
+            <a:off x="1712976" y="7315200"/>
             <a:ext cx="8763000" cy="1993900"/>
           </a:xfrm>
           <a:prstGeom prst="rect">
@@ -14588,7 +14781,7 @@
         </p:nvSpPr>
         <p:spPr>
           <a:xfrm>
-            <a:off x="1712976" y="1524000"/>
+            <a:off x="1712976" y="4064000"/>
             <a:ext cx="7112000" cy="1993900"/>
           </a:xfrm>
           <a:prstGeom prst="rect">
@@ -14609,7 +14802,7 @@
                 </a:solidFill>
                 <a:latin typeface="Times New Roman"/>
               </a:rPr>
-              <a:t>MARGARITA. - Mi marido se ha ido de casa con su secretaria. </a:t>
+              <a:t>ABOGADO. - Veamos... veamos.</a:t>
             </a:r>
           </a:p>
           <a:p/>
@@ -14623,7 +14816,7 @@
         </p:nvSpPr>
         <p:spPr>
           <a:xfrm>
-            <a:off x="1712976" y="4114800"/>
+            <a:off x="1712976" y="7315200"/>
             <a:ext cx="8763000" cy="1993900"/>
           </a:xfrm>
           <a:prstGeom prst="rect">
@@ -14684,7 +14877,7 @@
         </p:nvSpPr>
         <p:spPr>
           <a:xfrm>
-            <a:off x="1712976" y="1524000"/>
+            <a:off x="1712976" y="4064000"/>
             <a:ext cx="7112000" cy="1993900"/>
           </a:xfrm>
           <a:prstGeom prst="rect">
@@ -14705,7 +14898,7 @@
                 </a:solidFill>
                 <a:latin typeface="Times New Roman"/>
               </a:rPr>
-              <a:t>MARGARITA. - ¿Le parece poco?   ABOGADO. - Veamos... veamos.</a:t>
+              <a:t>ABOGADO. - Puede ser mucho y puede ser poco.  ¿A dónde se han ido?</a:t>
             </a:r>
           </a:p>
           <a:p/>
@@ -14719,7 +14912,7 @@
         </p:nvSpPr>
         <p:spPr>
           <a:xfrm>
-            <a:off x="1712976" y="4114800"/>
+            <a:off x="1712976" y="7315200"/>
             <a:ext cx="8763000" cy="1993900"/>
           </a:xfrm>
           <a:prstGeom prst="rect">
@@ -14780,7 +14973,7 @@
         </p:nvSpPr>
         <p:spPr>
           <a:xfrm>
-            <a:off x="1712976" y="1524000"/>
+            <a:off x="1712976" y="4064000"/>
             <a:ext cx="7112000" cy="1993900"/>
           </a:xfrm>
           <a:prstGeom prst="rect">
@@ -14801,7 +14994,7 @@
                 </a:solidFill>
                 <a:latin typeface="Times New Roman"/>
               </a:rPr>
-              <a:t>ABOGADO. - Puede ser mucho y puede ser poco.  ¿A dónde se han ido?</a:t>
+              <a:t>MARGARITA. - A Mallorca. A pasar unos días de vacaciones.</a:t>
             </a:r>
           </a:p>
           <a:p/>
@@ -14815,7 +15008,7 @@
         </p:nvSpPr>
         <p:spPr>
           <a:xfrm>
-            <a:off x="1712976" y="4114800"/>
+            <a:off x="1712976" y="7315200"/>
             <a:ext cx="8763000" cy="1993900"/>
           </a:xfrm>
           <a:prstGeom prst="rect">
@@ -14876,7 +15069,7 @@
         </p:nvSpPr>
         <p:spPr>
           <a:xfrm>
-            <a:off x="1712976" y="1524000"/>
+            <a:off x="1712976" y="4064000"/>
             <a:ext cx="7112000" cy="1993900"/>
           </a:xfrm>
           <a:prstGeom prst="rect">
@@ -14897,7 +15090,7 @@
                 </a:solidFill>
                 <a:latin typeface="Times New Roman"/>
               </a:rPr>
-              <a:t>MARGARITA. - A Mallorca. A pasar unos días de vacaciones.</a:t>
+              <a:t>MARGARITA. - Se hospedan en el Hotel Central.</a:t>
             </a:r>
           </a:p>
           <a:p/>
@@ -14911,7 +15104,7 @@
         </p:nvSpPr>
         <p:spPr>
           <a:xfrm>
-            <a:off x="1712976" y="4114800"/>
+            <a:off x="1712976" y="7315200"/>
             <a:ext cx="8763000" cy="1993900"/>
           </a:xfrm>
           <a:prstGeom prst="rect">
@@ -14972,7 +15165,7 @@
         </p:nvSpPr>
         <p:spPr>
           <a:xfrm>
-            <a:off x="1712976" y="1524000"/>
+            <a:off x="1712976" y="4064000"/>
             <a:ext cx="7112000" cy="1993900"/>
           </a:xfrm>
           <a:prstGeom prst="rect">
@@ -14993,7 +15186,7 @@
                 </a:solidFill>
                 <a:latin typeface="Times New Roman"/>
               </a:rPr>
-              <a:t>MARGARITA. - Se hospedan en el Hotel Central.</a:t>
+              <a:t>MARGARITA. - Tengo el número de la habitación y el del teléfono.</a:t>
             </a:r>
           </a:p>
           <a:p/>
@@ -15007,7 +15200,7 @@
         </p:nvSpPr>
         <p:spPr>
           <a:xfrm>
-            <a:off x="1712976" y="4114800"/>
+            <a:off x="1712976" y="7315200"/>
             <a:ext cx="8763000" cy="1993900"/>
           </a:xfrm>
           <a:prstGeom prst="rect">
@@ -15068,7 +15261,7 @@
         </p:nvSpPr>
         <p:spPr>
           <a:xfrm>
-            <a:off x="1712976" y="1524000"/>
+            <a:off x="1712976" y="4064000"/>
             <a:ext cx="7112000" cy="1993900"/>
           </a:xfrm>
           <a:prstGeom prst="rect">
@@ -15089,7 +15282,7 @@
                 </a:solidFill>
                 <a:latin typeface="Times New Roman"/>
               </a:rPr>
-              <a:t>MARGARITA. - Tengo el número de la habitación y el del teléfono.</a:t>
+              <a:t>ABOGADO. - Bueno, bueno. No es mucho, bien mirado.</a:t>
             </a:r>
           </a:p>
           <a:p/>
@@ -15103,7 +15296,7 @@
         </p:nvSpPr>
         <p:spPr>
           <a:xfrm>
-            <a:off x="1712976" y="4114800"/>
+            <a:off x="1712976" y="7315200"/>
             <a:ext cx="8763000" cy="1993900"/>
           </a:xfrm>
           <a:prstGeom prst="rect">
@@ -15164,7 +15357,7 @@
         </p:nvSpPr>
         <p:spPr>
           <a:xfrm>
-            <a:off x="1712976" y="1524000"/>
+            <a:off x="1712976" y="4064000"/>
             <a:ext cx="7112000" cy="1993900"/>
           </a:xfrm>
           <a:prstGeom prst="rect">
@@ -15185,7 +15378,7 @@
                 </a:solidFill>
                 <a:latin typeface="Times New Roman"/>
               </a:rPr>
-              <a:t>ABOGADO. - Bueno, bueno. No es mucho, bien mirado.</a:t>
+              <a:t>ABOGADO. - ¿Y hacen vida marital?</a:t>
             </a:r>
           </a:p>
           <a:p/>
@@ -15199,7 +15392,7 @@
         </p:nvSpPr>
         <p:spPr>
           <a:xfrm>
-            <a:off x="1712976" y="4114800"/>
+            <a:off x="1712976" y="7315200"/>
             <a:ext cx="8763000" cy="1993900"/>
           </a:xfrm>
           <a:prstGeom prst="rect">
@@ -15260,7 +15453,7 @@
         </p:nvSpPr>
         <p:spPr>
           <a:xfrm>
-            <a:off x="1712976" y="1524000"/>
+            <a:off x="1712976" y="4064000"/>
             <a:ext cx="7112000" cy="1993900"/>
           </a:xfrm>
           <a:prstGeom prst="rect">
@@ -15295,7 +15488,7 @@
         </p:nvSpPr>
         <p:spPr>
           <a:xfrm>
-            <a:off x="1712976" y="4114800"/>
+            <a:off x="1712976" y="7315200"/>
             <a:ext cx="8763000" cy="1993900"/>
           </a:xfrm>
           <a:prstGeom prst="rect">
@@ -15356,7 +15549,7 @@
         </p:nvSpPr>
         <p:spPr>
           <a:xfrm>
-            <a:off x="1712976" y="1524000"/>
+            <a:off x="1712976" y="4064000"/>
             <a:ext cx="7112000" cy="1993900"/>
           </a:xfrm>
           <a:prstGeom prst="rect">
@@ -15377,7 +15570,7 @@
                 </a:solidFill>
                 <a:latin typeface="Times New Roman"/>
               </a:rPr>
-              <a:t>ABOGADO. - ¿Y hacen vida marital?</a:t>
+              <a:t>ABOGADO. - ¿Están inscritos en el registro del hotel como marido y mujer?</a:t>
             </a:r>
           </a:p>
           <a:p/>
@@ -15391,7 +15584,7 @@
         </p:nvSpPr>
         <p:spPr>
           <a:xfrm>
-            <a:off x="1712976" y="4114800"/>
+            <a:off x="1712976" y="7315200"/>
             <a:ext cx="8763000" cy="1993900"/>
           </a:xfrm>
           <a:prstGeom prst="rect">
@@ -15452,7 +15645,7 @@
         </p:nvSpPr>
         <p:spPr>
           <a:xfrm>
-            <a:off x="1712976" y="1524000"/>
+            <a:off x="1712976" y="4064000"/>
             <a:ext cx="7112000" cy="1993900"/>
           </a:xfrm>
           <a:prstGeom prst="rect">
@@ -15473,7 +15666,7 @@
                 </a:solidFill>
                 <a:latin typeface="Times New Roman"/>
               </a:rPr>
-              <a:t>ABOGADO. - ¿Están inscritos en el registro del hotel como marido y mujer?</a:t>
+              <a:t>MARGARITA. - No. Se hospedan en habitaciones separadas con sus propios nombres.</a:t>
             </a:r>
           </a:p>
           <a:p/>
@@ -15487,7 +15680,7 @@
         </p:nvSpPr>
         <p:spPr>
           <a:xfrm>
-            <a:off x="1712976" y="4114800"/>
+            <a:off x="1712976" y="7315200"/>
             <a:ext cx="8763000" cy="1993900"/>
           </a:xfrm>
           <a:prstGeom prst="rect">
@@ -15548,7 +15741,7 @@
         </p:nvSpPr>
         <p:spPr>
           <a:xfrm>
-            <a:off x="1712976" y="1524000"/>
+            <a:off x="1712976" y="4064000"/>
             <a:ext cx="7112000" cy="1993900"/>
           </a:xfrm>
           <a:prstGeom prst="rect">
@@ -15569,7 +15762,7 @@
                 </a:solidFill>
                 <a:latin typeface="Times New Roman"/>
               </a:rPr>
-              <a:t>MARGARITA. - No. Se hospedan en habitaciones separadas con sus propios nombres.</a:t>
+              <a:t>MARGARITA. - Fingen que sólo son jefe y secretaria.</a:t>
             </a:r>
           </a:p>
           <a:p/>
@@ -15583,7 +15776,7 @@
         </p:nvSpPr>
         <p:spPr>
           <a:xfrm>
-            <a:off x="1712976" y="4114800"/>
+            <a:off x="1712976" y="7315200"/>
             <a:ext cx="8763000" cy="1993900"/>
           </a:xfrm>
           <a:prstGeom prst="rect">
@@ -15644,7 +15837,7 @@
         </p:nvSpPr>
         <p:spPr>
           <a:xfrm>
-            <a:off x="1712976" y="1524000"/>
+            <a:off x="1712976" y="4064000"/>
             <a:ext cx="7112000" cy="1993900"/>
           </a:xfrm>
           <a:prstGeom prst="rect">
@@ -15665,7 +15858,7 @@
                 </a:solidFill>
                 <a:latin typeface="Times New Roman"/>
               </a:rPr>
-              <a:t>MARGARITA. - Fingen que sólo son jefe y secretaria.</a:t>
+              <a:t>ABOGADO. - ¡Huy! Malo, muy malo.  No existen pruebas fehacientes de adulterio.</a:t>
             </a:r>
           </a:p>
           <a:p/>
@@ -15679,7 +15872,7 @@
         </p:nvSpPr>
         <p:spPr>
           <a:xfrm>
-            <a:off x="1712976" y="4114800"/>
+            <a:off x="1712976" y="7315200"/>
             <a:ext cx="8763000" cy="1993900"/>
           </a:xfrm>
           <a:prstGeom prst="rect">
@@ -15740,7 +15933,7 @@
         </p:nvSpPr>
         <p:spPr>
           <a:xfrm>
-            <a:off x="1712976" y="1524000"/>
+            <a:off x="1712976" y="4064000"/>
             <a:ext cx="7112000" cy="1993900"/>
           </a:xfrm>
           <a:prstGeom prst="rect">
@@ -15761,7 +15954,7 @@
                 </a:solidFill>
                 <a:latin typeface="Times New Roman"/>
               </a:rPr>
-              <a:t>ABOGADO. - ¡Huy! Malo, muy malo.  No existen pruebas fehacientes de adulterio.</a:t>
+              <a:t>ABOGADO. - Adulterii probatum debem esse, ¿comprende?</a:t>
             </a:r>
           </a:p>
           <a:p/>
@@ -15775,7 +15968,7 @@
         </p:nvSpPr>
         <p:spPr>
           <a:xfrm>
-            <a:off x="1712976" y="4114800"/>
+            <a:off x="1712976" y="7315200"/>
             <a:ext cx="8763000" cy="1993900"/>
           </a:xfrm>
           <a:prstGeom prst="rect">
@@ -15836,7 +16029,7 @@
         </p:nvSpPr>
         <p:spPr>
           <a:xfrm>
-            <a:off x="1712976" y="1524000"/>
+            <a:off x="1712976" y="4064000"/>
             <a:ext cx="7112000" cy="1993900"/>
           </a:xfrm>
           <a:prstGeom prst="rect">
@@ -15857,7 +16050,7 @@
                 </a:solidFill>
                 <a:latin typeface="Times New Roman"/>
               </a:rPr>
-              <a:t>ABOGADO. - Adulterii probatum debem esse, ¿comprende?</a:t>
+              <a:t>ABOGADO. -  el adulterio comprobatum est siempre que un testigo presencial preste testimonio en tal sentido, </a:t>
             </a:r>
           </a:p>
           <a:p/>
@@ -15871,7 +16064,7 @@
         </p:nvSpPr>
         <p:spPr>
           <a:xfrm>
-            <a:off x="1712976" y="4114800"/>
+            <a:off x="1712976" y="7315200"/>
             <a:ext cx="8763000" cy="1993900"/>
           </a:xfrm>
           <a:prstGeom prst="rect">
@@ -15932,7 +16125,7 @@
         </p:nvSpPr>
         <p:spPr>
           <a:xfrm>
-            <a:off x="1712976" y="1524000"/>
+            <a:off x="1712976" y="4064000"/>
             <a:ext cx="7112000" cy="1993900"/>
           </a:xfrm>
           <a:prstGeom prst="rect">
@@ -15953,7 +16146,7 @@
                 </a:solidFill>
                 <a:latin typeface="Times New Roman"/>
               </a:rPr>
-              <a:t>ABOGADO. -  el adulterio comprobatum est siempre que un testigo presencial preste testimonio en tal sentido, </a:t>
+              <a:t>ABOGADO. - bajo juramento indubitado, de que haya ayuntamiento carnal. </a:t>
             </a:r>
           </a:p>
           <a:p/>
@@ -15967,7 +16160,7 @@
         </p:nvSpPr>
         <p:spPr>
           <a:xfrm>
-            <a:off x="1712976" y="4114800"/>
+            <a:off x="1712976" y="7315200"/>
             <a:ext cx="8763000" cy="1993900"/>
           </a:xfrm>
           <a:prstGeom prst="rect">
@@ -16028,7 +16221,7 @@
         </p:nvSpPr>
         <p:spPr>
           <a:xfrm>
-            <a:off x="1712976" y="1524000"/>
+            <a:off x="1712976" y="4064000"/>
             <a:ext cx="7112000" cy="1993900"/>
           </a:xfrm>
           <a:prstGeom prst="rect">
@@ -16049,7 +16242,7 @@
                 </a:solidFill>
                 <a:latin typeface="Times New Roman"/>
               </a:rPr>
-              <a:t>ABOGADO. - bajo juramento indubitado, de que haya ayuntamiento carnal. </a:t>
+              <a:t>ABOGADO. - Pero, entendamos... </a:t>
             </a:r>
           </a:p>
           <a:p/>
@@ -16063,7 +16256,7 @@
         </p:nvSpPr>
         <p:spPr>
           <a:xfrm>
-            <a:off x="1712976" y="4114800"/>
+            <a:off x="1712976" y="7315200"/>
             <a:ext cx="8763000" cy="1993900"/>
           </a:xfrm>
           <a:prstGeom prst="rect">
@@ -16124,7 +16317,7 @@
         </p:nvSpPr>
         <p:spPr>
           <a:xfrm>
-            <a:off x="1712976" y="1524000"/>
+            <a:off x="1712976" y="4064000"/>
             <a:ext cx="7112000" cy="1993900"/>
           </a:xfrm>
           <a:prstGeom prst="rect">
@@ -16145,7 +16338,7 @@
                 </a:solidFill>
                 <a:latin typeface="Times New Roman"/>
               </a:rPr>
-              <a:t>ABOGADO. - Pero, entendamos... </a:t>
+              <a:t>ABOGADO. - El ayuntamiento que se precisa para la existencia de un cierto y probado adulterio es el coito perfecto; </a:t>
             </a:r>
           </a:p>
           <a:p/>
@@ -16159,7 +16352,7 @@
         </p:nvSpPr>
         <p:spPr>
           <a:xfrm>
-            <a:off x="1712976" y="4114800"/>
+            <a:off x="1712976" y="7315200"/>
             <a:ext cx="8763000" cy="1993900"/>
           </a:xfrm>
           <a:prstGeom prst="rect">
@@ -16220,7 +16413,7 @@
         </p:nvSpPr>
         <p:spPr>
           <a:xfrm>
-            <a:off x="1712976" y="1524000"/>
+            <a:off x="1712976" y="4064000"/>
             <a:ext cx="7112000" cy="1993900"/>
           </a:xfrm>
           <a:prstGeom prst="rect">
@@ -16241,7 +16434,7 @@
                 </a:solidFill>
                 <a:latin typeface="Times New Roman"/>
               </a:rPr>
-              <a:t>ABOGADO. - El ayuntamiento que se precisa para la existencia de un cierto y probado adulterio es el coito perfecto; </a:t>
+              <a:t>ABOGADO. -  es decir, la introducción del pene en al vagina con emisión del esperma en ura eyaculación completa.</a:t>
             </a:r>
           </a:p>
           <a:p/>
@@ -16255,7 +16448,7 @@
         </p:nvSpPr>
         <p:spPr>
           <a:xfrm>
-            <a:off x="1712976" y="4114800"/>
+            <a:off x="1712976" y="7315200"/>
             <a:ext cx="8763000" cy="1993900"/>
           </a:xfrm>
           <a:prstGeom prst="rect">
@@ -16316,7 +16509,7 @@
         </p:nvSpPr>
         <p:spPr>
           <a:xfrm>
-            <a:off x="1712976" y="1524000"/>
+            <a:off x="1712976" y="4064000"/>
             <a:ext cx="7112000" cy="1993900"/>
           </a:xfrm>
           <a:prstGeom prst="rect">
@@ -16351,7 +16544,7 @@
         </p:nvSpPr>
         <p:spPr>
           <a:xfrm>
-            <a:off x="1712976" y="4114800"/>
+            <a:off x="1712976" y="7315200"/>
             <a:ext cx="8763000" cy="1993900"/>
           </a:xfrm>
           <a:prstGeom prst="rect">
@@ -16412,7 +16605,7 @@
         </p:nvSpPr>
         <p:spPr>
           <a:xfrm>
-            <a:off x="1712976" y="1524000"/>
+            <a:off x="1712976" y="4064000"/>
             <a:ext cx="7112000" cy="1993900"/>
           </a:xfrm>
           <a:prstGeom prst="rect">
@@ -16433,7 +16626,7 @@
                 </a:solidFill>
                 <a:latin typeface="Times New Roman"/>
               </a:rPr>
-              <a:t>ABOGADO. -  es decir, la introducción del pene en al vagina con emisión del esperma en ura eyaculación completa.</a:t>
+              <a:t>ABOGADO. - Entendamos que la comprobación de tal emisión no se precisa presenciar inmediata y ocularmente,</a:t>
             </a:r>
           </a:p>
           <a:p/>
@@ -16447,7 +16640,7 @@
         </p:nvSpPr>
         <p:spPr>
           <a:xfrm>
-            <a:off x="1712976" y="4114800"/>
+            <a:off x="1712976" y="7315200"/>
             <a:ext cx="8763000" cy="1993900"/>
           </a:xfrm>
           <a:prstGeom prst="rect">
@@ -16508,7 +16701,7 @@
         </p:nvSpPr>
         <p:spPr>
           <a:xfrm>
-            <a:off x="1712976" y="1524000"/>
+            <a:off x="1712976" y="4064000"/>
             <a:ext cx="7112000" cy="1993900"/>
           </a:xfrm>
           <a:prstGeom prst="rect">
@@ -16529,7 +16722,7 @@
                 </a:solidFill>
                 <a:latin typeface="Times New Roman"/>
               </a:rPr>
-              <a:t>ABOGADO. - Entendamos que la comprobación de tal emisión no se precisa presenciar inmediata y ocularmente,</a:t>
+              <a:t>ABOGADO. - bastando los signos externos suficientes, como la sábana recién manchada,</a:t>
             </a:r>
           </a:p>
           <a:p/>
@@ -16543,7 +16736,7 @@
         </p:nvSpPr>
         <p:spPr>
           <a:xfrm>
-            <a:off x="1712976" y="4114800"/>
+            <a:off x="1712976" y="7315200"/>
             <a:ext cx="8763000" cy="1993900"/>
           </a:xfrm>
           <a:prstGeom prst="rect">
@@ -16604,7 +16797,7 @@
         </p:nvSpPr>
         <p:spPr>
           <a:xfrm>
-            <a:off x="1712976" y="1524000"/>
+            <a:off x="1712976" y="4064000"/>
             <a:ext cx="7112000" cy="1993900"/>
           </a:xfrm>
           <a:prstGeom prst="rect">
@@ -16625,7 +16818,7 @@
                 </a:solidFill>
                 <a:latin typeface="Times New Roman"/>
               </a:rPr>
-              <a:t>ABOGADO. - bastando los signos externos suficientes, como la sábana recién manchada,</a:t>
+              <a:t>ABOGADO. -  o la inspección médica de la vagina de la mujer,</a:t>
             </a:r>
           </a:p>
           <a:p/>
@@ -16639,7 +16832,7 @@
         </p:nvSpPr>
         <p:spPr>
           <a:xfrm>
-            <a:off x="1712976" y="4114800"/>
+            <a:off x="1712976" y="7315200"/>
             <a:ext cx="8763000" cy="1993900"/>
           </a:xfrm>
           <a:prstGeom prst="rect">
@@ -16700,7 +16893,7 @@
         </p:nvSpPr>
         <p:spPr>
           <a:xfrm>
-            <a:off x="1712976" y="1524000"/>
+            <a:off x="1712976" y="4064000"/>
             <a:ext cx="7112000" cy="1993900"/>
           </a:xfrm>
           <a:prstGeom prst="rect">
@@ -16721,7 +16914,7 @@
                 </a:solidFill>
                 <a:latin typeface="Times New Roman"/>
               </a:rPr>
-              <a:t>ABOGADO. -  o la inspección médica de la vagina de la mujer,</a:t>
+              <a:t>ABOGADO. - Pero dígame, ¿cómo puede usted presentar semejantes pruebas, ni aun indicios de tal cosa?</a:t>
             </a:r>
           </a:p>
           <a:p/>
@@ -16735,7 +16928,7 @@
         </p:nvSpPr>
         <p:spPr>
           <a:xfrm>
-            <a:off x="1712976" y="4114800"/>
+            <a:off x="1712976" y="7315200"/>
             <a:ext cx="8763000" cy="1993900"/>
           </a:xfrm>
           <a:prstGeom prst="rect">
@@ -16796,7 +16989,7 @@
         </p:nvSpPr>
         <p:spPr>
           <a:xfrm>
-            <a:off x="1712976" y="1524000"/>
+            <a:off x="1712976" y="4064000"/>
             <a:ext cx="7112000" cy="1993900"/>
           </a:xfrm>
           <a:prstGeom prst="rect">
@@ -16817,7 +17010,7 @@
                 </a:solidFill>
                 <a:latin typeface="Times New Roman"/>
               </a:rPr>
-              <a:t>ABOGADO. - Pero dígame, ¿cómo puede usted presentar semejantes pruebas, ni aun indicios de tal cosa?</a:t>
+              <a:t>MARGARITA. - Por supuesto eso es imposible. Pero mi marido sale con esa señorita desde hace dos años. </a:t>
             </a:r>
           </a:p>
           <a:p/>
@@ -16831,7 +17024,7 @@
         </p:nvSpPr>
         <p:spPr>
           <a:xfrm>
-            <a:off x="1712976" y="4114800"/>
+            <a:off x="1712976" y="7315200"/>
             <a:ext cx="8763000" cy="1993900"/>
           </a:xfrm>
           <a:prstGeom prst="rect">
@@ -16892,7 +17085,7 @@
         </p:nvSpPr>
         <p:spPr>
           <a:xfrm>
-            <a:off x="1712976" y="1524000"/>
+            <a:off x="1712976" y="4064000"/>
             <a:ext cx="7112000" cy="1993900"/>
           </a:xfrm>
           <a:prstGeom prst="rect">
@@ -16913,7 +17106,7 @@
                 </a:solidFill>
                 <a:latin typeface="Times New Roman"/>
               </a:rPr>
-              <a:t>MARGARITA. - Por supuesto eso es imposible. Pero mi marido sale con esa señorita desde hace dos años. </a:t>
+              <a:t>MARGARITA. - Van a todas partes juntos, cogidos del brazo. </a:t>
             </a:r>
           </a:p>
           <a:p/>
@@ -16927,7 +17120,7 @@
         </p:nvSpPr>
         <p:spPr>
           <a:xfrm>
-            <a:off x="1712976" y="4114800"/>
+            <a:off x="1712976" y="7315200"/>
             <a:ext cx="8763000" cy="1993900"/>
           </a:xfrm>
           <a:prstGeom prst="rect">
@@ -16988,7 +17181,7 @@
         </p:nvSpPr>
         <p:spPr>
           <a:xfrm>
-            <a:off x="1712976" y="1524000"/>
+            <a:off x="1712976" y="4064000"/>
             <a:ext cx="7112000" cy="1993900"/>
           </a:xfrm>
           <a:prstGeom prst="rect">
@@ -17009,7 +17202,7 @@
                 </a:solidFill>
                 <a:latin typeface="Times New Roman"/>
               </a:rPr>
-              <a:t>MARGARITA. - Van a todas partes juntos, cogidos del brazo. </a:t>
+              <a:t>MARGARITA. - Le ha regalado incluso el anillo de brillantes de pedida que me regalaron sus padres antes de casarnos,</a:t>
             </a:r>
           </a:p>
           <a:p/>
@@ -17023,7 +17216,7 @@
         </p:nvSpPr>
         <p:spPr>
           <a:xfrm>
-            <a:off x="1712976" y="4114800"/>
+            <a:off x="1712976" y="7315200"/>
             <a:ext cx="8763000" cy="1993900"/>
           </a:xfrm>
           <a:prstGeom prst="rect">
@@ -17084,7 +17277,7 @@
         </p:nvSpPr>
         <p:spPr>
           <a:xfrm>
-            <a:off x="1712976" y="1524000"/>
+            <a:off x="1712976" y="4064000"/>
             <a:ext cx="7112000" cy="1993900"/>
           </a:xfrm>
           <a:prstGeom prst="rect">
@@ -17105,7 +17298,7 @@
                 </a:solidFill>
                 <a:latin typeface="Times New Roman"/>
               </a:rPr>
-              <a:t>MARGARITA. - Le ha regalado incluso el anillo de brillantes de pedida que me regalaron sus padres antes de casarnos,</a:t>
+              <a:t>MARGARITA. - También tiene alquilado un apar- tamento donde van juntos al terminar el trabajo</a:t>
             </a:r>
           </a:p>
           <a:p/>
@@ -17119,7 +17312,7 @@
         </p:nvSpPr>
         <p:spPr>
           <a:xfrm>
-            <a:off x="1712976" y="4114800"/>
+            <a:off x="1712976" y="7315200"/>
             <a:ext cx="8763000" cy="1993900"/>
           </a:xfrm>
           <a:prstGeom prst="rect">
@@ -17180,7 +17373,7 @@
         </p:nvSpPr>
         <p:spPr>
           <a:xfrm>
-            <a:off x="1712976" y="1524000"/>
+            <a:off x="1712976" y="4064000"/>
             <a:ext cx="7112000" cy="1993900"/>
           </a:xfrm>
           <a:prstGeom prst="rect">
@@ -17201,7 +17394,7 @@
                 </a:solidFill>
                 <a:latin typeface="Times New Roman"/>
               </a:rPr>
-              <a:t>MARGARITA. - También tiene alquilado un apar- tamento donde van juntos al terminar el trabajo</a:t>
+              <a:t>MARGARITA. - y los vecinos los han visto entrar y salir.</a:t>
             </a:r>
           </a:p>
           <a:p/>
@@ -17215,7 +17408,7 @@
         </p:nvSpPr>
         <p:spPr>
           <a:xfrm>
-            <a:off x="1712976" y="4114800"/>
+            <a:off x="1712976" y="7315200"/>
             <a:ext cx="8763000" cy="1993900"/>
           </a:xfrm>
           <a:prstGeom prst="rect">
@@ -17276,7 +17469,7 @@
         </p:nvSpPr>
         <p:spPr>
           <a:xfrm>
-            <a:off x="1712976" y="1524000"/>
+            <a:off x="1712976" y="4064000"/>
             <a:ext cx="7112000" cy="1993900"/>
           </a:xfrm>
           <a:prstGeom prst="rect">
@@ -17297,7 +17490,7 @@
                 </a:solidFill>
                 <a:latin typeface="Times New Roman"/>
               </a:rPr>
-              <a:t>MARGARITA. - y los vecinos los han visto entrar y salir.</a:t>
+              <a:t>ABOGADO. - Indicios, suposiciones. ¡Ta, ta, ta!</a:t>
             </a:r>
           </a:p>
           <a:p/>
@@ -17311,7 +17504,7 @@
         </p:nvSpPr>
         <p:spPr>
           <a:xfrm>
-            <a:off x="1712976" y="4114800"/>
+            <a:off x="1712976" y="7315200"/>
             <a:ext cx="8763000" cy="1993900"/>
           </a:xfrm>
           <a:prstGeom prst="rect">
@@ -17372,7 +17565,7 @@
         </p:nvSpPr>
         <p:spPr>
           <a:xfrm>
-            <a:off x="1712976" y="1524000"/>
+            <a:off x="1712976" y="4064000"/>
             <a:ext cx="7112000" cy="1993900"/>
           </a:xfrm>
           <a:prstGeom prst="rect">
@@ -17407,7 +17600,7 @@
         </p:nvSpPr>
         <p:spPr>
           <a:xfrm>
-            <a:off x="1712976" y="4114800"/>
+            <a:off x="1712976" y="7315200"/>
             <a:ext cx="8763000" cy="1993900"/>
           </a:xfrm>
           <a:prstGeom prst="rect">
@@ -17468,7 +17661,7 @@
         </p:nvSpPr>
         <p:spPr>
           <a:xfrm>
-            <a:off x="1712976" y="1524000"/>
+            <a:off x="1712976" y="4064000"/>
             <a:ext cx="7112000" cy="1993900"/>
           </a:xfrm>
           <a:prstGeom prst="rect">
@@ -17489,7 +17682,7 @@
                 </a:solidFill>
                 <a:latin typeface="Times New Roman"/>
               </a:rPr>
-              <a:t>ABOGADO. - Indicios, suposiciones. ¡Ta, ta, ta!</a:t>
+              <a:t>ABOGADO. - Ello hubiese bastado en el Tribunal Eclesiástico para tramitar una separación por sospecha de adulterio,</a:t>
             </a:r>
           </a:p>
           <a:p/>
@@ -17503,7 +17696,7 @@
         </p:nvSpPr>
         <p:spPr>
           <a:xfrm>
-            <a:off x="1712976" y="4114800"/>
+            <a:off x="1712976" y="7315200"/>
             <a:ext cx="8763000" cy="1993900"/>
           </a:xfrm>
           <a:prstGeom prst="rect">
@@ -17564,7 +17757,7 @@
         </p:nvSpPr>
         <p:spPr>
           <a:xfrm>
-            <a:off x="1712976" y="1524000"/>
+            <a:off x="1712976" y="4064000"/>
             <a:ext cx="7112000" cy="1993900"/>
           </a:xfrm>
           <a:prstGeom prst="rect">
@@ -17585,7 +17778,7 @@
                 </a:solidFill>
                 <a:latin typeface="Times New Roman"/>
               </a:rPr>
-              <a:t>ABOGADO. - Ello hubiese bastado en el Tribunal Eclesiástico para tramitar una separación por sospecha de adulterio,</a:t>
+              <a:t>ABOGADO. - pero hoy, querida señora, en que se ha despreciado ingratamente a la jurisdicción eclesiástica</a:t>
             </a:r>
           </a:p>
           <a:p/>
@@ -17599,7 +17792,7 @@
         </p:nvSpPr>
         <p:spPr>
           <a:xfrm>
-            <a:off x="1712976" y="4114800"/>
+            <a:off x="1712976" y="7315200"/>
             <a:ext cx="8763000" cy="1993900"/>
           </a:xfrm>
           <a:prstGeom prst="rect">
@@ -17660,7 +17853,7 @@
         </p:nvSpPr>
         <p:spPr>
           <a:xfrm>
-            <a:off x="1712976" y="1524000"/>
+            <a:off x="1712976" y="4064000"/>
             <a:ext cx="7112000" cy="1993900"/>
           </a:xfrm>
           <a:prstGeom prst="rect">
@@ -17681,7 +17874,7 @@
                 </a:solidFill>
                 <a:latin typeface="Times New Roman"/>
               </a:rPr>
-              <a:t>ABOGADO. - pero hoy, querida señora, en que se ha despreciado ingratamente a la jurisdicción eclesiástica</a:t>
+              <a:t>ABOGADO. -  y hemos tenido que caer en el Juzgado Civil, donde no se tienen en cuenta los sentimientos humanos, ni la moral cristiana,</a:t>
             </a:r>
           </a:p>
           <a:p/>
@@ -17695,7 +17888,7 @@
         </p:nvSpPr>
         <p:spPr>
           <a:xfrm>
-            <a:off x="1712976" y="4114800"/>
+            <a:off x="1712976" y="7315200"/>
             <a:ext cx="8763000" cy="1993900"/>
           </a:xfrm>
           <a:prstGeom prst="rect">
@@ -17756,7 +17949,7 @@
         </p:nvSpPr>
         <p:spPr>
           <a:xfrm>
-            <a:off x="1712976" y="1524000"/>
+            <a:off x="1712976" y="4064000"/>
             <a:ext cx="7112000" cy="1993900"/>
           </a:xfrm>
           <a:prstGeom prst="rect">
@@ -17777,7 +17970,7 @@
                 </a:solidFill>
                 <a:latin typeface="Times New Roman"/>
               </a:rPr>
-              <a:t>ABOGADO. -  y hemos tenido que caer en el Juzgado Civil, donde no se tienen en cuenta los sentimientos humanos, ni la moral cristiana,</a:t>
+              <a:t>ABOGADO. - solamente podemos aportar pruebas, ipru-e-bas!, </a:t>
             </a:r>
           </a:p>
           <a:p/>
@@ -17791,7 +17984,7 @@
         </p:nvSpPr>
         <p:spPr>
           <a:xfrm>
-            <a:off x="1712976" y="4114800"/>
+            <a:off x="1712976" y="7315200"/>
             <a:ext cx="8763000" cy="1993900"/>
           </a:xfrm>
           <a:prstGeom prst="rect">
@@ -17852,7 +18045,7 @@
         </p:nvSpPr>
         <p:spPr>
           <a:xfrm>
-            <a:off x="1712976" y="1524000"/>
+            <a:off x="1712976" y="4064000"/>
             <a:ext cx="7112000" cy="1993900"/>
           </a:xfrm>
           <a:prstGeom prst="rect">
@@ -17873,7 +18066,7 @@
                 </a:solidFill>
                 <a:latin typeface="Times New Roman"/>
               </a:rPr>
-              <a:t>ABOGADO. - solamente podemos aportar pruebas, ipru-e-bas!, </a:t>
+              <a:t>ABOGADO. - fehacientes, indubitadas, para poder proceder a una separación.</a:t>
             </a:r>
           </a:p>
           <a:p/>
@@ -17887,7 +18080,7 @@
         </p:nvSpPr>
         <p:spPr>
           <a:xfrm>
-            <a:off x="1712976" y="4114800"/>
+            <a:off x="1712976" y="7315200"/>
             <a:ext cx="8763000" cy="1993900"/>
           </a:xfrm>
           <a:prstGeom prst="rect">
@@ -17948,7 +18141,7 @@
         </p:nvSpPr>
         <p:spPr>
           <a:xfrm>
-            <a:off x="1712976" y="1524000"/>
+            <a:off x="1712976" y="4064000"/>
             <a:ext cx="7112000" cy="1993900"/>
           </a:xfrm>
           <a:prstGeom prst="rect">
@@ -17969,7 +18162,7 @@
                 </a:solidFill>
                 <a:latin typeface="Times New Roman"/>
               </a:rPr>
-              <a:t>ABOGADO. - fehacientes, indubitadas, para poder proceder a una separación.</a:t>
+              <a:t>MARGARITA. - ¡Además se ha ido de casa con ella! </a:t>
             </a:r>
           </a:p>
           <a:p/>
@@ -17983,7 +18176,7 @@
         </p:nvSpPr>
         <p:spPr>
           <a:xfrm>
-            <a:off x="1712976" y="4114800"/>
+            <a:off x="1712976" y="7315200"/>
             <a:ext cx="8763000" cy="1993900"/>
           </a:xfrm>
           <a:prstGeom prst="rect">
@@ -18044,7 +18237,7 @@
         </p:nvSpPr>
         <p:spPr>
           <a:xfrm>
-            <a:off x="1712976" y="1524000"/>
+            <a:off x="1712976" y="4064000"/>
             <a:ext cx="7112000" cy="1993900"/>
           </a:xfrm>
           <a:prstGeom prst="rect">
@@ -18065,7 +18258,7 @@
                 </a:solidFill>
                 <a:latin typeface="Times New Roman"/>
               </a:rPr>
-              <a:t>MARGARITA. - ¡Además se ha ido de casa con ella! </a:t>
+              <a:t>MARGARITA. - No piensa volver en un mes que es ha tomado de vacaciones</a:t>
             </a:r>
           </a:p>
           <a:p/>
@@ -18079,7 +18272,7 @@
         </p:nvSpPr>
         <p:spPr>
           <a:xfrm>
-            <a:off x="1712976" y="4114800"/>
+            <a:off x="1712976" y="7315200"/>
             <a:ext cx="8763000" cy="1993900"/>
           </a:xfrm>
           <a:prstGeom prst="rect">
@@ -18140,7 +18333,7 @@
         </p:nvSpPr>
         <p:spPr>
           <a:xfrm>
-            <a:off x="1712976" y="1524000"/>
+            <a:off x="1712976" y="4064000"/>
             <a:ext cx="7112000" cy="1993900"/>
           </a:xfrm>
           <a:prstGeom prst="rect">
@@ -18161,7 +18354,7 @@
                 </a:solidFill>
                 <a:latin typeface="Times New Roman"/>
               </a:rPr>
-              <a:t>MARGARITA. - No piensa volver en un mes que es ha tomado de vacaciones</a:t>
+              <a:t>MARGARITA. - y me ha dejado sola con los niños en el piso de Barcelona y sin un duro. </a:t>
             </a:r>
           </a:p>
           <a:p/>
@@ -18175,7 +18368,7 @@
         </p:nvSpPr>
         <p:spPr>
           <a:xfrm>
-            <a:off x="1712976" y="4114800"/>
+            <a:off x="1712976" y="7315200"/>
             <a:ext cx="8763000" cy="1993900"/>
           </a:xfrm>
           <a:prstGeom prst="rect">
@@ -18236,7 +18429,7 @@
         </p:nvSpPr>
         <p:spPr>
           <a:xfrm>
-            <a:off x="1712976" y="1524000"/>
+            <a:off x="1712976" y="4064000"/>
             <a:ext cx="7112000" cy="1993900"/>
           </a:xfrm>
           <a:prstGeom prst="rect">
@@ -18257,7 +18450,7 @@
                 </a:solidFill>
                 <a:latin typeface="Times New Roman"/>
               </a:rPr>
-              <a:t>MARGARITA. - y me ha dejado sola con los niños en el piso de Barcelona y sin un duro. </a:t>
+              <a:t>MARGARITA. - Ayer me cortaron al luz por falta de pago. </a:t>
             </a:r>
           </a:p>
           <a:p/>
@@ -18271,7 +18464,7 @@
         </p:nvSpPr>
         <p:spPr>
           <a:xfrm>
-            <a:off x="1712976" y="4114800"/>
+            <a:off x="1712976" y="7315200"/>
             <a:ext cx="8763000" cy="1993900"/>
           </a:xfrm>
           <a:prstGeom prst="rect">
@@ -18332,7 +18525,7 @@
         </p:nvSpPr>
         <p:spPr>
           <a:xfrm>
-            <a:off x="1712976" y="1524000"/>
+            <a:off x="1712976" y="4064000"/>
             <a:ext cx="7112000" cy="1993900"/>
           </a:xfrm>
           <a:prstGeom prst="rect">
@@ -18353,7 +18546,7 @@
                 </a:solidFill>
                 <a:latin typeface="Times New Roman"/>
               </a:rPr>
-              <a:t>MARGARITA. - Ayer me cortaron al luz por falta de pago. </a:t>
+              <a:t>MARGARITA. - ¡Eso es abandono de familia, y además malicioso!</a:t>
             </a:r>
           </a:p>
           <a:p/>
@@ -18367,7 +18560,7 @@
         </p:nvSpPr>
         <p:spPr>
           <a:xfrm>
-            <a:off x="1712976" y="4114800"/>
+            <a:off x="1712976" y="7315200"/>
             <a:ext cx="8763000" cy="1993900"/>
           </a:xfrm>
           <a:prstGeom prst="rect">

</xml_diff>

<commit_message>
Enable synchronize external sharing
</commit_message>
<xml_diff>
--- a/complete-cap.pptx
+++ b/complete-cap.pptx
@@ -3263,7 +3263,7 @@
         </p:nvSpPr>
         <p:spPr>
           <a:xfrm>
-            <a:off x="1712976" y="4064000"/>
+            <a:off x="1712976" y="1270000"/>
             <a:ext cx="7112000" cy="1993900"/>
           </a:xfrm>
           <a:prstGeom prst="rect">
@@ -3298,7 +3298,7 @@
         </p:nvSpPr>
         <p:spPr>
           <a:xfrm>
-            <a:off x="1712976" y="7315200"/>
+            <a:off x="1712976" y="4572000"/>
             <a:ext cx="8763000" cy="1993900"/>
           </a:xfrm>
           <a:prstGeom prst="rect">
@@ -3359,7 +3359,7 @@
         </p:nvSpPr>
         <p:spPr>
           <a:xfrm>
-            <a:off x="1712976" y="4064000"/>
+            <a:off x="1712976" y="1270000"/>
             <a:ext cx="7112000" cy="1993900"/>
           </a:xfrm>
           <a:prstGeom prst="rect">
@@ -3394,7 +3394,7 @@
         </p:nvSpPr>
         <p:spPr>
           <a:xfrm>
-            <a:off x="1712976" y="7315200"/>
+            <a:off x="1712976" y="4572000"/>
             <a:ext cx="8763000" cy="1993900"/>
           </a:xfrm>
           <a:prstGeom prst="rect">
@@ -3415,7 +3415,7 @@
                 </a:solidFill>
                 <a:latin typeface="MS Mincho"/>
               </a:rPr>
-              <a:t>警部: でも、なぜ？</a:t>
+              <a:t>警部: でもなぜ？</a:t>
             </a:r>
           </a:p>
           <a:p/>
@@ -3455,7 +3455,7 @@
         </p:nvSpPr>
         <p:spPr>
           <a:xfrm>
-            <a:off x="1712976" y="4064000"/>
+            <a:off x="1712976" y="1270000"/>
             <a:ext cx="7112000" cy="1993900"/>
           </a:xfrm>
           <a:prstGeom prst="rect">
@@ -3490,7 +3490,7 @@
         </p:nvSpPr>
         <p:spPr>
           <a:xfrm>
-            <a:off x="1712976" y="7315200"/>
+            <a:off x="1712976" y="4572000"/>
             <a:ext cx="8763000" cy="1993900"/>
           </a:xfrm>
           <a:prstGeom prst="rect">
@@ -3551,7 +3551,7 @@
         </p:nvSpPr>
         <p:spPr>
           <a:xfrm>
-            <a:off x="1712976" y="4064000"/>
+            <a:off x="1712976" y="1270000"/>
             <a:ext cx="7112000" cy="1993900"/>
           </a:xfrm>
           <a:prstGeom prst="rect">
@@ -3586,7 +3586,7 @@
         </p:nvSpPr>
         <p:spPr>
           <a:xfrm>
-            <a:off x="1712976" y="7315200"/>
+            <a:off x="1712976" y="4572000"/>
             <a:ext cx="8763000" cy="1993900"/>
           </a:xfrm>
           <a:prstGeom prst="rect">
@@ -3647,7 +3647,7 @@
         </p:nvSpPr>
         <p:spPr>
           <a:xfrm>
-            <a:off x="1712976" y="4064000"/>
+            <a:off x="1712976" y="1270000"/>
             <a:ext cx="7112000" cy="1993900"/>
           </a:xfrm>
           <a:prstGeom prst="rect">
@@ -3682,7 +3682,7 @@
         </p:nvSpPr>
         <p:spPr>
           <a:xfrm>
-            <a:off x="1712976" y="7315200"/>
+            <a:off x="1712976" y="4572000"/>
             <a:ext cx="8763000" cy="1993900"/>
           </a:xfrm>
           <a:prstGeom prst="rect">
@@ -3743,7 +3743,7 @@
         </p:nvSpPr>
         <p:spPr>
           <a:xfrm>
-            <a:off x="1712976" y="4064000"/>
+            <a:off x="1712976" y="1270000"/>
             <a:ext cx="7112000" cy="1993900"/>
           </a:xfrm>
           <a:prstGeom prst="rect">
@@ -3764,7 +3764,7 @@
                 </a:solidFill>
                 <a:latin typeface="Times New Roman"/>
               </a:rPr>
-              <a:t> que conoce mucho mejor que usted los matices, los detalles jurídicos,</a:t>
+              <a:t>ABOGADO. -  que conoce mucho mejor que usted los matices, los detalles jurídicos,</a:t>
             </a:r>
           </a:p>
           <a:p/>
@@ -3778,7 +3778,7 @@
         </p:nvSpPr>
         <p:spPr>
           <a:xfrm>
-            <a:off x="1712976" y="7315200"/>
+            <a:off x="1712976" y="4572000"/>
             <a:ext cx="8763000" cy="1993900"/>
           </a:xfrm>
           <a:prstGeom prst="rect">
@@ -3799,7 +3799,7 @@
                 </a:solidFill>
                 <a:latin typeface="MS Mincho"/>
               </a:rPr>
-              <a:t>弁護士: 専門家はね、微妙な意味合いや司法の細かいことをあなたよりもずっとよく知っているし、</a:t>
+              <a:t>弁護士: 専門家はね 微妙な意味合いや司法の細かいことをあなたよりもずっとよく知っているし </a:t>
             </a:r>
           </a:p>
           <a:p/>
@@ -3839,7 +3839,7 @@
         </p:nvSpPr>
         <p:spPr>
           <a:xfrm>
-            <a:off x="1712976" y="4064000"/>
+            <a:off x="1712976" y="1270000"/>
             <a:ext cx="7112000" cy="1993900"/>
           </a:xfrm>
           <a:prstGeom prst="rect">
@@ -3874,7 +3874,7 @@
         </p:nvSpPr>
         <p:spPr>
           <a:xfrm>
-            <a:off x="1712976" y="7315200"/>
+            <a:off x="1712976" y="4572000"/>
             <a:ext cx="8763000" cy="1993900"/>
           </a:xfrm>
           <a:prstGeom prst="rect">
@@ -3895,7 +3895,7 @@
                 </a:solidFill>
                 <a:latin typeface="MS Mincho"/>
               </a:rPr>
-              <a:t>弁護士: あなたは刑法典を購入して、もう法律がわかった気になっている！</a:t>
+              <a:t>弁護士: あなたは刑法典を購入して もう法律がわかった気になっている!</a:t>
             </a:r>
           </a:p>
           <a:p/>
@@ -3935,7 +3935,7 @@
         </p:nvSpPr>
         <p:spPr>
           <a:xfrm>
-            <a:off x="1712976" y="4064000"/>
+            <a:off x="1712976" y="1270000"/>
             <a:ext cx="7112000" cy="1993900"/>
           </a:xfrm>
           <a:prstGeom prst="rect">
@@ -3970,7 +3970,7 @@
         </p:nvSpPr>
         <p:spPr>
           <a:xfrm>
-            <a:off x="1712976" y="7315200"/>
+            <a:off x="1712976" y="4572000"/>
             <a:ext cx="8763000" cy="1993900"/>
           </a:xfrm>
           <a:prstGeom prst="rect">
@@ -3991,7 +3991,7 @@
                 </a:solidFill>
                 <a:latin typeface="MS Mincho"/>
               </a:rPr>
-              <a:t>弁護士: それなら、我々弁護士は何のために存在しているのでしょうか？</a:t>
+              <a:t>弁護士: それなら 我々弁護士は何のために存在しているのでしょうか？</a:t>
             </a:r>
           </a:p>
           <a:p/>
@@ -4031,7 +4031,7 @@
         </p:nvSpPr>
         <p:spPr>
           <a:xfrm>
-            <a:off x="1712976" y="4064000"/>
+            <a:off x="1712976" y="1270000"/>
             <a:ext cx="7112000" cy="1993900"/>
           </a:xfrm>
           <a:prstGeom prst="rect">
@@ -4066,7 +4066,7 @@
         </p:nvSpPr>
         <p:spPr>
           <a:xfrm>
-            <a:off x="1712976" y="7315200"/>
+            <a:off x="1712976" y="4572000"/>
             <a:ext cx="8763000" cy="1993900"/>
           </a:xfrm>
           <a:prstGeom prst="rect">
@@ -4087,7 +4087,7 @@
                 </a:solidFill>
                 <a:latin typeface="MS Mincho"/>
               </a:rPr>
-              <a:t>弁護士: 離婚というのはそんなふうに簡単に諸求できないということも、ご存知ないのでしょう？</a:t>
+              <a:t>弁護士: 離婚というのはそんなふうに簡単に諸求できないということも ご存知ないのでしょう？</a:t>
             </a:r>
           </a:p>
           <a:p/>
@@ -4127,7 +4127,7 @@
         </p:nvSpPr>
         <p:spPr>
           <a:xfrm>
-            <a:off x="1712976" y="4064000"/>
+            <a:off x="1712976" y="1270000"/>
             <a:ext cx="7112000" cy="1993900"/>
           </a:xfrm>
           <a:prstGeom prst="rect">
@@ -4162,7 +4162,7 @@
         </p:nvSpPr>
         <p:spPr>
           <a:xfrm>
-            <a:off x="1712976" y="7315200"/>
+            <a:off x="1712976" y="4572000"/>
             <a:ext cx="8763000" cy="1993900"/>
           </a:xfrm>
           <a:prstGeom prst="rect">
@@ -4223,7 +4223,7 @@
         </p:nvSpPr>
         <p:spPr>
           <a:xfrm>
-            <a:off x="1712976" y="4064000"/>
+            <a:off x="1712976" y="1270000"/>
             <a:ext cx="7112000" cy="1993900"/>
           </a:xfrm>
           <a:prstGeom prst="rect">
@@ -4258,7 +4258,7 @@
         </p:nvSpPr>
         <p:spPr>
           <a:xfrm>
-            <a:off x="1712976" y="7315200"/>
+            <a:off x="1712976" y="4572000"/>
             <a:ext cx="8763000" cy="1993900"/>
           </a:xfrm>
           <a:prstGeom prst="rect">
@@ -4319,7 +4319,7 @@
         </p:nvSpPr>
         <p:spPr>
           <a:xfrm>
-            <a:off x="1712976" y="4064000"/>
+            <a:off x="1712976" y="1270000"/>
             <a:ext cx="7112000" cy="1993900"/>
           </a:xfrm>
           <a:prstGeom prst="rect">
@@ -4354,7 +4354,7 @@
         </p:nvSpPr>
         <p:spPr>
           <a:xfrm>
-            <a:off x="1712976" y="7315200"/>
+            <a:off x="1712976" y="4572000"/>
             <a:ext cx="8763000" cy="1993900"/>
           </a:xfrm>
           <a:prstGeom prst="rect">
@@ -4375,7 +4375,7 @@
                 </a:solidFill>
                 <a:latin typeface="MS Mincho"/>
               </a:rPr>
-              <a:t>マルガリータ: 知っています、実際にやってみました</a:t>
+              <a:t>マルガリータ: 知っています 実際にやってみました</a:t>
             </a:r>
           </a:p>
           <a:p/>
@@ -4415,7 +4415,7 @@
         </p:nvSpPr>
         <p:spPr>
           <a:xfrm>
-            <a:off x="1712976" y="4064000"/>
+            <a:off x="1712976" y="1270000"/>
             <a:ext cx="7112000" cy="1993900"/>
           </a:xfrm>
           <a:prstGeom prst="rect">
@@ -4450,7 +4450,7 @@
         </p:nvSpPr>
         <p:spPr>
           <a:xfrm>
-            <a:off x="1712976" y="7315200"/>
+            <a:off x="1712976" y="4572000"/>
             <a:ext cx="8763000" cy="1993900"/>
           </a:xfrm>
           <a:prstGeom prst="rect">
@@ -4511,7 +4511,7 @@
         </p:nvSpPr>
         <p:spPr>
           <a:xfrm>
-            <a:off x="1712976" y="4064000"/>
+            <a:off x="1712976" y="1270000"/>
             <a:ext cx="7112000" cy="1993900"/>
           </a:xfrm>
           <a:prstGeom prst="rect">
@@ -4532,7 +4532,7 @@
                 </a:solidFill>
                 <a:latin typeface="Times New Roman"/>
               </a:rPr>
-              <a:t>Estuve ayer por la tarde en la comisaría...</a:t>
+              <a:t>MARGARITA. - Estuve ayer por la tarde en la comisaría...</a:t>
             </a:r>
           </a:p>
           <a:p/>
@@ -4546,7 +4546,7 @@
         </p:nvSpPr>
         <p:spPr>
           <a:xfrm>
-            <a:off x="1712976" y="7315200"/>
+            <a:off x="1712976" y="4572000"/>
             <a:ext cx="8763000" cy="1993900"/>
           </a:xfrm>
           <a:prstGeom prst="rect">
@@ -4567,7 +4567,7 @@
                 </a:solidFill>
                 <a:latin typeface="MS Mincho"/>
               </a:rPr>
-              <a:t>マルガリータ: 昨日の午後、警察署に行きました</a:t>
+              <a:t>マルガリータ: 昨日の午後 警察署に行きました</a:t>
             </a:r>
           </a:p>
           <a:p/>
@@ -4607,7 +4607,7 @@
         </p:nvSpPr>
         <p:spPr>
           <a:xfrm>
-            <a:off x="1712976" y="4064000"/>
+            <a:off x="1712976" y="1270000"/>
             <a:ext cx="7112000" cy="1993900"/>
           </a:xfrm>
           <a:prstGeom prst="rect">
@@ -4642,7 +4642,7 @@
         </p:nvSpPr>
         <p:spPr>
           <a:xfrm>
-            <a:off x="1712976" y="7315200"/>
+            <a:off x="1712976" y="4572000"/>
             <a:ext cx="8763000" cy="1993900"/>
           </a:xfrm>
           <a:prstGeom prst="rect">
@@ -4703,7 +4703,7 @@
         </p:nvSpPr>
         <p:spPr>
           <a:xfrm>
-            <a:off x="1712976" y="4064000"/>
+            <a:off x="1712976" y="1270000"/>
             <a:ext cx="7112000" cy="1993900"/>
           </a:xfrm>
           <a:prstGeom prst="rect">
@@ -4738,7 +4738,7 @@
         </p:nvSpPr>
         <p:spPr>
           <a:xfrm>
-            <a:off x="1712976" y="7315200"/>
+            <a:off x="1712976" y="4572000"/>
             <a:ext cx="8763000" cy="1993900"/>
           </a:xfrm>
           <a:prstGeom prst="rect">
@@ -4799,7 +4799,7 @@
         </p:nvSpPr>
         <p:spPr>
           <a:xfrm>
-            <a:off x="1712976" y="4064000"/>
+            <a:off x="1712976" y="1270000"/>
             <a:ext cx="7112000" cy="1993900"/>
           </a:xfrm>
           <a:prstGeom prst="rect">
@@ -4834,7 +4834,7 @@
         </p:nvSpPr>
         <p:spPr>
           <a:xfrm>
-            <a:off x="1712976" y="7315200"/>
+            <a:off x="1712976" y="4572000"/>
             <a:ext cx="8763000" cy="1993900"/>
           </a:xfrm>
           <a:prstGeom prst="rect">
@@ -4855,7 +4855,7 @@
                 </a:solidFill>
                 <a:latin typeface="MS Mincho"/>
               </a:rPr>
-              <a:t>マルガリータ: 警察署長は、それが馬鹿げていると言いました</a:t>
+              <a:t>マルガリータ: 警察署長は それが馬鹿げていると言いました</a:t>
             </a:r>
           </a:p>
           <a:p/>
@@ -4895,7 +4895,7 @@
         </p:nvSpPr>
         <p:spPr>
           <a:xfrm>
-            <a:off x="1712976" y="4064000"/>
+            <a:off x="1712976" y="1270000"/>
             <a:ext cx="7112000" cy="1993900"/>
           </a:xfrm>
           <a:prstGeom prst="rect">
@@ -4916,7 +4916,7 @@
                 </a:solidFill>
                 <a:latin typeface="Times New Roman"/>
               </a:rPr>
-              <a:t>que ya regresaría mi marido</a:t>
+              <a:t>MARGARITA. - que ya regresaría mi marido</a:t>
             </a:r>
           </a:p>
           <a:p/>
@@ -4930,7 +4930,7 @@
         </p:nvSpPr>
         <p:spPr>
           <a:xfrm>
-            <a:off x="1712976" y="7315200"/>
+            <a:off x="1712976" y="4572000"/>
             <a:ext cx="8763000" cy="1993900"/>
           </a:xfrm>
           <a:prstGeom prst="rect">
@@ -4951,7 +4951,7 @@
                 </a:solidFill>
                 <a:latin typeface="MS Mincho"/>
               </a:rPr>
-              <a:t>マルガリータ: そのうち主人は戻ってくるから、</a:t>
+              <a:t>マルガリータ: そのうち主人は戻ってくるから </a:t>
             </a:r>
           </a:p>
           <a:p/>
@@ -4991,7 +4991,7 @@
         </p:nvSpPr>
         <p:spPr>
           <a:xfrm>
-            <a:off x="1712976" y="4064000"/>
+            <a:off x="1712976" y="1270000"/>
             <a:ext cx="7112000" cy="1993900"/>
           </a:xfrm>
           <a:prstGeom prst="rect">
@@ -5026,7 +5026,7 @@
         </p:nvSpPr>
         <p:spPr>
           <a:xfrm>
-            <a:off x="1712976" y="7315200"/>
+            <a:off x="1712976" y="4572000"/>
             <a:ext cx="8763000" cy="1993900"/>
           </a:xfrm>
           <a:prstGeom prst="rect">
@@ -5087,7 +5087,7 @@
         </p:nvSpPr>
         <p:spPr>
           <a:xfrm>
-            <a:off x="1712976" y="4064000"/>
+            <a:off x="1712976" y="1270000"/>
             <a:ext cx="7112000" cy="1993900"/>
           </a:xfrm>
           <a:prstGeom prst="rect">
@@ -5108,7 +5108,7 @@
                 </a:solidFill>
                 <a:latin typeface="Times New Roman"/>
               </a:rPr>
-              <a:t>que volvería muy cansado...</a:t>
+              <a:t>MARGARITA. - que volvería muy cansado...</a:t>
             </a:r>
           </a:p>
           <a:p/>
@@ -5122,7 +5122,7 @@
         </p:nvSpPr>
         <p:spPr>
           <a:xfrm>
-            <a:off x="1712976" y="7315200"/>
+            <a:off x="1712976" y="4572000"/>
             <a:ext cx="8763000" cy="1993900"/>
           </a:xfrm>
           <a:prstGeom prst="rect">
@@ -5183,7 +5183,7 @@
         </p:nvSpPr>
         <p:spPr>
           <a:xfrm>
-            <a:off x="1712976" y="4064000"/>
+            <a:off x="1712976" y="1270000"/>
             <a:ext cx="7112000" cy="1993900"/>
           </a:xfrm>
           <a:prstGeom prst="rect">
@@ -5218,7 +5218,7 @@
         </p:nvSpPr>
         <p:spPr>
           <a:xfrm>
-            <a:off x="1712976" y="7315200"/>
+            <a:off x="1712976" y="4572000"/>
             <a:ext cx="8763000" cy="1993900"/>
           </a:xfrm>
           <a:prstGeom prst="rect">
@@ -5279,7 +5279,7 @@
         </p:nvSpPr>
         <p:spPr>
           <a:xfrm>
-            <a:off x="1712976" y="4064000"/>
+            <a:off x="1712976" y="1270000"/>
             <a:ext cx="7112000" cy="1993900"/>
           </a:xfrm>
           <a:prstGeom prst="rect">
@@ -5314,7 +5314,7 @@
         </p:nvSpPr>
         <p:spPr>
           <a:xfrm>
-            <a:off x="1712976" y="7315200"/>
+            <a:off x="1712976" y="4572000"/>
             <a:ext cx="8763000" cy="1993900"/>
           </a:xfrm>
           <a:prstGeom prst="rect">
@@ -5335,7 +5335,7 @@
                 </a:solidFill>
                 <a:latin typeface="MS Mincho"/>
               </a:rPr>
-              <a:t>弁護士: あなたが真面目に家事をして夫を取り戻す努力をすれば、間違いなく戻ってくるでしょう、そして……</a:t>
+              <a:t>弁護士: あなたが真面目に家事をして夫を取り戻す努力をすれば 間違いなく戻ってくるでしょう そして……</a:t>
             </a:r>
           </a:p>
           <a:p/>
@@ -5375,7 +5375,7 @@
         </p:nvSpPr>
         <p:spPr>
           <a:xfrm>
-            <a:off x="1712976" y="4064000"/>
+            <a:off x="1712976" y="1270000"/>
             <a:ext cx="7112000" cy="1993900"/>
           </a:xfrm>
           <a:prstGeom prst="rect">
@@ -5410,7 +5410,7 @@
         </p:nvSpPr>
         <p:spPr>
           <a:xfrm>
-            <a:off x="1712976" y="7315200"/>
+            <a:off x="1712976" y="4572000"/>
             <a:ext cx="8763000" cy="1993900"/>
           </a:xfrm>
           <a:prstGeom prst="rect">
@@ -5431,7 +5431,7 @@
                 </a:solidFill>
                 <a:latin typeface="MS Mincho"/>
               </a:rPr>
-              <a:t>弁護士: 出口で私の秘書に相談料を払うのをお忘れなく！</a:t>
+              <a:t>弁護士: 出口で私の秘書に相談料を払うのをお忘れなく!</a:t>
             </a:r>
           </a:p>
           <a:p/>
@@ -5471,7 +5471,7 @@
         </p:nvSpPr>
         <p:spPr>
           <a:xfrm>
-            <a:off x="1712976" y="4064000"/>
+            <a:off x="1712976" y="1270000"/>
             <a:ext cx="7112000" cy="1993900"/>
           </a:xfrm>
           <a:prstGeom prst="rect">
@@ -5506,7 +5506,7 @@
         </p:nvSpPr>
         <p:spPr>
           <a:xfrm>
-            <a:off x="1712976" y="7315200"/>
+            <a:off x="1712976" y="4572000"/>
             <a:ext cx="8763000" cy="1993900"/>
           </a:xfrm>
           <a:prstGeom prst="rect">
@@ -5527,7 +5527,7 @@
                 </a:solidFill>
                 <a:latin typeface="MS Mincho"/>
               </a:rPr>
-              <a:t>警部: もちろんです！</a:t>
+              <a:t>警部: もちろんです!</a:t>
             </a:r>
           </a:p>
           <a:p/>
@@ -5567,7 +5567,7 @@
         </p:nvSpPr>
         <p:spPr>
           <a:xfrm>
-            <a:off x="1712976" y="4064000"/>
+            <a:off x="1712976" y="1270000"/>
             <a:ext cx="7112000" cy="1993900"/>
           </a:xfrm>
           <a:prstGeom prst="rect">
@@ -5602,7 +5602,7 @@
         </p:nvSpPr>
         <p:spPr>
           <a:xfrm>
-            <a:off x="1712976" y="7315200"/>
+            <a:off x="1712976" y="4572000"/>
             <a:ext cx="8763000" cy="1993900"/>
           </a:xfrm>
           <a:prstGeom prst="rect">
@@ -5663,7 +5663,7 @@
         </p:nvSpPr>
         <p:spPr>
           <a:xfrm>
-            <a:off x="1712976" y="4064000"/>
+            <a:off x="1712976" y="1270000"/>
             <a:ext cx="7112000" cy="1993900"/>
           </a:xfrm>
           <a:prstGeom prst="rect">
@@ -5698,7 +5698,7 @@
         </p:nvSpPr>
         <p:spPr>
           <a:xfrm>
-            <a:off x="1712976" y="7315200"/>
+            <a:off x="1712976" y="4572000"/>
             <a:ext cx="8763000" cy="1993900"/>
           </a:xfrm>
           <a:prstGeom prst="rect">
@@ -5759,7 +5759,7 @@
         </p:nvSpPr>
         <p:spPr>
           <a:xfrm>
-            <a:off x="1712976" y="4064000"/>
+            <a:off x="1712976" y="1270000"/>
             <a:ext cx="7112000" cy="1993900"/>
           </a:xfrm>
           <a:prstGeom prst="rect">
@@ -5794,7 +5794,7 @@
         </p:nvSpPr>
         <p:spPr>
           <a:xfrm>
-            <a:off x="1712976" y="7315200"/>
+            <a:off x="1712976" y="4572000"/>
             <a:ext cx="8763000" cy="1993900"/>
           </a:xfrm>
           <a:prstGeom prst="rect">
@@ -5855,7 +5855,7 @@
         </p:nvSpPr>
         <p:spPr>
           <a:xfrm>
-            <a:off x="1712976" y="4064000"/>
+            <a:off x="1712976" y="1270000"/>
             <a:ext cx="7112000" cy="1993900"/>
           </a:xfrm>
           <a:prstGeom prst="rect">
@@ -5890,7 +5890,7 @@
         </p:nvSpPr>
         <p:spPr>
           <a:xfrm>
-            <a:off x="1712976" y="7315200"/>
+            <a:off x="1712976" y="4572000"/>
             <a:ext cx="8763000" cy="1993900"/>
           </a:xfrm>
           <a:prstGeom prst="rect">
@@ -5951,7 +5951,7 @@
         </p:nvSpPr>
         <p:spPr>
           <a:xfrm>
-            <a:off x="1712976" y="4064000"/>
+            <a:off x="1712976" y="1270000"/>
             <a:ext cx="7112000" cy="1993900"/>
           </a:xfrm>
           <a:prstGeom prst="rect">
@@ -5986,7 +5986,7 @@
         </p:nvSpPr>
         <p:spPr>
           <a:xfrm>
-            <a:off x="1712976" y="7315200"/>
+            <a:off x="1712976" y="4572000"/>
             <a:ext cx="8763000" cy="1993900"/>
           </a:xfrm>
           <a:prstGeom prst="rect">
@@ -6047,7 +6047,7 @@
         </p:nvSpPr>
         <p:spPr>
           <a:xfrm>
-            <a:off x="1712976" y="4064000"/>
+            <a:off x="1712976" y="1270000"/>
             <a:ext cx="7112000" cy="1993900"/>
           </a:xfrm>
           <a:prstGeom prst="rect">
@@ -6082,7 +6082,7 @@
         </p:nvSpPr>
         <p:spPr>
           <a:xfrm>
-            <a:off x="1712976" y="7315200"/>
+            <a:off x="1712976" y="4572000"/>
             <a:ext cx="8763000" cy="1993900"/>
           </a:xfrm>
           <a:prstGeom prst="rect">
@@ -6143,7 +6143,7 @@
         </p:nvSpPr>
         <p:spPr>
           <a:xfrm>
-            <a:off x="1712976" y="4064000"/>
+            <a:off x="1712976" y="1270000"/>
             <a:ext cx="7112000" cy="1993900"/>
           </a:xfrm>
           <a:prstGeom prst="rect">
@@ -6178,7 +6178,7 @@
         </p:nvSpPr>
         <p:spPr>
           <a:xfrm>
-            <a:off x="1712976" y="7315200"/>
+            <a:off x="1712976" y="4572000"/>
             <a:ext cx="8763000" cy="1993900"/>
           </a:xfrm>
           <a:prstGeom prst="rect">
@@ -6239,7 +6239,7 @@
         </p:nvSpPr>
         <p:spPr>
           <a:xfrm>
-            <a:off x="1712976" y="4064000"/>
+            <a:off x="1712976" y="1270000"/>
             <a:ext cx="7112000" cy="1993900"/>
           </a:xfrm>
           <a:prstGeom prst="rect">
@@ -6274,7 +6274,7 @@
         </p:nvSpPr>
         <p:spPr>
           <a:xfrm>
-            <a:off x="1712976" y="7315200"/>
+            <a:off x="1712976" y="4572000"/>
             <a:ext cx="8763000" cy="1993900"/>
           </a:xfrm>
           <a:prstGeom prst="rect">
@@ -6335,7 +6335,7 @@
         </p:nvSpPr>
         <p:spPr>
           <a:xfrm>
-            <a:off x="1712976" y="4064000"/>
+            <a:off x="1712976" y="1270000"/>
             <a:ext cx="7112000" cy="1993900"/>
           </a:xfrm>
           <a:prstGeom prst="rect">
@@ -6370,7 +6370,7 @@
         </p:nvSpPr>
         <p:spPr>
           <a:xfrm>
-            <a:off x="1712976" y="7315200"/>
+            <a:off x="1712976" y="4572000"/>
             <a:ext cx="8763000" cy="1993900"/>
           </a:xfrm>
           <a:prstGeom prst="rect">
@@ -6431,7 +6431,7 @@
         </p:nvSpPr>
         <p:spPr>
           <a:xfrm>
-            <a:off x="1712976" y="4064000"/>
+            <a:off x="1712976" y="1270000"/>
             <a:ext cx="7112000" cy="1993900"/>
           </a:xfrm>
           <a:prstGeom prst="rect">
@@ -6466,7 +6466,7 @@
         </p:nvSpPr>
         <p:spPr>
           <a:xfrm>
-            <a:off x="1712976" y="7315200"/>
+            <a:off x="1712976" y="4572000"/>
             <a:ext cx="8763000" cy="1993900"/>
           </a:xfrm>
           <a:prstGeom prst="rect">
@@ -6527,7 +6527,7 @@
         </p:nvSpPr>
         <p:spPr>
           <a:xfrm>
-            <a:off x="1712976" y="4064000"/>
+            <a:off x="1712976" y="1270000"/>
             <a:ext cx="7112000" cy="1993900"/>
           </a:xfrm>
           <a:prstGeom prst="rect">
@@ -6562,7 +6562,7 @@
         </p:nvSpPr>
         <p:spPr>
           <a:xfrm>
-            <a:off x="1712976" y="7315200"/>
+            <a:off x="1712976" y="4572000"/>
             <a:ext cx="8763000" cy="1993900"/>
           </a:xfrm>
           <a:prstGeom prst="rect">
@@ -6623,7 +6623,7 @@
         </p:nvSpPr>
         <p:spPr>
           <a:xfrm>
-            <a:off x="1712976" y="4064000"/>
+            <a:off x="1712976" y="1270000"/>
             <a:ext cx="7112000" cy="1993900"/>
           </a:xfrm>
           <a:prstGeom prst="rect">
@@ -6658,7 +6658,7 @@
         </p:nvSpPr>
         <p:spPr>
           <a:xfrm>
-            <a:off x="1712976" y="7315200"/>
+            <a:off x="1712976" y="4572000"/>
             <a:ext cx="8763000" cy="1993900"/>
           </a:xfrm>
           <a:prstGeom prst="rect">
@@ -6719,7 +6719,7 @@
         </p:nvSpPr>
         <p:spPr>
           <a:xfrm>
-            <a:off x="1712976" y="4064000"/>
+            <a:off x="1712976" y="1270000"/>
             <a:ext cx="7112000" cy="1993900"/>
           </a:xfrm>
           <a:prstGeom prst="rect">
@@ -6754,7 +6754,7 @@
         </p:nvSpPr>
         <p:spPr>
           <a:xfrm>
-            <a:off x="1712976" y="7315200"/>
+            <a:off x="1712976" y="4572000"/>
             <a:ext cx="8763000" cy="1993900"/>
           </a:xfrm>
           <a:prstGeom prst="rect">
@@ -6815,7 +6815,7 @@
         </p:nvSpPr>
         <p:spPr>
           <a:xfrm>
-            <a:off x="1712976" y="4064000"/>
+            <a:off x="1712976" y="1270000"/>
             <a:ext cx="7112000" cy="1993900"/>
           </a:xfrm>
           <a:prstGeom prst="rect">
@@ -6850,7 +6850,7 @@
         </p:nvSpPr>
         <p:spPr>
           <a:xfrm>
-            <a:off x="1712976" y="7315200"/>
+            <a:off x="1712976" y="4572000"/>
             <a:ext cx="8763000" cy="1993900"/>
           </a:xfrm>
           <a:prstGeom prst="rect">
@@ -6911,7 +6911,7 @@
         </p:nvSpPr>
         <p:spPr>
           <a:xfrm>
-            <a:off x="1712976" y="4064000"/>
+            <a:off x="1712976" y="1270000"/>
             <a:ext cx="7112000" cy="1993900"/>
           </a:xfrm>
           <a:prstGeom prst="rect">
@@ -6946,7 +6946,7 @@
         </p:nvSpPr>
         <p:spPr>
           <a:xfrm>
-            <a:off x="1712976" y="7315200"/>
+            <a:off x="1712976" y="4572000"/>
             <a:ext cx="8763000" cy="1993900"/>
           </a:xfrm>
           <a:prstGeom prst="rect">
@@ -6967,7 +6967,7 @@
                 </a:solidFill>
                 <a:latin typeface="MS Mincho"/>
               </a:rPr>
-              <a:t>声: 愛人ですか、それともご主人ですか?</a:t>
+              <a:t>声: 愛人ですか それともご主人ですか?</a:t>
             </a:r>
           </a:p>
           <a:p/>
@@ -7007,7 +7007,7 @@
         </p:nvSpPr>
         <p:spPr>
           <a:xfrm>
-            <a:off x="1712976" y="4064000"/>
+            <a:off x="1712976" y="1270000"/>
             <a:ext cx="7112000" cy="1993900"/>
           </a:xfrm>
           <a:prstGeom prst="rect">
@@ -7042,7 +7042,7 @@
         </p:nvSpPr>
         <p:spPr>
           <a:xfrm>
-            <a:off x="1712976" y="7315200"/>
+            <a:off x="1712976" y="4572000"/>
             <a:ext cx="8763000" cy="1993900"/>
           </a:xfrm>
           <a:prstGeom prst="rect">
@@ -7103,7 +7103,7 @@
         </p:nvSpPr>
         <p:spPr>
           <a:xfrm>
-            <a:off x="1712976" y="4064000"/>
+            <a:off x="1712976" y="1270000"/>
             <a:ext cx="7112000" cy="1993900"/>
           </a:xfrm>
           <a:prstGeom prst="rect">
@@ -7138,7 +7138,7 @@
         </p:nvSpPr>
         <p:spPr>
           <a:xfrm>
-            <a:off x="1712976" y="7315200"/>
+            <a:off x="1712976" y="4572000"/>
             <a:ext cx="8763000" cy="1993900"/>
           </a:xfrm>
           <a:prstGeom prst="rect">
@@ -7159,7 +7159,7 @@
                 </a:solidFill>
                 <a:latin typeface="MS Mincho"/>
               </a:rPr>
-              <a:t>声: そんな乱れた関係は、あなたが未熟で、まだ口答期を乗り越えていない証拠です</a:t>
+              <a:t>声: そんな乱れた関係は あなたが未熟で まだ口答期を乗り越えていない証拠です</a:t>
             </a:r>
           </a:p>
           <a:p/>
@@ -7199,7 +7199,7 @@
         </p:nvSpPr>
         <p:spPr>
           <a:xfrm>
-            <a:off x="1712976" y="4064000"/>
+            <a:off x="1712976" y="1270000"/>
             <a:ext cx="7112000" cy="1993900"/>
           </a:xfrm>
           <a:prstGeom prst="rect">
@@ -7234,7 +7234,7 @@
         </p:nvSpPr>
         <p:spPr>
           <a:xfrm>
-            <a:off x="1712976" y="7315200"/>
+            <a:off x="1712976" y="4572000"/>
             <a:ext cx="8763000" cy="1993900"/>
           </a:xfrm>
           <a:prstGeom prst="rect">
@@ -7255,7 +7255,7 @@
                 </a:solidFill>
                 <a:latin typeface="MS Mincho"/>
               </a:rPr>
-              <a:t>マリア: 彼、奥さんと別れて私と暮らすと言い ました</a:t>
+              <a:t>マリア: 彼 奥さんと別れて私と暮らすと言い ました</a:t>
             </a:r>
           </a:p>
           <a:p/>
@@ -7295,7 +7295,7 @@
         </p:nvSpPr>
         <p:spPr>
           <a:xfrm>
-            <a:off x="1712976" y="4064000"/>
+            <a:off x="1712976" y="1270000"/>
             <a:ext cx="7112000" cy="1993900"/>
           </a:xfrm>
           <a:prstGeom prst="rect">
@@ -7330,7 +7330,7 @@
         </p:nvSpPr>
         <p:spPr>
           <a:xfrm>
-            <a:off x="1712976" y="7315200"/>
+            <a:off x="1712976" y="4572000"/>
             <a:ext cx="8763000" cy="1993900"/>
           </a:xfrm>
           <a:prstGeom prst="rect">
@@ -7391,7 +7391,7 @@
         </p:nvSpPr>
         <p:spPr>
           <a:xfrm>
-            <a:off x="1712976" y="4064000"/>
+            <a:off x="1712976" y="1270000"/>
             <a:ext cx="7112000" cy="1993900"/>
           </a:xfrm>
           <a:prstGeom prst="rect">
@@ -7426,7 +7426,7 @@
         </p:nvSpPr>
         <p:spPr>
           <a:xfrm>
-            <a:off x="1712976" y="7315200"/>
+            <a:off x="1712976" y="4572000"/>
             <a:ext cx="8763000" cy="1993900"/>
           </a:xfrm>
           <a:prstGeom prst="rect">
@@ -7487,7 +7487,7 @@
         </p:nvSpPr>
         <p:spPr>
           <a:xfrm>
-            <a:off x="1712976" y="4064000"/>
+            <a:off x="1712976" y="1270000"/>
             <a:ext cx="7112000" cy="1993900"/>
           </a:xfrm>
           <a:prstGeom prst="rect">
@@ -7522,7 +7522,7 @@
         </p:nvSpPr>
         <p:spPr>
           <a:xfrm>
-            <a:off x="1712976" y="7315200"/>
+            <a:off x="1712976" y="4572000"/>
             <a:ext cx="8763000" cy="1993900"/>
           </a:xfrm>
           <a:prstGeom prst="rect">
@@ -7543,7 +7543,7 @@
                 </a:solidFill>
                 <a:latin typeface="MS Mincho"/>
               </a:rPr>
-              <a:t>声: エディプスコンプレックスを克服しておらず、あなたの愛人を使って父親への愛を達成しようとしています</a:t>
+              <a:t>声: エディプスコンプレックスを克服しておらず あなたの愛人を使って父親への愛を達成しようとしています</a:t>
             </a:r>
           </a:p>
           <a:p/>
@@ -7583,7 +7583,7 @@
         </p:nvSpPr>
         <p:spPr>
           <a:xfrm>
-            <a:off x="1712976" y="4064000"/>
+            <a:off x="1712976" y="1270000"/>
             <a:ext cx="7112000" cy="1993900"/>
           </a:xfrm>
           <a:prstGeom prst="rect">
@@ -7618,7 +7618,7 @@
         </p:nvSpPr>
         <p:spPr>
           <a:xfrm>
-            <a:off x="1712976" y="7315200"/>
+            <a:off x="1712976" y="4572000"/>
             <a:ext cx="8763000" cy="1993900"/>
           </a:xfrm>
           <a:prstGeom prst="rect">
@@ -7679,7 +7679,7 @@
         </p:nvSpPr>
         <p:spPr>
           <a:xfrm>
-            <a:off x="1712976" y="4064000"/>
+            <a:off x="1712976" y="1270000"/>
             <a:ext cx="7112000" cy="1993900"/>
           </a:xfrm>
           <a:prstGeom prst="rect">
@@ -7714,7 +7714,7 @@
         </p:nvSpPr>
         <p:spPr>
           <a:xfrm>
-            <a:off x="1712976" y="7315200"/>
+            <a:off x="1712976" y="4572000"/>
             <a:ext cx="8763000" cy="1993900"/>
           </a:xfrm>
           <a:prstGeom prst="rect">
@@ -7735,7 +7735,7 @@
                 </a:solidFill>
                 <a:latin typeface="MS Mincho"/>
               </a:rPr>
-              <a:t>マリア: いや、どうかしら... 彼はいつも奥さんが理解してくれないと文句を言ってました</a:t>
+              <a:t>マリア: いや どうかしら... 彼はいつも奥さんが理解してくれないと文句を言ってました</a:t>
             </a:r>
           </a:p>
           <a:p/>
@@ -7775,7 +7775,7 @@
         </p:nvSpPr>
         <p:spPr>
           <a:xfrm>
-            <a:off x="1712976" y="4064000"/>
+            <a:off x="1712976" y="1270000"/>
             <a:ext cx="7112000" cy="1993900"/>
           </a:xfrm>
           <a:prstGeom prst="rect">
@@ -7810,7 +7810,7 @@
         </p:nvSpPr>
         <p:spPr>
           <a:xfrm>
-            <a:off x="1712976" y="7315200"/>
+            <a:off x="1712976" y="4572000"/>
             <a:ext cx="8763000" cy="1993900"/>
           </a:xfrm>
           <a:prstGeom prst="rect">
@@ -7871,7 +7871,7 @@
         </p:nvSpPr>
         <p:spPr>
           <a:xfrm>
-            <a:off x="1712976" y="4064000"/>
+            <a:off x="1712976" y="1270000"/>
             <a:ext cx="7112000" cy="1993900"/>
           </a:xfrm>
           <a:prstGeom prst="rect">
@@ -7892,7 +7892,7 @@
                 </a:solidFill>
                 <a:latin typeface="Times New Roman"/>
               </a:rPr>
-              <a:t>porque siempre decía que el hacía falta cariño, que nadie le atendía como yo.</a:t>
+              <a:t>MARÍA. - porque siempre decía que el hacía falta cariño, que nadie le atendía como yo.</a:t>
             </a:r>
           </a:p>
           <a:p/>
@@ -7906,7 +7906,7 @@
         </p:nvSpPr>
         <p:spPr>
           <a:xfrm>
-            <a:off x="1712976" y="7315200"/>
+            <a:off x="1712976" y="4572000"/>
             <a:ext cx="8763000" cy="1993900"/>
           </a:xfrm>
           <a:prstGeom prst="rect">
@@ -7927,7 +7927,7 @@
                 </a:solidFill>
                 <a:latin typeface="MS Mincho"/>
               </a:rPr>
-              <a:t>マリア: だって、彼はいつだって愛情不足で、私みたいに世話をしてくれる人 はいないって言ってましたから</a:t>
+              <a:t>マリア: だって 彼はいつだって愛情不足で 私みたいに世話をしてくれる人 はいないって言ってましたから</a:t>
             </a:r>
           </a:p>
           <a:p/>
@@ -7967,7 +7967,7 @@
         </p:nvSpPr>
         <p:spPr>
           <a:xfrm>
-            <a:off x="1712976" y="4064000"/>
+            <a:off x="1712976" y="1270000"/>
             <a:ext cx="7112000" cy="1993900"/>
           </a:xfrm>
           <a:prstGeom prst="rect">
@@ -8002,7 +8002,7 @@
         </p:nvSpPr>
         <p:spPr>
           <a:xfrm>
-            <a:off x="1712976" y="7315200"/>
+            <a:off x="1712976" y="4572000"/>
             <a:ext cx="8763000" cy="1993900"/>
           </a:xfrm>
           <a:prstGeom prst="rect">
@@ -8023,7 +8023,7 @@
                 </a:solidFill>
                 <a:latin typeface="MS Mincho"/>
               </a:rPr>
-              <a:t>声: イオカステのコンプレックス、満足していない母性本能です あなたは子供が欲しいのです</a:t>
+              <a:t>声: イオカステのコンプレックス 満足していない母性本能です あなたは子供が欲しいのです</a:t>
             </a:r>
           </a:p>
           <a:p/>
@@ -8063,7 +8063,7 @@
         </p:nvSpPr>
         <p:spPr>
           <a:xfrm>
-            <a:off x="1712976" y="4064000"/>
+            <a:off x="1712976" y="1270000"/>
             <a:ext cx="7112000" cy="1993900"/>
           </a:xfrm>
           <a:prstGeom prst="rect">
@@ -8098,7 +8098,7 @@
         </p:nvSpPr>
         <p:spPr>
           <a:xfrm>
-            <a:off x="1712976" y="7315200"/>
+            <a:off x="1712976" y="4572000"/>
             <a:ext cx="8763000" cy="1993900"/>
           </a:xfrm>
           <a:prstGeom prst="rect">
@@ -8119,7 +8119,7 @@
                 </a:solidFill>
                 <a:latin typeface="MS Mincho"/>
               </a:rPr>
-              <a:t>マリア: 今は欲しくないです、彼は子沢山で、奥さんとその子供達を養わなければならないからです</a:t>
+              <a:t>マリア: 今は欲しくないです 彼は子沢山で 奥さんとその子供達を養わなければならないからです</a:t>
             </a:r>
           </a:p>
           <a:p/>
@@ -8159,7 +8159,7 @@
         </p:nvSpPr>
         <p:spPr>
           <a:xfrm>
-            <a:off x="1712976" y="4064000"/>
+            <a:off x="1712976" y="1270000"/>
             <a:ext cx="7112000" cy="1993900"/>
           </a:xfrm>
           <a:prstGeom prst="rect">
@@ -8194,7 +8194,7 @@
         </p:nvSpPr>
         <p:spPr>
           <a:xfrm>
-            <a:off x="1712976" y="7315200"/>
+            <a:off x="1712976" y="4572000"/>
             <a:ext cx="8763000" cy="1993900"/>
           </a:xfrm>
           <a:prstGeom prst="rect">
@@ -8255,7 +8255,7 @@
         </p:nvSpPr>
         <p:spPr>
           <a:xfrm>
-            <a:off x="1712976" y="4064000"/>
+            <a:off x="1712976" y="1270000"/>
             <a:ext cx="7112000" cy="1993900"/>
           </a:xfrm>
           <a:prstGeom prst="rect">
@@ -8290,7 +8290,7 @@
         </p:nvSpPr>
         <p:spPr>
           <a:xfrm>
-            <a:off x="1712976" y="7315200"/>
+            <a:off x="1712976" y="4572000"/>
             <a:ext cx="8763000" cy="1993900"/>
           </a:xfrm>
           <a:prstGeom prst="rect">
@@ -8351,7 +8351,7 @@
         </p:nvSpPr>
         <p:spPr>
           <a:xfrm>
-            <a:off x="1712976" y="4064000"/>
+            <a:off x="1712976" y="1270000"/>
             <a:ext cx="7112000" cy="1993900"/>
           </a:xfrm>
           <a:prstGeom prst="rect">
@@ -8386,7 +8386,7 @@
         </p:nvSpPr>
         <p:spPr>
           <a:xfrm>
-            <a:off x="1712976" y="7315200"/>
+            <a:off x="1712976" y="4572000"/>
             <a:ext cx="8763000" cy="1993900"/>
           </a:xfrm>
           <a:prstGeom prst="rect">
@@ -8447,7 +8447,7 @@
         </p:nvSpPr>
         <p:spPr>
           <a:xfrm>
-            <a:off x="1712976" y="4064000"/>
+            <a:off x="1712976" y="1270000"/>
             <a:ext cx="7112000" cy="1993900"/>
           </a:xfrm>
           <a:prstGeom prst="rect">
@@ -8482,7 +8482,7 @@
         </p:nvSpPr>
         <p:spPr>
           <a:xfrm>
-            <a:off x="1712976" y="7315200"/>
+            <a:off x="1712976" y="4572000"/>
             <a:ext cx="8763000" cy="1993900"/>
           </a:xfrm>
           <a:prstGeom prst="rect">
@@ -8543,7 +8543,7 @@
         </p:nvSpPr>
         <p:spPr>
           <a:xfrm>
-            <a:off x="1712976" y="4064000"/>
+            <a:off x="1712976" y="1270000"/>
             <a:ext cx="7112000" cy="1993900"/>
           </a:xfrm>
           <a:prstGeom prst="rect">
@@ -8578,7 +8578,7 @@
         </p:nvSpPr>
         <p:spPr>
           <a:xfrm>
-            <a:off x="1712976" y="7315200"/>
+            <a:off x="1712976" y="4572000"/>
             <a:ext cx="8763000" cy="1993900"/>
           </a:xfrm>
           <a:prstGeom prst="rect">
@@ -8599,7 +8599,7 @@
                 </a:solidFill>
                 <a:latin typeface="MS Mincho"/>
               </a:rPr>
-              <a:t>マリア: 短い手紙で別れを告げ、プレゼントしてくれたダイヤモンドの指輪は持っていってしまいました</a:t>
+              <a:t>マリア: 短い手紙で別れを告げ プレゼントしてくれたダイヤモンドの指輪は持っていってしまいました</a:t>
             </a:r>
           </a:p>
           <a:p/>
@@ -8639,7 +8639,7 @@
         </p:nvSpPr>
         <p:spPr>
           <a:xfrm>
-            <a:off x="1712976" y="4064000"/>
+            <a:off x="1712976" y="1270000"/>
             <a:ext cx="7112000" cy="1993900"/>
           </a:xfrm>
           <a:prstGeom prst="rect">
@@ -8674,7 +8674,7 @@
         </p:nvSpPr>
         <p:spPr>
           <a:xfrm>
-            <a:off x="1712976" y="7315200"/>
+            <a:off x="1712976" y="4572000"/>
             <a:ext cx="8763000" cy="1993900"/>
           </a:xfrm>
           <a:prstGeom prst="rect">
@@ -8735,7 +8735,7 @@
         </p:nvSpPr>
         <p:spPr>
           <a:xfrm>
-            <a:off x="1712976" y="4064000"/>
+            <a:off x="1712976" y="1270000"/>
             <a:ext cx="7112000" cy="1993900"/>
           </a:xfrm>
           <a:prstGeom prst="rect">
@@ -8770,7 +8770,7 @@
         </p:nvSpPr>
         <p:spPr>
           <a:xfrm>
-            <a:off x="1712976" y="7315200"/>
+            <a:off x="1712976" y="4572000"/>
             <a:ext cx="8763000" cy="1993900"/>
           </a:xfrm>
           <a:prstGeom prst="rect">
@@ -8791,7 +8791,7 @@
                 </a:solidFill>
                 <a:latin typeface="MS Mincho"/>
               </a:rPr>
-              <a:t>マリア: 彼が出て行ってから気づいたわ、宝石箱から取っいったのね</a:t>
+              <a:t>マリア: 彼が出て行ってから気づいたわ 宝石箱から取っいったのね</a:t>
             </a:r>
           </a:p>
           <a:p/>
@@ -8831,7 +8831,7 @@
         </p:nvSpPr>
         <p:spPr>
           <a:xfrm>
-            <a:off x="1712976" y="4064000"/>
+            <a:off x="1712976" y="1270000"/>
             <a:ext cx="7112000" cy="1993900"/>
           </a:xfrm>
           <a:prstGeom prst="rect">
@@ -8852,7 +8852,7 @@
                 </a:solidFill>
                 <a:latin typeface="Times New Roman"/>
               </a:rPr>
-              <a:t>y las llaves del apartamento que me sacó del bolso, sin que me diera cuenta tampoco. </a:t>
+              <a:t>MARÍA. - y las llaves del apartamento que me sacó del bolso, sin que me diera cuenta tampoco. </a:t>
             </a:r>
           </a:p>
           <a:p/>
@@ -8866,7 +8866,7 @@
         </p:nvSpPr>
         <p:spPr>
           <a:xfrm>
-            <a:off x="1712976" y="7315200"/>
+            <a:off x="1712976" y="4572000"/>
             <a:ext cx="8763000" cy="1993900"/>
           </a:xfrm>
           <a:prstGeom prst="rect">
@@ -8887,7 +8887,7 @@
                 </a:solidFill>
                 <a:latin typeface="MS Mincho"/>
               </a:rPr>
-              <a:t>マリア: そしてアパートの鍵は私のバッグから取ったんだわ、これにも気づかなかった……</a:t>
+              <a:t>マリア: そしてアパートの鍵は私のバッグから取ったんだわ これにも気づかなかった……</a:t>
             </a:r>
           </a:p>
           <a:p/>
@@ -8927,7 +8927,7 @@
         </p:nvSpPr>
         <p:spPr>
           <a:xfrm>
-            <a:off x="1712976" y="4064000"/>
+            <a:off x="1712976" y="1270000"/>
             <a:ext cx="7112000" cy="1993900"/>
           </a:xfrm>
           <a:prstGeom prst="rect">
@@ -8962,7 +8962,7 @@
         </p:nvSpPr>
         <p:spPr>
           <a:xfrm>
-            <a:off x="1712976" y="7315200"/>
+            <a:off x="1712976" y="4572000"/>
             <a:ext cx="8763000" cy="1993900"/>
           </a:xfrm>
           <a:prstGeom prst="rect">
@@ -9023,7 +9023,7 @@
         </p:nvSpPr>
         <p:spPr>
           <a:xfrm>
-            <a:off x="1712976" y="4064000"/>
+            <a:off x="1712976" y="1270000"/>
             <a:ext cx="7112000" cy="1993900"/>
           </a:xfrm>
           <a:prstGeom prst="rect">
@@ -9058,7 +9058,7 @@
         </p:nvSpPr>
         <p:spPr>
           <a:xfrm>
-            <a:off x="1712976" y="7315200"/>
+            <a:off x="1712976" y="4572000"/>
             <a:ext cx="8763000" cy="1993900"/>
           </a:xfrm>
           <a:prstGeom prst="rect">
@@ -9079,7 +9079,7 @@
                 </a:solidFill>
                 <a:latin typeface="MS Mincho"/>
               </a:rPr>
-              <a:t>マリア: 手紙には、「アパートを入居したときと同じ状態にしておくように」とだけ...</a:t>
+              <a:t>マリア: 手紙には 「アパートを入居したときと同じ状態にしておくように」とだけ...</a:t>
             </a:r>
           </a:p>
           <a:p/>
@@ -9119,7 +9119,7 @@
         </p:nvSpPr>
         <p:spPr>
           <a:xfrm>
-            <a:off x="1712976" y="4064000"/>
+            <a:off x="1712976" y="1270000"/>
             <a:ext cx="7112000" cy="1993900"/>
           </a:xfrm>
           <a:prstGeom prst="rect">
@@ -9154,7 +9154,7 @@
         </p:nvSpPr>
         <p:spPr>
           <a:xfrm>
-            <a:off x="1712976" y="7315200"/>
+            <a:off x="1712976" y="4572000"/>
             <a:ext cx="8763000" cy="1993900"/>
           </a:xfrm>
           <a:prstGeom prst="rect">
@@ -9175,7 +9175,7 @@
                 </a:solidFill>
                 <a:latin typeface="MS Mincho"/>
               </a:rPr>
-              <a:t>声: あなたの声が聞こえません！マイクに向かって話してください！</a:t>
+              <a:t>声: あなたの声が聞こえません!マイクに向かって話してください!</a:t>
             </a:r>
           </a:p>
           <a:p/>
@@ -9215,7 +9215,7 @@
         </p:nvSpPr>
         <p:spPr>
           <a:xfrm>
-            <a:off x="1712976" y="4064000"/>
+            <a:off x="1712976" y="1270000"/>
             <a:ext cx="7112000" cy="1993900"/>
           </a:xfrm>
           <a:prstGeom prst="rect">
@@ -9250,7 +9250,7 @@
         </p:nvSpPr>
         <p:spPr>
           <a:xfrm>
-            <a:off x="1712976" y="7315200"/>
+            <a:off x="1712976" y="4572000"/>
             <a:ext cx="8763000" cy="1993900"/>
           </a:xfrm>
           <a:prstGeom prst="rect">
@@ -9271,7 +9271,7 @@
                 </a:solidFill>
                 <a:latin typeface="MS Mincho"/>
               </a:rPr>
-              <a:t>マリア: 理由はわかりませんわ！彼に捨てられたんです！</a:t>
+              <a:t>マリア: 理由はわかりませんわ!彼に捨てられたんです!</a:t>
             </a:r>
           </a:p>
           <a:p/>
@@ -9311,7 +9311,7 @@
         </p:nvSpPr>
         <p:spPr>
           <a:xfrm>
-            <a:off x="1712976" y="4064000"/>
+            <a:off x="1712976" y="1270000"/>
             <a:ext cx="7112000" cy="1993900"/>
           </a:xfrm>
           <a:prstGeom prst="rect">
@@ -9346,7 +9346,7 @@
         </p:nvSpPr>
         <p:spPr>
           <a:xfrm>
-            <a:off x="1712976" y="7315200"/>
+            <a:off x="1712976" y="4572000"/>
             <a:ext cx="8763000" cy="1993900"/>
           </a:xfrm>
           <a:prstGeom prst="rect">
@@ -9367,7 +9367,7 @@
                 </a:solidFill>
                 <a:latin typeface="MS Mincho"/>
               </a:rPr>
-              <a:t>声: あなたは傲慢だ、彼にとってあなたはもう一人のメディアに変わってしまったのです</a:t>
+              <a:t>声: あなたは傲慢だ 彼にとってあなたはもう一人のメディアに変わってしまったのです</a:t>
             </a:r>
           </a:p>
           <a:p/>
@@ -9407,7 +9407,7 @@
         </p:nvSpPr>
         <p:spPr>
           <a:xfrm>
-            <a:off x="1712976" y="4064000"/>
+            <a:off x="1712976" y="1270000"/>
             <a:ext cx="7112000" cy="1993900"/>
           </a:xfrm>
           <a:prstGeom prst="rect">
@@ -9442,7 +9442,7 @@
         </p:nvSpPr>
         <p:spPr>
           <a:xfrm>
-            <a:off x="1712976" y="7315200"/>
+            <a:off x="1712976" y="4572000"/>
             <a:ext cx="8763000" cy="1993900"/>
           </a:xfrm>
           <a:prstGeom prst="rect">
@@ -9463,7 +9463,7 @@
                 </a:solidFill>
                 <a:latin typeface="MS Mincho"/>
               </a:rPr>
-              <a:t>声: あなたは彼の母親になって、彼を支配したいのです</a:t>
+              <a:t>声: あなたは彼の母親になって 彼を支配したいのです</a:t>
             </a:r>
           </a:p>
           <a:p/>
@@ -9503,7 +9503,7 @@
         </p:nvSpPr>
         <p:spPr>
           <a:xfrm>
-            <a:off x="1712976" y="4064000"/>
+            <a:off x="1712976" y="1270000"/>
             <a:ext cx="7112000" cy="1993900"/>
           </a:xfrm>
           <a:prstGeom prst="rect">
@@ -9538,7 +9538,7 @@
         </p:nvSpPr>
         <p:spPr>
           <a:xfrm>
-            <a:off x="1712976" y="7315200"/>
+            <a:off x="1712976" y="4572000"/>
             <a:ext cx="8763000" cy="1993900"/>
           </a:xfrm>
           <a:prstGeom prst="rect">
@@ -9559,7 +9559,7 @@
                 </a:solidFill>
                 <a:latin typeface="MS Mincho"/>
               </a:rPr>
-              <a:t>声: 彼が母親の子宮に戻るように、もう一度彼を飲み込もうとしているのです</a:t>
+              <a:t>声: 彼が母親の子宮に戻るように もう一度彼を飲み込もうとしているのです</a:t>
             </a:r>
           </a:p>
           <a:p/>
@@ -9599,7 +9599,7 @@
         </p:nvSpPr>
         <p:spPr>
           <a:xfrm>
-            <a:off x="1712976" y="4064000"/>
+            <a:off x="1712976" y="1270000"/>
             <a:ext cx="7112000" cy="1993900"/>
           </a:xfrm>
           <a:prstGeom prst="rect">
@@ -9634,7 +9634,7 @@
         </p:nvSpPr>
         <p:spPr>
           <a:xfrm>
-            <a:off x="1712976" y="7315200"/>
+            <a:off x="1712976" y="4572000"/>
             <a:ext cx="8763000" cy="1993900"/>
           </a:xfrm>
           <a:prstGeom prst="rect">
@@ -9655,7 +9655,7 @@
                 </a:solidFill>
                 <a:latin typeface="MS Mincho"/>
               </a:rPr>
-              <a:t>マリア: 違います、私は……！</a:t>
+              <a:t>マリア: 違います 私は……!</a:t>
             </a:r>
           </a:p>
           <a:p/>
@@ -9695,7 +9695,7 @@
         </p:nvSpPr>
         <p:spPr>
           <a:xfrm>
-            <a:off x="1712976" y="4064000"/>
+            <a:off x="1712976" y="1270000"/>
             <a:ext cx="7112000" cy="1993900"/>
           </a:xfrm>
           <a:prstGeom prst="rect">
@@ -9730,7 +9730,7 @@
         </p:nvSpPr>
         <p:spPr>
           <a:xfrm>
-            <a:off x="1712976" y="7315200"/>
+            <a:off x="1712976" y="4572000"/>
             <a:ext cx="8763000" cy="1993900"/>
           </a:xfrm>
           <a:prstGeom prst="rect">
@@ -9791,7 +9791,7 @@
         </p:nvSpPr>
         <p:spPr>
           <a:xfrm>
-            <a:off x="1712976" y="4064000"/>
+            <a:off x="1712976" y="1270000"/>
             <a:ext cx="7112000" cy="1993900"/>
           </a:xfrm>
           <a:prstGeom prst="rect">
@@ -9825,7 +9825,7 @@
         </p:nvSpPr>
         <p:spPr>
           <a:xfrm>
-            <a:off x="1712976" y="7315200"/>
+            <a:off x="1712976" y="4572000"/>
             <a:ext cx="8763000" cy="1993900"/>
           </a:xfrm>
           <a:prstGeom prst="rect">
@@ -9885,7 +9885,7 @@
         </p:nvSpPr>
         <p:spPr>
           <a:xfrm>
-            <a:off x="1712976" y="4064000"/>
+            <a:off x="1712976" y="1270000"/>
             <a:ext cx="7112000" cy="1993900"/>
           </a:xfrm>
           <a:prstGeom prst="rect">
@@ -9920,7 +9920,7 @@
         </p:nvSpPr>
         <p:spPr>
           <a:xfrm>
-            <a:off x="1712976" y="7315200"/>
+            <a:off x="1712976" y="4572000"/>
             <a:ext cx="8763000" cy="1993900"/>
           </a:xfrm>
           <a:prstGeom prst="rect">
@@ -9941,7 +9941,7 @@
                 </a:solidFill>
                 <a:latin typeface="MS Mincho"/>
               </a:rPr>
-              <a:t>警部: 告訴！ありえるとでも？</a:t>
+              <a:t>警部: 告訴!ありえるとでも？</a:t>
             </a:r>
           </a:p>
           <a:p/>
@@ -9981,7 +9981,7 @@
         </p:nvSpPr>
         <p:spPr>
           <a:xfrm>
-            <a:off x="1712976" y="4064000"/>
+            <a:off x="1712976" y="1270000"/>
             <a:ext cx="7112000" cy="1993900"/>
           </a:xfrm>
           <a:prstGeom prst="rect">
@@ -10016,7 +10016,7 @@
         </p:nvSpPr>
         <p:spPr>
           <a:xfrm>
-            <a:off x="1712976" y="7315200"/>
+            <a:off x="1712976" y="4572000"/>
             <a:ext cx="8763000" cy="1993900"/>
           </a:xfrm>
           <a:prstGeom prst="rect">
@@ -10077,7 +10077,7 @@
         </p:nvSpPr>
         <p:spPr>
           <a:xfrm>
-            <a:off x="1712976" y="4064000"/>
+            <a:off x="1712976" y="1270000"/>
             <a:ext cx="7112000" cy="1993900"/>
           </a:xfrm>
           <a:prstGeom prst="rect">
@@ -10098,7 +10098,7 @@
                 </a:solidFill>
                 <a:latin typeface="Times New Roman"/>
               </a:rPr>
-              <a:t>a presentar denuncia porque su marido le ha pegado,</a:t>
+              <a:t>INSPECTOR. - a presentar denuncia porque su marido le ha pegado,</a:t>
             </a:r>
           </a:p>
           <a:p/>
@@ -10112,7 +10112,7 @@
         </p:nvSpPr>
         <p:spPr>
           <a:xfrm>
-            <a:off x="1712976" y="7315200"/>
+            <a:off x="1712976" y="4572000"/>
             <a:ext cx="8763000" cy="1993900"/>
           </a:xfrm>
           <a:prstGeom prst="rect">
@@ -10133,7 +10133,7 @@
                 </a:solidFill>
                 <a:latin typeface="MS Mincho"/>
               </a:rPr>
-              <a:t>警部: たとえご主人があなたを殴ったとしても！</a:t>
+              <a:t>警部: たとえご主人があなたを殴ったとしても!</a:t>
             </a:r>
           </a:p>
           <a:p/>
@@ -10173,7 +10173,7 @@
         </p:nvSpPr>
         <p:spPr>
           <a:xfrm>
-            <a:off x="1712976" y="4064000"/>
+            <a:off x="1712976" y="1270000"/>
             <a:ext cx="7112000" cy="1993900"/>
           </a:xfrm>
           <a:prstGeom prst="rect">
@@ -10208,7 +10208,7 @@
         </p:nvSpPr>
         <p:spPr>
           <a:xfrm>
-            <a:off x="1712976" y="7315200"/>
+            <a:off x="1712976" y="4572000"/>
             <a:ext cx="8763000" cy="1993900"/>
           </a:xfrm>
           <a:prstGeom prst="rect">
@@ -10269,7 +10269,7 @@
         </p:nvSpPr>
         <p:spPr>
           <a:xfrm>
-            <a:off x="1712976" y="4064000"/>
+            <a:off x="1712976" y="1270000"/>
             <a:ext cx="7112000" cy="1993900"/>
           </a:xfrm>
           <a:prstGeom prst="rect">
@@ -10304,7 +10304,7 @@
         </p:nvSpPr>
         <p:spPr>
           <a:xfrm>
-            <a:off x="1712976" y="7315200"/>
+            <a:off x="1712976" y="4572000"/>
             <a:ext cx="8763000" cy="1993900"/>
           </a:xfrm>
           <a:prstGeom prst="rect">
@@ -10325,7 +10325,7 @@
                 </a:solidFill>
                 <a:latin typeface="MS Mincho"/>
               </a:rPr>
-              <a:t>警部: 今は日曜日の午後、サッカー中継の最中ですよ！</a:t>
+              <a:t>警部: 今は日曜日の午後!サッカー中継の最中ですよ!</a:t>
             </a:r>
           </a:p>
           <a:p/>
@@ -10365,7 +10365,7 @@
         </p:nvSpPr>
         <p:spPr>
           <a:xfrm>
-            <a:off x="1712976" y="4064000"/>
+            <a:off x="1712976" y="1270000"/>
             <a:ext cx="7112000" cy="1993900"/>
           </a:xfrm>
           <a:prstGeom prst="rect">
@@ -10400,7 +10400,7 @@
         </p:nvSpPr>
         <p:spPr>
           <a:xfrm>
-            <a:off x="1712976" y="7315200"/>
+            <a:off x="1712976" y="4572000"/>
             <a:ext cx="8763000" cy="1993900"/>
           </a:xfrm>
           <a:prstGeom prst="rect">
@@ -10421,7 +10421,7 @@
                 </a:solidFill>
                 <a:latin typeface="MS Mincho"/>
               </a:rPr>
-              <a:t>マグダ: 腕は折れ、とても痛かったです..</a:t>
+              <a:t>マグダ: 腕は折れ とても痛かったです...</a:t>
             </a:r>
           </a:p>
           <a:p/>
@@ -10461,7 +10461,7 @@
         </p:nvSpPr>
         <p:spPr>
           <a:xfrm>
-            <a:off x="1712976" y="4064000"/>
+            <a:off x="1712976" y="1270000"/>
             <a:ext cx="7112000" cy="1993900"/>
           </a:xfrm>
           <a:prstGeom prst="rect">
@@ -10496,7 +10496,7 @@
         </p:nvSpPr>
         <p:spPr>
           <a:xfrm>
-            <a:off x="1712976" y="7315200"/>
+            <a:off x="1712976" y="4572000"/>
             <a:ext cx="8763000" cy="1993900"/>
           </a:xfrm>
           <a:prstGeom prst="rect">
@@ -10557,7 +10557,7 @@
         </p:nvSpPr>
         <p:spPr>
           <a:xfrm>
-            <a:off x="1712976" y="4064000"/>
+            <a:off x="1712976" y="1270000"/>
             <a:ext cx="7112000" cy="1993900"/>
           </a:xfrm>
           <a:prstGeom prst="rect">
@@ -10592,7 +10592,7 @@
         </p:nvSpPr>
         <p:spPr>
           <a:xfrm>
-            <a:off x="1712976" y="7315200"/>
+            <a:off x="1712976" y="4572000"/>
             <a:ext cx="8763000" cy="1993900"/>
           </a:xfrm>
           <a:prstGeom prst="rect">
@@ -10613,7 +10613,7 @@
                 </a:solidFill>
                 <a:latin typeface="MS Mincho"/>
               </a:rPr>
-              <a:t>マグダ: また、子供達が邪魔なので施設に入れる、とも...</a:t>
+              <a:t>マグダ: 「子供達が邪魔なので施設に入れる」とも...</a:t>
             </a:r>
           </a:p>
           <a:p/>
@@ -10653,7 +10653,7 @@
         </p:nvSpPr>
         <p:spPr>
           <a:xfrm>
-            <a:off x="1712976" y="4064000"/>
+            <a:off x="1712976" y="1270000"/>
             <a:ext cx="7112000" cy="1993900"/>
           </a:xfrm>
           <a:prstGeom prst="rect">
@@ -10688,7 +10688,7 @@
         </p:nvSpPr>
         <p:spPr>
           <a:xfrm>
-            <a:off x="1712976" y="7315200"/>
+            <a:off x="1712976" y="4572000"/>
             <a:ext cx="8763000" cy="1993900"/>
           </a:xfrm>
           <a:prstGeom prst="rect">
@@ -10749,7 +10749,7 @@
         </p:nvSpPr>
         <p:spPr>
           <a:xfrm>
-            <a:off x="1712976" y="4064000"/>
+            <a:off x="1712976" y="1270000"/>
             <a:ext cx="7112000" cy="1993900"/>
           </a:xfrm>
           <a:prstGeom prst="rect">
@@ -10784,7 +10784,7 @@
         </p:nvSpPr>
         <p:spPr>
           <a:xfrm>
-            <a:off x="1712976" y="7315200"/>
+            <a:off x="1712976" y="4572000"/>
             <a:ext cx="8763000" cy="1993900"/>
           </a:xfrm>
           <a:prstGeom prst="rect">
@@ -10845,7 +10845,7 @@
         </p:nvSpPr>
         <p:spPr>
           <a:xfrm>
-            <a:off x="1712976" y="4064000"/>
+            <a:off x="1712976" y="1270000"/>
             <a:ext cx="7112000" cy="1993900"/>
           </a:xfrm>
           <a:prstGeom prst="rect">
@@ -10880,7 +10880,7 @@
         </p:nvSpPr>
         <p:spPr>
           <a:xfrm>
-            <a:off x="1712976" y="7315200"/>
+            <a:off x="1712976" y="4572000"/>
             <a:ext cx="8763000" cy="1993900"/>
           </a:xfrm>
           <a:prstGeom prst="rect">
@@ -10901,7 +10901,7 @@
                 </a:solidFill>
                 <a:latin typeface="MS Mincho"/>
               </a:rPr>
-              <a:t>マグダ: 子供達と私が夫の邪魔をしている、騒々しくて、</a:t>
+              <a:t>マグダ: 子供達と私が夫の邪魔をしていると言っており</a:t>
             </a:r>
           </a:p>
           <a:p/>
@@ -10941,7 +10941,7 @@
         </p:nvSpPr>
         <p:spPr>
           <a:xfrm>
-            <a:off x="1712976" y="4064000"/>
+            <a:off x="1712976" y="1270000"/>
             <a:ext cx="7112000" cy="1993900"/>
           </a:xfrm>
           <a:prstGeom prst="rect">
@@ -10962,7 +10962,7 @@
                 </a:solidFill>
                 <a:latin typeface="Times New Roman"/>
               </a:rPr>
-              <a:t>que hacemos mucho ruido y que no le dejamos oír el partido.</a:t>
+              <a:t>MAGDA. - que hacemos mucho ruido y que no le dejamos oír el partido.</a:t>
             </a:r>
           </a:p>
           <a:p/>
@@ -10976,7 +10976,7 @@
         </p:nvSpPr>
         <p:spPr>
           <a:xfrm>
-            <a:off x="1712976" y="7315200"/>
+            <a:off x="1712976" y="4572000"/>
             <a:ext cx="8763000" cy="1993900"/>
           </a:xfrm>
           <a:prstGeom prst="rect">
@@ -11037,7 +11037,7 @@
         </p:nvSpPr>
         <p:spPr>
           <a:xfrm>
-            <a:off x="1712976" y="4064000"/>
+            <a:off x="1712976" y="1270000"/>
             <a:ext cx="7112000" cy="1993900"/>
           </a:xfrm>
           <a:prstGeom prst="rect">
@@ -11072,7 +11072,7 @@
         </p:nvSpPr>
         <p:spPr>
           <a:xfrm>
-            <a:off x="1712976" y="7315200"/>
+            <a:off x="1712976" y="4572000"/>
             <a:ext cx="8763000" cy="1993900"/>
           </a:xfrm>
           <a:prstGeom prst="rect">
@@ -11093,7 +11093,7 @@
                 </a:solidFill>
                 <a:latin typeface="MS Mincho"/>
               </a:rPr>
-              <a:t>警部: で、それは本当なのですか？</a:t>
+              <a:t>警部: それは本当なのですか？</a:t>
             </a:r>
           </a:p>
           <a:p/>
@@ -11133,7 +11133,7 @@
         </p:nvSpPr>
         <p:spPr>
           <a:xfrm>
-            <a:off x="1712976" y="4064000"/>
+            <a:off x="1712976" y="1270000"/>
             <a:ext cx="7112000" cy="1993900"/>
           </a:xfrm>
           <a:prstGeom prst="rect">
@@ -11168,7 +11168,7 @@
         </p:nvSpPr>
         <p:spPr>
           <a:xfrm>
-            <a:off x="1712976" y="7315200"/>
+            <a:off x="1712976" y="4572000"/>
             <a:ext cx="8763000" cy="1993900"/>
           </a:xfrm>
           <a:prstGeom prst="rect">
@@ -11229,7 +11229,7 @@
         </p:nvSpPr>
         <p:spPr>
           <a:xfrm>
-            <a:off x="1712976" y="4064000"/>
+            <a:off x="1712976" y="1270000"/>
             <a:ext cx="7112000" cy="1993900"/>
           </a:xfrm>
           <a:prstGeom prst="rect">
@@ -11264,7 +11264,7 @@
         </p:nvSpPr>
         <p:spPr>
           <a:xfrm>
-            <a:off x="1712976" y="7315200"/>
+            <a:off x="1712976" y="4572000"/>
             <a:ext cx="8763000" cy="1993900"/>
           </a:xfrm>
           <a:prstGeom prst="rect">
@@ -11325,7 +11325,7 @@
         </p:nvSpPr>
         <p:spPr>
           <a:xfrm>
-            <a:off x="1712976" y="4064000"/>
+            <a:off x="1712976" y="1270000"/>
             <a:ext cx="7112000" cy="1993900"/>
           </a:xfrm>
           <a:prstGeom prst="rect">
@@ -11360,7 +11360,7 @@
         </p:nvSpPr>
         <p:spPr>
           <a:xfrm>
-            <a:off x="1712976" y="7315200"/>
+            <a:off x="1712976" y="4572000"/>
             <a:ext cx="8763000" cy="1993900"/>
           </a:xfrm>
           <a:prstGeom prst="rect">
@@ -11381,7 +11381,7 @@
                 </a:solidFill>
                 <a:latin typeface="MS Mincho"/>
               </a:rPr>
-              <a:t>マグダ: 子供達はまだ小さく、騒いでいても私は何もできません...</a:t>
+              <a:t>マグダ: 子供達はまだ小さいので騒いでいても仕方がありません...</a:t>
             </a:r>
           </a:p>
           <a:p/>
@@ -11421,7 +11421,7 @@
         </p:nvSpPr>
         <p:spPr>
           <a:xfrm>
-            <a:off x="1712976" y="4064000"/>
+            <a:off x="1712976" y="1270000"/>
             <a:ext cx="7112000" cy="1993900"/>
           </a:xfrm>
           <a:prstGeom prst="rect">
@@ -11456,7 +11456,7 @@
         </p:nvSpPr>
         <p:spPr>
           <a:xfrm>
-            <a:off x="1712976" y="7315200"/>
+            <a:off x="1712976" y="4572000"/>
             <a:ext cx="8763000" cy="1993900"/>
           </a:xfrm>
           <a:prstGeom prst="rect">
@@ -11477,7 +11477,7 @@
                 </a:solidFill>
                 <a:latin typeface="MS Mincho"/>
               </a:rPr>
-              <a:t>警部: それでもあなたは告訴したいのですか！</a:t>
+              <a:t>警部: それでもあなたは告訴したいのですか!</a:t>
             </a:r>
           </a:p>
           <a:p/>
@@ -11517,7 +11517,7 @@
         </p:nvSpPr>
         <p:spPr>
           <a:xfrm>
-            <a:off x="1712976" y="4064000"/>
+            <a:off x="1712976" y="1270000"/>
             <a:ext cx="7112000" cy="1993900"/>
           </a:xfrm>
           <a:prstGeom prst="rect">
@@ -11538,7 +11538,7 @@
                 </a:solidFill>
                 <a:latin typeface="Times New Roman"/>
               </a:rPr>
-              <a:t>Un pobre hombre, cansado de trabajar, que regresa a su casa</a:t>
+              <a:t>INSPECTOR. - Un pobre hombre, cansado de trabajar, que regresa a su casa</a:t>
             </a:r>
           </a:p>
           <a:p/>
@@ -11552,7 +11552,7 @@
         </p:nvSpPr>
         <p:spPr>
           <a:xfrm>
-            <a:off x="1712976" y="7315200"/>
+            <a:off x="1712976" y="4572000"/>
             <a:ext cx="8763000" cy="1993900"/>
           </a:xfrm>
           <a:prstGeom prst="rect">
@@ -11573,7 +11573,7 @@
                 </a:solidFill>
                 <a:latin typeface="MS Mincho"/>
               </a:rPr>
-              <a:t>警部: かわいそうな男だ！仕事で疲れて</a:t>
+              <a:t>警部: かわいそうな男だ!仕事で疲れて</a:t>
             </a:r>
           </a:p>
           <a:p/>
@@ -11613,7 +11613,7 @@
         </p:nvSpPr>
         <p:spPr>
           <a:xfrm>
-            <a:off x="1712976" y="4064000"/>
+            <a:off x="1712976" y="1270000"/>
             <a:ext cx="7112000" cy="1993900"/>
           </a:xfrm>
           <a:prstGeom prst="rect">
@@ -11648,7 +11648,7 @@
         </p:nvSpPr>
         <p:spPr>
           <a:xfrm>
-            <a:off x="1712976" y="7315200"/>
+            <a:off x="1712976" y="4572000"/>
             <a:ext cx="8763000" cy="1993900"/>
           </a:xfrm>
           <a:prstGeom prst="rect">
@@ -11709,7 +11709,7 @@
         </p:nvSpPr>
         <p:spPr>
           <a:xfrm>
-            <a:off x="1712976" y="4064000"/>
+            <a:off x="1712976" y="1270000"/>
             <a:ext cx="7112000" cy="1993900"/>
           </a:xfrm>
           <a:prstGeom prst="rect">
@@ -11744,7 +11744,7 @@
         </p:nvSpPr>
         <p:spPr>
           <a:xfrm>
-            <a:off x="1712976" y="7315200"/>
+            <a:off x="1712976" y="4572000"/>
             <a:ext cx="8763000" cy="1993900"/>
           </a:xfrm>
           <a:prstGeom prst="rect">
@@ -11765,7 +11765,7 @@
                 </a:solidFill>
                 <a:latin typeface="MS Mincho"/>
               </a:rPr>
-              <a:t>警部: しかも決勝戦、相手はマドリード、ホームグラウンドで！</a:t>
+              <a:t>警部: しかも決勝戦! マドリード相手にホームグラウンドで!</a:t>
             </a:r>
           </a:p>
           <a:p/>
@@ -11805,7 +11805,7 @@
         </p:nvSpPr>
         <p:spPr>
           <a:xfrm>
-            <a:off x="1712976" y="4064000"/>
+            <a:off x="1712976" y="1270000"/>
             <a:ext cx="7112000" cy="1993900"/>
           </a:xfrm>
           <a:prstGeom prst="rect">
@@ -11840,7 +11840,7 @@
         </p:nvSpPr>
         <p:spPr>
           <a:xfrm>
-            <a:off x="1712976" y="7315200"/>
+            <a:off x="1712976" y="4572000"/>
             <a:ext cx="8763000" cy="1993900"/>
           </a:xfrm>
           <a:prstGeom prst="rect">
@@ -11861,7 +11861,7 @@
                 </a:solidFill>
                 <a:latin typeface="MS Mincho"/>
               </a:rPr>
-              <a:t>警部: それなのに、泣き虫の妻とやかましい子供達がいて、</a:t>
+              <a:t>警部: それなのに 泣き虫の妻とやかましい子供達がいて </a:t>
             </a:r>
           </a:p>
           <a:p/>
@@ -11901,7 +11901,7 @@
         </p:nvSpPr>
         <p:spPr>
           <a:xfrm>
-            <a:off x="1712976" y="4064000"/>
+            <a:off x="1712976" y="1270000"/>
             <a:ext cx="7112000" cy="1993900"/>
           </a:xfrm>
           <a:prstGeom prst="rect">
@@ -11922,7 +11922,7 @@
                 </a:solidFill>
                 <a:latin typeface="Times New Roman"/>
               </a:rPr>
-              <a:t>y unos niños gritones que no le dejan oír con tranquilidad...</a:t>
+              <a:t>INSPECTOR. - y unos niños gritones que no le dejan oír con tranquilidad...</a:t>
             </a:r>
           </a:p>
           <a:p/>
@@ -11936,7 +11936,7 @@
         </p:nvSpPr>
         <p:spPr>
           <a:xfrm>
-            <a:off x="1712976" y="7315200"/>
+            <a:off x="1712976" y="4572000"/>
             <a:ext cx="8763000" cy="1993900"/>
           </a:xfrm>
           <a:prstGeom prst="rect">
@@ -11957,7 +11957,7 @@
                 </a:solidFill>
                 <a:latin typeface="MS Mincho"/>
               </a:rPr>
-              <a:t>警部: 落ち着いて試合を聞かせてもらえない⋯⋯！</a:t>
+              <a:t>警部: 落ち着いて試合を聞かせてもらえない⋯⋯!</a:t>
             </a:r>
           </a:p>
           <a:p/>
@@ -11997,7 +11997,7 @@
         </p:nvSpPr>
         <p:spPr>
           <a:xfrm>
-            <a:off x="1712976" y="4064000"/>
+            <a:off x="1712976" y="1270000"/>
             <a:ext cx="7112000" cy="1993900"/>
           </a:xfrm>
           <a:prstGeom prst="rect">
@@ -12032,7 +12032,7 @@
         </p:nvSpPr>
         <p:spPr>
           <a:xfrm>
-            <a:off x="1712976" y="7315200"/>
+            <a:off x="1712976" y="4572000"/>
             <a:ext cx="8763000" cy="1993900"/>
           </a:xfrm>
           <a:prstGeom prst="rect">
@@ -12053,7 +12053,7 @@
                 </a:solidFill>
                 <a:latin typeface="MS Mincho"/>
               </a:rPr>
-              <a:t>警部: それはもう、皆殺しするに値する！ご主人はあなたに何もしていないに等しい！</a:t>
+              <a:t>警部: それはもう 皆殺しするに値する!ご主人はあなたに何もしていないに等しい!</a:t>
             </a:r>
           </a:p>
           <a:p/>
@@ -12093,7 +12093,7 @@
         </p:nvSpPr>
         <p:spPr>
           <a:xfrm>
-            <a:off x="1712976" y="4064000"/>
+            <a:off x="1712976" y="1270000"/>
             <a:ext cx="7112000" cy="1993900"/>
           </a:xfrm>
           <a:prstGeom prst="rect">
@@ -12128,7 +12128,7 @@
         </p:nvSpPr>
         <p:spPr>
           <a:xfrm>
-            <a:off x="1712976" y="7315200"/>
+            <a:off x="1712976" y="4572000"/>
             <a:ext cx="8763000" cy="1993900"/>
           </a:xfrm>
           <a:prstGeom prst="rect">
@@ -12149,7 +12149,7 @@
                 </a:solidFill>
                 <a:latin typeface="MS Mincho"/>
               </a:rPr>
-              <a:t>警部補: 警部！レケホ銀行に強盗が入りました！</a:t>
+              <a:t>警部補: 警部!レケホ銀行に強盗が入りました!</a:t>
             </a:r>
           </a:p>
           <a:p/>
@@ -12189,7 +12189,7 @@
         </p:nvSpPr>
         <p:spPr>
           <a:xfrm>
-            <a:off x="1712976" y="4064000"/>
+            <a:off x="1712976" y="1270000"/>
             <a:ext cx="7112000" cy="1993900"/>
           </a:xfrm>
           <a:prstGeom prst="rect">
@@ -12224,7 +12224,7 @@
         </p:nvSpPr>
         <p:spPr>
           <a:xfrm>
-            <a:off x="1712976" y="7315200"/>
+            <a:off x="1712976" y="4572000"/>
             <a:ext cx="8763000" cy="1993900"/>
           </a:xfrm>
           <a:prstGeom prst="rect">
@@ -12245,7 +12245,7 @@
                 </a:solidFill>
                 <a:latin typeface="MS Mincho"/>
               </a:rPr>
-              <a:t>警部補: この建物です！強盗が中にいます！</a:t>
+              <a:t>警部補: この建物です!強盗が中にいます!</a:t>
             </a:r>
           </a:p>
           <a:p/>
@@ -12285,7 +12285,7 @@
         </p:nvSpPr>
         <p:spPr>
           <a:xfrm>
-            <a:off x="1712976" y="4064000"/>
+            <a:off x="1712976" y="1270000"/>
             <a:ext cx="7112000" cy="1993900"/>
           </a:xfrm>
           <a:prstGeom prst="rect">
@@ -12320,7 +12320,7 @@
         </p:nvSpPr>
         <p:spPr>
           <a:xfrm>
-            <a:off x="1712976" y="7315200"/>
+            <a:off x="1712976" y="4572000"/>
             <a:ext cx="8763000" cy="1993900"/>
           </a:xfrm>
           <a:prstGeom prst="rect">
@@ -12381,7 +12381,7 @@
         </p:nvSpPr>
         <p:spPr>
           <a:xfrm>
-            <a:off x="1712976" y="4064000"/>
+            <a:off x="1712976" y="1270000"/>
             <a:ext cx="7112000" cy="1993900"/>
           </a:xfrm>
           <a:prstGeom prst="rect">
@@ -12416,7 +12416,7 @@
         </p:nvSpPr>
         <p:spPr>
           <a:xfrm>
-            <a:off x="1712976" y="7315200"/>
+            <a:off x="1712976" y="4572000"/>
             <a:ext cx="8763000" cy="1993900"/>
           </a:xfrm>
           <a:prstGeom prst="rect">
@@ -12437,7 +12437,7 @@
                 </a:solidFill>
                 <a:latin typeface="MS Mincho"/>
               </a:rPr>
-              <a:t>警部補: 会計係を負傷させて、人質を20人とっています⋯⋯</a:t>
+              <a:t>警部補: 会計係を負傷させて 人質を20人とっています⋯⋯</a:t>
             </a:r>
           </a:p>
           <a:p/>
@@ -12477,7 +12477,7 @@
         </p:nvSpPr>
         <p:spPr>
           <a:xfrm>
-            <a:off x="1712976" y="4064000"/>
+            <a:off x="1712976" y="1270000"/>
             <a:ext cx="7112000" cy="1993900"/>
           </a:xfrm>
           <a:prstGeom prst="rect">
@@ -12512,7 +12512,7 @@
         </p:nvSpPr>
         <p:spPr>
           <a:xfrm>
-            <a:off x="1712976" y="7315200"/>
+            <a:off x="1712976" y="4572000"/>
             <a:ext cx="8763000" cy="1993900"/>
           </a:xfrm>
           <a:prstGeom prst="rect">
@@ -12533,7 +12533,7 @@
                 </a:solidFill>
                 <a:latin typeface="MS Mincho"/>
               </a:rPr>
-              <a:t>警部: なんてことだ！</a:t>
+              <a:t>警部: なんてことだ!</a:t>
             </a:r>
           </a:p>
           <a:p/>
@@ -12573,7 +12573,7 @@
         </p:nvSpPr>
         <p:spPr>
           <a:xfrm>
-            <a:off x="1712976" y="4064000"/>
+            <a:off x="1712976" y="1270000"/>
             <a:ext cx="7112000" cy="1993900"/>
           </a:xfrm>
           <a:prstGeom prst="rect">
@@ -12608,7 +12608,7 @@
         </p:nvSpPr>
         <p:spPr>
           <a:xfrm>
-            <a:off x="1712976" y="7315200"/>
+            <a:off x="1712976" y="4572000"/>
             <a:ext cx="8763000" cy="1993900"/>
           </a:xfrm>
           <a:prstGeom prst="rect">
@@ -12629,7 +12629,7 @@
                 </a:solidFill>
                 <a:latin typeface="MS Mincho"/>
               </a:rPr>
-              <a:t>警部: テロリスト、マフィア、エタの協力者、こそ泥、こんちくしょうだ！</a:t>
+              <a:t>警部: テロリスト マフィア エタの協力者 こそ泥 こんちくしょうだ!</a:t>
             </a:r>
           </a:p>
           <a:p/>
@@ -12669,7 +12669,7 @@
         </p:nvSpPr>
         <p:spPr>
           <a:xfrm>
-            <a:off x="1712976" y="4064000"/>
+            <a:off x="1712976" y="1270000"/>
             <a:ext cx="7112000" cy="1993900"/>
           </a:xfrm>
           <a:prstGeom prst="rect">
@@ -12704,7 +12704,7 @@
         </p:nvSpPr>
         <p:spPr>
           <a:xfrm>
-            <a:off x="1712976" y="7315200"/>
+            <a:off x="1712976" y="4572000"/>
             <a:ext cx="8763000" cy="1993900"/>
           </a:xfrm>
           <a:prstGeom prst="rect">
@@ -12725,7 +12725,7 @@
                 </a:solidFill>
                 <a:latin typeface="MS Mincho"/>
               </a:rPr>
-              <a:t>警部: 出動させろ、皆だ！ 平の隊員 警部 警部補 警察官 全員だ！</a:t>
+              <a:t>警部: 出動させろ 皆だ! 平の隊員 警部 警部補 警察官 全員だ!</a:t>
             </a:r>
           </a:p>
           <a:p/>
@@ -12765,7 +12765,7 @@
         </p:nvSpPr>
         <p:spPr>
           <a:xfrm>
-            <a:off x="1712976" y="4064000"/>
+            <a:off x="1712976" y="1270000"/>
             <a:ext cx="7112000" cy="1993900"/>
           </a:xfrm>
           <a:prstGeom prst="rect">
@@ -12800,7 +12800,7 @@
         </p:nvSpPr>
         <p:spPr>
           <a:xfrm>
-            <a:off x="1712976" y="7315200"/>
+            <a:off x="1712976" y="4572000"/>
             <a:ext cx="8763000" cy="1993900"/>
           </a:xfrm>
           <a:prstGeom prst="rect">
@@ -12821,7 +12821,7 @@
                 </a:solidFill>
                 <a:latin typeface="MS Mincho"/>
               </a:rPr>
-              <a:t>警部補: 平隊員は2名のみで、警察署で警備に当たっています</a:t>
+              <a:t>警部補: 平隊員は2名のみで 警察署で警備に当たっています</a:t>
             </a:r>
           </a:p>
           <a:p/>
@@ -12861,7 +12861,7 @@
         </p:nvSpPr>
         <p:spPr>
           <a:xfrm>
-            <a:off x="1712976" y="4064000"/>
+            <a:off x="1712976" y="1270000"/>
             <a:ext cx="7112000" cy="1993900"/>
           </a:xfrm>
           <a:prstGeom prst="rect">
@@ -12896,7 +12896,7 @@
         </p:nvSpPr>
         <p:spPr>
           <a:xfrm>
-            <a:off x="1712976" y="7315200"/>
+            <a:off x="1712976" y="4572000"/>
             <a:ext cx="8763000" cy="1993900"/>
           </a:xfrm>
           <a:prstGeom prst="rect">
@@ -12917,7 +12917,7 @@
                 </a:solidFill>
                 <a:latin typeface="MS Mincho"/>
               </a:rPr>
-              <a:t>警部: なら ほとんど仕事をしていない特殊作戦部隊を呼ぶんだ！</a:t>
+              <a:t>警部: なら ほとんど仕事をしていない特殊作戦部隊を呼ぶんだ!</a:t>
             </a:r>
           </a:p>
           <a:p/>
@@ -12957,7 +12957,7 @@
         </p:nvSpPr>
         <p:spPr>
           <a:xfrm>
-            <a:off x="1712976" y="4064000"/>
+            <a:off x="1712976" y="1270000"/>
             <a:ext cx="7112000" cy="1993900"/>
           </a:xfrm>
           <a:prstGeom prst="rect">
@@ -12992,7 +12992,7 @@
         </p:nvSpPr>
         <p:spPr>
           <a:xfrm>
-            <a:off x="1712976" y="7315200"/>
+            <a:off x="1712976" y="4572000"/>
             <a:ext cx="8763000" cy="1993900"/>
           </a:xfrm>
           <a:prstGeom prst="rect">
@@ -13013,7 +13013,7 @@
                 </a:solidFill>
                 <a:latin typeface="MS Mincho"/>
               </a:rPr>
-              <a:t>警部: あいつらが受け取っている特別報酬分の仕事をしてもらおうじゃないか！</a:t>
+              <a:t>警部: あいつらが受け取っている特別報酬分の仕事をしてもらおうじゃないか!</a:t>
             </a:r>
           </a:p>
           <a:p/>
@@ -13053,7 +13053,7 @@
         </p:nvSpPr>
         <p:spPr>
           <a:xfrm>
-            <a:off x="1712976" y="4064000"/>
+            <a:off x="1712976" y="1270000"/>
             <a:ext cx="7112000" cy="1993900"/>
           </a:xfrm>
           <a:prstGeom prst="rect">
@@ -13088,7 +13088,7 @@
         </p:nvSpPr>
         <p:spPr>
           <a:xfrm>
-            <a:off x="1712976" y="7315200"/>
+            <a:off x="1712976" y="4572000"/>
             <a:ext cx="8763000" cy="1993900"/>
           </a:xfrm>
           <a:prstGeom prst="rect">
@@ -13109,7 +13109,7 @@
                 </a:solidFill>
                 <a:latin typeface="MS Mincho"/>
               </a:rPr>
-              <a:t>警部: そして俺はここで、仕事で疲労困憊して、一人きりで、助けもなく、残業代もなしだ！</a:t>
+              <a:t>警部: そして俺はここで 仕事で疲労困憊して 一人きりで 助けもなく 残業代もなしだ!</a:t>
             </a:r>
           </a:p>
           <a:p/>
@@ -13149,7 +13149,7 @@
         </p:nvSpPr>
         <p:spPr>
           <a:xfrm>
-            <a:off x="1712976" y="4064000"/>
+            <a:off x="1712976" y="1270000"/>
             <a:ext cx="7112000" cy="1993900"/>
           </a:xfrm>
           <a:prstGeom prst="rect">
@@ -13184,7 +13184,7 @@
         </p:nvSpPr>
         <p:spPr>
           <a:xfrm>
-            <a:off x="1712976" y="7315200"/>
+            <a:off x="1712976" y="4572000"/>
             <a:ext cx="8763000" cy="1993900"/>
           </a:xfrm>
           <a:prstGeom prst="rect">
@@ -13245,7 +13245,7 @@
         </p:nvSpPr>
         <p:spPr>
           <a:xfrm>
-            <a:off x="1712976" y="4064000"/>
+            <a:off x="1712976" y="1270000"/>
             <a:ext cx="7112000" cy="1993900"/>
           </a:xfrm>
           <a:prstGeom prst="rect">
@@ -13280,7 +13280,7 @@
         </p:nvSpPr>
         <p:spPr>
           <a:xfrm>
-            <a:off x="1712976" y="7315200"/>
+            <a:off x="1712976" y="4572000"/>
             <a:ext cx="8763000" cy="1993900"/>
           </a:xfrm>
           <a:prstGeom prst="rect">
@@ -13301,7 +13301,7 @@
                 </a:solidFill>
                 <a:latin typeface="MS Mincho"/>
               </a:rPr>
-              <a:t>警部: なんということだ！まだここにいるのですか？</a:t>
+              <a:t>警部: なんということだ!まだここにいるのですか？</a:t>
             </a:r>
           </a:p>
           <a:p/>
@@ -13341,7 +13341,7 @@
         </p:nvSpPr>
         <p:spPr>
           <a:xfrm>
-            <a:off x="1712976" y="4064000"/>
+            <a:off x="1712976" y="1270000"/>
             <a:ext cx="7112000" cy="1993900"/>
           </a:xfrm>
           <a:prstGeom prst="rect">
@@ -13376,7 +13376,7 @@
         </p:nvSpPr>
         <p:spPr>
           <a:xfrm>
-            <a:off x="1712976" y="7315200"/>
+            <a:off x="1712976" y="4572000"/>
             <a:ext cx="8763000" cy="1993900"/>
           </a:xfrm>
           <a:prstGeom prst="rect">
@@ -13397,7 +13397,7 @@
                 </a:solidFill>
                 <a:latin typeface="MS Mincho"/>
               </a:rPr>
-              <a:t>マグダ: その、あの警官に、中に入るようにと...</a:t>
+              <a:t>マグダ: その...あの警官に...中に入るようにと...</a:t>
             </a:r>
           </a:p>
           <a:p/>
@@ -13437,7 +13437,7 @@
         </p:nvSpPr>
         <p:spPr>
           <a:xfrm>
-            <a:off x="1712976" y="4064000"/>
+            <a:off x="1712976" y="1270000"/>
             <a:ext cx="7112000" cy="1993900"/>
           </a:xfrm>
           <a:prstGeom prst="rect">
@@ -13472,7 +13472,7 @@
         </p:nvSpPr>
         <p:spPr>
           <a:xfrm>
-            <a:off x="1712976" y="7315200"/>
+            <a:off x="1712976" y="4572000"/>
             <a:ext cx="8763000" cy="1993900"/>
           </a:xfrm>
           <a:prstGeom prst="rect">
@@ -13533,7 +13533,7 @@
         </p:nvSpPr>
         <p:spPr>
           <a:xfrm>
-            <a:off x="1712976" y="4064000"/>
+            <a:off x="1712976" y="1270000"/>
             <a:ext cx="7112000" cy="1993900"/>
           </a:xfrm>
           <a:prstGeom prst="rect">
@@ -13568,7 +13568,7 @@
         </p:nvSpPr>
         <p:spPr>
           <a:xfrm>
-            <a:off x="1712976" y="7315200"/>
+            <a:off x="1712976" y="4572000"/>
             <a:ext cx="8763000" cy="1993900"/>
           </a:xfrm>
           <a:prstGeom prst="rect">
@@ -13589,7 +13589,7 @@
                 </a:solidFill>
                 <a:latin typeface="MS Mincho"/>
               </a:rPr>
-              <a:t>警部: 祖国の危機の最中に、あなたは平手打ちと呼べなくもない理由に泣いている！</a:t>
+              <a:t>警部: 祖国の危機の最中に あなたは平手打ちと呼べなくもない理由に泣いている!</a:t>
             </a:r>
           </a:p>
           <a:p/>
@@ -13629,7 +13629,7 @@
         </p:nvSpPr>
         <p:spPr>
           <a:xfrm>
-            <a:off x="1712976" y="4064000"/>
+            <a:off x="1712976" y="1270000"/>
             <a:ext cx="7112000" cy="1993900"/>
           </a:xfrm>
           <a:prstGeom prst="rect">
@@ -13664,7 +13664,7 @@
         </p:nvSpPr>
         <p:spPr>
           <a:xfrm>
-            <a:off x="1712976" y="7315200"/>
+            <a:off x="1712976" y="4572000"/>
             <a:ext cx="8763000" cy="1993900"/>
           </a:xfrm>
           <a:prstGeom prst="rect">
@@ -13685,7 +13685,7 @@
                 </a:solidFill>
                 <a:latin typeface="MS Mincho"/>
               </a:rPr>
-              <a:t>警部: 私たちはあなたのため 奴らのために命の危険を冒し、</a:t>
+              <a:t>警部: 私たちはあなたのため 奴らのために命の危険を冒し </a:t>
             </a:r>
           </a:p>
           <a:p/>
@@ -13725,7 +13725,7 @@
         </p:nvSpPr>
         <p:spPr>
           <a:xfrm>
-            <a:off x="1712976" y="4064000"/>
+            <a:off x="1712976" y="1270000"/>
             <a:ext cx="7112000" cy="1993900"/>
           </a:xfrm>
           <a:prstGeom prst="rect">
@@ -13760,7 +13760,7 @@
         </p:nvSpPr>
         <p:spPr>
           <a:xfrm>
-            <a:off x="1712976" y="7315200"/>
+            <a:off x="1712976" y="4572000"/>
             <a:ext cx="8763000" cy="1993900"/>
           </a:xfrm>
           <a:prstGeom prst="rect">
@@ -13821,7 +13821,7 @@
         </p:nvSpPr>
         <p:spPr>
           <a:xfrm>
-            <a:off x="1712976" y="4064000"/>
+            <a:off x="1712976" y="1270000"/>
             <a:ext cx="7112000" cy="1993900"/>
           </a:xfrm>
           <a:prstGeom prst="rect">
@@ -13856,7 +13856,7 @@
         </p:nvSpPr>
         <p:spPr>
           <a:xfrm>
-            <a:off x="1712976" y="7315200"/>
+            <a:off x="1712976" y="4572000"/>
             <a:ext cx="8763000" cy="1993900"/>
           </a:xfrm>
           <a:prstGeom prst="rect">
@@ -13917,7 +13917,7 @@
         </p:nvSpPr>
         <p:spPr>
           <a:xfrm>
-            <a:off x="1712976" y="4064000"/>
+            <a:off x="1712976" y="1270000"/>
             <a:ext cx="7112000" cy="1993900"/>
           </a:xfrm>
           <a:prstGeom prst="rect">
@@ -13952,7 +13952,7 @@
         </p:nvSpPr>
         <p:spPr>
           <a:xfrm>
-            <a:off x="1712976" y="7315200"/>
+            <a:off x="1712976" y="4572000"/>
             <a:ext cx="8763000" cy="1993900"/>
           </a:xfrm>
           <a:prstGeom prst="rect">
@@ -13973,7 +13973,7 @@
                 </a:solidFill>
                 <a:latin typeface="MS Mincho"/>
               </a:rPr>
-              <a:t>警部: とっとと出てってください！今回は許してあげますから！</a:t>
+              <a:t>警部: とっとと出てってください!今回は許してあげますから!</a:t>
             </a:r>
           </a:p>
           <a:p/>
@@ -14013,7 +14013,7 @@
         </p:nvSpPr>
         <p:spPr>
           <a:xfrm>
-            <a:off x="1712976" y="4064000"/>
+            <a:off x="1712976" y="1270000"/>
             <a:ext cx="7112000" cy="1993900"/>
           </a:xfrm>
           <a:prstGeom prst="rect">
@@ -14048,7 +14048,7 @@
         </p:nvSpPr>
         <p:spPr>
           <a:xfrm>
-            <a:off x="1712976" y="7315200"/>
+            <a:off x="1712976" y="4572000"/>
             <a:ext cx="8763000" cy="1993900"/>
           </a:xfrm>
           <a:prstGeom prst="rect">
@@ -14069,7 +14069,7 @@
                 </a:solidFill>
                 <a:latin typeface="MS Mincho"/>
               </a:rPr>
-              <a:t>警部: もう繰り返さないように！</a:t>
+              <a:t>警部: もう繰り返さないように!</a:t>
             </a:r>
           </a:p>
           <a:p/>
@@ -14109,7 +14109,7 @@
         </p:nvSpPr>
         <p:spPr>
           <a:xfrm>
-            <a:off x="1712976" y="4064000"/>
+            <a:off x="1712976" y="1270000"/>
             <a:ext cx="7112000" cy="1993900"/>
           </a:xfrm>
           <a:prstGeom prst="rect">
@@ -14144,7 +14144,7 @@
         </p:nvSpPr>
         <p:spPr>
           <a:xfrm>
-            <a:off x="1712976" y="7315200"/>
+            <a:off x="1712976" y="4572000"/>
             <a:ext cx="8763000" cy="1993900"/>
           </a:xfrm>
           <a:prstGeom prst="rect">
@@ -14205,7 +14205,7 @@
         </p:nvSpPr>
         <p:spPr>
           <a:xfrm>
-            <a:off x="1712976" y="4064000"/>
+            <a:off x="1712976" y="1270000"/>
             <a:ext cx="7112000" cy="1993900"/>
           </a:xfrm>
           <a:prstGeom prst="rect">
@@ -14240,7 +14240,7 @@
         </p:nvSpPr>
         <p:spPr>
           <a:xfrm>
-            <a:off x="1712976" y="7315200"/>
+            <a:off x="1712976" y="4572000"/>
             <a:ext cx="8763000" cy="1993900"/>
           </a:xfrm>
           <a:prstGeom prst="rect">
@@ -14301,7 +14301,7 @@
         </p:nvSpPr>
         <p:spPr>
           <a:xfrm>
-            <a:off x="1712976" y="4064000"/>
+            <a:off x="1712976" y="1270000"/>
             <a:ext cx="7112000" cy="1993900"/>
           </a:xfrm>
           <a:prstGeom prst="rect">
@@ -14336,7 +14336,7 @@
         </p:nvSpPr>
         <p:spPr>
           <a:xfrm>
-            <a:off x="1712976" y="7315200"/>
+            <a:off x="1712976" y="4572000"/>
             <a:ext cx="8763000" cy="1993900"/>
           </a:xfrm>
           <a:prstGeom prst="rect">
@@ -14397,7 +14397,7 @@
         </p:nvSpPr>
         <p:spPr>
           <a:xfrm>
-            <a:off x="1712976" y="4064000"/>
+            <a:off x="1712976" y="1270000"/>
             <a:ext cx="7112000" cy="1993900"/>
           </a:xfrm>
           <a:prstGeom prst="rect">
@@ -14432,7 +14432,7 @@
         </p:nvSpPr>
         <p:spPr>
           <a:xfrm>
-            <a:off x="1712976" y="7315200"/>
+            <a:off x="1712976" y="4572000"/>
             <a:ext cx="8763000" cy="1993900"/>
           </a:xfrm>
           <a:prstGeom prst="rect">
@@ -14493,7 +14493,7 @@
         </p:nvSpPr>
         <p:spPr>
           <a:xfrm>
-            <a:off x="1712976" y="4064000"/>
+            <a:off x="1712976" y="1270000"/>
             <a:ext cx="7112000" cy="1993900"/>
           </a:xfrm>
           <a:prstGeom prst="rect">
@@ -14528,7 +14528,7 @@
         </p:nvSpPr>
         <p:spPr>
           <a:xfrm>
-            <a:off x="1712976" y="7315200"/>
+            <a:off x="1712976" y="4572000"/>
             <a:ext cx="8763000" cy="1993900"/>
           </a:xfrm>
           <a:prstGeom prst="rect">
@@ -14549,7 +14549,7 @@
                 </a:solidFill>
                 <a:latin typeface="MS Mincho"/>
               </a:rPr>
-              <a:t>弁護士: では、その理由を教えていただけますか？</a:t>
+              <a:t>弁護士: では その理由を教えていただけますか？</a:t>
             </a:r>
           </a:p>
           <a:p/>
@@ -14589,7 +14589,7 @@
         </p:nvSpPr>
         <p:spPr>
           <a:xfrm>
-            <a:off x="1712976" y="4064000"/>
+            <a:off x="1712976" y="1270000"/>
             <a:ext cx="7112000" cy="1993900"/>
           </a:xfrm>
           <a:prstGeom prst="rect">
@@ -14624,7 +14624,7 @@
         </p:nvSpPr>
         <p:spPr>
           <a:xfrm>
-            <a:off x="1712976" y="7315200"/>
+            <a:off x="1712976" y="4572000"/>
             <a:ext cx="8763000" cy="1993900"/>
           </a:xfrm>
           <a:prstGeom prst="rect">
@@ -14685,7 +14685,7 @@
         </p:nvSpPr>
         <p:spPr>
           <a:xfrm>
-            <a:off x="1712976" y="4064000"/>
+            <a:off x="1712976" y="1270000"/>
             <a:ext cx="7112000" cy="1993900"/>
           </a:xfrm>
           <a:prstGeom prst="rect">
@@ -14720,7 +14720,7 @@
         </p:nvSpPr>
         <p:spPr>
           <a:xfrm>
-            <a:off x="1712976" y="7315200"/>
+            <a:off x="1712976" y="4572000"/>
             <a:ext cx="8763000" cy="1993900"/>
           </a:xfrm>
           <a:prstGeom prst="rect">
@@ -14781,7 +14781,7 @@
         </p:nvSpPr>
         <p:spPr>
           <a:xfrm>
-            <a:off x="1712976" y="4064000"/>
+            <a:off x="1712976" y="1270000"/>
             <a:ext cx="7112000" cy="1993900"/>
           </a:xfrm>
           <a:prstGeom prst="rect">
@@ -14816,7 +14816,7 @@
         </p:nvSpPr>
         <p:spPr>
           <a:xfrm>
-            <a:off x="1712976" y="7315200"/>
+            <a:off x="1712976" y="4572000"/>
             <a:ext cx="8763000" cy="1993900"/>
           </a:xfrm>
           <a:prstGeom prst="rect">
@@ -14877,7 +14877,7 @@
         </p:nvSpPr>
         <p:spPr>
           <a:xfrm>
-            <a:off x="1712976" y="4064000"/>
+            <a:off x="1712976" y="1270000"/>
             <a:ext cx="7112000" cy="1993900"/>
           </a:xfrm>
           <a:prstGeom prst="rect">
@@ -14912,7 +14912,7 @@
         </p:nvSpPr>
         <p:spPr>
           <a:xfrm>
-            <a:off x="1712976" y="7315200"/>
+            <a:off x="1712976" y="4572000"/>
             <a:ext cx="8763000" cy="1993900"/>
           </a:xfrm>
           <a:prstGeom prst="rect">
@@ -14933,7 +14933,7 @@
                 </a:solidFill>
                 <a:latin typeface="MS Mincho"/>
               </a:rPr>
-              <a:t>弁護士: 大変なことかもしれないし、どうでもいいことかもしれません その二人はどこに行ったのですか？</a:t>
+              <a:t>弁護士: 大変なことかもしれないし どうでもいいことかもしれません その二人はどこに行ったのですか？</a:t>
             </a:r>
           </a:p>
           <a:p/>
@@ -14973,7 +14973,7 @@
         </p:nvSpPr>
         <p:spPr>
           <a:xfrm>
-            <a:off x="1712976" y="4064000"/>
+            <a:off x="1712976" y="1270000"/>
             <a:ext cx="7112000" cy="1993900"/>
           </a:xfrm>
           <a:prstGeom prst="rect">
@@ -15008,7 +15008,7 @@
         </p:nvSpPr>
         <p:spPr>
           <a:xfrm>
-            <a:off x="1712976" y="7315200"/>
+            <a:off x="1712976" y="4572000"/>
             <a:ext cx="8763000" cy="1993900"/>
           </a:xfrm>
           <a:prstGeom prst="rect">
@@ -15069,7 +15069,7 @@
         </p:nvSpPr>
         <p:spPr>
           <a:xfrm>
-            <a:off x="1712976" y="4064000"/>
+            <a:off x="1712976" y="1270000"/>
             <a:ext cx="7112000" cy="1993900"/>
           </a:xfrm>
           <a:prstGeom prst="rect">
@@ -15104,7 +15104,7 @@
         </p:nvSpPr>
         <p:spPr>
           <a:xfrm>
-            <a:off x="1712976" y="7315200"/>
+            <a:off x="1712976" y="4572000"/>
             <a:ext cx="8763000" cy="1993900"/>
           </a:xfrm>
           <a:prstGeom prst="rect">
@@ -15165,7 +15165,7 @@
         </p:nvSpPr>
         <p:spPr>
           <a:xfrm>
-            <a:off x="1712976" y="4064000"/>
+            <a:off x="1712976" y="1270000"/>
             <a:ext cx="7112000" cy="1993900"/>
           </a:xfrm>
           <a:prstGeom prst="rect">
@@ -15200,7 +15200,7 @@
         </p:nvSpPr>
         <p:spPr>
           <a:xfrm>
-            <a:off x="1712976" y="7315200"/>
+            <a:off x="1712976" y="4572000"/>
             <a:ext cx="8763000" cy="1993900"/>
           </a:xfrm>
           <a:prstGeom prst="rect">
@@ -15261,7 +15261,7 @@
         </p:nvSpPr>
         <p:spPr>
           <a:xfrm>
-            <a:off x="1712976" y="4064000"/>
+            <a:off x="1712976" y="1270000"/>
             <a:ext cx="7112000" cy="1993900"/>
           </a:xfrm>
           <a:prstGeom prst="rect">
@@ -15296,7 +15296,7 @@
         </p:nvSpPr>
         <p:spPr>
           <a:xfrm>
-            <a:off x="1712976" y="7315200"/>
+            <a:off x="1712976" y="4572000"/>
             <a:ext cx="8763000" cy="1993900"/>
           </a:xfrm>
           <a:prstGeom prst="rect">
@@ -15357,7 +15357,7 @@
         </p:nvSpPr>
         <p:spPr>
           <a:xfrm>
-            <a:off x="1712976" y="4064000"/>
+            <a:off x="1712976" y="1270000"/>
             <a:ext cx="7112000" cy="1993900"/>
           </a:xfrm>
           <a:prstGeom prst="rect">
@@ -15392,7 +15392,7 @@
         </p:nvSpPr>
         <p:spPr>
           <a:xfrm>
-            <a:off x="1712976" y="7315200"/>
+            <a:off x="1712976" y="4572000"/>
             <a:ext cx="8763000" cy="1993900"/>
           </a:xfrm>
           <a:prstGeom prst="rect">
@@ -15453,7 +15453,7 @@
         </p:nvSpPr>
         <p:spPr>
           <a:xfrm>
-            <a:off x="1712976" y="4064000"/>
+            <a:off x="1712976" y="1270000"/>
             <a:ext cx="7112000" cy="1993900"/>
           </a:xfrm>
           <a:prstGeom prst="rect">
@@ -15488,7 +15488,7 @@
         </p:nvSpPr>
         <p:spPr>
           <a:xfrm>
-            <a:off x="1712976" y="7315200"/>
+            <a:off x="1712976" y="4572000"/>
             <a:ext cx="8763000" cy="1993900"/>
           </a:xfrm>
           <a:prstGeom prst="rect">
@@ -15509,7 +15509,7 @@
                 </a:solidFill>
                 <a:latin typeface="MS Mincho"/>
               </a:rPr>
-              <a:t>マグダ: 告訴、するためです⋯⋯</a:t>
+              <a:t>マグダ: 告訴するためです</a:t>
             </a:r>
           </a:p>
           <a:p/>
@@ -15549,7 +15549,7 @@
         </p:nvSpPr>
         <p:spPr>
           <a:xfrm>
-            <a:off x="1712976" y="4064000"/>
+            <a:off x="1712976" y="1270000"/>
             <a:ext cx="7112000" cy="1993900"/>
           </a:xfrm>
           <a:prstGeom prst="rect">
@@ -15584,7 +15584,7 @@
         </p:nvSpPr>
         <p:spPr>
           <a:xfrm>
-            <a:off x="1712976" y="7315200"/>
+            <a:off x="1712976" y="4572000"/>
             <a:ext cx="8763000" cy="1993900"/>
           </a:xfrm>
           <a:prstGeom prst="rect">
@@ -15645,7 +15645,7 @@
         </p:nvSpPr>
         <p:spPr>
           <a:xfrm>
-            <a:off x="1712976" y="4064000"/>
+            <a:off x="1712976" y="1270000"/>
             <a:ext cx="7112000" cy="1993900"/>
           </a:xfrm>
           <a:prstGeom prst="rect">
@@ -15680,7 +15680,7 @@
         </p:nvSpPr>
         <p:spPr>
           <a:xfrm>
-            <a:off x="1712976" y="7315200"/>
+            <a:off x="1712976" y="4572000"/>
             <a:ext cx="8763000" cy="1993900"/>
           </a:xfrm>
           <a:prstGeom prst="rect">
@@ -15701,7 +15701,7 @@
                 </a:solidFill>
                 <a:latin typeface="MS Mincho"/>
               </a:rPr>
-              <a:t>マルガリータ: いえ、二人はそれぞれの名前で別々の部屋に泊まっています</a:t>
+              <a:t>マルガリータ: いえ 二人はそれぞれの名前で別々の部屋に泊まっています</a:t>
             </a:r>
           </a:p>
           <a:p/>
@@ -15741,7 +15741,7 @@
         </p:nvSpPr>
         <p:spPr>
           <a:xfrm>
-            <a:off x="1712976" y="4064000"/>
+            <a:off x="1712976" y="1270000"/>
             <a:ext cx="7112000" cy="1993900"/>
           </a:xfrm>
           <a:prstGeom prst="rect">
@@ -15776,7 +15776,7 @@
         </p:nvSpPr>
         <p:spPr>
           <a:xfrm>
-            <a:off x="1712976" y="7315200"/>
+            <a:off x="1712976" y="4572000"/>
             <a:ext cx="8763000" cy="1993900"/>
           </a:xfrm>
           <a:prstGeom prst="rect">
@@ -15837,7 +15837,7 @@
         </p:nvSpPr>
         <p:spPr>
           <a:xfrm>
-            <a:off x="1712976" y="4064000"/>
+            <a:off x="1712976" y="1270000"/>
             <a:ext cx="7112000" cy="1993900"/>
           </a:xfrm>
           <a:prstGeom prst="rect">
@@ -15872,7 +15872,7 @@
         </p:nvSpPr>
         <p:spPr>
           <a:xfrm>
-            <a:off x="1712976" y="7315200"/>
+            <a:off x="1712976" y="4572000"/>
             <a:ext cx="8763000" cy="1993900"/>
           </a:xfrm>
           <a:prstGeom prst="rect">
@@ -15893,7 +15893,7 @@
                 </a:solidFill>
                 <a:latin typeface="MS Mincho"/>
               </a:rPr>
-              <a:t>弁護士: ああ！良くない、非常に良くない 姦通の明確な証拠がありません</a:t>
+              <a:t>弁護士: ああ!良くない 非常に良くない 姦通の明確な証拠がありません</a:t>
             </a:r>
           </a:p>
           <a:p/>
@@ -15933,7 +15933,7 @@
         </p:nvSpPr>
         <p:spPr>
           <a:xfrm>
-            <a:off x="1712976" y="4064000"/>
+            <a:off x="1712976" y="1270000"/>
             <a:ext cx="7112000" cy="1993900"/>
           </a:xfrm>
           <a:prstGeom prst="rect">
@@ -15968,7 +15968,7 @@
         </p:nvSpPr>
         <p:spPr>
           <a:xfrm>
-            <a:off x="1712976" y="7315200"/>
+            <a:off x="1712976" y="4572000"/>
             <a:ext cx="8763000" cy="1993900"/>
           </a:xfrm>
           <a:prstGeom prst="rect">
@@ -16029,7 +16029,7 @@
         </p:nvSpPr>
         <p:spPr>
           <a:xfrm>
-            <a:off x="1712976" y="4064000"/>
+            <a:off x="1712976" y="1270000"/>
             <a:ext cx="7112000" cy="1993900"/>
           </a:xfrm>
           <a:prstGeom prst="rect">
@@ -16064,7 +16064,7 @@
         </p:nvSpPr>
         <p:spPr>
           <a:xfrm>
-            <a:off x="1712976" y="7315200"/>
+            <a:off x="1712976" y="4572000"/>
             <a:ext cx="8763000" cy="1993900"/>
           </a:xfrm>
           <a:prstGeom prst="rect">
@@ -16085,7 +16085,7 @@
                 </a:solidFill>
                 <a:latin typeface="MS Mincho"/>
               </a:rPr>
-              <a:t>弁護士: 姦通は、性交があった証言をする限りにおいて COMPROBATUM EST つまり立証されます</a:t>
+              <a:t>弁護士: 姦通は 性交があった証言をする限りにおいて COMPROBATUM EST つまり立証されます</a:t>
             </a:r>
           </a:p>
           <a:p/>
@@ -16125,7 +16125,7 @@
         </p:nvSpPr>
         <p:spPr>
           <a:xfrm>
-            <a:off x="1712976" y="4064000"/>
+            <a:off x="1712976" y="1270000"/>
             <a:ext cx="7112000" cy="1993900"/>
           </a:xfrm>
           <a:prstGeom prst="rect">
@@ -16160,7 +16160,7 @@
         </p:nvSpPr>
         <p:spPr>
           <a:xfrm>
-            <a:off x="1712976" y="7315200"/>
+            <a:off x="1712976" y="4572000"/>
             <a:ext cx="8763000" cy="1993900"/>
           </a:xfrm>
           <a:prstGeom prst="rect">
@@ -16181,7 +16181,7 @@
                 </a:solidFill>
                 <a:latin typeface="MS Mincho"/>
               </a:rPr>
-              <a:t>弁護士: それも、居合わせた目撃者が明白な誓いのもと！</a:t>
+              <a:t>弁護士: それも 居合わせた目撃者が明白な誓いのもと!</a:t>
             </a:r>
           </a:p>
           <a:p/>
@@ -16221,7 +16221,7 @@
         </p:nvSpPr>
         <p:spPr>
           <a:xfrm>
-            <a:off x="1712976" y="4064000"/>
+            <a:off x="1712976" y="1270000"/>
             <a:ext cx="7112000" cy="1993900"/>
           </a:xfrm>
           <a:prstGeom prst="rect">
@@ -16256,7 +16256,7 @@
         </p:nvSpPr>
         <p:spPr>
           <a:xfrm>
-            <a:off x="1712976" y="7315200"/>
+            <a:off x="1712976" y="4572000"/>
             <a:ext cx="8763000" cy="1993900"/>
           </a:xfrm>
           <a:prstGeom prst="rect">
@@ -16277,7 +16277,7 @@
                 </a:solidFill>
                 <a:latin typeface="MS Mincho"/>
               </a:rPr>
-              <a:t>弁護士: しかし、理解に努めましょう</a:t>
+              <a:t>弁護士: しかし 理解に努めましょう</a:t>
             </a:r>
           </a:p>
           <a:p/>
@@ -16317,7 +16317,7 @@
         </p:nvSpPr>
         <p:spPr>
           <a:xfrm>
-            <a:off x="1712976" y="4064000"/>
+            <a:off x="1712976" y="1270000"/>
             <a:ext cx="7112000" cy="1993900"/>
           </a:xfrm>
           <a:prstGeom prst="rect">
@@ -16352,7 +16352,7 @@
         </p:nvSpPr>
         <p:spPr>
           <a:xfrm>
-            <a:off x="1712976" y="7315200"/>
+            <a:off x="1712976" y="4572000"/>
             <a:ext cx="8763000" cy="1993900"/>
           </a:xfrm>
           <a:prstGeom prst="rect">
@@ -16373,7 +16373,7 @@
                 </a:solidFill>
                 <a:latin typeface="MS Mincho"/>
               </a:rPr>
-              <a:t>弁護士: 姦通を事実と認めるには、完全なる交が必要です</a:t>
+              <a:t>弁護士: 姦通を事実と認めるには 完全なる交が必要です</a:t>
             </a:r>
           </a:p>
           <a:p/>
@@ -16413,7 +16413,7 @@
         </p:nvSpPr>
         <p:spPr>
           <a:xfrm>
-            <a:off x="1712976" y="4064000"/>
+            <a:off x="1712976" y="1270000"/>
             <a:ext cx="7112000" cy="1993900"/>
           </a:xfrm>
           <a:prstGeom prst="rect">
@@ -16448,7 +16448,7 @@
         </p:nvSpPr>
         <p:spPr>
           <a:xfrm>
-            <a:off x="1712976" y="7315200"/>
+            <a:off x="1712976" y="4572000"/>
             <a:ext cx="8763000" cy="1993900"/>
           </a:xfrm>
           <a:prstGeom prst="rect">
@@ -16469,7 +16469,7 @@
                 </a:solidFill>
                 <a:latin typeface="MS Mincho"/>
               </a:rPr>
-              <a:t>弁護士: つまり、完全な射精における精液の放出をともなう男性器の女性器への挿入です</a:t>
+              <a:t>弁護士: つまり 完全な射精における精液の放出をともなう男性器の女性器への挿入です</a:t>
             </a:r>
           </a:p>
           <a:p/>
@@ -16509,7 +16509,7 @@
         </p:nvSpPr>
         <p:spPr>
           <a:xfrm>
-            <a:off x="1712976" y="4064000"/>
+            <a:off x="1712976" y="1270000"/>
             <a:ext cx="7112000" cy="1993900"/>
           </a:xfrm>
           <a:prstGeom prst="rect">
@@ -16544,7 +16544,7 @@
         </p:nvSpPr>
         <p:spPr>
           <a:xfrm>
-            <a:off x="1712976" y="7315200"/>
+            <a:off x="1712976" y="4572000"/>
             <a:ext cx="8763000" cy="1993900"/>
           </a:xfrm>
           <a:prstGeom prst="rect">
@@ -16605,7 +16605,7 @@
         </p:nvSpPr>
         <p:spPr>
           <a:xfrm>
-            <a:off x="1712976" y="4064000"/>
+            <a:off x="1712976" y="1270000"/>
             <a:ext cx="7112000" cy="1993900"/>
           </a:xfrm>
           <a:prstGeom prst="rect">
@@ -16640,7 +16640,7 @@
         </p:nvSpPr>
         <p:spPr>
           <a:xfrm>
-            <a:off x="1712976" y="7315200"/>
+            <a:off x="1712976" y="4572000"/>
             <a:ext cx="8763000" cy="1993900"/>
           </a:xfrm>
           <a:prstGeom prst="rect">
@@ -16661,7 +16661,7 @@
                 </a:solidFill>
                 <a:latin typeface="MS Mincho"/>
               </a:rPr>
-              <a:t>弁護士: そのような射精の検証には、その場に居合わせて即座に目で見ることは必要とされず、</a:t>
+              <a:t>弁護士: そのような射精の検証には その場に居合わせて即座に目で見ることは必要とされず </a:t>
             </a:r>
           </a:p>
           <a:p/>
@@ -16701,7 +16701,7 @@
         </p:nvSpPr>
         <p:spPr>
           <a:xfrm>
-            <a:off x="1712976" y="4064000"/>
+            <a:off x="1712976" y="1270000"/>
             <a:ext cx="7112000" cy="1993900"/>
           </a:xfrm>
           <a:prstGeom prst="rect">
@@ -16736,7 +16736,7 @@
         </p:nvSpPr>
         <p:spPr>
           <a:xfrm>
-            <a:off x="1712976" y="7315200"/>
+            <a:off x="1712976" y="4572000"/>
             <a:ext cx="8763000" cy="1993900"/>
           </a:xfrm>
           <a:prstGeom prst="rect">
@@ -16757,7 +16757,7 @@
                 </a:solidFill>
                 <a:latin typeface="MS Mincho"/>
               </a:rPr>
-              <a:t>弁護士: 染みが付いたばかりのシーツなど、外から見て十分といえる印で大丈夫です</a:t>
+              <a:t>弁護士: 染みが付いたばかりのシーツなど 外から見て十分といえる印で大丈夫です</a:t>
             </a:r>
           </a:p>
           <a:p/>
@@ -16797,7 +16797,7 @@
         </p:nvSpPr>
         <p:spPr>
           <a:xfrm>
-            <a:off x="1712976" y="4064000"/>
+            <a:off x="1712976" y="1270000"/>
             <a:ext cx="7112000" cy="1993900"/>
           </a:xfrm>
           <a:prstGeom prst="rect">
@@ -16832,7 +16832,7 @@
         </p:nvSpPr>
         <p:spPr>
           <a:xfrm>
-            <a:off x="1712976" y="7315200"/>
+            <a:off x="1712976" y="4572000"/>
             <a:ext cx="8763000" cy="1993900"/>
           </a:xfrm>
           <a:prstGeom prst="rect">
@@ -16893,7 +16893,7 @@
         </p:nvSpPr>
         <p:spPr>
           <a:xfrm>
-            <a:off x="1712976" y="4064000"/>
+            <a:off x="1712976" y="1270000"/>
             <a:ext cx="7112000" cy="1993900"/>
           </a:xfrm>
           <a:prstGeom prst="rect">
@@ -16928,7 +16928,7 @@
         </p:nvSpPr>
         <p:spPr>
           <a:xfrm>
-            <a:off x="1712976" y="7315200"/>
+            <a:off x="1712976" y="4572000"/>
             <a:ext cx="8763000" cy="1993900"/>
           </a:xfrm>
           <a:prstGeom prst="rect">
@@ -16949,7 +16949,7 @@
                 </a:solidFill>
                 <a:latin typeface="MS Mincho"/>
               </a:rPr>
-              <a:t>弁護士: そんな形跡もないのに、どう証拠を提示するのですか？</a:t>
+              <a:t>弁護士: そんな形跡もないのに どう証拠を提示するのですか？</a:t>
             </a:r>
           </a:p>
           <a:p/>
@@ -16989,7 +16989,7 @@
         </p:nvSpPr>
         <p:spPr>
           <a:xfrm>
-            <a:off x="1712976" y="4064000"/>
+            <a:off x="1712976" y="1270000"/>
             <a:ext cx="7112000" cy="1993900"/>
           </a:xfrm>
           <a:prstGeom prst="rect">
@@ -17024,7 +17024,7 @@
         </p:nvSpPr>
         <p:spPr>
           <a:xfrm>
-            <a:off x="1712976" y="7315200"/>
+            <a:off x="1712976" y="4572000"/>
             <a:ext cx="8763000" cy="1993900"/>
           </a:xfrm>
           <a:prstGeom prst="rect">
@@ -17085,7 +17085,7 @@
         </p:nvSpPr>
         <p:spPr>
           <a:xfrm>
-            <a:off x="1712976" y="4064000"/>
+            <a:off x="1712976" y="1270000"/>
             <a:ext cx="7112000" cy="1993900"/>
           </a:xfrm>
           <a:prstGeom prst="rect">
@@ -17120,7 +17120,7 @@
         </p:nvSpPr>
         <p:spPr>
           <a:xfrm>
-            <a:off x="1712976" y="7315200"/>
+            <a:off x="1712976" y="4572000"/>
             <a:ext cx="8763000" cy="1993900"/>
           </a:xfrm>
           <a:prstGeom prst="rect">
@@ -17141,7 +17141,7 @@
                 </a:solidFill>
                 <a:latin typeface="MS Mincho"/>
               </a:rPr>
-              <a:t>マルガリータ: でも、主人はその女性と2年前から付き合っています</a:t>
+              <a:t>マルガリータ: でも 主人はその女性と2年前から付き合っています</a:t>
             </a:r>
           </a:p>
           <a:p/>
@@ -17181,7 +17181,7 @@
         </p:nvSpPr>
         <p:spPr>
           <a:xfrm>
-            <a:off x="1712976" y="4064000"/>
+            <a:off x="1712976" y="1270000"/>
             <a:ext cx="7112000" cy="1993900"/>
           </a:xfrm>
           <a:prstGeom prst="rect">
@@ -17216,7 +17216,7 @@
         </p:nvSpPr>
         <p:spPr>
           <a:xfrm>
-            <a:off x="1712976" y="7315200"/>
+            <a:off x="1712976" y="4572000"/>
             <a:ext cx="8763000" cy="1993900"/>
           </a:xfrm>
           <a:prstGeom prst="rect">
@@ -17277,7 +17277,7 @@
         </p:nvSpPr>
         <p:spPr>
           <a:xfrm>
-            <a:off x="1712976" y="4064000"/>
+            <a:off x="1712976" y="1270000"/>
             <a:ext cx="7112000" cy="1993900"/>
           </a:xfrm>
           <a:prstGeom prst="rect">
@@ -17312,7 +17312,7 @@
         </p:nvSpPr>
         <p:spPr>
           <a:xfrm>
-            <a:off x="1712976" y="7315200"/>
+            <a:off x="1712976" y="4572000"/>
             <a:ext cx="8763000" cy="1993900"/>
           </a:xfrm>
           <a:prstGeom prst="rect">
@@ -17333,7 +17333,7 @@
                 </a:solidFill>
                 <a:latin typeface="MS Mincho"/>
               </a:rPr>
-              <a:t>マルガリータ: しかも、アパートを借りていて、仕事のあとは一緒にそこに行くのです</a:t>
+              <a:t>マルガリータ: しかも アパートを借りていて 仕事のあとは一緒にそこに行くのです</a:t>
             </a:r>
           </a:p>
           <a:p/>
@@ -17373,7 +17373,7 @@
         </p:nvSpPr>
         <p:spPr>
           <a:xfrm>
-            <a:off x="1712976" y="4064000"/>
+            <a:off x="1712976" y="1270000"/>
             <a:ext cx="7112000" cy="1993900"/>
           </a:xfrm>
           <a:prstGeom prst="rect">
@@ -17408,7 +17408,7 @@
         </p:nvSpPr>
         <p:spPr>
           <a:xfrm>
-            <a:off x="1712976" y="7315200"/>
+            <a:off x="1712976" y="4572000"/>
             <a:ext cx="8763000" cy="1993900"/>
           </a:xfrm>
           <a:prstGeom prst="rect">
@@ -17469,7 +17469,7 @@
         </p:nvSpPr>
         <p:spPr>
           <a:xfrm>
-            <a:off x="1712976" y="4064000"/>
+            <a:off x="1712976" y="1270000"/>
             <a:ext cx="7112000" cy="1993900"/>
           </a:xfrm>
           <a:prstGeom prst="rect">
@@ -17504,7 +17504,7 @@
         </p:nvSpPr>
         <p:spPr>
           <a:xfrm>
-            <a:off x="1712976" y="7315200"/>
+            <a:off x="1712976" y="4572000"/>
             <a:ext cx="8763000" cy="1993900"/>
           </a:xfrm>
           <a:prstGeom prst="rect">
@@ -17525,7 +17525,7 @@
                 </a:solidFill>
                 <a:latin typeface="MS Mincho"/>
               </a:rPr>
-              <a:t>弁護士: 徴候、憶測、ああでもない、こうでもない！</a:t>
+              <a:t>弁護士: 徴候 憶測 ああでもない こうでもない!</a:t>
             </a:r>
           </a:p>
           <a:p/>
@@ -17565,7 +17565,7 @@
         </p:nvSpPr>
         <p:spPr>
           <a:xfrm>
-            <a:off x="1712976" y="4064000"/>
+            <a:off x="1712976" y="1270000"/>
             <a:ext cx="7112000" cy="1993900"/>
           </a:xfrm>
           <a:prstGeom prst="rect">
@@ -17600,7 +17600,7 @@
         </p:nvSpPr>
         <p:spPr>
           <a:xfrm>
-            <a:off x="1712976" y="7315200"/>
+            <a:off x="1712976" y="4572000"/>
             <a:ext cx="8763000" cy="1993900"/>
           </a:xfrm>
           <a:prstGeom prst="rect">
@@ -17661,7 +17661,7 @@
         </p:nvSpPr>
         <p:spPr>
           <a:xfrm>
-            <a:off x="1712976" y="4064000"/>
+            <a:off x="1712976" y="1270000"/>
             <a:ext cx="7112000" cy="1993900"/>
           </a:xfrm>
           <a:prstGeom prst="rect">
@@ -17696,7 +17696,7 @@
         </p:nvSpPr>
         <p:spPr>
           <a:xfrm>
-            <a:off x="1712976" y="7315200"/>
+            <a:off x="1712976" y="4572000"/>
             <a:ext cx="8763000" cy="1993900"/>
           </a:xfrm>
           <a:prstGeom prst="rect">
@@ -17717,7 +17717,7 @@
                 </a:solidFill>
                 <a:latin typeface="MS Mincho"/>
               </a:rPr>
-              <a:t>弁護士: それは教会裁判所で姦通の疑いによる別居手続きには十分だったでしょうが、</a:t>
+              <a:t>弁護士: それは教会裁判所で姦通の疑いによる別居手続きには十分だったでしょうが </a:t>
             </a:r>
           </a:p>
           <a:p/>
@@ -17757,7 +17757,7 @@
         </p:nvSpPr>
         <p:spPr>
           <a:xfrm>
-            <a:off x="1712976" y="4064000"/>
+            <a:off x="1712976" y="1270000"/>
             <a:ext cx="7112000" cy="1993900"/>
           </a:xfrm>
           <a:prstGeom prst="rect">
@@ -17792,7 +17792,7 @@
         </p:nvSpPr>
         <p:spPr>
           <a:xfrm>
-            <a:off x="1712976" y="7315200"/>
+            <a:off x="1712976" y="4572000"/>
             <a:ext cx="8763000" cy="1993900"/>
           </a:xfrm>
           <a:prstGeom prst="rect">
@@ -17813,7 +17813,7 @@
                 </a:solidFill>
                 <a:latin typeface="MS Mincho"/>
               </a:rPr>
-              <a:t>弁護士: いまのご時勢はですね奥さん、恩知らずなことに教会の司法権が軽んじられ</a:t>
+              <a:t>弁護士: いまのご時勢はですね奥さん 恩知らずなことに教会の司法権が軽んじられ</a:t>
             </a:r>
           </a:p>
           <a:p/>
@@ -17853,7 +17853,7 @@
         </p:nvSpPr>
         <p:spPr>
           <a:xfrm>
-            <a:off x="1712976" y="4064000"/>
+            <a:off x="1712976" y="1270000"/>
             <a:ext cx="7112000" cy="1993900"/>
           </a:xfrm>
           <a:prstGeom prst="rect">
@@ -17888,7 +17888,7 @@
         </p:nvSpPr>
         <p:spPr>
           <a:xfrm>
-            <a:off x="1712976" y="7315200"/>
+            <a:off x="1712976" y="4572000"/>
             <a:ext cx="8763000" cy="1993900"/>
           </a:xfrm>
           <a:prstGeom prst="rect">
@@ -17949,7 +17949,7 @@
         </p:nvSpPr>
         <p:spPr>
           <a:xfrm>
-            <a:off x="1712976" y="4064000"/>
+            <a:off x="1712976" y="1270000"/>
             <a:ext cx="7112000" cy="1993900"/>
           </a:xfrm>
           <a:prstGeom prst="rect">
@@ -17984,7 +17984,7 @@
         </p:nvSpPr>
         <p:spPr>
           <a:xfrm>
-            <a:off x="1712976" y="7315200"/>
+            <a:off x="1712976" y="4572000"/>
             <a:ext cx="8763000" cy="1993900"/>
           </a:xfrm>
           <a:prstGeom prst="rect">
@@ -18045,7 +18045,7 @@
         </p:nvSpPr>
         <p:spPr>
           <a:xfrm>
-            <a:off x="1712976" y="4064000"/>
+            <a:off x="1712976" y="1270000"/>
             <a:ext cx="7112000" cy="1993900"/>
           </a:xfrm>
           <a:prstGeom prst="rect">
@@ -18080,7 +18080,7 @@
         </p:nvSpPr>
         <p:spPr>
           <a:xfrm>
-            <a:off x="1712976" y="7315200"/>
+            <a:off x="1712976" y="4572000"/>
             <a:ext cx="8763000" cy="1993900"/>
           </a:xfrm>
           <a:prstGeom prst="rect">
@@ -18101,7 +18101,7 @@
                 </a:solidFill>
                 <a:latin typeface="MS Mincho"/>
               </a:rPr>
-              <a:t>弁護士: 別居手続きにとりかかるための反証できない、疑う余地のない、証拠を！</a:t>
+              <a:t>弁護士: 別居手続きにとりかかるための反証できない 疑う余地のない 証拠を!</a:t>
             </a:r>
           </a:p>
           <a:p/>
@@ -18141,7 +18141,7 @@
         </p:nvSpPr>
         <p:spPr>
           <a:xfrm>
-            <a:off x="1712976" y="4064000"/>
+            <a:off x="1712976" y="1270000"/>
             <a:ext cx="7112000" cy="1993900"/>
           </a:xfrm>
           <a:prstGeom prst="rect">
@@ -18176,7 +18176,7 @@
         </p:nvSpPr>
         <p:spPr>
           <a:xfrm>
-            <a:off x="1712976" y="7315200"/>
+            <a:off x="1712976" y="4572000"/>
             <a:ext cx="8763000" cy="1993900"/>
           </a:xfrm>
           <a:prstGeom prst="rect">
@@ -18197,7 +18197,7 @@
                 </a:solidFill>
                 <a:latin typeface="MS Mincho"/>
               </a:rPr>
-              <a:t>マルガリータ: それに、中人は家を出て行って、彼女と一緒にいるのですよ！</a:t>
+              <a:t>マルガリータ: それに 中人は家を出て行って 彼女と一緒にいるのですよ!</a:t>
             </a:r>
           </a:p>
           <a:p/>
@@ -18237,7 +18237,7 @@
         </p:nvSpPr>
         <p:spPr>
           <a:xfrm>
-            <a:off x="1712976" y="4064000"/>
+            <a:off x="1712976" y="1270000"/>
             <a:ext cx="7112000" cy="1993900"/>
           </a:xfrm>
           <a:prstGeom prst="rect">
@@ -18272,7 +18272,7 @@
         </p:nvSpPr>
         <p:spPr>
           <a:xfrm>
-            <a:off x="1712976" y="7315200"/>
+            <a:off x="1712976" y="4572000"/>
             <a:ext cx="8763000" cy="1993900"/>
           </a:xfrm>
           <a:prstGeom prst="rect">
@@ -18293,7 +18293,7 @@
                 </a:solidFill>
                 <a:latin typeface="MS Mincho"/>
               </a:rPr>
-              <a:t>マルガリータ: 休暇を取った1ヶ月は戻ってこないつもりです、</a:t>
+              <a:t>マルガリータ: 休暇を取った1ヶ月は戻ってこないつもりです </a:t>
             </a:r>
           </a:p>
           <a:p/>
@@ -18333,7 +18333,7 @@
         </p:nvSpPr>
         <p:spPr>
           <a:xfrm>
-            <a:off x="1712976" y="4064000"/>
+            <a:off x="1712976" y="1270000"/>
             <a:ext cx="7112000" cy="1993900"/>
           </a:xfrm>
           <a:prstGeom prst="rect">
@@ -18368,7 +18368,7 @@
         </p:nvSpPr>
         <p:spPr>
           <a:xfrm>
-            <a:off x="1712976" y="7315200"/>
+            <a:off x="1712976" y="4572000"/>
             <a:ext cx="8763000" cy="1993900"/>
           </a:xfrm>
           <a:prstGeom prst="rect">
@@ -18389,7 +18389,7 @@
                 </a:solidFill>
                 <a:latin typeface="MS Mincho"/>
               </a:rPr>
-              <a:t>マルガリータ: 私一人をバルセロナのマンションに子供と残して、しかも5ペセタのお金もなしに</a:t>
+              <a:t>マルガリータ: 私一人をバルセロナのマンションに子供と残して しかも5ペセタのお金もなしに</a:t>
             </a:r>
           </a:p>
           <a:p/>
@@ -18429,7 +18429,7 @@
         </p:nvSpPr>
         <p:spPr>
           <a:xfrm>
-            <a:off x="1712976" y="4064000"/>
+            <a:off x="1712976" y="1270000"/>
             <a:ext cx="7112000" cy="1993900"/>
           </a:xfrm>
           <a:prstGeom prst="rect">
@@ -18464,7 +18464,7 @@
         </p:nvSpPr>
         <p:spPr>
           <a:xfrm>
-            <a:off x="1712976" y="7315200"/>
+            <a:off x="1712976" y="4572000"/>
             <a:ext cx="8763000" cy="1993900"/>
           </a:xfrm>
           <a:prstGeom prst="rect">
@@ -18485,7 +18485,7 @@
                 </a:solidFill>
                 <a:latin typeface="MS Mincho"/>
               </a:rPr>
-              <a:t>マルガリータ: 昨日は、料金未納のため電気が止められました</a:t>
+              <a:t>マルガリータ: 昨日は 料金未納のため電気が止められました</a:t>
             </a:r>
           </a:p>
           <a:p/>
@@ -18525,7 +18525,7 @@
         </p:nvSpPr>
         <p:spPr>
           <a:xfrm>
-            <a:off x="1712976" y="4064000"/>
+            <a:off x="1712976" y="1270000"/>
             <a:ext cx="7112000" cy="1993900"/>
           </a:xfrm>
           <a:prstGeom prst="rect">
@@ -18560,7 +18560,7 @@
         </p:nvSpPr>
         <p:spPr>
           <a:xfrm>
-            <a:off x="1712976" y="7315200"/>
+            <a:off x="1712976" y="4572000"/>
             <a:ext cx="8763000" cy="1993900"/>
           </a:xfrm>
           <a:prstGeom prst="rect">
@@ -18581,7 +18581,7 @@
                 </a:solidFill>
                 <a:latin typeface="MS Mincho"/>
               </a:rPr>
-              <a:t>マルガリータ: それって家族の放棄です、しかも悪意のある！</a:t>
+              <a:t>マルガリータ: それって家族の放棄です しかも悪意のある!</a:t>
             </a:r>
           </a:p>
           <a:p/>

</xml_diff>

<commit_message>
Add last commit before new branch
</commit_message>
<xml_diff>
--- a/complete-cap.pptx
+++ b/complete-cap.pptx
@@ -5430,7 +5430,7 @@
                 </a:solidFill>
                 <a:latin typeface="MS Mincho"/>
               </a:rPr>
-              <a:t>第三場 精神科にて</a:t>
+              <a:t>第三場 心療内科クリニックにて</a:t>
             </a:r>
           </a:p>
           <a:p/>
@@ -7062,7 +7062,7 @@
                 </a:solidFill>
                 <a:latin typeface="MS Mincho"/>
               </a:rPr>
-              <a:t>声: そんな乱れた関係は あなたが未熟で まだ口答期を乗り越えていない証拠です</a:t>
+              <a:t>声: そんな乱れた関係は あなたが未熟で まだ口唇期を乗り越えていない証拠です</a:t>
             </a:r>
           </a:p>
           <a:p/>
@@ -8563,7 +8563,7 @@
                 </a:solidFill>
                 <a:latin typeface="Times New Roman"/>
               </a:rPr>
-              <a:t>MARÍA. - Me di cuenta cuando es había ido, me lo quitó del joyero... </a:t>
+              <a:t>MARÍA. - Me di cuenta cuando se había ido, me lo quitó del joyero... </a:t>
             </a:r>
           </a:p>
           <a:p/>
@@ -13492,7 +13492,7 @@
                 </a:solidFill>
                 <a:latin typeface="MS Mincho"/>
               </a:rPr>
-              <a:t>警部: 祖国の危機の最中 あなたは平手打のようなものにに泣いている!</a:t>
+              <a:t>警部: 祖国の危機の最中 あなたは平手打のようなものに泣いている!</a:t>
             </a:r>
           </a:p>
           <a:p/>
@@ -13841,7 +13841,7 @@
                 </a:solidFill>
                 <a:latin typeface="Times New Roman"/>
               </a:rPr>
-              <a:t>INSPECTOR, - Ande, ¡váyase! ¡Váyase de una vez y por ésta se lo perdodo!</a:t>
+              <a:t>INSPECTOR, - Ande, ¡váyase! ¡Váyase de una vez y por ésta se lo perdono!</a:t>
             </a:r>
           </a:p>
           <a:p/>
@@ -14164,7 +14164,7 @@
                 </a:solidFill>
                 <a:latin typeface="MS Mincho"/>
               </a:rPr>
-              <a:t>第二場 法律相談所にて</a:t>
+              <a:t>第二場 弁護士事務所</a:t>
             </a:r>
           </a:p>
           <a:p/>
@@ -14356,7 +14356,7 @@
                 </a:solidFill>
                 <a:latin typeface="MS Mincho"/>
               </a:rPr>
-              <a:t>警部: なぜ?</a:t>
+              <a:t>警部: 何のために?</a:t>
             </a:r>
           </a:p>
           <a:p/>
@@ -16084,7 +16084,7 @@
                 </a:solidFill>
                 <a:latin typeface="MS Mincho"/>
               </a:rPr>
-              <a:t>弁護士: それも 居合わせた目撃者が明白な誓いのもと!</a:t>
+              <a:t>弁護士: それも 居合わせた目撃者の明白な誓いのもと!</a:t>
             </a:r>
           </a:p>
           <a:p/>
@@ -16276,7 +16276,7 @@
                 </a:solidFill>
                 <a:latin typeface="MS Mincho"/>
               </a:rPr>
-              <a:t>弁護士: 姦通を事実と認めるには 完全なる交が必要です</a:t>
+              <a:t>弁護士: 姦通を事実と認めるには 完全なる性交が必要です</a:t>
             </a:r>
           </a:p>
           <a:p/>
@@ -17201,7 +17201,7 @@
                 </a:solidFill>
                 <a:latin typeface="Times New Roman"/>
               </a:rPr>
-              <a:t>MARGARITA. - También tiene alquilado un apar- tamento donde van juntos al terminar el trabajo</a:t>
+              <a:t>MARGARITA. - También tiene alquilado un apartamento donde van juntos al terminar el trabajo</a:t>
             </a:r>
           </a:p>
           <a:p/>
@@ -18100,7 +18100,7 @@
                 </a:solidFill>
                 <a:latin typeface="MS Mincho"/>
               </a:rPr>
-              <a:t>マルガリータ: それに 中人は家を出て行って 彼女と一緒にいるのですよ!</a:t>
+              <a:t>マルガリータ: それに 主人は家を出て行って 彼女と一緒にいるのですよ!</a:t>
             </a:r>
           </a:p>
           <a:p/>

</xml_diff>